<commit_message>
more progress on n1ql details
</commit_message>
<xml_diff>
--- a/server/presentations/07_N1QL Details.pptx
+++ b/server/presentations/07_N1QL Details.pptx
@@ -604,11 +604,11 @@
           <c:showBubbleSize val="0"/>
         </c:dLbls>
         <c:gapWidth val="150"/>
-        <c:axId val="-2084026952"/>
-        <c:axId val="-2081221512"/>
+        <c:axId val="-2081564648"/>
+        <c:axId val="-2081561320"/>
       </c:barChart>
       <c:catAx>
-        <c:axId val="-2084026952"/>
+        <c:axId val="-2081564648"/>
         <c:scaling>
           <c:orientation val="minMax"/>
         </c:scaling>
@@ -634,7 +634,7 @@
             <a:endParaRPr lang="de-DE"/>
           </a:p>
         </c:txPr>
-        <c:crossAx val="-2081221512"/>
+        <c:crossAx val="-2081561320"/>
         <c:crosses val="autoZero"/>
         <c:auto val="1"/>
         <c:lblAlgn val="ctr"/>
@@ -642,7 +642,7 @@
         <c:noMultiLvlLbl val="0"/>
       </c:catAx>
       <c:valAx>
-        <c:axId val="-2081221512"/>
+        <c:axId val="-2081561320"/>
         <c:scaling>
           <c:orientation val="minMax"/>
         </c:scaling>
@@ -684,7 +684,7 @@
             <a:endParaRPr lang="de-DE"/>
           </a:p>
         </c:txPr>
-        <c:crossAx val="-2084026952"/>
+        <c:crossAx val="-2081564648"/>
         <c:crosses val="autoZero"/>
         <c:crossBetween val="between"/>
       </c:valAx>
@@ -926,11 +926,11 @@
           <c:showBubbleSize val="0"/>
         </c:dLbls>
         <c:gapWidth val="150"/>
-        <c:axId val="-2092527144"/>
-        <c:axId val="-2092523928"/>
+        <c:axId val="-2069488232"/>
+        <c:axId val="-2069484904"/>
       </c:barChart>
       <c:catAx>
-        <c:axId val="-2092527144"/>
+        <c:axId val="-2069488232"/>
         <c:scaling>
           <c:orientation val="minMax"/>
         </c:scaling>
@@ -956,7 +956,7 @@
             <a:endParaRPr lang="de-DE"/>
           </a:p>
         </c:txPr>
-        <c:crossAx val="-2092523928"/>
+        <c:crossAx val="-2069484904"/>
         <c:crosses val="autoZero"/>
         <c:auto val="1"/>
         <c:lblAlgn val="ctr"/>
@@ -964,7 +964,7 @@
         <c:noMultiLvlLbl val="0"/>
       </c:catAx>
       <c:valAx>
-        <c:axId val="-2092523928"/>
+        <c:axId val="-2069484904"/>
         <c:scaling>
           <c:orientation val="minMax"/>
         </c:scaling>
@@ -1006,7 +1006,7 @@
             <a:endParaRPr lang="de-DE"/>
           </a:p>
         </c:txPr>
-        <c:crossAx val="-2092527144"/>
+        <c:crossAx val="-2069488232"/>
         <c:crosses val="autoZero"/>
         <c:crossBetween val="between"/>
       </c:valAx>
@@ -1256,11 +1256,11 @@
         </c:dLbls>
         <c:marker val="1"/>
         <c:smooth val="0"/>
-        <c:axId val="-2147303112"/>
-        <c:axId val="-2092769208"/>
+        <c:axId val="-2069466872"/>
+        <c:axId val="-2069463544"/>
       </c:lineChart>
       <c:catAx>
-        <c:axId val="-2147303112"/>
+        <c:axId val="-2069466872"/>
         <c:scaling>
           <c:orientation val="minMax"/>
         </c:scaling>
@@ -1286,7 +1286,7 @@
             <a:endParaRPr lang="de-DE"/>
           </a:p>
         </c:txPr>
-        <c:crossAx val="-2092769208"/>
+        <c:crossAx val="-2069463544"/>
         <c:crosses val="autoZero"/>
         <c:auto val="1"/>
         <c:lblAlgn val="ctr"/>
@@ -1294,7 +1294,7 @@
         <c:noMultiLvlLbl val="0"/>
       </c:catAx>
       <c:valAx>
-        <c:axId val="-2092769208"/>
+        <c:axId val="-2069463544"/>
         <c:scaling>
           <c:orientation val="minMax"/>
         </c:scaling>
@@ -1334,7 +1334,7 @@
             <a:endParaRPr lang="de-DE"/>
           </a:p>
         </c:txPr>
-        <c:crossAx val="-2147303112"/>
+        <c:crossAx val="-2069466872"/>
         <c:crosses val="autoZero"/>
         <c:crossBetween val="between"/>
       </c:valAx>
@@ -4911,10 +4911,6 @@
           <a:bodyPr/>
           <a:lstStyle/>
           <a:p>
-            <a:r>
-              <a:rPr lang="en-US" dirty="0" smtClean="0"/>
-              <a:t>Subtitle</a:t>
-            </a:r>
             <a:endParaRPr lang="en-US" dirty="0"/>
           </a:p>
         </p:txBody>
@@ -15867,7 +15863,6 @@
               <a:rPr lang="en-US" dirty="0" smtClean="0"/>
               <a:t>Are the backing data structure for N1QL</a:t>
             </a:r>
-            <a:endParaRPr lang="en-US" dirty="0" smtClean="0"/>
           </a:p>
           <a:p>
             <a:pPr>
@@ -15877,13 +15872,8 @@
             </a:pPr>
             <a:r>
               <a:rPr lang="en-US" dirty="0" smtClean="0"/>
-              <a:t>Optimize the data lookup path for the query </a:t>
-            </a:r>
-            <a:r>
-              <a:rPr lang="en-US" dirty="0" smtClean="0"/>
-              <a:t>engine (“avoiding the full table scan”)</a:t>
-            </a:r>
-            <a:endParaRPr lang="en-US" dirty="0" smtClean="0"/>
+              <a:t>Optimize the data lookup path for the query engine (“avoiding the full table scan”)</a:t>
+            </a:r>
           </a:p>
           <a:p>
             <a:pPr>
@@ -15933,286 +15923,9 @@
   <p:timing>
     <p:tnLst>
       <p:par>
-        <p:cTn xmlns:p14="http://schemas.microsoft.com/office/powerpoint/2010/main" id="1" dur="indefinite" restart="never" nodeType="tmRoot">
-          <p:childTnLst>
-            <p:seq concurrent="1" nextAc="seek">
-              <p:cTn id="2" dur="indefinite" nodeType="mainSeq">
-                <p:childTnLst>
-                  <p:par>
-                    <p:cTn id="3" fill="hold">
-                      <p:stCondLst>
-                        <p:cond delay="indefinite"/>
-                      </p:stCondLst>
-                      <p:childTnLst>
-                        <p:par>
-                          <p:cTn id="4" fill="hold">
-                            <p:stCondLst>
-                              <p:cond delay="0"/>
-                            </p:stCondLst>
-                            <p:childTnLst>
-                              <p:par>
-                                <p:cTn id="5" presetID="10" presetClass="entr" presetSubtype="0" fill="hold" grpId="0" nodeType="clickEffect">
-                                  <p:stCondLst>
-                                    <p:cond delay="0"/>
-                                  </p:stCondLst>
-                                  <p:childTnLst>
-                                    <p:set>
-                                      <p:cBhvr>
-                                        <p:cTn id="6" dur="1" fill="hold">
-                                          <p:stCondLst>
-                                            <p:cond delay="0"/>
-                                          </p:stCondLst>
-                                        </p:cTn>
-                                        <p:tgtEl>
-                                          <p:spTgt spid="3">
-                                            <p:txEl>
-                                              <p:pRg st="0" end="0"/>
-                                            </p:txEl>
-                                          </p:spTgt>
-                                        </p:tgtEl>
-                                        <p:attrNameLst>
-                                          <p:attrName>style.visibility</p:attrName>
-                                        </p:attrNameLst>
-                                      </p:cBhvr>
-                                      <p:to>
-                                        <p:strVal val="visible"/>
-                                      </p:to>
-                                    </p:set>
-                                    <p:animEffect transition="in" filter="fade">
-                                      <p:cBhvr>
-                                        <p:cTn id="7" dur="500"/>
-                                        <p:tgtEl>
-                                          <p:spTgt spid="3">
-                                            <p:txEl>
-                                              <p:pRg st="0" end="0"/>
-                                            </p:txEl>
-                                          </p:spTgt>
-                                        </p:tgtEl>
-                                      </p:cBhvr>
-                                    </p:animEffect>
-                                  </p:childTnLst>
-                                </p:cTn>
-                              </p:par>
-                            </p:childTnLst>
-                          </p:cTn>
-                        </p:par>
-                      </p:childTnLst>
-                    </p:cTn>
-                  </p:par>
-                  <p:par>
-                    <p:cTn id="8" fill="hold">
-                      <p:stCondLst>
-                        <p:cond delay="indefinite"/>
-                      </p:stCondLst>
-                      <p:childTnLst>
-                        <p:par>
-                          <p:cTn id="9" fill="hold">
-                            <p:stCondLst>
-                              <p:cond delay="0"/>
-                            </p:stCondLst>
-                            <p:childTnLst>
-                              <p:par>
-                                <p:cTn id="10" presetID="10" presetClass="entr" presetSubtype="0" fill="hold" grpId="0" nodeType="clickEffect">
-                                  <p:stCondLst>
-                                    <p:cond delay="0"/>
-                                  </p:stCondLst>
-                                  <p:childTnLst>
-                                    <p:set>
-                                      <p:cBhvr>
-                                        <p:cTn id="11" dur="1" fill="hold">
-                                          <p:stCondLst>
-                                            <p:cond delay="0"/>
-                                          </p:stCondLst>
-                                        </p:cTn>
-                                        <p:tgtEl>
-                                          <p:spTgt spid="3">
-                                            <p:txEl>
-                                              <p:pRg st="1" end="1"/>
-                                            </p:txEl>
-                                          </p:spTgt>
-                                        </p:tgtEl>
-                                        <p:attrNameLst>
-                                          <p:attrName>style.visibility</p:attrName>
-                                        </p:attrNameLst>
-                                      </p:cBhvr>
-                                      <p:to>
-                                        <p:strVal val="visible"/>
-                                      </p:to>
-                                    </p:set>
-                                    <p:animEffect transition="in" filter="fade">
-                                      <p:cBhvr>
-                                        <p:cTn id="12" dur="500"/>
-                                        <p:tgtEl>
-                                          <p:spTgt spid="3">
-                                            <p:txEl>
-                                              <p:pRg st="1" end="1"/>
-                                            </p:txEl>
-                                          </p:spTgt>
-                                        </p:tgtEl>
-                                      </p:cBhvr>
-                                    </p:animEffect>
-                                  </p:childTnLst>
-                                </p:cTn>
-                              </p:par>
-                              <p:par>
-                                <p:cTn id="13" presetID="10" presetClass="entr" presetSubtype="0" fill="hold" grpId="0" nodeType="withEffect">
-                                  <p:stCondLst>
-                                    <p:cond delay="0"/>
-                                  </p:stCondLst>
-                                  <p:childTnLst>
-                                    <p:set>
-                                      <p:cBhvr>
-                                        <p:cTn id="14" dur="1" fill="hold">
-                                          <p:stCondLst>
-                                            <p:cond delay="0"/>
-                                          </p:stCondLst>
-                                        </p:cTn>
-                                        <p:tgtEl>
-                                          <p:spTgt spid="3">
-                                            <p:txEl>
-                                              <p:pRg st="2" end="2"/>
-                                            </p:txEl>
-                                          </p:spTgt>
-                                        </p:tgtEl>
-                                        <p:attrNameLst>
-                                          <p:attrName>style.visibility</p:attrName>
-                                        </p:attrNameLst>
-                                      </p:cBhvr>
-                                      <p:to>
-                                        <p:strVal val="visible"/>
-                                      </p:to>
-                                    </p:set>
-                                    <p:animEffect transition="in" filter="fade">
-                                      <p:cBhvr>
-                                        <p:cTn id="15" dur="500"/>
-                                        <p:tgtEl>
-                                          <p:spTgt spid="3">
-                                            <p:txEl>
-                                              <p:pRg st="2" end="2"/>
-                                            </p:txEl>
-                                          </p:spTgt>
-                                        </p:tgtEl>
-                                      </p:cBhvr>
-                                    </p:animEffect>
-                                  </p:childTnLst>
-                                </p:cTn>
-                              </p:par>
-                              <p:par>
-                                <p:cTn id="16" presetID="10" presetClass="entr" presetSubtype="0" fill="hold" grpId="0" nodeType="withEffect">
-                                  <p:stCondLst>
-                                    <p:cond delay="0"/>
-                                  </p:stCondLst>
-                                  <p:childTnLst>
-                                    <p:set>
-                                      <p:cBhvr>
-                                        <p:cTn id="17" dur="1" fill="hold">
-                                          <p:stCondLst>
-                                            <p:cond delay="0"/>
-                                          </p:stCondLst>
-                                        </p:cTn>
-                                        <p:tgtEl>
-                                          <p:spTgt spid="3">
-                                            <p:txEl>
-                                              <p:pRg st="3" end="3"/>
-                                            </p:txEl>
-                                          </p:spTgt>
-                                        </p:tgtEl>
-                                        <p:attrNameLst>
-                                          <p:attrName>style.visibility</p:attrName>
-                                        </p:attrNameLst>
-                                      </p:cBhvr>
-                                      <p:to>
-                                        <p:strVal val="visible"/>
-                                      </p:to>
-                                    </p:set>
-                                    <p:animEffect transition="in" filter="fade">
-                                      <p:cBhvr>
-                                        <p:cTn id="18" dur="500"/>
-                                        <p:tgtEl>
-                                          <p:spTgt spid="3">
-                                            <p:txEl>
-                                              <p:pRg st="3" end="3"/>
-                                            </p:txEl>
-                                          </p:spTgt>
-                                        </p:tgtEl>
-                                      </p:cBhvr>
-                                    </p:animEffect>
-                                  </p:childTnLst>
-                                </p:cTn>
-                              </p:par>
-                              <p:par>
-                                <p:cTn id="19" presetID="10" presetClass="entr" presetSubtype="0" fill="hold" grpId="0" nodeType="withEffect">
-                                  <p:stCondLst>
-                                    <p:cond delay="0"/>
-                                  </p:stCondLst>
-                                  <p:childTnLst>
-                                    <p:set>
-                                      <p:cBhvr>
-                                        <p:cTn id="20" dur="1" fill="hold">
-                                          <p:stCondLst>
-                                            <p:cond delay="0"/>
-                                          </p:stCondLst>
-                                        </p:cTn>
-                                        <p:tgtEl>
-                                          <p:spTgt spid="3">
-                                            <p:txEl>
-                                              <p:pRg st="4" end="4"/>
-                                            </p:txEl>
-                                          </p:spTgt>
-                                        </p:tgtEl>
-                                        <p:attrNameLst>
-                                          <p:attrName>style.visibility</p:attrName>
-                                        </p:attrNameLst>
-                                      </p:cBhvr>
-                                      <p:to>
-                                        <p:strVal val="visible"/>
-                                      </p:to>
-                                    </p:set>
-                                    <p:animEffect transition="in" filter="fade">
-                                      <p:cBhvr>
-                                        <p:cTn id="21" dur="500"/>
-                                        <p:tgtEl>
-                                          <p:spTgt spid="3">
-                                            <p:txEl>
-                                              <p:pRg st="4" end="4"/>
-                                            </p:txEl>
-                                          </p:spTgt>
-                                        </p:tgtEl>
-                                      </p:cBhvr>
-                                    </p:animEffect>
-                                  </p:childTnLst>
-                                </p:cTn>
-                              </p:par>
-                            </p:childTnLst>
-                          </p:cTn>
-                        </p:par>
-                      </p:childTnLst>
-                    </p:cTn>
-                  </p:par>
-                </p:childTnLst>
-              </p:cTn>
-              <p:prevCondLst>
-                <p:cond evt="onPrev" delay="0">
-                  <p:tgtEl>
-                    <p:sldTgt/>
-                  </p:tgtEl>
-                </p:cond>
-              </p:prevCondLst>
-              <p:nextCondLst>
-                <p:cond evt="onNext" delay="0">
-                  <p:tgtEl>
-                    <p:sldTgt/>
-                  </p:tgtEl>
-                </p:cond>
-              </p:nextCondLst>
-            </p:seq>
-          </p:childTnLst>
-        </p:cTn>
+        <p:cTn xmlns:p14="http://schemas.microsoft.com/office/powerpoint/2010/main" id="1" dur="indefinite" restart="never" nodeType="tmRoot"/>
       </p:par>
     </p:tnLst>
-    <p:bldLst>
-      <p:bldP spid="3" grpId="0" build="p"/>
-    </p:bldLst>
   </p:timing>
 </p:sld>
 </file>
@@ -18347,7 +18060,6 @@
               <a:rPr lang="en-US" dirty="0" smtClean="0"/>
               <a:t>basis</a:t>
             </a:r>
-            <a:endParaRPr lang="en-US" dirty="0" smtClean="0"/>
           </a:p>
           <a:p>
             <a:pPr>
@@ -18357,11 +18069,7 @@
             </a:pPr>
             <a:r>
               <a:rPr lang="en-US" dirty="0" smtClean="0"/>
-              <a:t>Indexes can </a:t>
-            </a:r>
-            <a:r>
-              <a:rPr lang="en-US" dirty="0" smtClean="0"/>
-              <a:t>be created and dropped</a:t>
+              <a:t>Indexes can be created and dropped</a:t>
             </a:r>
           </a:p>
           <a:p>
@@ -18372,15 +18080,7 @@
             </a:pPr>
             <a:r>
               <a:rPr lang="en-US" dirty="0" smtClean="0"/>
-              <a:t>Special </a:t>
-            </a:r>
-            <a:r>
-              <a:rPr lang="en-US" dirty="0" smtClean="0"/>
-              <a:t>case: primary </a:t>
-            </a:r>
-            <a:r>
-              <a:rPr lang="en-US" dirty="0" smtClean="0"/>
-              <a:t>index</a:t>
+              <a:t>Special case: primary index</a:t>
             </a:r>
             <a:endParaRPr lang="en-US" dirty="0"/>
           </a:p>
@@ -18410,279 +18110,9 @@
   <p:timing>
     <p:tnLst>
       <p:par>
-        <p:cTn xmlns:p14="http://schemas.microsoft.com/office/powerpoint/2010/main" id="1" dur="indefinite" restart="never" nodeType="tmRoot">
-          <p:childTnLst>
-            <p:seq concurrent="1" nextAc="seek">
-              <p:cTn id="2" dur="indefinite" nodeType="mainSeq">
-                <p:childTnLst>
-                  <p:par>
-                    <p:cTn id="3" fill="hold">
-                      <p:stCondLst>
-                        <p:cond delay="indefinite"/>
-                      </p:stCondLst>
-                      <p:childTnLst>
-                        <p:par>
-                          <p:cTn id="4" fill="hold">
-                            <p:stCondLst>
-                              <p:cond delay="0"/>
-                            </p:stCondLst>
-                            <p:childTnLst>
-                              <p:par>
-                                <p:cTn id="5" presetID="10" presetClass="entr" presetSubtype="0" fill="hold" grpId="0" nodeType="clickEffect">
-                                  <p:stCondLst>
-                                    <p:cond delay="0"/>
-                                  </p:stCondLst>
-                                  <p:childTnLst>
-                                    <p:set>
-                                      <p:cBhvr>
-                                        <p:cTn id="6" dur="1" fill="hold">
-                                          <p:stCondLst>
-                                            <p:cond delay="0"/>
-                                          </p:stCondLst>
-                                        </p:cTn>
-                                        <p:tgtEl>
-                                          <p:spTgt spid="3">
-                                            <p:txEl>
-                                              <p:pRg st="0" end="0"/>
-                                            </p:txEl>
-                                          </p:spTgt>
-                                        </p:tgtEl>
-                                        <p:attrNameLst>
-                                          <p:attrName>style.visibility</p:attrName>
-                                        </p:attrNameLst>
-                                      </p:cBhvr>
-                                      <p:to>
-                                        <p:strVal val="visible"/>
-                                      </p:to>
-                                    </p:set>
-                                    <p:animEffect transition="in" filter="fade">
-                                      <p:cBhvr>
-                                        <p:cTn id="7" dur="500"/>
-                                        <p:tgtEl>
-                                          <p:spTgt spid="3">
-                                            <p:txEl>
-                                              <p:pRg st="0" end="0"/>
-                                            </p:txEl>
-                                          </p:spTgt>
-                                        </p:tgtEl>
-                                      </p:cBhvr>
-                                    </p:animEffect>
-                                  </p:childTnLst>
-                                </p:cTn>
-                              </p:par>
-                            </p:childTnLst>
-                          </p:cTn>
-                        </p:par>
-                      </p:childTnLst>
-                    </p:cTn>
-                  </p:par>
-                  <p:par>
-                    <p:cTn id="8" fill="hold">
-                      <p:stCondLst>
-                        <p:cond delay="indefinite"/>
-                      </p:stCondLst>
-                      <p:childTnLst>
-                        <p:par>
-                          <p:cTn id="9" fill="hold">
-                            <p:stCondLst>
-                              <p:cond delay="0"/>
-                            </p:stCondLst>
-                            <p:childTnLst>
-                              <p:par>
-                                <p:cTn id="10" presetID="10" presetClass="entr" presetSubtype="0" fill="hold" grpId="0" nodeType="clickEffect">
-                                  <p:stCondLst>
-                                    <p:cond delay="0"/>
-                                  </p:stCondLst>
-                                  <p:childTnLst>
-                                    <p:set>
-                                      <p:cBhvr>
-                                        <p:cTn id="11" dur="1" fill="hold">
-                                          <p:stCondLst>
-                                            <p:cond delay="0"/>
-                                          </p:stCondLst>
-                                        </p:cTn>
-                                        <p:tgtEl>
-                                          <p:spTgt spid="3">
-                                            <p:txEl>
-                                              <p:pRg st="1" end="1"/>
-                                            </p:txEl>
-                                          </p:spTgt>
-                                        </p:tgtEl>
-                                        <p:attrNameLst>
-                                          <p:attrName>style.visibility</p:attrName>
-                                        </p:attrNameLst>
-                                      </p:cBhvr>
-                                      <p:to>
-                                        <p:strVal val="visible"/>
-                                      </p:to>
-                                    </p:set>
-                                    <p:animEffect transition="in" filter="fade">
-                                      <p:cBhvr>
-                                        <p:cTn id="12" dur="500"/>
-                                        <p:tgtEl>
-                                          <p:spTgt spid="3">
-                                            <p:txEl>
-                                              <p:pRg st="1" end="1"/>
-                                            </p:txEl>
-                                          </p:spTgt>
-                                        </p:tgtEl>
-                                      </p:cBhvr>
-                                    </p:animEffect>
-                                  </p:childTnLst>
-                                </p:cTn>
-                              </p:par>
-                            </p:childTnLst>
-                          </p:cTn>
-                        </p:par>
-                      </p:childTnLst>
-                    </p:cTn>
-                  </p:par>
-                  <p:par>
-                    <p:cTn id="13" fill="hold">
-                      <p:stCondLst>
-                        <p:cond delay="indefinite"/>
-                      </p:stCondLst>
-                      <p:childTnLst>
-                        <p:par>
-                          <p:cTn id="14" fill="hold">
-                            <p:stCondLst>
-                              <p:cond delay="0"/>
-                            </p:stCondLst>
-                            <p:childTnLst>
-                              <p:par>
-                                <p:cTn id="15" presetID="10" presetClass="entr" presetSubtype="0" fill="hold" grpId="0" nodeType="clickEffect">
-                                  <p:stCondLst>
-                                    <p:cond delay="0"/>
-                                  </p:stCondLst>
-                                  <p:childTnLst>
-                                    <p:set>
-                                      <p:cBhvr>
-                                        <p:cTn id="16" dur="1" fill="hold">
-                                          <p:stCondLst>
-                                            <p:cond delay="0"/>
-                                          </p:stCondLst>
-                                        </p:cTn>
-                                        <p:tgtEl>
-                                          <p:spTgt spid="3">
-                                            <p:txEl>
-                                              <p:pRg st="2" end="2"/>
-                                            </p:txEl>
-                                          </p:spTgt>
-                                        </p:tgtEl>
-                                        <p:attrNameLst>
-                                          <p:attrName>style.visibility</p:attrName>
-                                        </p:attrNameLst>
-                                      </p:cBhvr>
-                                      <p:to>
-                                        <p:strVal val="visible"/>
-                                      </p:to>
-                                    </p:set>
-                                    <p:animEffect transition="in" filter="fade">
-                                      <p:cBhvr>
-                                        <p:cTn id="17" dur="500"/>
-                                        <p:tgtEl>
-                                          <p:spTgt spid="3">
-                                            <p:txEl>
-                                              <p:pRg st="2" end="2"/>
-                                            </p:txEl>
-                                          </p:spTgt>
-                                        </p:tgtEl>
-                                      </p:cBhvr>
-                                    </p:animEffect>
-                                  </p:childTnLst>
-                                </p:cTn>
-                              </p:par>
-                            </p:childTnLst>
-                          </p:cTn>
-                        </p:par>
-                      </p:childTnLst>
-                    </p:cTn>
-                  </p:par>
-                  <p:par>
-                    <p:cTn id="18" fill="hold">
-                      <p:stCondLst>
-                        <p:cond delay="indefinite"/>
-                      </p:stCondLst>
-                      <p:childTnLst>
-                        <p:par>
-                          <p:cTn id="19" fill="hold">
-                            <p:stCondLst>
-                              <p:cond delay="0"/>
-                            </p:stCondLst>
-                            <p:childTnLst>
-                              <p:par>
-                                <p:cTn id="20" presetID="10" presetClass="entr" presetSubtype="0" fill="hold" grpId="0" nodeType="clickEffect">
-                                  <p:stCondLst>
-                                    <p:cond delay="0"/>
-                                  </p:stCondLst>
-                                  <p:childTnLst>
-                                    <p:set>
-                                      <p:cBhvr>
-                                        <p:cTn id="21" dur="1" fill="hold">
-                                          <p:stCondLst>
-                                            <p:cond delay="0"/>
-                                          </p:stCondLst>
-                                        </p:cTn>
-                                        <p:tgtEl>
-                                          <p:spTgt spid="3">
-                                            <p:txEl>
-                                              <p:pRg st="3" end="3"/>
-                                            </p:txEl>
-                                          </p:spTgt>
-                                        </p:tgtEl>
-                                        <p:attrNameLst>
-                                          <p:attrName>style.visibility</p:attrName>
-                                        </p:attrNameLst>
-                                      </p:cBhvr>
-                                      <p:to>
-                                        <p:strVal val="visible"/>
-                                      </p:to>
-                                    </p:set>
-                                    <p:animEffect transition="in" filter="fade">
-                                      <p:cBhvr>
-                                        <p:cTn id="22" dur="500"/>
-                                        <p:tgtEl>
-                                          <p:spTgt spid="3">
-                                            <p:txEl>
-                                              <p:pRg st="3" end="3"/>
-                                            </p:txEl>
-                                          </p:spTgt>
-                                        </p:tgtEl>
-                                      </p:cBhvr>
-                                    </p:animEffect>
-                                  </p:childTnLst>
-                                </p:cTn>
-                              </p:par>
-                            </p:childTnLst>
-                          </p:cTn>
-                        </p:par>
-                      </p:childTnLst>
-                    </p:cTn>
-                  </p:par>
-                </p:childTnLst>
-              </p:cTn>
-              <p:prevCondLst>
-                <p:cond evt="onPrev" delay="0">
-                  <p:tgtEl>
-                    <p:sldTgt/>
-                  </p:tgtEl>
-                </p:cond>
-              </p:prevCondLst>
-              <p:nextCondLst>
-                <p:cond evt="onNext" delay="0">
-                  <p:tgtEl>
-                    <p:sldTgt/>
-                  </p:tgtEl>
-                </p:cond>
-              </p:nextCondLst>
-            </p:seq>
-          </p:childTnLst>
-        </p:cTn>
+        <p:cTn xmlns:p14="http://schemas.microsoft.com/office/powerpoint/2010/main" id="1" dur="indefinite" restart="never" nodeType="tmRoot"/>
       </p:par>
     </p:tnLst>
-    <p:bldLst>
-      <p:bldP spid="3" grpId="0" build="p"/>
-    </p:bldLst>
   </p:timing>
 </p:sld>
 </file>
@@ -18752,10 +18182,128 @@
                 <a:spcPct val="140000"/>
               </a:lnSpc>
             </a:pPr>
+            <a:r>
+              <a:rPr lang="en-US" dirty="0" smtClean="0"/>
+              <a:t>Query Information through</a:t>
+            </a:r>
+          </a:p>
+          <a:p>
+            <a:pPr>
+              <a:lnSpc>
+                <a:spcPct val="140000"/>
+              </a:lnSpc>
+            </a:pPr>
+            <a:r>
+              <a:rPr lang="en-US" dirty="0" smtClean="0"/>
+              <a:t>For each Index:</a:t>
+            </a:r>
+            <a:endParaRPr lang="en-US" dirty="0" smtClean="0"/>
+          </a:p>
+          <a:p>
+            <a:pPr>
+              <a:lnSpc>
+                <a:spcPct val="140000"/>
+              </a:lnSpc>
+            </a:pPr>
+            <a:endParaRPr lang="en-US" dirty="0"/>
+          </a:p>
+          <a:p>
+            <a:pPr>
+              <a:lnSpc>
+                <a:spcPct val="140000"/>
+              </a:lnSpc>
+            </a:pPr>
+            <a:endParaRPr lang="en-US" dirty="0" smtClean="0"/>
+          </a:p>
+          <a:p>
+            <a:pPr>
+              <a:lnSpc>
+                <a:spcPct val="140000"/>
+              </a:lnSpc>
+            </a:pPr>
             <a:endParaRPr lang="en-US" dirty="0" smtClean="0"/>
           </a:p>
         </p:txBody>
       </p:sp>
+      <p:sp>
+        <p:nvSpPr>
+          <p:cNvPr id="4" name="Rechteck 3"/>
+          <p:cNvSpPr/>
+          <p:nvPr/>
+        </p:nvSpPr>
+        <p:spPr>
+          <a:xfrm>
+            <a:off x="4340194" y="1149902"/>
+            <a:ext cx="4201804" cy="369332"/>
+          </a:xfrm>
+          <a:prstGeom prst="rect">
+            <a:avLst/>
+          </a:prstGeom>
+        </p:spPr>
+        <p:txBody>
+          <a:bodyPr wrap="none">
+            <a:spAutoFit/>
+          </a:bodyPr>
+          <a:lstStyle/>
+          <a:p>
+            <a:r>
+              <a:rPr lang="de-DE" dirty="0" smtClean="0">
+                <a:latin typeface="Courier New"/>
+                <a:cs typeface="Courier New"/>
+              </a:rPr>
+              <a:t>SELECT * FROM </a:t>
+            </a:r>
+            <a:r>
+              <a:rPr lang="de-DE" b="1" dirty="0" err="1" smtClean="0">
+                <a:latin typeface="Courier New"/>
+                <a:cs typeface="Courier New"/>
+              </a:rPr>
+              <a:t>system:indexes</a:t>
+            </a:r>
+            <a:r>
+              <a:rPr lang="de-DE" dirty="0">
+                <a:latin typeface="Courier New"/>
+                <a:cs typeface="Courier New"/>
+              </a:rPr>
+              <a:t>;</a:t>
+            </a:r>
+            <a:endParaRPr lang="de-DE" dirty="0">
+              <a:latin typeface="Courier New"/>
+              <a:cs typeface="Courier New"/>
+            </a:endParaRPr>
+          </a:p>
+        </p:txBody>
+      </p:sp>
+      <p:pic>
+        <p:nvPicPr>
+          <p:cNvPr id="5" name="Bild 4" descr="Screen Shot 2015-05-25 at 19.53.59.png"/>
+          <p:cNvPicPr>
+            <a:picLocks noChangeAspect="1"/>
+          </p:cNvPicPr>
+          <p:nvPr/>
+        </p:nvPicPr>
+        <p:blipFill>
+          <a:blip r:embed="rId2">
+            <a:extLst>
+              <a:ext uri="{28A0092B-C50C-407E-A947-70E740481C1C}">
+                <a14:useLocalDpi xmlns:a14="http://schemas.microsoft.com/office/drawing/2010/main" val="0"/>
+              </a:ext>
+            </a:extLst>
+          </a:blip>
+          <a:stretch>
+            <a:fillRect/>
+          </a:stretch>
+        </p:blipFill>
+        <p:spPr>
+          <a:xfrm>
+            <a:off x="3054386" y="1712851"/>
+            <a:ext cx="4437276" cy="3196627"/>
+          </a:xfrm>
+          <a:prstGeom prst="rect">
+            <a:avLst/>
+          </a:prstGeom>
+        </p:spPr>
+      </p:pic>
     </p:spTree>
     <p:extLst>
       <p:ext uri="{BB962C8B-B14F-4D97-AF65-F5344CB8AC3E}">
@@ -18769,101 +18317,9 @@
   <p:timing>
     <p:tnLst>
       <p:par>
-        <p:cTn xmlns:p14="http://schemas.microsoft.com/office/powerpoint/2010/main" id="1" dur="indefinite" restart="never" nodeType="tmRoot">
-          <p:childTnLst>
-            <p:seq concurrent="1" nextAc="seek">
-              <p:cTn id="2" dur="indefinite" nodeType="mainSeq">
-                <p:childTnLst>
-                  <p:par>
-                    <p:cTn id="3" fill="hold">
-                      <p:stCondLst>
-                        <p:cond delay="indefinite"/>
-                      </p:stCondLst>
-                      <p:childTnLst>
-                        <p:par>
-                          <p:cTn id="4" fill="hold">
-                            <p:stCondLst>
-                              <p:cond delay="0"/>
-                            </p:stCondLst>
-                            <p:childTnLst>
-                              <p:par>
-                                <p:cTn id="5" presetID="10" presetClass="entr" presetSubtype="0" fill="hold" grpId="0" nodeType="clickEffect" nodePh="1">
-                                  <p:stCondLst>
-                                    <p:cond delay="0"/>
-                                  </p:stCondLst>
-                                  <p:endCondLst>
-                                    <p:cond evt="begin" delay="0">
-                                      <p:tn val="5"/>
-                                    </p:cond>
-                                  </p:endCondLst>
-                                  <p:childTnLst>
-                                    <p:set>
-                                      <p:cBhvr>
-                                        <p:cTn id="6" dur="1" fill="hold">
-                                          <p:stCondLst>
-                                            <p:cond delay="0"/>
-                                          </p:stCondLst>
-                                        </p:cTn>
-                                        <p:tgtEl>
-                                          <p:spTgt spid="3">
-                                            <p:txEl>
-                                              <p:pRg st="0" end="0"/>
-                                            </p:txEl>
-                                          </p:spTgt>
-                                        </p:tgtEl>
-                                        <p:attrNameLst>
-                                          <p:attrName>style.visibility</p:attrName>
-                                        </p:attrNameLst>
-                                      </p:cBhvr>
-                                      <p:to>
-                                        <p:strVal val="visible"/>
-                                      </p:to>
-                                    </p:set>
-                                    <p:animEffect transition="in" filter="fade">
-                                      <p:cBhvr>
-                                        <p:cTn id="7" dur="500"/>
-                                        <p:tgtEl>
-                                          <p:spTgt spid="3">
-                                            <p:txEl>
-                                              <p:pRg st="0" end="0"/>
-                                            </p:txEl>
-                                          </p:spTgt>
-                                        </p:tgtEl>
-                                      </p:cBhvr>
-                                    </p:animEffect>
-                                  </p:childTnLst>
-                                </p:cTn>
-                              </p:par>
-                            </p:childTnLst>
-                          </p:cTn>
-                        </p:par>
-                      </p:childTnLst>
-                    </p:cTn>
-                  </p:par>
-                </p:childTnLst>
-              </p:cTn>
-              <p:prevCondLst>
-                <p:cond evt="onPrev" delay="0">
-                  <p:tgtEl>
-                    <p:sldTgt/>
-                  </p:tgtEl>
-                </p:cond>
-              </p:prevCondLst>
-              <p:nextCondLst>
-                <p:cond evt="onNext" delay="0">
-                  <p:tgtEl>
-                    <p:sldTgt/>
-                  </p:tgtEl>
-                </p:cond>
-              </p:nextCondLst>
-            </p:seq>
-          </p:childTnLst>
-        </p:cTn>
+        <p:cTn xmlns:p14="http://schemas.microsoft.com/office/powerpoint/2010/main" id="1" dur="indefinite" restart="never" nodeType="tmRoot"/>
       </p:par>
     </p:tnLst>
-    <p:bldLst>
-      <p:bldP spid="3" grpId="0" build="p"/>
-    </p:bldLst>
   </p:timing>
 </p:sld>
 </file>
@@ -19295,10 +18751,152 @@
                 <a:spcPct val="140000"/>
               </a:lnSpc>
             </a:pPr>
+            <a:r>
+              <a:rPr lang="en-US" dirty="0" smtClean="0"/>
+              <a:t>Shows the planned execution </a:t>
+            </a:r>
+            <a:br>
+              <a:rPr lang="en-US" dirty="0" smtClean="0"/>
+            </a:br>
+            <a:r>
+              <a:rPr lang="en-US" dirty="0" smtClean="0"/>
+              <a:t>(including selected index)</a:t>
+            </a:r>
             <a:endParaRPr lang="en-US" dirty="0" smtClean="0"/>
           </a:p>
         </p:txBody>
       </p:sp>
+      <p:sp>
+        <p:nvSpPr>
+          <p:cNvPr id="4" name="Rechteck 3"/>
+          <p:cNvSpPr/>
+          <p:nvPr/>
+        </p:nvSpPr>
+        <p:spPr>
+          <a:xfrm>
+            <a:off x="807525" y="2633710"/>
+            <a:ext cx="3363520" cy="1200329"/>
+          </a:xfrm>
+          <a:prstGeom prst="rect">
+            <a:avLst/>
+          </a:prstGeom>
+        </p:spPr>
+        <p:txBody>
+          <a:bodyPr wrap="square">
+            <a:spAutoFit/>
+          </a:bodyPr>
+          <a:lstStyle/>
+          <a:p>
+            <a:r>
+              <a:rPr lang="de-DE" b="1" dirty="0" smtClean="0">
+                <a:latin typeface="Courier New"/>
+                <a:cs typeface="Courier New"/>
+              </a:rPr>
+              <a:t>EXPLAIN </a:t>
+            </a:r>
+          </a:p>
+          <a:p>
+            <a:r>
+              <a:rPr lang="de-DE" dirty="0" smtClean="0">
+                <a:latin typeface="Courier New"/>
+                <a:cs typeface="Courier New"/>
+              </a:rPr>
+              <a:t>SELECT * </a:t>
+            </a:r>
+          </a:p>
+          <a:p>
+            <a:r>
+              <a:rPr lang="de-DE" dirty="0" err="1" smtClean="0">
+                <a:latin typeface="Courier New"/>
+                <a:cs typeface="Courier New"/>
+              </a:rPr>
+              <a:t>FROM`</a:t>
+            </a:r>
+            <a:r>
+              <a:rPr lang="de-DE" dirty="0" err="1">
+                <a:latin typeface="Courier New"/>
+                <a:cs typeface="Courier New"/>
+              </a:rPr>
+              <a:t>travel</a:t>
+            </a:r>
+            <a:r>
+              <a:rPr lang="de-DE" dirty="0">
+                <a:latin typeface="Courier New"/>
+                <a:cs typeface="Courier New"/>
+              </a:rPr>
+              <a:t>-sample` </a:t>
+            </a:r>
+            <a:endParaRPr lang="de-DE" dirty="0" smtClean="0">
+              <a:latin typeface="Courier New"/>
+              <a:cs typeface="Courier New"/>
+            </a:endParaRPr>
+          </a:p>
+          <a:p>
+            <a:r>
+              <a:rPr lang="de-DE" dirty="0" smtClean="0">
+                <a:latin typeface="Courier New"/>
+                <a:cs typeface="Courier New"/>
+              </a:rPr>
+              <a:t>WHERE type </a:t>
+            </a:r>
+            <a:r>
+              <a:rPr lang="de-DE" dirty="0">
+                <a:latin typeface="Courier New"/>
+                <a:cs typeface="Courier New"/>
+              </a:rPr>
+              <a:t>= "</a:t>
+            </a:r>
+            <a:r>
+              <a:rPr lang="de-DE" dirty="0" err="1">
+                <a:latin typeface="Courier New"/>
+                <a:cs typeface="Courier New"/>
+              </a:rPr>
+              <a:t>airline</a:t>
+            </a:r>
+            <a:r>
+              <a:rPr lang="de-DE" dirty="0">
+                <a:latin typeface="Courier New"/>
+                <a:cs typeface="Courier New"/>
+              </a:rPr>
+              <a:t>";</a:t>
+            </a:r>
+            <a:endParaRPr lang="de-DE" dirty="0">
+              <a:latin typeface="Courier New"/>
+              <a:cs typeface="Courier New"/>
+            </a:endParaRPr>
+          </a:p>
+        </p:txBody>
+      </p:sp>
+      <p:pic>
+        <p:nvPicPr>
+          <p:cNvPr id="5" name="Bild 4" descr="Screen Shot 2015-05-25 at 20.09.18.png"/>
+          <p:cNvPicPr>
+            <a:picLocks noChangeAspect="1"/>
+          </p:cNvPicPr>
+          <p:nvPr/>
+        </p:nvPicPr>
+        <p:blipFill>
+          <a:blip r:embed="rId2">
+            <a:extLst>
+              <a:ext uri="{28A0092B-C50C-407E-A947-70E740481C1C}">
+                <a14:useLocalDpi xmlns:a14="http://schemas.microsoft.com/office/drawing/2010/main" val="0"/>
+              </a:ext>
+            </a:extLst>
+          </a:blip>
+          <a:stretch>
+            <a:fillRect/>
+          </a:stretch>
+        </p:blipFill>
+        <p:spPr>
+          <a:xfrm>
+            <a:off x="5206011" y="850439"/>
+            <a:ext cx="3070389" cy="4107144"/>
+          </a:xfrm>
+          <a:prstGeom prst="rect">
+            <a:avLst/>
+          </a:prstGeom>
+        </p:spPr>
+      </p:pic>
     </p:spTree>
     <p:extLst>
       <p:ext uri="{BB962C8B-B14F-4D97-AF65-F5344CB8AC3E}">
@@ -19312,101 +18910,9 @@
   <p:timing>
     <p:tnLst>
       <p:par>
-        <p:cTn xmlns:p14="http://schemas.microsoft.com/office/powerpoint/2010/main" id="1" dur="indefinite" restart="never" nodeType="tmRoot">
-          <p:childTnLst>
-            <p:seq concurrent="1" nextAc="seek">
-              <p:cTn id="2" dur="indefinite" nodeType="mainSeq">
-                <p:childTnLst>
-                  <p:par>
-                    <p:cTn id="3" fill="hold">
-                      <p:stCondLst>
-                        <p:cond delay="indefinite"/>
-                      </p:stCondLst>
-                      <p:childTnLst>
-                        <p:par>
-                          <p:cTn id="4" fill="hold">
-                            <p:stCondLst>
-                              <p:cond delay="0"/>
-                            </p:stCondLst>
-                            <p:childTnLst>
-                              <p:par>
-                                <p:cTn id="5" presetID="10" presetClass="entr" presetSubtype="0" fill="hold" grpId="0" nodeType="clickEffect" nodePh="1">
-                                  <p:stCondLst>
-                                    <p:cond delay="0"/>
-                                  </p:stCondLst>
-                                  <p:endCondLst>
-                                    <p:cond evt="begin" delay="0">
-                                      <p:tn val="5"/>
-                                    </p:cond>
-                                  </p:endCondLst>
-                                  <p:childTnLst>
-                                    <p:set>
-                                      <p:cBhvr>
-                                        <p:cTn id="6" dur="1" fill="hold">
-                                          <p:stCondLst>
-                                            <p:cond delay="0"/>
-                                          </p:stCondLst>
-                                        </p:cTn>
-                                        <p:tgtEl>
-                                          <p:spTgt spid="3">
-                                            <p:txEl>
-                                              <p:pRg st="0" end="0"/>
-                                            </p:txEl>
-                                          </p:spTgt>
-                                        </p:tgtEl>
-                                        <p:attrNameLst>
-                                          <p:attrName>style.visibility</p:attrName>
-                                        </p:attrNameLst>
-                                      </p:cBhvr>
-                                      <p:to>
-                                        <p:strVal val="visible"/>
-                                      </p:to>
-                                    </p:set>
-                                    <p:animEffect transition="in" filter="fade">
-                                      <p:cBhvr>
-                                        <p:cTn id="7" dur="500"/>
-                                        <p:tgtEl>
-                                          <p:spTgt spid="3">
-                                            <p:txEl>
-                                              <p:pRg st="0" end="0"/>
-                                            </p:txEl>
-                                          </p:spTgt>
-                                        </p:tgtEl>
-                                      </p:cBhvr>
-                                    </p:animEffect>
-                                  </p:childTnLst>
-                                </p:cTn>
-                              </p:par>
-                            </p:childTnLst>
-                          </p:cTn>
-                        </p:par>
-                      </p:childTnLst>
-                    </p:cTn>
-                  </p:par>
-                </p:childTnLst>
-              </p:cTn>
-              <p:prevCondLst>
-                <p:cond evt="onPrev" delay="0">
-                  <p:tgtEl>
-                    <p:sldTgt/>
-                  </p:tgtEl>
-                </p:cond>
-              </p:prevCondLst>
-              <p:nextCondLst>
-                <p:cond evt="onNext" delay="0">
-                  <p:tgtEl>
-                    <p:sldTgt/>
-                  </p:tgtEl>
-                </p:cond>
-              </p:nextCondLst>
-            </p:seq>
-          </p:childTnLst>
-        </p:cTn>
+        <p:cTn xmlns:p14="http://schemas.microsoft.com/office/powerpoint/2010/main" id="1" dur="indefinite" restart="never" nodeType="tmRoot"/>
       </p:par>
     </p:tnLst>
-    <p:bldLst>
-      <p:bldP spid="3" grpId="0" build="p"/>
-    </p:bldLst>
   </p:timing>
 </p:sld>
 </file>

</xml_diff>

<commit_message>
more info on sync/async
</commit_message>
<xml_diff>
--- a/server/presentations/07_N1QL Details.pptx
+++ b/server/presentations/07_N1QL Details.pptx
@@ -5,10 +5,10 @@
     <p:sldMasterId id="2147483648" r:id="rId1"/>
   </p:sldMasterIdLst>
   <p:notesMasterIdLst>
-    <p:notesMasterId r:id="rId38"/>
+    <p:notesMasterId r:id="rId39"/>
   </p:notesMasterIdLst>
   <p:handoutMasterIdLst>
-    <p:handoutMasterId r:id="rId39"/>
+    <p:handoutMasterId r:id="rId40"/>
   </p:handoutMasterIdLst>
   <p:sldIdLst>
     <p:sldId id="256" r:id="rId2"/>
@@ -20,33 +20,34 @@
     <p:sldId id="297" r:id="rId8"/>
     <p:sldId id="299" r:id="rId9"/>
     <p:sldId id="300" r:id="rId10"/>
-    <p:sldId id="301" r:id="rId11"/>
-    <p:sldId id="302" r:id="rId12"/>
-    <p:sldId id="304" r:id="rId13"/>
-    <p:sldId id="303" r:id="rId14"/>
-    <p:sldId id="290" r:id="rId15"/>
-    <p:sldId id="291" r:id="rId16"/>
-    <p:sldId id="292" r:id="rId17"/>
-    <p:sldId id="285" r:id="rId18"/>
-    <p:sldId id="284" r:id="rId19"/>
-    <p:sldId id="288" r:id="rId20"/>
-    <p:sldId id="287" r:id="rId21"/>
-    <p:sldId id="286" r:id="rId22"/>
-    <p:sldId id="289" r:id="rId23"/>
-    <p:sldId id="294" r:id="rId24"/>
-    <p:sldId id="279" r:id="rId25"/>
-    <p:sldId id="280" r:id="rId26"/>
-    <p:sldId id="281" r:id="rId27"/>
-    <p:sldId id="264" r:id="rId28"/>
-    <p:sldId id="270" r:id="rId29"/>
-    <p:sldId id="276" r:id="rId30"/>
-    <p:sldId id="277" r:id="rId31"/>
-    <p:sldId id="272" r:id="rId32"/>
-    <p:sldId id="275" r:id="rId33"/>
-    <p:sldId id="273" r:id="rId34"/>
-    <p:sldId id="274" r:id="rId35"/>
-    <p:sldId id="267" r:id="rId36"/>
-    <p:sldId id="269" r:id="rId37"/>
+    <p:sldId id="305" r:id="rId11"/>
+    <p:sldId id="301" r:id="rId12"/>
+    <p:sldId id="302" r:id="rId13"/>
+    <p:sldId id="304" r:id="rId14"/>
+    <p:sldId id="303" r:id="rId15"/>
+    <p:sldId id="290" r:id="rId16"/>
+    <p:sldId id="291" r:id="rId17"/>
+    <p:sldId id="292" r:id="rId18"/>
+    <p:sldId id="285" r:id="rId19"/>
+    <p:sldId id="284" r:id="rId20"/>
+    <p:sldId id="288" r:id="rId21"/>
+    <p:sldId id="287" r:id="rId22"/>
+    <p:sldId id="286" r:id="rId23"/>
+    <p:sldId id="289" r:id="rId24"/>
+    <p:sldId id="294" r:id="rId25"/>
+    <p:sldId id="279" r:id="rId26"/>
+    <p:sldId id="280" r:id="rId27"/>
+    <p:sldId id="281" r:id="rId28"/>
+    <p:sldId id="264" r:id="rId29"/>
+    <p:sldId id="270" r:id="rId30"/>
+    <p:sldId id="276" r:id="rId31"/>
+    <p:sldId id="277" r:id="rId32"/>
+    <p:sldId id="272" r:id="rId33"/>
+    <p:sldId id="275" r:id="rId34"/>
+    <p:sldId id="273" r:id="rId35"/>
+    <p:sldId id="274" r:id="rId36"/>
+    <p:sldId id="267" r:id="rId37"/>
+    <p:sldId id="269" r:id="rId38"/>
   </p:sldIdLst>
   <p:sldSz cx="9144000" cy="5143500" type="screen16x9"/>
   <p:notesSz cx="6858000" cy="9144000"/>
@@ -604,11 +605,11 @@
           <c:showBubbleSize val="0"/>
         </c:dLbls>
         <c:gapWidth val="150"/>
-        <c:axId val="-2081564648"/>
-        <c:axId val="-2081561320"/>
+        <c:axId val="-2110872712"/>
+        <c:axId val="-2085143288"/>
       </c:barChart>
       <c:catAx>
-        <c:axId val="-2081564648"/>
+        <c:axId val="-2110872712"/>
         <c:scaling>
           <c:orientation val="minMax"/>
         </c:scaling>
@@ -634,7 +635,7 @@
             <a:endParaRPr lang="de-DE"/>
           </a:p>
         </c:txPr>
-        <c:crossAx val="-2081561320"/>
+        <c:crossAx val="-2085143288"/>
         <c:crosses val="autoZero"/>
         <c:auto val="1"/>
         <c:lblAlgn val="ctr"/>
@@ -642,7 +643,7 @@
         <c:noMultiLvlLbl val="0"/>
       </c:catAx>
       <c:valAx>
-        <c:axId val="-2081561320"/>
+        <c:axId val="-2085143288"/>
         <c:scaling>
           <c:orientation val="minMax"/>
         </c:scaling>
@@ -684,7 +685,7 @@
             <a:endParaRPr lang="de-DE"/>
           </a:p>
         </c:txPr>
-        <c:crossAx val="-2081564648"/>
+        <c:crossAx val="-2110872712"/>
         <c:crosses val="autoZero"/>
         <c:crossBetween val="between"/>
       </c:valAx>
@@ -926,11 +927,11 @@
           <c:showBubbleSize val="0"/>
         </c:dLbls>
         <c:gapWidth val="150"/>
-        <c:axId val="-2069488232"/>
-        <c:axId val="-2069484904"/>
+        <c:axId val="-2085823752"/>
+        <c:axId val="-2085820536"/>
       </c:barChart>
       <c:catAx>
-        <c:axId val="-2069488232"/>
+        <c:axId val="-2085823752"/>
         <c:scaling>
           <c:orientation val="minMax"/>
         </c:scaling>
@@ -956,7 +957,7 @@
             <a:endParaRPr lang="de-DE"/>
           </a:p>
         </c:txPr>
-        <c:crossAx val="-2069484904"/>
+        <c:crossAx val="-2085820536"/>
         <c:crosses val="autoZero"/>
         <c:auto val="1"/>
         <c:lblAlgn val="ctr"/>
@@ -964,7 +965,7 @@
         <c:noMultiLvlLbl val="0"/>
       </c:catAx>
       <c:valAx>
-        <c:axId val="-2069484904"/>
+        <c:axId val="-2085820536"/>
         <c:scaling>
           <c:orientation val="minMax"/>
         </c:scaling>
@@ -1006,7 +1007,7 @@
             <a:endParaRPr lang="de-DE"/>
           </a:p>
         </c:txPr>
-        <c:crossAx val="-2069488232"/>
+        <c:crossAx val="-2085823752"/>
         <c:crosses val="autoZero"/>
         <c:crossBetween val="between"/>
       </c:valAx>
@@ -1256,11 +1257,11 @@
         </c:dLbls>
         <c:marker val="1"/>
         <c:smooth val="0"/>
-        <c:axId val="-2069466872"/>
-        <c:axId val="-2069463544"/>
+        <c:axId val="-2084959624"/>
+        <c:axId val="-2084954088"/>
       </c:lineChart>
       <c:catAx>
-        <c:axId val="-2069466872"/>
+        <c:axId val="-2084959624"/>
         <c:scaling>
           <c:orientation val="minMax"/>
         </c:scaling>
@@ -1286,7 +1287,7 @@
             <a:endParaRPr lang="de-DE"/>
           </a:p>
         </c:txPr>
-        <c:crossAx val="-2069463544"/>
+        <c:crossAx val="-2084954088"/>
         <c:crosses val="autoZero"/>
         <c:auto val="1"/>
         <c:lblAlgn val="ctr"/>
@@ -1294,7 +1295,7 @@
         <c:noMultiLvlLbl val="0"/>
       </c:catAx>
       <c:valAx>
-        <c:axId val="-2069463544"/>
+        <c:axId val="-2084954088"/>
         <c:scaling>
           <c:orientation val="minMax"/>
         </c:scaling>
@@ -1334,7 +1335,7 @@
             <a:endParaRPr lang="de-DE"/>
           </a:p>
         </c:txPr>
-        <c:crossAx val="-2069466872"/>
+        <c:crossAx val="-2084959624"/>
         <c:crosses val="autoZero"/>
         <c:crossBetween val="between"/>
       </c:valAx>
@@ -1456,7 +1457,7 @@
           <a:p>
             <a:fld id="{B5389E1E-C654-E943-9883-792E99AD7287}" type="datetimeFigureOut">
               <a:rPr lang="en-US" smtClean="0"/>
-              <a:t>25/05/15</a:t>
+              <a:t>26/05/15</a:t>
             </a:fld>
             <a:endParaRPr lang="en-US"/>
           </a:p>
@@ -1622,7 +1623,7 @@
           <a:p>
             <a:fld id="{9920D99B-2862-464A-984E-65BFC5FC0BBC}" type="datetimeFigureOut">
               <a:rPr lang="en-US" smtClean="0"/>
-              <a:t>25/05/15</a:t>
+              <a:t>26/05/15</a:t>
             </a:fld>
             <a:endParaRPr lang="en-US"/>
           </a:p>
@@ -2017,7 +2018,7 @@
                 <a:latin typeface="Calibri"/>
               </a:rPr>
               <a:pPr/>
-              <a:t>19</a:t>
+              <a:t>20</a:t>
             </a:fld>
             <a:endParaRPr lang="en-US">
               <a:solidFill>
@@ -2106,7 +2107,7 @@
           <a:p>
             <a:fld id="{615C908D-C35B-B346-A739-79C621D2BD36}" type="slidenum">
               <a:rPr lang="en-US" smtClean="0"/>
-              <a:t>20</a:t>
+              <a:t>21</a:t>
             </a:fld>
             <a:endParaRPr lang="en-US"/>
           </a:p>
@@ -4959,6 +4960,565 @@
             <a:spLocks noGrp="1"/>
           </p:cNvSpPr>
           <p:nvPr>
+            <p:ph type="title"/>
+          </p:nvPr>
+        </p:nvSpPr>
+        <p:spPr/>
+        <p:txBody>
+          <a:bodyPr/>
+          <a:lstStyle/>
+          <a:p>
+            <a:r>
+              <a:rPr lang="en-US" dirty="0" smtClean="0"/>
+              <a:t>Sync vs. </a:t>
+            </a:r>
+            <a:r>
+              <a:rPr lang="en-US" dirty="0" err="1" smtClean="0"/>
+              <a:t>Async</a:t>
+            </a:r>
+            <a:endParaRPr lang="en-US" dirty="0"/>
+          </a:p>
+        </p:txBody>
+      </p:sp>
+      <p:sp>
+        <p:nvSpPr>
+          <p:cNvPr id="3" name="Content Placeholder 2"/>
+          <p:cNvSpPr>
+            <a:spLocks noGrp="1"/>
+          </p:cNvSpPr>
+          <p:nvPr>
+            <p:ph idx="1"/>
+          </p:nvPr>
+        </p:nvSpPr>
+        <p:spPr>
+          <a:xfrm>
+            <a:off x="457200" y="955193"/>
+            <a:ext cx="8007739" cy="3493655"/>
+          </a:xfrm>
+        </p:spPr>
+        <p:txBody>
+          <a:bodyPr/>
+          <a:lstStyle/>
+          <a:p>
+            <a:pPr>
+              <a:lnSpc>
+                <a:spcPct val="140000"/>
+              </a:lnSpc>
+            </a:pPr>
+            <a:r>
+              <a:rPr lang="en-US" dirty="0" smtClean="0"/>
+              <a:t>Index creation is per default synchronous</a:t>
+            </a:r>
+          </a:p>
+          <a:p>
+            <a:pPr>
+              <a:lnSpc>
+                <a:spcPct val="140000"/>
+              </a:lnSpc>
+            </a:pPr>
+            <a:r>
+              <a:rPr lang="en-US" dirty="0" smtClean="0"/>
+              <a:t>On large datasets, index creation can take time</a:t>
+            </a:r>
+            <a:endParaRPr lang="en-US" dirty="0" smtClean="0"/>
+          </a:p>
+          <a:p>
+            <a:pPr>
+              <a:lnSpc>
+                <a:spcPct val="140000"/>
+              </a:lnSpc>
+            </a:pPr>
+            <a:r>
+              <a:rPr lang="en-US" dirty="0" smtClean="0"/>
+              <a:t>Can be made asynchronous through:</a:t>
+            </a:r>
+          </a:p>
+          <a:p>
+            <a:pPr>
+              <a:lnSpc>
+                <a:spcPct val="140000"/>
+              </a:lnSpc>
+            </a:pPr>
+            <a:endParaRPr lang="en-US" dirty="0"/>
+          </a:p>
+          <a:p>
+            <a:pPr>
+              <a:lnSpc>
+                <a:spcPct val="140000"/>
+              </a:lnSpc>
+            </a:pPr>
+            <a:r>
+              <a:rPr lang="en-US" dirty="0" smtClean="0"/>
+              <a:t>Monitor build status through:</a:t>
+            </a:r>
+            <a:endParaRPr lang="en-US" dirty="0" smtClean="0"/>
+          </a:p>
+        </p:txBody>
+      </p:sp>
+      <p:sp>
+        <p:nvSpPr>
+          <p:cNvPr id="7" name="Rechteck 6"/>
+          <p:cNvSpPr/>
+          <p:nvPr/>
+        </p:nvSpPr>
+        <p:spPr>
+          <a:xfrm>
+            <a:off x="457200" y="4002082"/>
+            <a:ext cx="8782592" cy="369332"/>
+          </a:xfrm>
+          <a:prstGeom prst="rect">
+            <a:avLst/>
+          </a:prstGeom>
+        </p:spPr>
+        <p:txBody>
+          <a:bodyPr wrap="square">
+            <a:spAutoFit/>
+          </a:bodyPr>
+          <a:lstStyle/>
+          <a:p>
+            <a:r>
+              <a:rPr lang="de-DE" dirty="0" err="1">
+                <a:latin typeface="Courier New"/>
+                <a:cs typeface="Courier New"/>
+              </a:rPr>
+              <a:t>select</a:t>
+            </a:r>
+            <a:r>
+              <a:rPr lang="de-DE" dirty="0">
+                <a:latin typeface="Courier New"/>
+                <a:cs typeface="Courier New"/>
+              </a:rPr>
+              <a:t> </a:t>
+            </a:r>
+            <a:r>
+              <a:rPr lang="de-DE" dirty="0" err="1">
+                <a:latin typeface="Courier New"/>
+                <a:cs typeface="Courier New"/>
+              </a:rPr>
+              <a:t>count</a:t>
+            </a:r>
+            <a:r>
+              <a:rPr lang="de-DE" dirty="0">
+                <a:latin typeface="Courier New"/>
+                <a:cs typeface="Courier New"/>
+              </a:rPr>
+              <a:t>(*) </a:t>
+            </a:r>
+            <a:r>
+              <a:rPr lang="de-DE" dirty="0" err="1">
+                <a:latin typeface="Courier New"/>
+                <a:cs typeface="Courier New"/>
+              </a:rPr>
+              <a:t>from</a:t>
+            </a:r>
+            <a:r>
+              <a:rPr lang="de-DE" dirty="0">
+                <a:latin typeface="Courier New"/>
+                <a:cs typeface="Courier New"/>
+              </a:rPr>
+              <a:t> </a:t>
+            </a:r>
+            <a:r>
+              <a:rPr lang="de-DE" dirty="0" err="1">
+                <a:latin typeface="Courier New"/>
+                <a:cs typeface="Courier New"/>
+              </a:rPr>
+              <a:t>system:indexes</a:t>
+            </a:r>
+            <a:r>
+              <a:rPr lang="de-DE" dirty="0">
+                <a:latin typeface="Courier New"/>
+                <a:cs typeface="Courier New"/>
+              </a:rPr>
+              <a:t> </a:t>
+            </a:r>
+            <a:r>
+              <a:rPr lang="de-DE" dirty="0" err="1">
+                <a:latin typeface="Courier New"/>
+                <a:cs typeface="Courier New"/>
+              </a:rPr>
+              <a:t>where</a:t>
+            </a:r>
+            <a:r>
+              <a:rPr lang="de-DE" dirty="0">
+                <a:latin typeface="Courier New"/>
+                <a:cs typeface="Courier New"/>
+              </a:rPr>
+              <a:t> </a:t>
+            </a:r>
+            <a:r>
+              <a:rPr lang="de-DE" dirty="0" err="1">
+                <a:latin typeface="Courier New"/>
+                <a:cs typeface="Courier New"/>
+              </a:rPr>
+              <a:t>state</a:t>
+            </a:r>
+            <a:r>
+              <a:rPr lang="de-DE" dirty="0">
+                <a:latin typeface="Courier New"/>
+                <a:cs typeface="Courier New"/>
+              </a:rPr>
+              <a:t> = "online";</a:t>
+            </a:r>
+            <a:endParaRPr lang="de-DE" dirty="0">
+              <a:latin typeface="Courier New"/>
+              <a:cs typeface="Courier New"/>
+            </a:endParaRPr>
+          </a:p>
+        </p:txBody>
+      </p:sp>
+      <p:sp>
+        <p:nvSpPr>
+          <p:cNvPr id="8" name="Rechteck 7"/>
+          <p:cNvSpPr/>
+          <p:nvPr/>
+        </p:nvSpPr>
+        <p:spPr>
+          <a:xfrm>
+            <a:off x="609600" y="2724750"/>
+            <a:ext cx="8782592" cy="369332"/>
+          </a:xfrm>
+          <a:prstGeom prst="rect">
+            <a:avLst/>
+          </a:prstGeom>
+          <a:solidFill>
+            <a:srgbClr val="E10021"/>
+          </a:solidFill>
+        </p:spPr>
+        <p:txBody>
+          <a:bodyPr wrap="square">
+            <a:spAutoFit/>
+          </a:bodyPr>
+          <a:lstStyle/>
+          <a:p>
+            <a:r>
+              <a:rPr lang="de-DE" dirty="0" smtClean="0">
+                <a:latin typeface="Courier New"/>
+                <a:cs typeface="Courier New"/>
+              </a:rPr>
+              <a:t>ADD ME</a:t>
+            </a:r>
+            <a:endParaRPr lang="de-DE" dirty="0">
+              <a:latin typeface="Courier New"/>
+              <a:cs typeface="Courier New"/>
+            </a:endParaRPr>
+          </a:p>
+        </p:txBody>
+      </p:sp>
+    </p:spTree>
+    <p:extLst>
+      <p:ext uri="{BB962C8B-B14F-4D97-AF65-F5344CB8AC3E}">
+        <p14:creationId xmlns:p14="http://schemas.microsoft.com/office/powerpoint/2010/main" val="1848800269"/>
+      </p:ext>
+    </p:extLst>
+  </p:cSld>
+  <p:clrMapOvr>
+    <a:masterClrMapping/>
+  </p:clrMapOvr>
+  <p:timing>
+    <p:tnLst>
+      <p:par>
+        <p:cTn xmlns:p14="http://schemas.microsoft.com/office/powerpoint/2010/main" id="1" dur="indefinite" restart="never" nodeType="tmRoot">
+          <p:childTnLst>
+            <p:seq concurrent="1" nextAc="seek">
+              <p:cTn id="2" dur="indefinite" nodeType="mainSeq">
+                <p:childTnLst>
+                  <p:par>
+                    <p:cTn id="3" fill="hold">
+                      <p:stCondLst>
+                        <p:cond delay="indefinite"/>
+                      </p:stCondLst>
+                      <p:childTnLst>
+                        <p:par>
+                          <p:cTn id="4" fill="hold">
+                            <p:stCondLst>
+                              <p:cond delay="0"/>
+                            </p:stCondLst>
+                            <p:childTnLst>
+                              <p:par>
+                                <p:cTn id="5" presetID="10" presetClass="entr" presetSubtype="0" fill="hold" grpId="0" nodeType="clickEffect">
+                                  <p:stCondLst>
+                                    <p:cond delay="0"/>
+                                  </p:stCondLst>
+                                  <p:childTnLst>
+                                    <p:set>
+                                      <p:cBhvr>
+                                        <p:cTn id="6" dur="1" fill="hold">
+                                          <p:stCondLst>
+                                            <p:cond delay="0"/>
+                                          </p:stCondLst>
+                                        </p:cTn>
+                                        <p:tgtEl>
+                                          <p:spTgt spid="3">
+                                            <p:txEl>
+                                              <p:pRg st="0" end="0"/>
+                                            </p:txEl>
+                                          </p:spTgt>
+                                        </p:tgtEl>
+                                        <p:attrNameLst>
+                                          <p:attrName>style.visibility</p:attrName>
+                                        </p:attrNameLst>
+                                      </p:cBhvr>
+                                      <p:to>
+                                        <p:strVal val="visible"/>
+                                      </p:to>
+                                    </p:set>
+                                    <p:animEffect transition="in" filter="fade">
+                                      <p:cBhvr>
+                                        <p:cTn id="7" dur="500"/>
+                                        <p:tgtEl>
+                                          <p:spTgt spid="3">
+                                            <p:txEl>
+                                              <p:pRg st="0" end="0"/>
+                                            </p:txEl>
+                                          </p:spTgt>
+                                        </p:tgtEl>
+                                      </p:cBhvr>
+                                    </p:animEffect>
+                                  </p:childTnLst>
+                                </p:cTn>
+                              </p:par>
+                            </p:childTnLst>
+                          </p:cTn>
+                        </p:par>
+                      </p:childTnLst>
+                    </p:cTn>
+                  </p:par>
+                  <p:par>
+                    <p:cTn id="8" fill="hold">
+                      <p:stCondLst>
+                        <p:cond delay="indefinite"/>
+                      </p:stCondLst>
+                      <p:childTnLst>
+                        <p:par>
+                          <p:cTn id="9" fill="hold">
+                            <p:stCondLst>
+                              <p:cond delay="0"/>
+                            </p:stCondLst>
+                            <p:childTnLst>
+                              <p:par>
+                                <p:cTn id="10" presetID="10" presetClass="entr" presetSubtype="0" fill="hold" grpId="0" nodeType="clickEffect">
+                                  <p:stCondLst>
+                                    <p:cond delay="0"/>
+                                  </p:stCondLst>
+                                  <p:childTnLst>
+                                    <p:set>
+                                      <p:cBhvr>
+                                        <p:cTn id="11" dur="1" fill="hold">
+                                          <p:stCondLst>
+                                            <p:cond delay="0"/>
+                                          </p:stCondLst>
+                                        </p:cTn>
+                                        <p:tgtEl>
+                                          <p:spTgt spid="3">
+                                            <p:txEl>
+                                              <p:pRg st="1" end="1"/>
+                                            </p:txEl>
+                                          </p:spTgt>
+                                        </p:tgtEl>
+                                        <p:attrNameLst>
+                                          <p:attrName>style.visibility</p:attrName>
+                                        </p:attrNameLst>
+                                      </p:cBhvr>
+                                      <p:to>
+                                        <p:strVal val="visible"/>
+                                      </p:to>
+                                    </p:set>
+                                    <p:animEffect transition="in" filter="fade">
+                                      <p:cBhvr>
+                                        <p:cTn id="12" dur="500"/>
+                                        <p:tgtEl>
+                                          <p:spTgt spid="3">
+                                            <p:txEl>
+                                              <p:pRg st="1" end="1"/>
+                                            </p:txEl>
+                                          </p:spTgt>
+                                        </p:tgtEl>
+                                      </p:cBhvr>
+                                    </p:animEffect>
+                                  </p:childTnLst>
+                                </p:cTn>
+                              </p:par>
+                            </p:childTnLst>
+                          </p:cTn>
+                        </p:par>
+                      </p:childTnLst>
+                    </p:cTn>
+                  </p:par>
+                  <p:par>
+                    <p:cTn id="13" fill="hold">
+                      <p:stCondLst>
+                        <p:cond delay="indefinite"/>
+                      </p:stCondLst>
+                      <p:childTnLst>
+                        <p:par>
+                          <p:cTn id="14" fill="hold">
+                            <p:stCondLst>
+                              <p:cond delay="0"/>
+                            </p:stCondLst>
+                            <p:childTnLst>
+                              <p:par>
+                                <p:cTn id="15" presetID="10" presetClass="entr" presetSubtype="0" fill="hold" grpId="0" nodeType="clickEffect">
+                                  <p:stCondLst>
+                                    <p:cond delay="0"/>
+                                  </p:stCondLst>
+                                  <p:childTnLst>
+                                    <p:set>
+                                      <p:cBhvr>
+                                        <p:cTn id="16" dur="1" fill="hold">
+                                          <p:stCondLst>
+                                            <p:cond delay="0"/>
+                                          </p:stCondLst>
+                                        </p:cTn>
+                                        <p:tgtEl>
+                                          <p:spTgt spid="3">
+                                            <p:txEl>
+                                              <p:pRg st="2" end="2"/>
+                                            </p:txEl>
+                                          </p:spTgt>
+                                        </p:tgtEl>
+                                        <p:attrNameLst>
+                                          <p:attrName>style.visibility</p:attrName>
+                                        </p:attrNameLst>
+                                      </p:cBhvr>
+                                      <p:to>
+                                        <p:strVal val="visible"/>
+                                      </p:to>
+                                    </p:set>
+                                    <p:animEffect transition="in" filter="fade">
+                                      <p:cBhvr>
+                                        <p:cTn id="17" dur="500"/>
+                                        <p:tgtEl>
+                                          <p:spTgt spid="3">
+                                            <p:txEl>
+                                              <p:pRg st="2" end="2"/>
+                                            </p:txEl>
+                                          </p:spTgt>
+                                        </p:tgtEl>
+                                      </p:cBhvr>
+                                    </p:animEffect>
+                                  </p:childTnLst>
+                                </p:cTn>
+                              </p:par>
+                            </p:childTnLst>
+                          </p:cTn>
+                        </p:par>
+                      </p:childTnLst>
+                    </p:cTn>
+                  </p:par>
+                  <p:par>
+                    <p:cTn id="18" fill="hold">
+                      <p:stCondLst>
+                        <p:cond delay="indefinite"/>
+                      </p:stCondLst>
+                      <p:childTnLst>
+                        <p:par>
+                          <p:cTn id="19" fill="hold">
+                            <p:stCondLst>
+                              <p:cond delay="0"/>
+                            </p:stCondLst>
+                            <p:childTnLst>
+                              <p:par>
+                                <p:cTn id="20" presetID="10" presetClass="entr" presetSubtype="0" fill="hold" grpId="0" nodeType="clickEffect">
+                                  <p:stCondLst>
+                                    <p:cond delay="0"/>
+                                  </p:stCondLst>
+                                  <p:childTnLst>
+                                    <p:set>
+                                      <p:cBhvr>
+                                        <p:cTn id="21" dur="1" fill="hold">
+                                          <p:stCondLst>
+                                            <p:cond delay="0"/>
+                                          </p:stCondLst>
+                                        </p:cTn>
+                                        <p:tgtEl>
+                                          <p:spTgt spid="3">
+                                            <p:txEl>
+                                              <p:pRg st="4" end="4"/>
+                                            </p:txEl>
+                                          </p:spTgt>
+                                        </p:tgtEl>
+                                        <p:attrNameLst>
+                                          <p:attrName>style.visibility</p:attrName>
+                                        </p:attrNameLst>
+                                      </p:cBhvr>
+                                      <p:to>
+                                        <p:strVal val="visible"/>
+                                      </p:to>
+                                    </p:set>
+                                    <p:animEffect transition="in" filter="fade">
+                                      <p:cBhvr>
+                                        <p:cTn id="22" dur="500"/>
+                                        <p:tgtEl>
+                                          <p:spTgt spid="3">
+                                            <p:txEl>
+                                              <p:pRg st="4" end="4"/>
+                                            </p:txEl>
+                                          </p:spTgt>
+                                        </p:tgtEl>
+                                      </p:cBhvr>
+                                    </p:animEffect>
+                                  </p:childTnLst>
+                                </p:cTn>
+                              </p:par>
+                            </p:childTnLst>
+                          </p:cTn>
+                        </p:par>
+                      </p:childTnLst>
+                    </p:cTn>
+                  </p:par>
+                </p:childTnLst>
+              </p:cTn>
+              <p:prevCondLst>
+                <p:cond evt="onPrev" delay="0">
+                  <p:tgtEl>
+                    <p:sldTgt/>
+                  </p:tgtEl>
+                </p:cond>
+              </p:prevCondLst>
+              <p:nextCondLst>
+                <p:cond evt="onNext" delay="0">
+                  <p:tgtEl>
+                    <p:sldTgt/>
+                  </p:tgtEl>
+                </p:cond>
+              </p:nextCondLst>
+            </p:seq>
+          </p:childTnLst>
+        </p:cTn>
+      </p:par>
+    </p:tnLst>
+    <p:bldLst>
+      <p:bldP spid="3" grpId="0" build="p"/>
+    </p:bldLst>
+  </p:timing>
+</p:sld>
+</file>
+
+<file path=ppt/slides/slide11.xml><?xml version="1.0" encoding="utf-8"?>
+<p:sld xmlns:a="http://schemas.openxmlformats.org/drawingml/2006/main" xmlns:r="http://schemas.openxmlformats.org/officeDocument/2006/relationships" xmlns:p="http://schemas.openxmlformats.org/presentationml/2006/main">
+  <p:cSld>
+    <p:spTree>
+      <p:nvGrpSpPr>
+        <p:cNvPr id="1" name=""/>
+        <p:cNvGrpSpPr/>
+        <p:nvPr/>
+      </p:nvGrpSpPr>
+      <p:grpSpPr>
+        <a:xfrm>
+          <a:off x="0" y="0"/>
+          <a:ext cx="0" cy="0"/>
+          <a:chOff x="0" y="0"/>
+          <a:chExt cx="0" cy="0"/>
+        </a:xfrm>
+      </p:grpSpPr>
+      <p:sp>
+        <p:nvSpPr>
+          <p:cNvPr id="2" name="Title 1"/>
+          <p:cNvSpPr>
+            <a:spLocks noGrp="1"/>
+          </p:cNvSpPr>
+          <p:nvPr>
             <p:ph type="ctrTitle"/>
           </p:nvPr>
         </p:nvSpPr>
@@ -4995,7 +5555,7 @@
 </p:sld>
 </file>
 
-<file path=ppt/slides/slide11.xml><?xml version="1.0" encoding="utf-8"?>
+<file path=ppt/slides/slide12.xml><?xml version="1.0" encoding="utf-8"?>
 <p:sld xmlns:a="http://schemas.openxmlformats.org/drawingml/2006/main" xmlns:r="http://schemas.openxmlformats.org/officeDocument/2006/relationships" xmlns:p="http://schemas.openxmlformats.org/presentationml/2006/main">
   <p:cSld>
     <p:spTree>
@@ -5451,7 +6011,7 @@
 </p:sld>
 </file>
 
-<file path=ppt/slides/slide12.xml><?xml version="1.0" encoding="utf-8"?>
+<file path=ppt/slides/slide13.xml><?xml version="1.0" encoding="utf-8"?>
 <p:sld xmlns:a="http://schemas.openxmlformats.org/drawingml/2006/main" xmlns:r="http://schemas.openxmlformats.org/officeDocument/2006/relationships" xmlns:p="http://schemas.openxmlformats.org/presentationml/2006/main">
   <p:cSld>
     <p:spTree>
@@ -5569,7 +6129,6 @@
               <a:rPr lang="en-US" dirty="0" smtClean="0"/>
               <a:t>)</a:t>
             </a:r>
-            <a:endParaRPr lang="en-US" dirty="0" smtClean="0"/>
           </a:p>
         </p:txBody>
       </p:sp>
@@ -6040,7 +6599,7 @@
 </p:sld>
 </file>
 
-<file path=ppt/slides/slide13.xml><?xml version="1.0" encoding="utf-8"?>
+<file path=ppt/slides/slide14.xml><?xml version="1.0" encoding="utf-8"?>
 <p:sld xmlns:a="http://schemas.openxmlformats.org/drawingml/2006/main" xmlns:r="http://schemas.openxmlformats.org/officeDocument/2006/relationships" xmlns:p="http://schemas.openxmlformats.org/presentationml/2006/main">
   <p:cSld>
     <p:spTree>
@@ -6139,7 +6698,6 @@
               <a:rPr lang="en-US" dirty="0" smtClean="0"/>
               <a:t>SDK support for easier handling</a:t>
             </a:r>
-            <a:endParaRPr lang="en-US" dirty="0" smtClean="0"/>
           </a:p>
         </p:txBody>
       </p:sp>
@@ -6432,66 +6990,6 @@
 </p:sld>
 </file>
 
-<file path=ppt/slides/slide14.xml><?xml version="1.0" encoding="utf-8"?>
-<p:sld xmlns:a="http://schemas.openxmlformats.org/drawingml/2006/main" xmlns:r="http://schemas.openxmlformats.org/officeDocument/2006/relationships" xmlns:p="http://schemas.openxmlformats.org/presentationml/2006/main">
-  <p:cSld>
-    <p:spTree>
-      <p:nvGrpSpPr>
-        <p:cNvPr id="1" name=""/>
-        <p:cNvGrpSpPr/>
-        <p:nvPr/>
-      </p:nvGrpSpPr>
-      <p:grpSpPr>
-        <a:xfrm>
-          <a:off x="0" y="0"/>
-          <a:ext cx="0" cy="0"/>
-          <a:chOff x="0" y="0"/>
-          <a:chExt cx="0" cy="0"/>
-        </a:xfrm>
-      </p:grpSpPr>
-      <p:sp>
-        <p:nvSpPr>
-          <p:cNvPr id="2" name="Title 1"/>
-          <p:cNvSpPr>
-            <a:spLocks noGrp="1"/>
-          </p:cNvSpPr>
-          <p:nvPr>
-            <p:ph type="ctrTitle"/>
-          </p:nvPr>
-        </p:nvSpPr>
-        <p:spPr/>
-        <p:txBody>
-          <a:bodyPr/>
-          <a:lstStyle/>
-          <a:p>
-            <a:r>
-              <a:rPr lang="en-US" dirty="0" smtClean="0"/>
-              <a:t>Advanced Queries - Java</a:t>
-            </a:r>
-            <a:endParaRPr lang="en-US" dirty="0"/>
-          </a:p>
-        </p:txBody>
-      </p:sp>
-    </p:spTree>
-    <p:extLst>
-      <p:ext uri="{BB962C8B-B14F-4D97-AF65-F5344CB8AC3E}">
-        <p14:creationId xmlns:p14="http://schemas.microsoft.com/office/powerpoint/2010/main" val="3683186877"/>
-      </p:ext>
-    </p:extLst>
-  </p:cSld>
-  <p:clrMapOvr>
-    <a:masterClrMapping/>
-  </p:clrMapOvr>
-  <p:timing>
-    <p:tnLst>
-      <p:par>
-        <p:cTn xmlns:p14="http://schemas.microsoft.com/office/powerpoint/2010/main" id="1" dur="indefinite" restart="never" nodeType="tmRoot"/>
-      </p:par>
-    </p:tnLst>
-  </p:timing>
-</p:sld>
-</file>
-
 <file path=ppt/slides/slide15.xml><?xml version="1.0" encoding="utf-8"?>
 <p:sld xmlns:a="http://schemas.openxmlformats.org/drawingml/2006/main" xmlns:r="http://schemas.openxmlformats.org/officeDocument/2006/relationships" xmlns:p="http://schemas.openxmlformats.org/presentationml/2006/main">
   <p:cSld>
@@ -6525,12 +7023,8 @@
           <a:lstStyle/>
           <a:p>
             <a:r>
-              <a:rPr lang="en-US" dirty="0"/>
-              <a:t>Advanced Queries - </a:t>
-            </a:r>
-            <a:r>
               <a:rPr lang="en-US" dirty="0" smtClean="0"/>
-              <a:t>.NET</a:t>
+              <a:t>Advanced Queries - Java</a:t>
             </a:r>
             <a:endParaRPr lang="en-US" dirty="0"/>
           </a:p>
@@ -6539,7 +7033,7 @@
     </p:spTree>
     <p:extLst>
       <p:ext uri="{BB962C8B-B14F-4D97-AF65-F5344CB8AC3E}">
-        <p14:creationId xmlns:p14="http://schemas.microsoft.com/office/powerpoint/2010/main" val="882545490"/>
+        <p14:creationId xmlns:p14="http://schemas.microsoft.com/office/powerpoint/2010/main" val="3683186877"/>
       </p:ext>
     </p:extLst>
   </p:cSld>
@@ -6593,8 +7087,8 @@
               <a:t>Advanced Queries - </a:t>
             </a:r>
             <a:r>
-              <a:rPr lang="en-US" dirty="0" err="1" smtClean="0"/>
-              <a:t>NodeJS</a:t>
+              <a:rPr lang="en-US" dirty="0" smtClean="0"/>
+              <a:t>.NET</a:t>
             </a:r>
             <a:endParaRPr lang="en-US" dirty="0"/>
           </a:p>
@@ -6603,7 +7097,7 @@
     </p:spTree>
     <p:extLst>
       <p:ext uri="{BB962C8B-B14F-4D97-AF65-F5344CB8AC3E}">
-        <p14:creationId xmlns:p14="http://schemas.microsoft.com/office/powerpoint/2010/main" val="3686523847"/>
+        <p14:creationId xmlns:p14="http://schemas.microsoft.com/office/powerpoint/2010/main" val="882545490"/>
       </p:ext>
     </p:extLst>
   </p:cSld>
@@ -6653,6 +7147,70 @@
           <a:lstStyle/>
           <a:p>
             <a:r>
+              <a:rPr lang="en-US" dirty="0"/>
+              <a:t>Advanced Queries - </a:t>
+            </a:r>
+            <a:r>
+              <a:rPr lang="en-US" dirty="0" err="1" smtClean="0"/>
+              <a:t>NodeJS</a:t>
+            </a:r>
+            <a:endParaRPr lang="en-US" dirty="0"/>
+          </a:p>
+        </p:txBody>
+      </p:sp>
+    </p:spTree>
+    <p:extLst>
+      <p:ext uri="{BB962C8B-B14F-4D97-AF65-F5344CB8AC3E}">
+        <p14:creationId xmlns:p14="http://schemas.microsoft.com/office/powerpoint/2010/main" val="3686523847"/>
+      </p:ext>
+    </p:extLst>
+  </p:cSld>
+  <p:clrMapOvr>
+    <a:masterClrMapping/>
+  </p:clrMapOvr>
+  <p:timing>
+    <p:tnLst>
+      <p:par>
+        <p:cTn xmlns:p14="http://schemas.microsoft.com/office/powerpoint/2010/main" id="1" dur="indefinite" restart="never" nodeType="tmRoot"/>
+      </p:par>
+    </p:tnLst>
+  </p:timing>
+</p:sld>
+</file>
+
+<file path=ppt/slides/slide18.xml><?xml version="1.0" encoding="utf-8"?>
+<p:sld xmlns:a="http://schemas.openxmlformats.org/drawingml/2006/main" xmlns:r="http://schemas.openxmlformats.org/officeDocument/2006/relationships" xmlns:p="http://schemas.openxmlformats.org/presentationml/2006/main">
+  <p:cSld>
+    <p:spTree>
+      <p:nvGrpSpPr>
+        <p:cNvPr id="1" name=""/>
+        <p:cNvGrpSpPr/>
+        <p:nvPr/>
+      </p:nvGrpSpPr>
+      <p:grpSpPr>
+        <a:xfrm>
+          <a:off x="0" y="0"/>
+          <a:ext cx="0" cy="0"/>
+          <a:chOff x="0" y="0"/>
+          <a:chExt cx="0" cy="0"/>
+        </a:xfrm>
+      </p:grpSpPr>
+      <p:sp>
+        <p:nvSpPr>
+          <p:cNvPr id="2" name="Title 1"/>
+          <p:cNvSpPr>
+            <a:spLocks noGrp="1"/>
+          </p:cNvSpPr>
+          <p:nvPr>
+            <p:ph type="ctrTitle"/>
+          </p:nvPr>
+        </p:nvSpPr>
+        <p:spPr/>
+        <p:txBody>
+          <a:bodyPr/>
+          <a:lstStyle/>
+          <a:p>
+            <a:r>
               <a:rPr lang="en-US" dirty="0" smtClean="0"/>
               <a:t>View vs. Indexes</a:t>
             </a:r>
@@ -6680,7 +7238,7 @@
 </p:sld>
 </file>
 
-<file path=ppt/slides/slide18.xml><?xml version="1.0" encoding="utf-8"?>
+<file path=ppt/slides/slide19.xml><?xml version="1.0" encoding="utf-8"?>
 <p:sld xmlns:a="http://schemas.openxmlformats.org/drawingml/2006/main" xmlns:r="http://schemas.openxmlformats.org/officeDocument/2006/relationships" xmlns:p="http://schemas.openxmlformats.org/presentationml/2006/main">
   <p:cSld>
     <p:spTree>
@@ -7095,7 +7653,67 @@
 </p:sld>
 </file>
 
-<file path=ppt/slides/slide19.xml><?xml version="1.0" encoding="utf-8"?>
+<file path=ppt/slides/slide2.xml><?xml version="1.0" encoding="utf-8"?>
+<p:sld xmlns:a="http://schemas.openxmlformats.org/drawingml/2006/main" xmlns:r="http://schemas.openxmlformats.org/officeDocument/2006/relationships" xmlns:p="http://schemas.openxmlformats.org/presentationml/2006/main">
+  <p:cSld>
+    <p:spTree>
+      <p:nvGrpSpPr>
+        <p:cNvPr id="1" name=""/>
+        <p:cNvGrpSpPr/>
+        <p:nvPr/>
+      </p:nvGrpSpPr>
+      <p:grpSpPr>
+        <a:xfrm>
+          <a:off x="0" y="0"/>
+          <a:ext cx="0" cy="0"/>
+          <a:chOff x="0" y="0"/>
+          <a:chExt cx="0" cy="0"/>
+        </a:xfrm>
+      </p:grpSpPr>
+      <p:sp>
+        <p:nvSpPr>
+          <p:cNvPr id="2" name="Title 1"/>
+          <p:cNvSpPr>
+            <a:spLocks noGrp="1"/>
+          </p:cNvSpPr>
+          <p:nvPr>
+            <p:ph type="ctrTitle"/>
+          </p:nvPr>
+        </p:nvSpPr>
+        <p:spPr/>
+        <p:txBody>
+          <a:bodyPr/>
+          <a:lstStyle/>
+          <a:p>
+            <a:r>
+              <a:rPr lang="en-US" dirty="0" smtClean="0"/>
+              <a:t>Index Management</a:t>
+            </a:r>
+            <a:endParaRPr lang="en-US" dirty="0"/>
+          </a:p>
+        </p:txBody>
+      </p:sp>
+    </p:spTree>
+    <p:extLst>
+      <p:ext uri="{BB962C8B-B14F-4D97-AF65-F5344CB8AC3E}">
+        <p14:creationId xmlns:p14="http://schemas.microsoft.com/office/powerpoint/2010/main" val="735871736"/>
+      </p:ext>
+    </p:extLst>
+  </p:cSld>
+  <p:clrMapOvr>
+    <a:masterClrMapping/>
+  </p:clrMapOvr>
+  <p:timing>
+    <p:tnLst>
+      <p:par>
+        <p:cTn xmlns:p14="http://schemas.microsoft.com/office/powerpoint/2010/main" id="1" dur="indefinite" restart="never" nodeType="tmRoot"/>
+      </p:par>
+    </p:tnLst>
+  </p:timing>
+</p:sld>
+</file>
+
+<file path=ppt/slides/slide20.xml><?xml version="1.0" encoding="utf-8"?>
 <p:sld xmlns:a="http://schemas.openxmlformats.org/drawingml/2006/main" xmlns:r="http://schemas.openxmlformats.org/officeDocument/2006/relationships" xmlns:p="http://schemas.openxmlformats.org/presentationml/2006/main">
   <p:cSld>
     <p:spTree>
@@ -7328,7 +7946,7 @@
             <a:fld id="{2066355A-084C-D24E-9AD2-7E4FC41EA627}" type="slidenum">
               <a:rPr lang="en-US" smtClean="0"/>
               <a:pPr/>
-              <a:t>19</a:t>
+              <a:t>20</a:t>
             </a:fld>
             <a:endParaRPr lang="en-US" dirty="0"/>
           </a:p>
@@ -10952,67 +11570,7 @@
 </p:sld>
 </file>
 
-<file path=ppt/slides/slide2.xml><?xml version="1.0" encoding="utf-8"?>
-<p:sld xmlns:a="http://schemas.openxmlformats.org/drawingml/2006/main" xmlns:r="http://schemas.openxmlformats.org/officeDocument/2006/relationships" xmlns:p="http://schemas.openxmlformats.org/presentationml/2006/main">
-  <p:cSld>
-    <p:spTree>
-      <p:nvGrpSpPr>
-        <p:cNvPr id="1" name=""/>
-        <p:cNvGrpSpPr/>
-        <p:nvPr/>
-      </p:nvGrpSpPr>
-      <p:grpSpPr>
-        <a:xfrm>
-          <a:off x="0" y="0"/>
-          <a:ext cx="0" cy="0"/>
-          <a:chOff x="0" y="0"/>
-          <a:chExt cx="0" cy="0"/>
-        </a:xfrm>
-      </p:grpSpPr>
-      <p:sp>
-        <p:nvSpPr>
-          <p:cNvPr id="2" name="Title 1"/>
-          <p:cNvSpPr>
-            <a:spLocks noGrp="1"/>
-          </p:cNvSpPr>
-          <p:nvPr>
-            <p:ph type="ctrTitle"/>
-          </p:nvPr>
-        </p:nvSpPr>
-        <p:spPr/>
-        <p:txBody>
-          <a:bodyPr/>
-          <a:lstStyle/>
-          <a:p>
-            <a:r>
-              <a:rPr lang="en-US" dirty="0" smtClean="0"/>
-              <a:t>Index Management</a:t>
-            </a:r>
-            <a:endParaRPr lang="en-US" dirty="0"/>
-          </a:p>
-        </p:txBody>
-      </p:sp>
-    </p:spTree>
-    <p:extLst>
-      <p:ext uri="{BB962C8B-B14F-4D97-AF65-F5344CB8AC3E}">
-        <p14:creationId xmlns:p14="http://schemas.microsoft.com/office/powerpoint/2010/main" val="735871736"/>
-      </p:ext>
-    </p:extLst>
-  </p:cSld>
-  <p:clrMapOvr>
-    <a:masterClrMapping/>
-  </p:clrMapOvr>
-  <p:timing>
-    <p:tnLst>
-      <p:par>
-        <p:cTn xmlns:p14="http://schemas.microsoft.com/office/powerpoint/2010/main" id="1" dur="indefinite" restart="never" nodeType="tmRoot"/>
-      </p:par>
-    </p:tnLst>
-  </p:timing>
-</p:sld>
-</file>
-
-<file path=ppt/slides/slide20.xml><?xml version="1.0" encoding="utf-8"?>
+<file path=ppt/slides/slide21.xml><?xml version="1.0" encoding="utf-8"?>
 <p:sld xmlns:a="http://schemas.openxmlformats.org/drawingml/2006/main" xmlns:r="http://schemas.openxmlformats.org/officeDocument/2006/relationships" xmlns:p="http://schemas.openxmlformats.org/presentationml/2006/main">
   <p:cSld>
     <p:spTree>
@@ -12939,7 +13497,7 @@
 </p:sld>
 </file>
 
-<file path=ppt/slides/slide21.xml><?xml version="1.0" encoding="utf-8"?>
+<file path=ppt/slides/slide22.xml><?xml version="1.0" encoding="utf-8"?>
 <p:sld xmlns:a="http://schemas.openxmlformats.org/drawingml/2006/main" xmlns:r="http://schemas.openxmlformats.org/officeDocument/2006/relationships" xmlns:p="http://schemas.openxmlformats.org/presentationml/2006/main">
   <p:cSld>
     <p:spTree>
@@ -13648,85 +14206,6 @@
 </p:sld>
 </file>
 
-<file path=ppt/slides/slide22.xml><?xml version="1.0" encoding="utf-8"?>
-<p:sld xmlns:a="http://schemas.openxmlformats.org/drawingml/2006/main" xmlns:r="http://schemas.openxmlformats.org/officeDocument/2006/relationships" xmlns:p="http://schemas.openxmlformats.org/presentationml/2006/main">
-  <p:cSld>
-    <p:spTree>
-      <p:nvGrpSpPr>
-        <p:cNvPr id="1" name=""/>
-        <p:cNvGrpSpPr/>
-        <p:nvPr/>
-      </p:nvGrpSpPr>
-      <p:grpSpPr>
-        <a:xfrm>
-          <a:off x="0" y="0"/>
-          <a:ext cx="0" cy="0"/>
-          <a:chOff x="0" y="0"/>
-          <a:chExt cx="0" cy="0"/>
-        </a:xfrm>
-      </p:grpSpPr>
-      <p:sp>
-        <p:nvSpPr>
-          <p:cNvPr id="2" name="Title 1"/>
-          <p:cNvSpPr>
-            <a:spLocks noGrp="1"/>
-          </p:cNvSpPr>
-          <p:nvPr>
-            <p:ph type="ctrTitle"/>
-          </p:nvPr>
-        </p:nvSpPr>
-        <p:spPr/>
-        <p:txBody>
-          <a:bodyPr/>
-          <a:lstStyle/>
-          <a:p>
-            <a:r>
-              <a:rPr lang="en-US" dirty="0" smtClean="0"/>
-              <a:t>Questions?</a:t>
-            </a:r>
-            <a:endParaRPr lang="en-US" dirty="0"/>
-          </a:p>
-        </p:txBody>
-      </p:sp>
-      <p:sp>
-        <p:nvSpPr>
-          <p:cNvPr id="3" name="Subtitle 2"/>
-          <p:cNvSpPr>
-            <a:spLocks noGrp="1"/>
-          </p:cNvSpPr>
-          <p:nvPr>
-            <p:ph type="subTitle" idx="1"/>
-          </p:nvPr>
-        </p:nvSpPr>
-        <p:spPr/>
-        <p:txBody>
-          <a:bodyPr/>
-          <a:lstStyle/>
-          <a:p>
-            <a:endParaRPr lang="en-US" dirty="0"/>
-          </a:p>
-        </p:txBody>
-      </p:sp>
-    </p:spTree>
-    <p:extLst>
-      <p:ext uri="{BB962C8B-B14F-4D97-AF65-F5344CB8AC3E}">
-        <p14:creationId xmlns:p14="http://schemas.microsoft.com/office/powerpoint/2010/main" val="904379520"/>
-      </p:ext>
-    </p:extLst>
-  </p:cSld>
-  <p:clrMapOvr>
-    <a:masterClrMapping/>
-  </p:clrMapOvr>
-  <p:timing>
-    <p:tnLst>
-      <p:par>
-        <p:cTn xmlns:p14="http://schemas.microsoft.com/office/powerpoint/2010/main" id="1" dur="indefinite" restart="never" nodeType="tmRoot"/>
-      </p:par>
-    </p:tnLst>
-  </p:timing>
-</p:sld>
-</file>
-
 <file path=ppt/slides/slide23.xml><?xml version="1.0" encoding="utf-8"?>
 <p:sld xmlns:a="http://schemas.openxmlformats.org/drawingml/2006/main" xmlns:r="http://schemas.openxmlformats.org/officeDocument/2006/relationships" xmlns:p="http://schemas.openxmlformats.org/presentationml/2006/main">
   <p:cSld>
@@ -13761,8 +14240,27 @@
           <a:p>
             <a:r>
               <a:rPr lang="en-US" dirty="0" smtClean="0"/>
-              <a:t>Thank you.</a:t>
-            </a:r>
+              <a:t>Questions?</a:t>
+            </a:r>
+            <a:endParaRPr lang="en-US" dirty="0"/>
+          </a:p>
+        </p:txBody>
+      </p:sp>
+      <p:sp>
+        <p:nvSpPr>
+          <p:cNvPr id="3" name="Subtitle 2"/>
+          <p:cNvSpPr>
+            <a:spLocks noGrp="1"/>
+          </p:cNvSpPr>
+          <p:nvPr>
+            <p:ph type="subTitle" idx="1"/>
+          </p:nvPr>
+        </p:nvSpPr>
+        <p:spPr/>
+        <p:txBody>
+          <a:bodyPr/>
+          <a:lstStyle/>
+          <a:p>
             <a:endParaRPr lang="en-US" dirty="0"/>
           </a:p>
         </p:txBody>
@@ -13770,7 +14268,7 @@
     </p:spTree>
     <p:extLst>
       <p:ext uri="{BB962C8B-B14F-4D97-AF65-F5344CB8AC3E}">
-        <p14:creationId xmlns:p14="http://schemas.microsoft.com/office/powerpoint/2010/main" val="2598212430"/>
+        <p14:creationId xmlns:p14="http://schemas.microsoft.com/office/powerpoint/2010/main" val="904379520"/>
       </p:ext>
     </p:extLst>
   </p:cSld>
@@ -13788,7 +14286,7 @@
 </file>
 
 <file path=ppt/slides/slide24.xml><?xml version="1.0" encoding="utf-8"?>
-<p:sld xmlns:a="http://schemas.openxmlformats.org/drawingml/2006/main" xmlns:r="http://schemas.openxmlformats.org/officeDocument/2006/relationships" xmlns:p="http://schemas.openxmlformats.org/presentationml/2006/main" show="0">
+<p:sld xmlns:a="http://schemas.openxmlformats.org/drawingml/2006/main" xmlns:r="http://schemas.openxmlformats.org/officeDocument/2006/relationships" xmlns:p="http://schemas.openxmlformats.org/presentationml/2006/main">
   <p:cSld>
     <p:spTree>
       <p:nvGrpSpPr>
@@ -13811,7 +14309,7 @@
             <a:spLocks noGrp="1"/>
           </p:cNvSpPr>
           <p:nvPr>
-            <p:ph type="title"/>
+            <p:ph type="ctrTitle"/>
           </p:nvPr>
         </p:nvSpPr>
         <p:spPr/>
@@ -13821,58 +14319,7 @@
           <a:p>
             <a:r>
               <a:rPr lang="en-US" dirty="0" smtClean="0"/>
-              <a:t>Title and Bullets</a:t>
-            </a:r>
-            <a:endParaRPr lang="en-US" dirty="0"/>
-          </a:p>
-        </p:txBody>
-      </p:sp>
-      <p:sp>
-        <p:nvSpPr>
-          <p:cNvPr id="3" name="Content Placeholder 2"/>
-          <p:cNvSpPr>
-            <a:spLocks noGrp="1"/>
-          </p:cNvSpPr>
-          <p:nvPr>
-            <p:ph idx="1"/>
-          </p:nvPr>
-        </p:nvSpPr>
-        <p:spPr/>
-        <p:txBody>
-          <a:bodyPr/>
-          <a:lstStyle/>
-          <a:p>
-            <a:r>
-              <a:rPr lang="en-US" dirty="0" smtClean="0"/>
-              <a:t>First Level Bullet</a:t>
-            </a:r>
-          </a:p>
-          <a:p>
-            <a:pPr lvl="1"/>
-            <a:r>
-              <a:rPr lang="en-US" dirty="0" smtClean="0"/>
-              <a:t>Second Level Bullet</a:t>
-            </a:r>
-          </a:p>
-          <a:p>
-            <a:pPr lvl="2"/>
-            <a:r>
-              <a:rPr lang="en-US" dirty="0" smtClean="0"/>
-              <a:t>Third Level Bullet</a:t>
-            </a:r>
-          </a:p>
-          <a:p>
-            <a:pPr lvl="3"/>
-            <a:r>
-              <a:rPr lang="en-US" dirty="0" smtClean="0"/>
-              <a:t>Fourth Level Bullet</a:t>
-            </a:r>
-          </a:p>
-          <a:p>
-            <a:pPr lvl="4"/>
-            <a:r>
-              <a:rPr lang="en-US" dirty="0" smtClean="0"/>
-              <a:t>Fifth Level Bullet</a:t>
+              <a:t>Thank you.</a:t>
             </a:r>
             <a:endParaRPr lang="en-US" dirty="0"/>
           </a:p>
@@ -13881,21 +14328,13 @@
     </p:spTree>
     <p:extLst>
       <p:ext uri="{BB962C8B-B14F-4D97-AF65-F5344CB8AC3E}">
-        <p14:creationId xmlns:p14="http://schemas.microsoft.com/office/powerpoint/2010/main" val="1910273132"/>
+        <p14:creationId xmlns:p14="http://schemas.microsoft.com/office/powerpoint/2010/main" val="2598212430"/>
       </p:ext>
     </p:extLst>
   </p:cSld>
   <p:clrMapOvr>
     <a:masterClrMapping/>
   </p:clrMapOvr>
-  <mc:AlternateContent xmlns:mc="http://schemas.openxmlformats.org/markup-compatibility/2006">
-    <mc:Choice xmlns:p14="http://schemas.microsoft.com/office/powerpoint/2010/main" Requires="p14">
-      <p:transition spd="slow" p14:dur="2000"/>
-    </mc:Choice>
-    <mc:Fallback>
-      <p:transition xmlns:p14="http://schemas.microsoft.com/office/powerpoint/2010/main" spd="slow"/>
-    </mc:Fallback>
-  </mc:AlternateContent>
   <p:timing>
     <p:tnLst>
       <p:par>
@@ -13940,7 +14379,7 @@
           <a:p>
             <a:r>
               <a:rPr lang="en-US" dirty="0" smtClean="0"/>
-              <a:t>Title and Text</a:t>
+              <a:t>Title and Bullets</a:t>
             </a:r>
             <a:endParaRPr lang="en-US" dirty="0"/>
           </a:p>
@@ -13962,167 +14401,37 @@
           <a:lstStyle/>
           <a:p>
             <a:r>
-              <a:rPr lang="en-US" dirty="0" err="1"/>
-              <a:t>Lorem</a:t>
-            </a:r>
-            <a:r>
-              <a:rPr lang="en-US" dirty="0"/>
-              <a:t> </a:t>
-            </a:r>
-            <a:r>
-              <a:rPr lang="en-US" dirty="0" err="1"/>
-              <a:t>ipsum</a:t>
-            </a:r>
-            <a:r>
-              <a:rPr lang="en-US" dirty="0"/>
-              <a:t> dolor sit </a:t>
-            </a:r>
-            <a:r>
-              <a:rPr lang="en-US" dirty="0" err="1"/>
-              <a:t>amet</a:t>
-            </a:r>
-            <a:r>
-              <a:rPr lang="en-US" dirty="0"/>
-              <a:t>, </a:t>
-            </a:r>
-            <a:r>
-              <a:rPr lang="en-US" dirty="0" err="1"/>
-              <a:t>consectetur</a:t>
-            </a:r>
-            <a:r>
-              <a:rPr lang="en-US" dirty="0"/>
-              <a:t> </a:t>
-            </a:r>
-            <a:r>
-              <a:rPr lang="en-US" dirty="0" err="1"/>
-              <a:t>adipiscing</a:t>
-            </a:r>
-            <a:r>
-              <a:rPr lang="en-US" dirty="0"/>
-              <a:t> </a:t>
-            </a:r>
-            <a:r>
-              <a:rPr lang="en-US" dirty="0" err="1"/>
-              <a:t>elit</a:t>
-            </a:r>
-            <a:r>
-              <a:rPr lang="en-US" dirty="0"/>
-              <a:t>. </a:t>
-            </a:r>
-            <a:r>
-              <a:rPr lang="en-US" dirty="0" err="1"/>
-              <a:t>Donec</a:t>
-            </a:r>
-            <a:r>
-              <a:rPr lang="en-US" dirty="0"/>
-              <a:t> </a:t>
-            </a:r>
-            <a:r>
-              <a:rPr lang="en-US" dirty="0" err="1"/>
-              <a:t>risus</a:t>
-            </a:r>
-            <a:r>
-              <a:rPr lang="en-US" dirty="0"/>
-              <a:t> </a:t>
-            </a:r>
-            <a:r>
-              <a:rPr lang="en-US" dirty="0" err="1"/>
-              <a:t>purus</a:t>
-            </a:r>
-            <a:r>
-              <a:rPr lang="en-US" dirty="0"/>
-              <a:t>, tempus in </a:t>
-            </a:r>
-            <a:r>
-              <a:rPr lang="en-US" dirty="0" err="1"/>
-              <a:t>quis</a:t>
-            </a:r>
-            <a:r>
-              <a:rPr lang="en-US" dirty="0"/>
-              <a:t>, </a:t>
-            </a:r>
-            <a:r>
-              <a:rPr lang="en-US" dirty="0" err="1"/>
-              <a:t>ultricies</a:t>
-            </a:r>
-            <a:r>
-              <a:rPr lang="en-US" dirty="0"/>
-              <a:t> </a:t>
-            </a:r>
-            <a:r>
-              <a:rPr lang="en-US" dirty="0" err="1"/>
-              <a:t>eu</a:t>
-            </a:r>
-            <a:r>
-              <a:rPr lang="en-US" dirty="0"/>
-              <a:t> diam. </a:t>
-            </a:r>
-            <a:r>
-              <a:rPr lang="en-US" dirty="0" err="1"/>
-              <a:t>Donec</a:t>
-            </a:r>
-            <a:r>
-              <a:rPr lang="en-US" dirty="0"/>
-              <a:t> </a:t>
-            </a:r>
-            <a:r>
-              <a:rPr lang="en-US" dirty="0" err="1"/>
-              <a:t>convallis</a:t>
-            </a:r>
-            <a:r>
-              <a:rPr lang="en-US" dirty="0"/>
-              <a:t> </a:t>
-            </a:r>
-            <a:r>
-              <a:rPr lang="en-US" dirty="0" err="1"/>
-              <a:t>enim</a:t>
-            </a:r>
-            <a:r>
-              <a:rPr lang="en-US" dirty="0"/>
-              <a:t> in mi </a:t>
-            </a:r>
-            <a:r>
-              <a:rPr lang="en-US" dirty="0" err="1"/>
-              <a:t>lacinia</a:t>
-            </a:r>
-            <a:r>
-              <a:rPr lang="en-US" dirty="0"/>
-              <a:t>, id </a:t>
-            </a:r>
-            <a:r>
-              <a:rPr lang="en-US" dirty="0" err="1"/>
-              <a:t>viverra</a:t>
-            </a:r>
-            <a:r>
-              <a:rPr lang="en-US" dirty="0"/>
-              <a:t> </a:t>
-            </a:r>
-            <a:r>
-              <a:rPr lang="en-US" dirty="0" err="1"/>
-              <a:t>neque</a:t>
-            </a:r>
-            <a:r>
-              <a:rPr lang="en-US" dirty="0"/>
-              <a:t> </a:t>
-            </a:r>
-            <a:r>
-              <a:rPr lang="en-US" dirty="0" err="1"/>
-              <a:t>pretium</a:t>
-            </a:r>
-            <a:r>
-              <a:rPr lang="en-US" dirty="0"/>
-              <a:t>. </a:t>
-            </a:r>
-            <a:r>
-              <a:rPr lang="en-US" dirty="0" err="1"/>
-              <a:t>Phasellus</a:t>
-            </a:r>
-            <a:r>
-              <a:rPr lang="en-US" dirty="0"/>
-              <a:t> et.</a:t>
-            </a:r>
-          </a:p>
-          <a:p>
+              <a:rPr lang="en-US" dirty="0" smtClean="0"/>
+              <a:t>First Level Bullet</a:t>
+            </a:r>
+          </a:p>
+          <a:p>
+            <a:pPr lvl="1"/>
+            <a:r>
+              <a:rPr lang="en-US" dirty="0" smtClean="0"/>
+              <a:t>Second Level Bullet</a:t>
+            </a:r>
+          </a:p>
+          <a:p>
+            <a:pPr lvl="2"/>
+            <a:r>
+              <a:rPr lang="en-US" dirty="0" smtClean="0"/>
+              <a:t>Third Level Bullet</a:t>
+            </a:r>
+          </a:p>
+          <a:p>
+            <a:pPr lvl="3"/>
+            <a:r>
+              <a:rPr lang="en-US" dirty="0" smtClean="0"/>
+              <a:t>Fourth Level Bullet</a:t>
+            </a:r>
+          </a:p>
+          <a:p>
+            <a:pPr lvl="4"/>
+            <a:r>
+              <a:rPr lang="en-US" dirty="0" smtClean="0"/>
+              <a:t>Fifth Level Bullet</a:t>
+            </a:r>
             <a:endParaRPr lang="en-US" dirty="0"/>
           </a:p>
         </p:txBody>
@@ -14130,7 +14439,7 @@
     </p:spTree>
     <p:extLst>
       <p:ext uri="{BB962C8B-B14F-4D97-AF65-F5344CB8AC3E}">
-        <p14:creationId xmlns:p14="http://schemas.microsoft.com/office/powerpoint/2010/main" val="2354427935"/>
+        <p14:creationId xmlns:p14="http://schemas.microsoft.com/office/powerpoint/2010/main" val="1910273132"/>
       </p:ext>
     </p:extLst>
   </p:cSld>
@@ -14174,7 +14483,7 @@
       </p:grpSpPr>
       <p:sp>
         <p:nvSpPr>
-          <p:cNvPr id="5" name="Title 4"/>
+          <p:cNvPr id="2" name="Title 1"/>
           <p:cNvSpPr>
             <a:spLocks noGrp="1"/>
           </p:cNvSpPr>
@@ -14189,8 +14498,189 @@
           <a:p>
             <a:r>
               <a:rPr lang="en-US" dirty="0" smtClean="0"/>
-              <a:t>Title Only</a:t>
-            </a:r>
+              <a:t>Title and Text</a:t>
+            </a:r>
+            <a:endParaRPr lang="en-US" dirty="0"/>
+          </a:p>
+        </p:txBody>
+      </p:sp>
+      <p:sp>
+        <p:nvSpPr>
+          <p:cNvPr id="3" name="Content Placeholder 2"/>
+          <p:cNvSpPr>
+            <a:spLocks noGrp="1"/>
+          </p:cNvSpPr>
+          <p:nvPr>
+            <p:ph idx="1"/>
+          </p:nvPr>
+        </p:nvSpPr>
+        <p:spPr/>
+        <p:txBody>
+          <a:bodyPr/>
+          <a:lstStyle/>
+          <a:p>
+            <a:r>
+              <a:rPr lang="en-US" dirty="0" err="1"/>
+              <a:t>Lorem</a:t>
+            </a:r>
+            <a:r>
+              <a:rPr lang="en-US" dirty="0"/>
+              <a:t> </a:t>
+            </a:r>
+            <a:r>
+              <a:rPr lang="en-US" dirty="0" err="1"/>
+              <a:t>ipsum</a:t>
+            </a:r>
+            <a:r>
+              <a:rPr lang="en-US" dirty="0"/>
+              <a:t> dolor sit </a:t>
+            </a:r>
+            <a:r>
+              <a:rPr lang="en-US" dirty="0" err="1"/>
+              <a:t>amet</a:t>
+            </a:r>
+            <a:r>
+              <a:rPr lang="en-US" dirty="0"/>
+              <a:t>, </a:t>
+            </a:r>
+            <a:r>
+              <a:rPr lang="en-US" dirty="0" err="1"/>
+              <a:t>consectetur</a:t>
+            </a:r>
+            <a:r>
+              <a:rPr lang="en-US" dirty="0"/>
+              <a:t> </a:t>
+            </a:r>
+            <a:r>
+              <a:rPr lang="en-US" dirty="0" err="1"/>
+              <a:t>adipiscing</a:t>
+            </a:r>
+            <a:r>
+              <a:rPr lang="en-US" dirty="0"/>
+              <a:t> </a:t>
+            </a:r>
+            <a:r>
+              <a:rPr lang="en-US" dirty="0" err="1"/>
+              <a:t>elit</a:t>
+            </a:r>
+            <a:r>
+              <a:rPr lang="en-US" dirty="0"/>
+              <a:t>. </a:t>
+            </a:r>
+            <a:r>
+              <a:rPr lang="en-US" dirty="0" err="1"/>
+              <a:t>Donec</a:t>
+            </a:r>
+            <a:r>
+              <a:rPr lang="en-US" dirty="0"/>
+              <a:t> </a:t>
+            </a:r>
+            <a:r>
+              <a:rPr lang="en-US" dirty="0" err="1"/>
+              <a:t>risus</a:t>
+            </a:r>
+            <a:r>
+              <a:rPr lang="en-US" dirty="0"/>
+              <a:t> </a:t>
+            </a:r>
+            <a:r>
+              <a:rPr lang="en-US" dirty="0" err="1"/>
+              <a:t>purus</a:t>
+            </a:r>
+            <a:r>
+              <a:rPr lang="en-US" dirty="0"/>
+              <a:t>, tempus in </a:t>
+            </a:r>
+            <a:r>
+              <a:rPr lang="en-US" dirty="0" err="1"/>
+              <a:t>quis</a:t>
+            </a:r>
+            <a:r>
+              <a:rPr lang="en-US" dirty="0"/>
+              <a:t>, </a:t>
+            </a:r>
+            <a:r>
+              <a:rPr lang="en-US" dirty="0" err="1"/>
+              <a:t>ultricies</a:t>
+            </a:r>
+            <a:r>
+              <a:rPr lang="en-US" dirty="0"/>
+              <a:t> </a:t>
+            </a:r>
+            <a:r>
+              <a:rPr lang="en-US" dirty="0" err="1"/>
+              <a:t>eu</a:t>
+            </a:r>
+            <a:r>
+              <a:rPr lang="en-US" dirty="0"/>
+              <a:t> diam. </a:t>
+            </a:r>
+            <a:r>
+              <a:rPr lang="en-US" dirty="0" err="1"/>
+              <a:t>Donec</a:t>
+            </a:r>
+            <a:r>
+              <a:rPr lang="en-US" dirty="0"/>
+              <a:t> </a:t>
+            </a:r>
+            <a:r>
+              <a:rPr lang="en-US" dirty="0" err="1"/>
+              <a:t>convallis</a:t>
+            </a:r>
+            <a:r>
+              <a:rPr lang="en-US" dirty="0"/>
+              <a:t> </a:t>
+            </a:r>
+            <a:r>
+              <a:rPr lang="en-US" dirty="0" err="1"/>
+              <a:t>enim</a:t>
+            </a:r>
+            <a:r>
+              <a:rPr lang="en-US" dirty="0"/>
+              <a:t> in mi </a:t>
+            </a:r>
+            <a:r>
+              <a:rPr lang="en-US" dirty="0" err="1"/>
+              <a:t>lacinia</a:t>
+            </a:r>
+            <a:r>
+              <a:rPr lang="en-US" dirty="0"/>
+              <a:t>, id </a:t>
+            </a:r>
+            <a:r>
+              <a:rPr lang="en-US" dirty="0" err="1"/>
+              <a:t>viverra</a:t>
+            </a:r>
+            <a:r>
+              <a:rPr lang="en-US" dirty="0"/>
+              <a:t> </a:t>
+            </a:r>
+            <a:r>
+              <a:rPr lang="en-US" dirty="0" err="1"/>
+              <a:t>neque</a:t>
+            </a:r>
+            <a:r>
+              <a:rPr lang="en-US" dirty="0"/>
+              <a:t> </a:t>
+            </a:r>
+            <a:r>
+              <a:rPr lang="en-US" dirty="0" err="1"/>
+              <a:t>pretium</a:t>
+            </a:r>
+            <a:r>
+              <a:rPr lang="en-US" dirty="0"/>
+              <a:t>. </a:t>
+            </a:r>
+            <a:r>
+              <a:rPr lang="en-US" dirty="0" err="1"/>
+              <a:t>Phasellus</a:t>
+            </a:r>
+            <a:r>
+              <a:rPr lang="en-US" dirty="0"/>
+              <a:t> et.</a:t>
+            </a:r>
+          </a:p>
+          <a:p>
             <a:endParaRPr lang="en-US" dirty="0"/>
           </a:p>
         </p:txBody>
@@ -14198,7 +14688,7 @@
     </p:spTree>
     <p:extLst>
       <p:ext uri="{BB962C8B-B14F-4D97-AF65-F5344CB8AC3E}">
-        <p14:creationId xmlns:p14="http://schemas.microsoft.com/office/powerpoint/2010/main" val="1439852271"/>
+        <p14:creationId xmlns:p14="http://schemas.microsoft.com/office/powerpoint/2010/main" val="2354427935"/>
       </p:ext>
     </p:extLst>
   </p:cSld>
@@ -14242,6 +14732,74 @@
       </p:grpSpPr>
       <p:sp>
         <p:nvSpPr>
+          <p:cNvPr id="5" name="Title 4"/>
+          <p:cNvSpPr>
+            <a:spLocks noGrp="1"/>
+          </p:cNvSpPr>
+          <p:nvPr>
+            <p:ph type="title"/>
+          </p:nvPr>
+        </p:nvSpPr>
+        <p:spPr/>
+        <p:txBody>
+          <a:bodyPr/>
+          <a:lstStyle/>
+          <a:p>
+            <a:r>
+              <a:rPr lang="en-US" dirty="0" smtClean="0"/>
+              <a:t>Title Only</a:t>
+            </a:r>
+            <a:endParaRPr lang="en-US" dirty="0"/>
+          </a:p>
+        </p:txBody>
+      </p:sp>
+    </p:spTree>
+    <p:extLst>
+      <p:ext uri="{BB962C8B-B14F-4D97-AF65-F5344CB8AC3E}">
+        <p14:creationId xmlns:p14="http://schemas.microsoft.com/office/powerpoint/2010/main" val="1439852271"/>
+      </p:ext>
+    </p:extLst>
+  </p:cSld>
+  <p:clrMapOvr>
+    <a:masterClrMapping/>
+  </p:clrMapOvr>
+  <mc:AlternateContent xmlns:mc="http://schemas.openxmlformats.org/markup-compatibility/2006">
+    <mc:Choice xmlns:p14="http://schemas.microsoft.com/office/powerpoint/2010/main" Requires="p14">
+      <p:transition spd="slow" p14:dur="2000"/>
+    </mc:Choice>
+    <mc:Fallback>
+      <p:transition xmlns:p14="http://schemas.microsoft.com/office/powerpoint/2010/main" spd="slow"/>
+    </mc:Fallback>
+  </mc:AlternateContent>
+  <p:timing>
+    <p:tnLst>
+      <p:par>
+        <p:cTn xmlns:p14="http://schemas.microsoft.com/office/powerpoint/2010/main" id="1" dur="indefinite" restart="never" nodeType="tmRoot"/>
+      </p:par>
+    </p:tnLst>
+  </p:timing>
+</p:sld>
+</file>
+
+<file path=ppt/slides/slide28.xml><?xml version="1.0" encoding="utf-8"?>
+<p:sld xmlns:a="http://schemas.openxmlformats.org/drawingml/2006/main" xmlns:r="http://schemas.openxmlformats.org/officeDocument/2006/relationships" xmlns:p="http://schemas.openxmlformats.org/presentationml/2006/main" show="0">
+  <p:cSld>
+    <p:spTree>
+      <p:nvGrpSpPr>
+        <p:cNvPr id="1" name=""/>
+        <p:cNvGrpSpPr/>
+        <p:nvPr/>
+      </p:nvGrpSpPr>
+      <p:grpSpPr>
+        <a:xfrm>
+          <a:off x="0" y="0"/>
+          <a:ext cx="0" cy="0"/>
+          <a:chOff x="0" y="0"/>
+          <a:chExt cx="0" cy="0"/>
+        </a:xfrm>
+      </p:grpSpPr>
+      <p:sp>
+        <p:nvSpPr>
           <p:cNvPr id="2" name="Title 1"/>
           <p:cNvSpPr>
             <a:spLocks noGrp="1"/>
@@ -14314,7 +14872,7 @@
 </p:sld>
 </file>
 
-<file path=ppt/slides/slide28.xml><?xml version="1.0" encoding="utf-8"?>
+<file path=ppt/slides/slide29.xml><?xml version="1.0" encoding="utf-8"?>
 <p:sld xmlns:a="http://schemas.openxmlformats.org/drawingml/2006/main" xmlns:r="http://schemas.openxmlformats.org/officeDocument/2006/relationships" xmlns:p="http://schemas.openxmlformats.org/presentationml/2006/main" show="0">
   <p:cSld>
     <p:spTree>
@@ -15936,7 +16494,143 @@
 </p:sld>
 </file>
 
-<file path=ppt/slides/slide29.xml><?xml version="1.0" encoding="utf-8"?>
+<file path=ppt/slides/slide3.xml><?xml version="1.0" encoding="utf-8"?>
+<p:sld xmlns:a="http://schemas.openxmlformats.org/drawingml/2006/main" xmlns:r="http://schemas.openxmlformats.org/officeDocument/2006/relationships" xmlns:p="http://schemas.openxmlformats.org/presentationml/2006/main">
+  <p:cSld>
+    <p:spTree>
+      <p:nvGrpSpPr>
+        <p:cNvPr id="1" name=""/>
+        <p:cNvGrpSpPr/>
+        <p:nvPr/>
+      </p:nvGrpSpPr>
+      <p:grpSpPr>
+        <a:xfrm>
+          <a:off x="0" y="0"/>
+          <a:ext cx="0" cy="0"/>
+          <a:chOff x="0" y="0"/>
+          <a:chExt cx="0" cy="0"/>
+        </a:xfrm>
+      </p:grpSpPr>
+      <p:sp>
+        <p:nvSpPr>
+          <p:cNvPr id="2" name="Title 1"/>
+          <p:cNvSpPr>
+            <a:spLocks noGrp="1"/>
+          </p:cNvSpPr>
+          <p:nvPr>
+            <p:ph type="title"/>
+          </p:nvPr>
+        </p:nvSpPr>
+        <p:spPr/>
+        <p:txBody>
+          <a:bodyPr/>
+          <a:lstStyle/>
+          <a:p>
+            <a:r>
+              <a:rPr lang="en-US" dirty="0" smtClean="0"/>
+              <a:t>Secondary Indexes</a:t>
+            </a:r>
+            <a:endParaRPr lang="en-US" dirty="0"/>
+          </a:p>
+        </p:txBody>
+      </p:sp>
+      <p:sp>
+        <p:nvSpPr>
+          <p:cNvPr id="3" name="Content Placeholder 2"/>
+          <p:cNvSpPr>
+            <a:spLocks noGrp="1"/>
+          </p:cNvSpPr>
+          <p:nvPr>
+            <p:ph idx="1"/>
+          </p:nvPr>
+        </p:nvSpPr>
+        <p:spPr>
+          <a:xfrm>
+            <a:off x="457200" y="955193"/>
+            <a:ext cx="8007739" cy="3493655"/>
+          </a:xfrm>
+        </p:spPr>
+        <p:txBody>
+          <a:bodyPr/>
+          <a:lstStyle/>
+          <a:p>
+            <a:pPr>
+              <a:lnSpc>
+                <a:spcPct val="140000"/>
+              </a:lnSpc>
+            </a:pPr>
+            <a:r>
+              <a:rPr lang="en-US" dirty="0" smtClean="0"/>
+              <a:t>Are the backing data structure for N1QL</a:t>
+            </a:r>
+          </a:p>
+          <a:p>
+            <a:pPr>
+              <a:lnSpc>
+                <a:spcPct val="140000"/>
+              </a:lnSpc>
+            </a:pPr>
+            <a:r>
+              <a:rPr lang="en-US" dirty="0" smtClean="0"/>
+              <a:t>Optimize the data lookup path for the query engine (“avoiding the full table scan”)</a:t>
+            </a:r>
+          </a:p>
+          <a:p>
+            <a:pPr>
+              <a:lnSpc>
+                <a:spcPct val="140000"/>
+              </a:lnSpc>
+            </a:pPr>
+            <a:r>
+              <a:rPr lang="en-US" dirty="0" smtClean="0"/>
+              <a:t>Two types of indexes</a:t>
+            </a:r>
+          </a:p>
+          <a:p>
+            <a:pPr lvl="1">
+              <a:lnSpc>
+                <a:spcPct val="140000"/>
+              </a:lnSpc>
+            </a:pPr>
+            <a:r>
+              <a:rPr lang="en-US" dirty="0" smtClean="0"/>
+              <a:t>View indexes</a:t>
+            </a:r>
+          </a:p>
+          <a:p>
+            <a:pPr lvl="1">
+              <a:lnSpc>
+                <a:spcPct val="140000"/>
+              </a:lnSpc>
+            </a:pPr>
+            <a:r>
+              <a:rPr lang="en-US" dirty="0" smtClean="0"/>
+              <a:t>GSI indexes (new global secondary indexes)</a:t>
+            </a:r>
+          </a:p>
+        </p:txBody>
+      </p:sp>
+    </p:spTree>
+    <p:extLst>
+      <p:ext uri="{BB962C8B-B14F-4D97-AF65-F5344CB8AC3E}">
+        <p14:creationId xmlns:p14="http://schemas.microsoft.com/office/powerpoint/2010/main" val="230402553"/>
+      </p:ext>
+    </p:extLst>
+  </p:cSld>
+  <p:clrMapOvr>
+    <a:masterClrMapping/>
+  </p:clrMapOvr>
+  <p:timing>
+    <p:tnLst>
+      <p:par>
+        <p:cTn xmlns:p14="http://schemas.microsoft.com/office/powerpoint/2010/main" id="1" dur="indefinite" restart="never" nodeType="tmRoot"/>
+      </p:par>
+    </p:tnLst>
+  </p:timing>
+</p:sld>
+</file>
+
+<file path=ppt/slides/slide30.xml><?xml version="1.0" encoding="utf-8"?>
 <p:sld xmlns:a="http://schemas.openxmlformats.org/drawingml/2006/main" xmlns:r="http://schemas.openxmlformats.org/officeDocument/2006/relationships" xmlns:p="http://schemas.openxmlformats.org/presentationml/2006/main" show="0">
   <p:cSld>
     <p:spTree>
@@ -16688,143 +17382,7 @@
 </p:sld>
 </file>
 
-<file path=ppt/slides/slide3.xml><?xml version="1.0" encoding="utf-8"?>
-<p:sld xmlns:a="http://schemas.openxmlformats.org/drawingml/2006/main" xmlns:r="http://schemas.openxmlformats.org/officeDocument/2006/relationships" xmlns:p="http://schemas.openxmlformats.org/presentationml/2006/main">
-  <p:cSld>
-    <p:spTree>
-      <p:nvGrpSpPr>
-        <p:cNvPr id="1" name=""/>
-        <p:cNvGrpSpPr/>
-        <p:nvPr/>
-      </p:nvGrpSpPr>
-      <p:grpSpPr>
-        <a:xfrm>
-          <a:off x="0" y="0"/>
-          <a:ext cx="0" cy="0"/>
-          <a:chOff x="0" y="0"/>
-          <a:chExt cx="0" cy="0"/>
-        </a:xfrm>
-      </p:grpSpPr>
-      <p:sp>
-        <p:nvSpPr>
-          <p:cNvPr id="2" name="Title 1"/>
-          <p:cNvSpPr>
-            <a:spLocks noGrp="1"/>
-          </p:cNvSpPr>
-          <p:nvPr>
-            <p:ph type="title"/>
-          </p:nvPr>
-        </p:nvSpPr>
-        <p:spPr/>
-        <p:txBody>
-          <a:bodyPr/>
-          <a:lstStyle/>
-          <a:p>
-            <a:r>
-              <a:rPr lang="en-US" dirty="0" smtClean="0"/>
-              <a:t>Secondary Indexes</a:t>
-            </a:r>
-            <a:endParaRPr lang="en-US" dirty="0"/>
-          </a:p>
-        </p:txBody>
-      </p:sp>
-      <p:sp>
-        <p:nvSpPr>
-          <p:cNvPr id="3" name="Content Placeholder 2"/>
-          <p:cNvSpPr>
-            <a:spLocks noGrp="1"/>
-          </p:cNvSpPr>
-          <p:nvPr>
-            <p:ph idx="1"/>
-          </p:nvPr>
-        </p:nvSpPr>
-        <p:spPr>
-          <a:xfrm>
-            <a:off x="457200" y="955193"/>
-            <a:ext cx="8007739" cy="3493655"/>
-          </a:xfrm>
-        </p:spPr>
-        <p:txBody>
-          <a:bodyPr/>
-          <a:lstStyle/>
-          <a:p>
-            <a:pPr>
-              <a:lnSpc>
-                <a:spcPct val="140000"/>
-              </a:lnSpc>
-            </a:pPr>
-            <a:r>
-              <a:rPr lang="en-US" dirty="0" smtClean="0"/>
-              <a:t>Are the backing data structure for N1QL</a:t>
-            </a:r>
-          </a:p>
-          <a:p>
-            <a:pPr>
-              <a:lnSpc>
-                <a:spcPct val="140000"/>
-              </a:lnSpc>
-            </a:pPr>
-            <a:r>
-              <a:rPr lang="en-US" dirty="0" smtClean="0"/>
-              <a:t>Optimize the data lookup path for the query engine (“avoiding the full table scan”)</a:t>
-            </a:r>
-          </a:p>
-          <a:p>
-            <a:pPr>
-              <a:lnSpc>
-                <a:spcPct val="140000"/>
-              </a:lnSpc>
-            </a:pPr>
-            <a:r>
-              <a:rPr lang="en-US" dirty="0" smtClean="0"/>
-              <a:t>Two types of indexes</a:t>
-            </a:r>
-          </a:p>
-          <a:p>
-            <a:pPr lvl="1">
-              <a:lnSpc>
-                <a:spcPct val="140000"/>
-              </a:lnSpc>
-            </a:pPr>
-            <a:r>
-              <a:rPr lang="en-US" dirty="0" smtClean="0"/>
-              <a:t>View indexes</a:t>
-            </a:r>
-          </a:p>
-          <a:p>
-            <a:pPr lvl="1">
-              <a:lnSpc>
-                <a:spcPct val="140000"/>
-              </a:lnSpc>
-            </a:pPr>
-            <a:r>
-              <a:rPr lang="en-US" dirty="0" smtClean="0"/>
-              <a:t>GSI indexes (new global secondary indexes)</a:t>
-            </a:r>
-          </a:p>
-        </p:txBody>
-      </p:sp>
-    </p:spTree>
-    <p:extLst>
-      <p:ext uri="{BB962C8B-B14F-4D97-AF65-F5344CB8AC3E}">
-        <p14:creationId xmlns:p14="http://schemas.microsoft.com/office/powerpoint/2010/main" val="230402553"/>
-      </p:ext>
-    </p:extLst>
-  </p:cSld>
-  <p:clrMapOvr>
-    <a:masterClrMapping/>
-  </p:clrMapOvr>
-  <p:timing>
-    <p:tnLst>
-      <p:par>
-        <p:cTn xmlns:p14="http://schemas.microsoft.com/office/powerpoint/2010/main" id="1" dur="indefinite" restart="never" nodeType="tmRoot"/>
-      </p:par>
-    </p:tnLst>
-  </p:timing>
-</p:sld>
-</file>
-
-<file path=ppt/slides/slide30.xml><?xml version="1.0" encoding="utf-8"?>
+<file path=ppt/slides/slide31.xml><?xml version="1.0" encoding="utf-8"?>
 <p:sld xmlns:a="http://schemas.openxmlformats.org/drawingml/2006/main" xmlns:r="http://schemas.openxmlformats.org/officeDocument/2006/relationships" xmlns:p="http://schemas.openxmlformats.org/presentationml/2006/main" show="0">
   <p:cSld>
     <p:spTree>
@@ -17576,7 +18134,7 @@
 </p:sld>
 </file>
 
-<file path=ppt/slides/slide31.xml><?xml version="1.0" encoding="utf-8"?>
+<file path=ppt/slides/slide32.xml><?xml version="1.0" encoding="utf-8"?>
 <p:sld xmlns:a="http://schemas.openxmlformats.org/drawingml/2006/main" xmlns:r="http://schemas.openxmlformats.org/officeDocument/2006/relationships" xmlns:p="http://schemas.openxmlformats.org/presentationml/2006/main" show="0">
   <p:cSld>
     <p:spTree>
@@ -17742,7 +18300,7 @@
 </p:sld>
 </file>
 
-<file path=ppt/slides/slide32.xml><?xml version="1.0" encoding="utf-8"?>
+<file path=ppt/slides/slide33.xml><?xml version="1.0" encoding="utf-8"?>
 <p:sld xmlns:a="http://schemas.openxmlformats.org/drawingml/2006/main" xmlns:r="http://schemas.openxmlformats.org/officeDocument/2006/relationships" xmlns:p="http://schemas.openxmlformats.org/presentationml/2006/main" show="0">
   <p:cSld>
     <p:spTree>
@@ -17908,7 +18466,7 @@
 </p:sld>
 </file>
 
-<file path=ppt/slides/slide33.xml><?xml version="1.0" encoding="utf-8"?>
+<file path=ppt/slides/slide34.xml><?xml version="1.0" encoding="utf-8"?>
 <p:sld xmlns:a="http://schemas.openxmlformats.org/drawingml/2006/main" xmlns:r="http://schemas.openxmlformats.org/officeDocument/2006/relationships" xmlns:p="http://schemas.openxmlformats.org/presentationml/2006/main" show="0">
   <p:cSld>
     <p:spTree>
@@ -18074,7 +18632,7 @@
 </p:sld>
 </file>
 
-<file path=ppt/slides/slide34.xml><?xml version="1.0" encoding="utf-8"?>
+<file path=ppt/slides/slide35.xml><?xml version="1.0" encoding="utf-8"?>
 <p:sld xmlns:a="http://schemas.openxmlformats.org/drawingml/2006/main" xmlns:r="http://schemas.openxmlformats.org/officeDocument/2006/relationships" xmlns:p="http://schemas.openxmlformats.org/presentationml/2006/main" show="0">
   <p:cSld>
     <p:spTree>
@@ -18768,7 +19326,7 @@
 </p:sld>
 </file>
 
-<file path=ppt/slides/slide35.xml><?xml version="1.0" encoding="utf-8"?>
+<file path=ppt/slides/slide36.xml><?xml version="1.0" encoding="utf-8"?>
 <p:sld xmlns:a="http://schemas.openxmlformats.org/drawingml/2006/main" xmlns:r="http://schemas.openxmlformats.org/officeDocument/2006/relationships" xmlns:p="http://schemas.openxmlformats.org/presentationml/2006/main" show="0">
   <p:cSld>
     <p:spTree>
@@ -18836,7 +19394,7 @@
 </p:sld>
 </file>
 
-<file path=ppt/slides/slide36.xml><?xml version="1.0" encoding="utf-8"?>
+<file path=ppt/slides/slide37.xml><?xml version="1.0" encoding="utf-8"?>
 <p:sld xmlns:a="http://schemas.openxmlformats.org/drawingml/2006/main" xmlns:r="http://schemas.openxmlformats.org/officeDocument/2006/relationships" xmlns:p="http://schemas.openxmlformats.org/presentationml/2006/main" show="0">
   <p:cSld>
     <p:spTree>
@@ -18948,11 +19506,7 @@
             </a:pPr>
             <a:r>
               <a:rPr lang="en-US" dirty="0" smtClean="0"/>
-              <a:t>Indexes </a:t>
-            </a:r>
-            <a:r>
-              <a:rPr lang="en-US" dirty="0" smtClean="0"/>
-              <a:t>can be created and dropped</a:t>
+              <a:t>Indexes can be created and dropped</a:t>
             </a:r>
           </a:p>
           <a:p>
@@ -19080,7 +19634,6 @@
               <a:rPr lang="en-US" dirty="0" smtClean="0"/>
               <a:t>For each Index:</a:t>
             </a:r>
-            <a:endParaRPr lang="en-US" dirty="0" smtClean="0"/>
           </a:p>
           <a:p>
             <a:pPr>
@@ -19150,10 +19703,6 @@
               </a:rPr>
               <a:t>;</a:t>
             </a:r>
-            <a:endParaRPr lang="de-DE" dirty="0">
-              <a:latin typeface="Courier New"/>
-              <a:cs typeface="Courier New"/>
-            </a:endParaRPr>
           </a:p>
         </p:txBody>
       </p:sp>
@@ -19412,14 +19961,7 @@
                 <a:latin typeface="Courier New"/>
                 <a:cs typeface="Courier New"/>
               </a:rPr>
-              <a:t> ON </a:t>
-            </a:r>
-            <a:r>
-              <a:rPr lang="de-DE" dirty="0" smtClean="0">
-                <a:latin typeface="Courier New"/>
-                <a:cs typeface="Courier New"/>
-              </a:rPr>
-              <a:t>`</a:t>
+              <a:t> ON `</a:t>
             </a:r>
             <a:r>
               <a:rPr lang="de-DE" dirty="0" err="1" smtClean="0">
@@ -19755,7 +20297,6 @@
               <a:rPr lang="en-US" dirty="0" smtClean="0"/>
               <a:t>Make sure to drop the proper index (using)</a:t>
             </a:r>
-            <a:endParaRPr lang="en-US" dirty="0" smtClean="0"/>
           </a:p>
         </p:txBody>
       </p:sp>
@@ -19828,14 +20369,7 @@
                 <a:latin typeface="Courier New"/>
                 <a:cs typeface="Courier New"/>
               </a:rPr>
-              <a:t>DROP INDEX </a:t>
-            </a:r>
-            <a:r>
-              <a:rPr lang="de-DE" dirty="0" smtClean="0">
-                <a:latin typeface="Courier New"/>
-                <a:cs typeface="Courier New"/>
-              </a:rPr>
-              <a:t>`</a:t>
+              <a:t>DROP INDEX `</a:t>
             </a:r>
             <a:r>
               <a:rPr lang="de-DE" dirty="0" err="1" smtClean="0">
@@ -20150,7 +20684,6 @@
               <a:rPr lang="en-US" dirty="0" smtClean="0"/>
               <a:t>(including selected index)</a:t>
             </a:r>
-            <a:endParaRPr lang="en-US" dirty="0" smtClean="0"/>
           </a:p>
         </p:txBody>
       </p:sp>
@@ -20248,10 +20781,6 @@
               </a:rPr>
               <a:t>";</a:t>
             </a:r>
-            <a:endParaRPr lang="de-DE" dirty="0">
-              <a:latin typeface="Courier New"/>
-              <a:cs typeface="Courier New"/>
-            </a:endParaRPr>
           </a:p>
         </p:txBody>
       </p:sp>
@@ -20402,7 +20931,6 @@
               <a:rPr lang="en-US" dirty="0" smtClean="0"/>
               <a:t>Index type can also be selected</a:t>
             </a:r>
-            <a:endParaRPr lang="en-US" dirty="0" smtClean="0"/>
           </a:p>
         </p:txBody>
       </p:sp>
@@ -20432,14 +20960,7 @@
                 <a:latin typeface="Courier New"/>
                 <a:cs typeface="Courier New"/>
               </a:rPr>
-              <a:t>SELECT * FROM </a:t>
-            </a:r>
-            <a:r>
-              <a:rPr lang="de-DE" dirty="0" smtClean="0">
-                <a:latin typeface="Courier New"/>
-                <a:cs typeface="Courier New"/>
-              </a:rPr>
-              <a:t>`</a:t>
+              <a:t>SELECT * FROM `</a:t>
             </a:r>
             <a:r>
               <a:rPr lang="de-DE" dirty="0" err="1" smtClean="0">

</xml_diff>

<commit_message>
infos on defer build
</commit_message>
<xml_diff>
--- a/server/presentations/07_N1QL Details.pptx
+++ b/server/presentations/07_N1QL Details.pptx
@@ -4992,7 +4992,7 @@
         </p:nvSpPr>
         <p:spPr>
           <a:xfrm>
-            <a:off x="457200" y="955193"/>
+            <a:off x="457200" y="769052"/>
             <a:ext cx="8007739" cy="3493655"/>
           </a:xfrm>
         </p:spPr>
@@ -5040,6 +5040,14 @@
               </a:lnSpc>
             </a:pPr>
             <a:endParaRPr lang="en-US" dirty="0"/>
+          </a:p>
+          <a:p>
+            <a:pPr>
+              <a:lnSpc>
+                <a:spcPct val="140000"/>
+              </a:lnSpc>
+            </a:pPr>
+            <a:endParaRPr lang="en-US" dirty="0" smtClean="0"/>
           </a:p>
           <a:p>
             <a:pPr>
@@ -5063,7 +5071,7 @@
         </p:nvSpPr>
         <p:spPr>
           <a:xfrm>
-            <a:off x="457200" y="4002082"/>
+            <a:off x="466344" y="4186748"/>
             <a:ext cx="8782592" cy="369332"/>
           </a:xfrm>
           <a:prstGeom prst="rect">
@@ -5077,88 +5085,60 @@
           <a:lstStyle/>
           <a:p>
             <a:r>
-              <a:rPr lang="de-DE" dirty="0" err="1">
+              <a:rPr lang="de-DE" dirty="0" smtClean="0">
                 <a:latin typeface="Courier New"/>
                 <a:cs typeface="Courier New"/>
               </a:rPr>
-              <a:t>select</a:t>
+              <a:t>SELECT COUNT(</a:t>
             </a:r>
             <a:r>
               <a:rPr lang="de-DE" dirty="0">
                 <a:latin typeface="Courier New"/>
                 <a:cs typeface="Courier New"/>
               </a:rPr>
-              <a:t> </a:t>
-            </a:r>
-            <a:r>
-              <a:rPr lang="de-DE" dirty="0" err="1">
+              <a:t>*) </a:t>
+            </a:r>
+            <a:r>
+              <a:rPr lang="de-DE" dirty="0" smtClean="0">
                 <a:latin typeface="Courier New"/>
                 <a:cs typeface="Courier New"/>
               </a:rPr>
-              <a:t>count</a:t>
+              <a:t>FROM </a:t>
+            </a:r>
+            <a:r>
+              <a:rPr lang="de-DE" dirty="0" err="1" smtClean="0">
+                <a:latin typeface="Courier New"/>
+                <a:cs typeface="Courier New"/>
+              </a:rPr>
+              <a:t>system:indexes</a:t>
+            </a:r>
+            <a:r>
+              <a:rPr lang="de-DE" dirty="0" smtClean="0">
+                <a:latin typeface="Courier New"/>
+                <a:cs typeface="Courier New"/>
+              </a:rPr>
+              <a:t> WHERE </a:t>
+            </a:r>
+            <a:r>
+              <a:rPr lang="de-DE" dirty="0" err="1" smtClean="0">
+                <a:latin typeface="Courier New"/>
+                <a:cs typeface="Courier New"/>
+              </a:rPr>
+              <a:t>state</a:t>
+            </a:r>
+            <a:r>
+              <a:rPr lang="de-DE" dirty="0" smtClean="0">
+                <a:latin typeface="Courier New"/>
+                <a:cs typeface="Courier New"/>
+              </a:rPr>
+              <a:t> </a:t>
             </a:r>
             <a:r>
               <a:rPr lang="de-DE" dirty="0">
                 <a:latin typeface="Courier New"/>
                 <a:cs typeface="Courier New"/>
               </a:rPr>
-              <a:t>(*) </a:t>
-            </a:r>
-            <a:r>
-              <a:rPr lang="de-DE" dirty="0" err="1">
-                <a:latin typeface="Courier New"/>
-                <a:cs typeface="Courier New"/>
-              </a:rPr>
-              <a:t>from</a:t>
-            </a:r>
-            <a:r>
-              <a:rPr lang="de-DE" dirty="0">
-                <a:latin typeface="Courier New"/>
-                <a:cs typeface="Courier New"/>
-              </a:rPr>
-              <a:t> </a:t>
-            </a:r>
-            <a:r>
-              <a:rPr lang="de-DE" dirty="0" err="1">
-                <a:latin typeface="Courier New"/>
-                <a:cs typeface="Courier New"/>
-              </a:rPr>
-              <a:t>system:indexes</a:t>
-            </a:r>
-            <a:r>
-              <a:rPr lang="de-DE" dirty="0">
-                <a:latin typeface="Courier New"/>
-                <a:cs typeface="Courier New"/>
-              </a:rPr>
-              <a:t> </a:t>
-            </a:r>
-            <a:r>
-              <a:rPr lang="de-DE" dirty="0" err="1">
-                <a:latin typeface="Courier New"/>
-                <a:cs typeface="Courier New"/>
-              </a:rPr>
-              <a:t>where</a:t>
-            </a:r>
-            <a:r>
-              <a:rPr lang="de-DE" dirty="0">
-                <a:latin typeface="Courier New"/>
-                <a:cs typeface="Courier New"/>
-              </a:rPr>
-              <a:t> </a:t>
-            </a:r>
-            <a:r>
-              <a:rPr lang="de-DE" dirty="0" err="1">
-                <a:latin typeface="Courier New"/>
-                <a:cs typeface="Courier New"/>
-              </a:rPr>
-              <a:t>state</a:t>
-            </a:r>
-            <a:r>
-              <a:rPr lang="de-DE" dirty="0">
-                <a:latin typeface="Courier New"/>
-                <a:cs typeface="Courier New"/>
-              </a:rPr>
-              <a:t> = "online";</a:t>
+              <a:t>= "online";</a:t>
             </a:r>
             <a:endParaRPr lang="de-DE" dirty="0">
               <a:latin typeface="Courier New"/>
@@ -5169,21 +5149,18 @@
       </p:sp>
       <p:sp>
         <p:nvSpPr>
-          <p:cNvPr id="8" name="Rechteck 7"/>
+          <p:cNvPr id="9" name="Rechteck 8"/>
           <p:cNvSpPr/>
           <p:nvPr/>
         </p:nvSpPr>
         <p:spPr>
           <a:xfrm>
-            <a:off x="609600" y="2724750"/>
-            <a:ext cx="8782592" cy="369332"/>
+            <a:off x="260940" y="2605238"/>
+            <a:ext cx="8987996" cy="738664"/>
           </a:xfrm>
           <a:prstGeom prst="rect">
             <a:avLst/>
           </a:prstGeom>
-          <a:solidFill>
-            <a:srgbClr val="E10021"/>
-          </a:solidFill>
         </p:spPr>
         <p:txBody>
           <a:bodyPr wrap="square">
@@ -5192,13 +5169,276 @@
           <a:lstStyle/>
           <a:p>
             <a:r>
-              <a:rPr lang="de-DE" dirty="0" smtClean="0">
+              <a:rPr lang="de-DE" sz="1400" dirty="0">
                 <a:latin typeface="Courier New"/>
                 <a:cs typeface="Courier New"/>
               </a:rPr>
-              <a:t>ADD ME</a:t>
-            </a:r>
-            <a:endParaRPr lang="de-DE" dirty="0">
+              <a:t>CREATE INDEX </a:t>
+            </a:r>
+            <a:r>
+              <a:rPr lang="de-DE" sz="1400" dirty="0" err="1">
+                <a:latin typeface="Courier New"/>
+                <a:cs typeface="Courier New"/>
+              </a:rPr>
+              <a:t>foo</a:t>
+            </a:r>
+            <a:r>
+              <a:rPr lang="de-DE" sz="1400" dirty="0">
+                <a:latin typeface="Courier New"/>
+                <a:cs typeface="Courier New"/>
+              </a:rPr>
+              <a:t> ON </a:t>
+            </a:r>
+            <a:r>
+              <a:rPr lang="de-DE" sz="1400" dirty="0" smtClean="0">
+                <a:latin typeface="Courier New"/>
+                <a:cs typeface="Courier New"/>
+              </a:rPr>
+              <a:t>`</a:t>
+            </a:r>
+            <a:r>
+              <a:rPr lang="de-DE" sz="1400" dirty="0" err="1" smtClean="0">
+                <a:latin typeface="Courier New"/>
+                <a:cs typeface="Courier New"/>
+              </a:rPr>
+              <a:t>travel</a:t>
+            </a:r>
+            <a:r>
+              <a:rPr lang="de-DE" sz="1400" dirty="0" smtClean="0">
+                <a:latin typeface="Courier New"/>
+                <a:cs typeface="Courier New"/>
+              </a:rPr>
+              <a:t>-</a:t>
+            </a:r>
+            <a:r>
+              <a:rPr lang="de-DE" sz="1400" dirty="0">
+                <a:latin typeface="Courier New"/>
+                <a:cs typeface="Courier New"/>
+              </a:rPr>
+              <a:t>sample`</a:t>
+            </a:r>
+            <a:r>
+              <a:rPr lang="de-DE" sz="1400" dirty="0" smtClean="0">
+                <a:latin typeface="Courier New"/>
+                <a:cs typeface="Courier New"/>
+              </a:rPr>
+              <a:t>(</a:t>
+            </a:r>
+            <a:r>
+              <a:rPr lang="de-DE" sz="1400" dirty="0" err="1" smtClean="0">
+                <a:latin typeface="Courier New"/>
+                <a:cs typeface="Courier New"/>
+              </a:rPr>
+              <a:t>fieldb</a:t>
+            </a:r>
+            <a:r>
+              <a:rPr lang="de-DE" sz="1400" dirty="0" smtClean="0">
+                <a:latin typeface="Courier New"/>
+                <a:cs typeface="Courier New"/>
+              </a:rPr>
+              <a:t>) USING GSI WITH </a:t>
+            </a:r>
+            <a:r>
+              <a:rPr lang="de-DE" sz="1400" b="1" dirty="0">
+                <a:latin typeface="Courier New"/>
+                <a:cs typeface="Courier New"/>
+              </a:rPr>
+              <a:t>{"</a:t>
+            </a:r>
+            <a:r>
+              <a:rPr lang="de-DE" sz="1400" b="1" dirty="0" err="1">
+                <a:latin typeface="Courier New"/>
+                <a:cs typeface="Courier New"/>
+              </a:rPr>
+              <a:t>defer_build</a:t>
+            </a:r>
+            <a:r>
+              <a:rPr lang="de-DE" sz="1400" b="1" dirty="0">
+                <a:latin typeface="Courier New"/>
+                <a:cs typeface="Courier New"/>
+              </a:rPr>
+              <a:t>": </a:t>
+            </a:r>
+            <a:r>
+              <a:rPr lang="de-DE" sz="1400" b="1" dirty="0" err="1">
+                <a:latin typeface="Courier New"/>
+                <a:cs typeface="Courier New"/>
+              </a:rPr>
+              <a:t>true</a:t>
+            </a:r>
+            <a:r>
+              <a:rPr lang="de-DE" sz="1400" b="1" dirty="0">
+                <a:latin typeface="Courier New"/>
+                <a:cs typeface="Courier New"/>
+              </a:rPr>
+              <a:t>}</a:t>
+            </a:r>
+          </a:p>
+          <a:p>
+            <a:r>
+              <a:rPr lang="de-DE" sz="1400" dirty="0">
+                <a:latin typeface="Courier New"/>
+                <a:cs typeface="Courier New"/>
+              </a:rPr>
+              <a:t>CREATE INDEX bar ON </a:t>
+            </a:r>
+            <a:r>
+              <a:rPr lang="de-DE" sz="1400" dirty="0" smtClean="0">
+                <a:latin typeface="Courier New"/>
+                <a:cs typeface="Courier New"/>
+              </a:rPr>
+              <a:t>`</a:t>
+            </a:r>
+            <a:r>
+              <a:rPr lang="de-DE" sz="1400" dirty="0" err="1" smtClean="0">
+                <a:latin typeface="Courier New"/>
+                <a:cs typeface="Courier New"/>
+              </a:rPr>
+              <a:t>travel</a:t>
+            </a:r>
+            <a:r>
+              <a:rPr lang="de-DE" sz="1400" dirty="0" smtClean="0">
+                <a:latin typeface="Courier New"/>
+                <a:cs typeface="Courier New"/>
+              </a:rPr>
+              <a:t>-</a:t>
+            </a:r>
+            <a:r>
+              <a:rPr lang="de-DE" sz="1400" dirty="0">
+                <a:latin typeface="Courier New"/>
+                <a:cs typeface="Courier New"/>
+              </a:rPr>
+              <a:t>sample`</a:t>
+            </a:r>
+            <a:r>
+              <a:rPr lang="de-DE" sz="1400" dirty="0" smtClean="0">
+                <a:latin typeface="Courier New"/>
+                <a:cs typeface="Courier New"/>
+              </a:rPr>
+              <a:t>(</a:t>
+            </a:r>
+            <a:r>
+              <a:rPr lang="de-DE" sz="1400" dirty="0" err="1" smtClean="0">
+                <a:latin typeface="Courier New"/>
+                <a:cs typeface="Courier New"/>
+              </a:rPr>
+              <a:t>fielda</a:t>
+            </a:r>
+            <a:r>
+              <a:rPr lang="de-DE" sz="1400" dirty="0" smtClean="0">
+                <a:latin typeface="Courier New"/>
+                <a:cs typeface="Courier New"/>
+              </a:rPr>
+              <a:t>) </a:t>
+            </a:r>
+            <a:r>
+              <a:rPr lang="de-DE" sz="1400" dirty="0">
+                <a:latin typeface="Courier New"/>
+                <a:cs typeface="Courier New"/>
+              </a:rPr>
+              <a:t>USING GSI WITH </a:t>
+            </a:r>
+            <a:r>
+              <a:rPr lang="de-DE" sz="1400" b="1" dirty="0">
+                <a:latin typeface="Courier New"/>
+                <a:cs typeface="Courier New"/>
+              </a:rPr>
+              <a:t>{"</a:t>
+            </a:r>
+            <a:r>
+              <a:rPr lang="de-DE" sz="1400" b="1" dirty="0" err="1">
+                <a:latin typeface="Courier New"/>
+                <a:cs typeface="Courier New"/>
+              </a:rPr>
+              <a:t>defer_build</a:t>
+            </a:r>
+            <a:r>
+              <a:rPr lang="de-DE" sz="1400" b="1" dirty="0">
+                <a:latin typeface="Courier New"/>
+                <a:cs typeface="Courier New"/>
+              </a:rPr>
+              <a:t>": </a:t>
+            </a:r>
+            <a:r>
+              <a:rPr lang="de-DE" sz="1400" b="1" dirty="0" err="1">
+                <a:latin typeface="Courier New"/>
+                <a:cs typeface="Courier New"/>
+              </a:rPr>
+              <a:t>true</a:t>
+            </a:r>
+            <a:r>
+              <a:rPr lang="de-DE" sz="1400" b="1" dirty="0">
+                <a:latin typeface="Courier New"/>
+                <a:cs typeface="Courier New"/>
+              </a:rPr>
+              <a:t>}</a:t>
+            </a:r>
+          </a:p>
+          <a:p>
+            <a:r>
+              <a:rPr lang="de-DE" sz="1400" b="1" dirty="0" smtClean="0">
+                <a:latin typeface="Courier New"/>
+                <a:cs typeface="Courier New"/>
+              </a:rPr>
+              <a:t>BUILD </a:t>
+            </a:r>
+            <a:r>
+              <a:rPr lang="de-DE" sz="1400" b="1" dirty="0">
+                <a:latin typeface="Courier New"/>
+                <a:cs typeface="Courier New"/>
+              </a:rPr>
+              <a:t>INDEX </a:t>
+            </a:r>
+            <a:r>
+              <a:rPr lang="de-DE" sz="1400" b="1" dirty="0" smtClean="0">
+                <a:latin typeface="Courier New"/>
+                <a:cs typeface="Courier New"/>
+              </a:rPr>
+              <a:t>`</a:t>
+            </a:r>
+            <a:r>
+              <a:rPr lang="de-DE" sz="1400" b="1" dirty="0" err="1" smtClean="0">
+                <a:latin typeface="Courier New"/>
+                <a:cs typeface="Courier New"/>
+              </a:rPr>
+              <a:t>travel</a:t>
+            </a:r>
+            <a:r>
+              <a:rPr lang="de-DE" sz="1400" b="1" dirty="0" smtClean="0">
+                <a:latin typeface="Courier New"/>
+                <a:cs typeface="Courier New"/>
+              </a:rPr>
+              <a:t>-</a:t>
+            </a:r>
+            <a:r>
+              <a:rPr lang="de-DE" sz="1400" b="1" dirty="0">
+                <a:latin typeface="Courier New"/>
+                <a:cs typeface="Courier New"/>
+              </a:rPr>
+              <a:t>sample`(</a:t>
+            </a:r>
+            <a:r>
+              <a:rPr lang="de-DE" sz="1400" b="1" dirty="0" err="1">
+                <a:latin typeface="Courier New"/>
+                <a:cs typeface="Courier New"/>
+              </a:rPr>
+              <a:t>foo</a:t>
+            </a:r>
+            <a:r>
+              <a:rPr lang="de-DE" sz="1400" b="1" dirty="0">
+                <a:latin typeface="Courier New"/>
+                <a:cs typeface="Courier New"/>
+              </a:rPr>
+              <a:t>, </a:t>
+            </a:r>
+            <a:r>
+              <a:rPr lang="de-DE" sz="1400" b="1" dirty="0" smtClean="0">
+                <a:latin typeface="Courier New"/>
+                <a:cs typeface="Courier New"/>
+              </a:rPr>
+              <a:t>bar)</a:t>
+            </a:r>
+            <a:endParaRPr lang="de-DE" sz="1400" b="1" dirty="0">
               <a:latin typeface="Courier New"/>
               <a:cs typeface="Courier New"/>
             </a:endParaRPr>
@@ -5434,7 +5674,7 @@
                                         <p:tgtEl>
                                           <p:spTgt spid="3">
                                             <p:txEl>
-                                              <p:pRg st="4" end="4"/>
+                                              <p:pRg st="5" end="5"/>
                                             </p:txEl>
                                           </p:spTgt>
                                         </p:tgtEl>
@@ -5452,7 +5692,7 @@
                                         <p:tgtEl>
                                           <p:spTgt spid="3">
                                             <p:txEl>
-                                              <p:pRg st="4" end="4"/>
+                                              <p:pRg st="5" end="5"/>
                                             </p:txEl>
                                           </p:spTgt>
                                         </p:tgtEl>

</xml_diff>

<commit_message>
more on 6 beginner n1ql
</commit_message>
<xml_diff>
--- a/server/presentations/07_N1QL Details.pptx
+++ b/server/presentations/07_N1QL Details.pptx
@@ -5,10 +5,10 @@
     <p:sldMasterId id="2147483648" r:id="rId1"/>
   </p:sldMasterIdLst>
   <p:notesMasterIdLst>
-    <p:notesMasterId r:id="rId39"/>
+    <p:notesMasterId r:id="rId40"/>
   </p:notesMasterIdLst>
   <p:handoutMasterIdLst>
-    <p:handoutMasterId r:id="rId40"/>
+    <p:handoutMasterId r:id="rId41"/>
   </p:handoutMasterIdLst>
   <p:sldIdLst>
     <p:sldId id="256" r:id="rId2"/>
@@ -21,33 +21,34 @@
     <p:sldId id="299" r:id="rId9"/>
     <p:sldId id="300" r:id="rId10"/>
     <p:sldId id="305" r:id="rId11"/>
-    <p:sldId id="301" r:id="rId12"/>
-    <p:sldId id="302" r:id="rId13"/>
-    <p:sldId id="304" r:id="rId14"/>
-    <p:sldId id="303" r:id="rId15"/>
-    <p:sldId id="290" r:id="rId16"/>
-    <p:sldId id="291" r:id="rId17"/>
-    <p:sldId id="292" r:id="rId18"/>
-    <p:sldId id="285" r:id="rId19"/>
-    <p:sldId id="284" r:id="rId20"/>
-    <p:sldId id="288" r:id="rId21"/>
-    <p:sldId id="287" r:id="rId22"/>
-    <p:sldId id="286" r:id="rId23"/>
-    <p:sldId id="289" r:id="rId24"/>
-    <p:sldId id="294" r:id="rId25"/>
-    <p:sldId id="279" r:id="rId26"/>
-    <p:sldId id="280" r:id="rId27"/>
-    <p:sldId id="281" r:id="rId28"/>
-    <p:sldId id="264" r:id="rId29"/>
-    <p:sldId id="270" r:id="rId30"/>
-    <p:sldId id="276" r:id="rId31"/>
-    <p:sldId id="277" r:id="rId32"/>
-    <p:sldId id="272" r:id="rId33"/>
-    <p:sldId id="275" r:id="rId34"/>
-    <p:sldId id="273" r:id="rId35"/>
-    <p:sldId id="274" r:id="rId36"/>
-    <p:sldId id="267" r:id="rId37"/>
-    <p:sldId id="269" r:id="rId38"/>
+    <p:sldId id="306" r:id="rId12"/>
+    <p:sldId id="301" r:id="rId13"/>
+    <p:sldId id="302" r:id="rId14"/>
+    <p:sldId id="304" r:id="rId15"/>
+    <p:sldId id="303" r:id="rId16"/>
+    <p:sldId id="290" r:id="rId17"/>
+    <p:sldId id="291" r:id="rId18"/>
+    <p:sldId id="292" r:id="rId19"/>
+    <p:sldId id="285" r:id="rId20"/>
+    <p:sldId id="284" r:id="rId21"/>
+    <p:sldId id="288" r:id="rId22"/>
+    <p:sldId id="287" r:id="rId23"/>
+    <p:sldId id="286" r:id="rId24"/>
+    <p:sldId id="289" r:id="rId25"/>
+    <p:sldId id="294" r:id="rId26"/>
+    <p:sldId id="279" r:id="rId27"/>
+    <p:sldId id="280" r:id="rId28"/>
+    <p:sldId id="281" r:id="rId29"/>
+    <p:sldId id="264" r:id="rId30"/>
+    <p:sldId id="270" r:id="rId31"/>
+    <p:sldId id="276" r:id="rId32"/>
+    <p:sldId id="277" r:id="rId33"/>
+    <p:sldId id="272" r:id="rId34"/>
+    <p:sldId id="275" r:id="rId35"/>
+    <p:sldId id="273" r:id="rId36"/>
+    <p:sldId id="274" r:id="rId37"/>
+    <p:sldId id="267" r:id="rId38"/>
+    <p:sldId id="269" r:id="rId39"/>
   </p:sldIdLst>
   <p:sldSz cx="9144000" cy="5143500" type="screen16x9"/>
   <p:notesSz cx="6858000" cy="9144000"/>
@@ -605,11 +606,11 @@
           <c:showBubbleSize val="0"/>
         </c:dLbls>
         <c:gapWidth val="150"/>
-        <c:axId val="-2110872712"/>
-        <c:axId val="-2085143288"/>
+        <c:axId val="-2111926792"/>
+        <c:axId val="-2112635928"/>
       </c:barChart>
       <c:catAx>
-        <c:axId val="-2110872712"/>
+        <c:axId val="-2111926792"/>
         <c:scaling>
           <c:orientation val="minMax"/>
         </c:scaling>
@@ -635,7 +636,7 @@
             <a:endParaRPr lang="de-DE"/>
           </a:p>
         </c:txPr>
-        <c:crossAx val="-2085143288"/>
+        <c:crossAx val="-2112635928"/>
         <c:crosses val="autoZero"/>
         <c:auto val="1"/>
         <c:lblAlgn val="ctr"/>
@@ -643,7 +644,7 @@
         <c:noMultiLvlLbl val="0"/>
       </c:catAx>
       <c:valAx>
-        <c:axId val="-2085143288"/>
+        <c:axId val="-2112635928"/>
         <c:scaling>
           <c:orientation val="minMax"/>
         </c:scaling>
@@ -685,7 +686,7 @@
             <a:endParaRPr lang="de-DE"/>
           </a:p>
         </c:txPr>
-        <c:crossAx val="-2110872712"/>
+        <c:crossAx val="-2111926792"/>
         <c:crosses val="autoZero"/>
         <c:crossBetween val="between"/>
       </c:valAx>
@@ -927,11 +928,11 @@
           <c:showBubbleSize val="0"/>
         </c:dLbls>
         <c:gapWidth val="150"/>
-        <c:axId val="-2085823752"/>
-        <c:axId val="-2085820536"/>
+        <c:axId val="-2080167240"/>
+        <c:axId val="2133867768"/>
       </c:barChart>
       <c:catAx>
-        <c:axId val="-2085823752"/>
+        <c:axId val="-2080167240"/>
         <c:scaling>
           <c:orientation val="minMax"/>
         </c:scaling>
@@ -957,7 +958,7 @@
             <a:endParaRPr lang="de-DE"/>
           </a:p>
         </c:txPr>
-        <c:crossAx val="-2085820536"/>
+        <c:crossAx val="2133867768"/>
         <c:crosses val="autoZero"/>
         <c:auto val="1"/>
         <c:lblAlgn val="ctr"/>
@@ -965,7 +966,7 @@
         <c:noMultiLvlLbl val="0"/>
       </c:catAx>
       <c:valAx>
-        <c:axId val="-2085820536"/>
+        <c:axId val="2133867768"/>
         <c:scaling>
           <c:orientation val="minMax"/>
         </c:scaling>
@@ -1007,7 +1008,7 @@
             <a:endParaRPr lang="de-DE"/>
           </a:p>
         </c:txPr>
-        <c:crossAx val="-2085823752"/>
+        <c:crossAx val="-2080167240"/>
         <c:crosses val="autoZero"/>
         <c:crossBetween val="between"/>
       </c:valAx>
@@ -1257,11 +1258,11 @@
         </c:dLbls>
         <c:marker val="1"/>
         <c:smooth val="0"/>
-        <c:axId val="-2084959624"/>
-        <c:axId val="-2084954088"/>
+        <c:axId val="-2080226648"/>
+        <c:axId val="-2080223432"/>
       </c:lineChart>
       <c:catAx>
-        <c:axId val="-2084959624"/>
+        <c:axId val="-2080226648"/>
         <c:scaling>
           <c:orientation val="minMax"/>
         </c:scaling>
@@ -1287,7 +1288,7 @@
             <a:endParaRPr lang="de-DE"/>
           </a:p>
         </c:txPr>
-        <c:crossAx val="-2084954088"/>
+        <c:crossAx val="-2080223432"/>
         <c:crosses val="autoZero"/>
         <c:auto val="1"/>
         <c:lblAlgn val="ctr"/>
@@ -1295,7 +1296,7 @@
         <c:noMultiLvlLbl val="0"/>
       </c:catAx>
       <c:valAx>
-        <c:axId val="-2084954088"/>
+        <c:axId val="-2080223432"/>
         <c:scaling>
           <c:orientation val="minMax"/>
         </c:scaling>
@@ -1335,7 +1336,7 @@
             <a:endParaRPr lang="de-DE"/>
           </a:p>
         </c:txPr>
-        <c:crossAx val="-2084959624"/>
+        <c:crossAx val="-2080226648"/>
         <c:crosses val="autoZero"/>
         <c:crossBetween val="between"/>
       </c:valAx>
@@ -1457,7 +1458,7 @@
           <a:p>
             <a:fld id="{B5389E1E-C654-E943-9883-792E99AD7287}" type="datetimeFigureOut">
               <a:rPr lang="en-US" smtClean="0"/>
-              <a:t>26/05/15</a:t>
+              <a:t>27/05/15</a:t>
             </a:fld>
             <a:endParaRPr lang="en-US"/>
           </a:p>
@@ -1623,7 +1624,7 @@
           <a:p>
             <a:fld id="{9920D99B-2862-464A-984E-65BFC5FC0BBC}" type="datetimeFigureOut">
               <a:rPr lang="en-US" smtClean="0"/>
-              <a:t>26/05/15</a:t>
+              <a:t>27/05/15</a:t>
             </a:fld>
             <a:endParaRPr lang="en-US"/>
           </a:p>
@@ -1911,6 +1912,735 @@
       </p:grpSpPr>
       <p:sp>
         <p:nvSpPr>
+          <p:cNvPr id="2" name="Folienbildplatzhalter 1"/>
+          <p:cNvSpPr>
+            <a:spLocks noGrp="1" noRot="1" noChangeAspect="1"/>
+          </p:cNvSpPr>
+          <p:nvPr>
+            <p:ph type="sldImg"/>
+          </p:nvPr>
+        </p:nvSpPr>
+        <p:spPr/>
+      </p:sp>
+      <p:sp>
+        <p:nvSpPr>
+          <p:cNvPr id="3" name="Notizenplatzhalter 2"/>
+          <p:cNvSpPr>
+            <a:spLocks noGrp="1"/>
+          </p:cNvSpPr>
+          <p:nvPr>
+            <p:ph type="body" idx="1"/>
+          </p:nvPr>
+        </p:nvSpPr>
+        <p:spPr/>
+        <p:txBody>
+          <a:bodyPr/>
+          <a:lstStyle/>
+          <a:p>
+            <a:pPr marL="0" marR="0" indent="0" algn="l" defTabSz="457200" rtl="0" eaLnBrk="1" fontAlgn="auto" latinLnBrk="0" hangingPunct="1">
+              <a:lnSpc>
+                <a:spcPct val="100000"/>
+              </a:lnSpc>
+              <a:spcBef>
+                <a:spcPts val="0"/>
+              </a:spcBef>
+              <a:spcAft>
+                <a:spcPts val="0"/>
+              </a:spcAft>
+              <a:buClrTx/>
+              <a:buSzTx/>
+              <a:buFontTx/>
+              <a:buNone/>
+              <a:tabLst/>
+              <a:defRPr/>
+            </a:pPr>
+            <a:r>
+              <a:rPr lang="de-DE" dirty="0" smtClean="0"/>
+              <a:t>Index DDL Request </a:t>
+            </a:r>
+            <a:r>
+              <a:rPr lang="de-DE" dirty="0" err="1" smtClean="0"/>
+              <a:t>from</a:t>
+            </a:r>
+            <a:r>
+              <a:rPr lang="de-DE" dirty="0" smtClean="0"/>
+              <a:t> Query Server </a:t>
+            </a:r>
+            <a:r>
+              <a:rPr lang="de-DE" dirty="0" err="1" smtClean="0"/>
+              <a:t>to</a:t>
+            </a:r>
+            <a:r>
+              <a:rPr lang="de-DE" dirty="0" smtClean="0"/>
+              <a:t> Index Client.</a:t>
+            </a:r>
+          </a:p>
+          <a:p>
+            <a:pPr marL="0" marR="0" indent="0" algn="l" defTabSz="457200" rtl="0" eaLnBrk="1" fontAlgn="auto" latinLnBrk="0" hangingPunct="1">
+              <a:lnSpc>
+                <a:spcPct val="100000"/>
+              </a:lnSpc>
+              <a:spcBef>
+                <a:spcPts val="0"/>
+              </a:spcBef>
+              <a:spcAft>
+                <a:spcPts val="0"/>
+              </a:spcAft>
+              <a:buClrTx/>
+              <a:buSzTx/>
+              <a:buFontTx/>
+              <a:buNone/>
+              <a:tabLst/>
+              <a:defRPr/>
+            </a:pPr>
+            <a:r>
+              <a:rPr lang="de-DE" dirty="0" smtClean="0"/>
+              <a:t>Index Client </a:t>
+            </a:r>
+            <a:r>
+              <a:rPr lang="de-DE" dirty="0" err="1" smtClean="0"/>
+              <a:t>sends</a:t>
+            </a:r>
+            <a:r>
+              <a:rPr lang="de-DE" dirty="0" smtClean="0"/>
+              <a:t> </a:t>
+            </a:r>
+            <a:r>
+              <a:rPr lang="de-DE" dirty="0" err="1" smtClean="0"/>
+              <a:t>the</a:t>
+            </a:r>
+            <a:r>
+              <a:rPr lang="de-DE" dirty="0" smtClean="0"/>
+              <a:t> DDL </a:t>
+            </a:r>
+            <a:r>
+              <a:rPr lang="de-DE" dirty="0" err="1" smtClean="0"/>
+              <a:t>request</a:t>
+            </a:r>
+            <a:r>
+              <a:rPr lang="de-DE" dirty="0" smtClean="0"/>
+              <a:t> </a:t>
+            </a:r>
+            <a:r>
+              <a:rPr lang="de-DE" dirty="0" err="1" smtClean="0"/>
+              <a:t>to</a:t>
+            </a:r>
+            <a:r>
+              <a:rPr lang="de-DE" dirty="0" smtClean="0"/>
+              <a:t> Index </a:t>
+            </a:r>
+            <a:r>
+              <a:rPr lang="de-DE" dirty="0" err="1" smtClean="0"/>
+              <a:t>Coordinator</a:t>
+            </a:r>
+            <a:r>
+              <a:rPr lang="de-DE" dirty="0" smtClean="0"/>
+              <a:t> Master.</a:t>
+            </a:r>
+          </a:p>
+          <a:p>
+            <a:pPr marL="0" marR="0" indent="0" algn="l" defTabSz="457200" rtl="0" eaLnBrk="1" fontAlgn="auto" latinLnBrk="0" hangingPunct="1">
+              <a:lnSpc>
+                <a:spcPct val="100000"/>
+              </a:lnSpc>
+              <a:spcBef>
+                <a:spcPts val="0"/>
+              </a:spcBef>
+              <a:spcAft>
+                <a:spcPts val="0"/>
+              </a:spcAft>
+              <a:buClrTx/>
+              <a:buSzTx/>
+              <a:buFontTx/>
+              <a:buNone/>
+              <a:tabLst/>
+              <a:defRPr/>
+            </a:pPr>
+            <a:r>
+              <a:rPr lang="de-DE" dirty="0" smtClean="0"/>
+              <a:t>Index </a:t>
+            </a:r>
+            <a:r>
+              <a:rPr lang="de-DE" dirty="0" err="1" smtClean="0"/>
+              <a:t>Coordinator</a:t>
+            </a:r>
+            <a:r>
+              <a:rPr lang="de-DE" dirty="0" smtClean="0"/>
+              <a:t> Master </a:t>
+            </a:r>
+            <a:r>
+              <a:rPr lang="de-DE" dirty="0" err="1" smtClean="0"/>
+              <a:t>decides</a:t>
+            </a:r>
+            <a:r>
+              <a:rPr lang="de-DE" dirty="0" smtClean="0"/>
+              <a:t> </a:t>
+            </a:r>
+            <a:r>
+              <a:rPr lang="de-DE" dirty="0" err="1" smtClean="0"/>
+              <a:t>the</a:t>
+            </a:r>
+            <a:r>
+              <a:rPr lang="de-DE" dirty="0" smtClean="0"/>
+              <a:t> </a:t>
+            </a:r>
+            <a:r>
+              <a:rPr lang="de-DE" dirty="0" err="1" smtClean="0"/>
+              <a:t>topology</a:t>
+            </a:r>
+            <a:r>
+              <a:rPr lang="de-DE" dirty="0" smtClean="0"/>
+              <a:t> </a:t>
+            </a:r>
+            <a:r>
+              <a:rPr lang="de-DE" dirty="0" err="1" smtClean="0"/>
+              <a:t>and</a:t>
+            </a:r>
+            <a:r>
+              <a:rPr lang="de-DE" dirty="0" smtClean="0"/>
+              <a:t> </a:t>
+            </a:r>
+            <a:r>
+              <a:rPr lang="de-DE" dirty="0" err="1" smtClean="0"/>
+              <a:t>informs</a:t>
+            </a:r>
+            <a:r>
+              <a:rPr lang="de-DE" dirty="0" smtClean="0"/>
+              <a:t> </a:t>
+            </a:r>
+            <a:r>
+              <a:rPr lang="de-DE" dirty="0" err="1" smtClean="0"/>
+              <a:t>participating</a:t>
+            </a:r>
+            <a:r>
+              <a:rPr lang="de-DE" dirty="0" smtClean="0"/>
+              <a:t> </a:t>
+            </a:r>
+            <a:r>
+              <a:rPr lang="de-DE" dirty="0" err="1" smtClean="0"/>
+              <a:t>Local</a:t>
+            </a:r>
+            <a:r>
+              <a:rPr lang="de-DE" dirty="0" smtClean="0"/>
+              <a:t> </a:t>
+            </a:r>
+            <a:r>
+              <a:rPr lang="de-DE" dirty="0" err="1" smtClean="0"/>
+              <a:t>Indexers</a:t>
+            </a:r>
+            <a:r>
+              <a:rPr lang="de-DE" dirty="0" smtClean="0"/>
+              <a:t> </a:t>
+            </a:r>
+            <a:r>
+              <a:rPr lang="de-DE" dirty="0" err="1" smtClean="0"/>
+              <a:t>to</a:t>
+            </a:r>
+            <a:r>
+              <a:rPr lang="de-DE" dirty="0" smtClean="0"/>
+              <a:t> </a:t>
+            </a:r>
+            <a:r>
+              <a:rPr lang="de-DE" dirty="0" err="1" smtClean="0"/>
+              <a:t>process</a:t>
+            </a:r>
+            <a:r>
+              <a:rPr lang="de-DE" dirty="0" smtClean="0"/>
+              <a:t> DDL.</a:t>
+            </a:r>
+          </a:p>
+          <a:p>
+            <a:pPr marL="0" marR="0" indent="0" algn="l" defTabSz="457200" rtl="0" eaLnBrk="1" fontAlgn="auto" latinLnBrk="0" hangingPunct="1">
+              <a:lnSpc>
+                <a:spcPct val="100000"/>
+              </a:lnSpc>
+              <a:spcBef>
+                <a:spcPts val="0"/>
+              </a:spcBef>
+              <a:spcAft>
+                <a:spcPts val="0"/>
+              </a:spcAft>
+              <a:buClrTx/>
+              <a:buSzTx/>
+              <a:buFontTx/>
+              <a:buNone/>
+              <a:tabLst/>
+              <a:defRPr/>
+            </a:pPr>
+            <a:r>
+              <a:rPr lang="de-DE" dirty="0" err="1" smtClean="0"/>
+              <a:t>Local</a:t>
+            </a:r>
+            <a:r>
+              <a:rPr lang="de-DE" dirty="0" smtClean="0"/>
+              <a:t> </a:t>
+            </a:r>
+            <a:r>
+              <a:rPr lang="de-DE" dirty="0" err="1" smtClean="0"/>
+              <a:t>Indexers</a:t>
+            </a:r>
+            <a:r>
+              <a:rPr lang="de-DE" dirty="0" smtClean="0"/>
+              <a:t> </a:t>
+            </a:r>
+            <a:r>
+              <a:rPr lang="de-DE" dirty="0" err="1" smtClean="0"/>
+              <a:t>allocates</a:t>
+            </a:r>
+            <a:r>
+              <a:rPr lang="de-DE" dirty="0" smtClean="0"/>
+              <a:t>/</a:t>
+            </a:r>
+            <a:r>
+              <a:rPr lang="de-DE" dirty="0" err="1" smtClean="0"/>
+              <a:t>deallocates</a:t>
+            </a:r>
+            <a:r>
+              <a:rPr lang="de-DE" dirty="0" smtClean="0"/>
+              <a:t> </a:t>
+            </a:r>
+            <a:r>
+              <a:rPr lang="de-DE" dirty="0" err="1" smtClean="0"/>
+              <a:t>storage</a:t>
+            </a:r>
+            <a:r>
+              <a:rPr lang="de-DE" dirty="0" smtClean="0"/>
+              <a:t> </a:t>
+            </a:r>
+            <a:r>
+              <a:rPr lang="de-DE" dirty="0" err="1" smtClean="0"/>
+              <a:t>for</a:t>
+            </a:r>
+            <a:r>
+              <a:rPr lang="de-DE" dirty="0" smtClean="0"/>
+              <a:t> </a:t>
+            </a:r>
+            <a:r>
+              <a:rPr lang="de-DE" dirty="0" err="1" smtClean="0"/>
+              <a:t>new</a:t>
+            </a:r>
+            <a:r>
+              <a:rPr lang="de-DE" dirty="0" smtClean="0"/>
+              <a:t> DDL </a:t>
+            </a:r>
+            <a:r>
+              <a:rPr lang="de-DE" dirty="0" err="1" smtClean="0"/>
+              <a:t>request</a:t>
+            </a:r>
+            <a:r>
+              <a:rPr lang="de-DE" dirty="0" smtClean="0"/>
+              <a:t>.</a:t>
+            </a:r>
+          </a:p>
+          <a:p>
+            <a:pPr marL="0" marR="0" indent="0" algn="l" defTabSz="457200" rtl="0" eaLnBrk="1" fontAlgn="auto" latinLnBrk="0" hangingPunct="1">
+              <a:lnSpc>
+                <a:spcPct val="100000"/>
+              </a:lnSpc>
+              <a:spcBef>
+                <a:spcPts val="0"/>
+              </a:spcBef>
+              <a:spcAft>
+                <a:spcPts val="0"/>
+              </a:spcAft>
+              <a:buClrTx/>
+              <a:buSzTx/>
+              <a:buFontTx/>
+              <a:buNone/>
+              <a:tabLst/>
+              <a:defRPr/>
+            </a:pPr>
+            <a:r>
+              <a:rPr lang="de-DE" dirty="0" smtClean="0"/>
+              <a:t>Index </a:t>
+            </a:r>
+            <a:r>
+              <a:rPr lang="de-DE" dirty="0" err="1" smtClean="0"/>
+              <a:t>Coordinator</a:t>
+            </a:r>
+            <a:r>
+              <a:rPr lang="de-DE" dirty="0" smtClean="0"/>
+              <a:t> Master </a:t>
+            </a:r>
+            <a:r>
+              <a:rPr lang="de-DE" dirty="0" err="1" smtClean="0"/>
+              <a:t>replicates</a:t>
+            </a:r>
+            <a:r>
+              <a:rPr lang="de-DE" dirty="0" smtClean="0"/>
+              <a:t> </a:t>
+            </a:r>
+            <a:r>
+              <a:rPr lang="de-DE" dirty="0" err="1" smtClean="0"/>
+              <a:t>the</a:t>
+            </a:r>
+            <a:r>
+              <a:rPr lang="de-DE" dirty="0" smtClean="0"/>
+              <a:t> </a:t>
+            </a:r>
+            <a:r>
+              <a:rPr lang="de-DE" dirty="0" err="1" smtClean="0"/>
+              <a:t>updated</a:t>
+            </a:r>
+            <a:r>
+              <a:rPr lang="de-DE" dirty="0" smtClean="0"/>
+              <a:t> </a:t>
+            </a:r>
+            <a:r>
+              <a:rPr lang="de-DE" dirty="0" err="1" smtClean="0"/>
+              <a:t>metadata</a:t>
+            </a:r>
+            <a:r>
+              <a:rPr lang="de-DE" dirty="0" smtClean="0"/>
+              <a:t>.</a:t>
+            </a:r>
+          </a:p>
+          <a:p>
+            <a:pPr marL="0" marR="0" indent="0" algn="l" defTabSz="457200" rtl="0" eaLnBrk="1" fontAlgn="auto" latinLnBrk="0" hangingPunct="1">
+              <a:lnSpc>
+                <a:spcPct val="100000"/>
+              </a:lnSpc>
+              <a:spcBef>
+                <a:spcPts val="0"/>
+              </a:spcBef>
+              <a:spcAft>
+                <a:spcPts val="0"/>
+              </a:spcAft>
+              <a:buClrTx/>
+              <a:buSzTx/>
+              <a:buFontTx/>
+              <a:buNone/>
+              <a:tabLst/>
+              <a:defRPr/>
+            </a:pPr>
+            <a:r>
+              <a:rPr lang="de-DE" dirty="0" err="1" smtClean="0"/>
+              <a:t>Metadata</a:t>
+            </a:r>
+            <a:r>
+              <a:rPr lang="de-DE" dirty="0" smtClean="0"/>
+              <a:t> </a:t>
+            </a:r>
+            <a:r>
+              <a:rPr lang="de-DE" dirty="0" err="1" smtClean="0"/>
+              <a:t>is</a:t>
+            </a:r>
+            <a:r>
+              <a:rPr lang="de-DE" dirty="0" smtClean="0"/>
+              <a:t> </a:t>
+            </a:r>
+            <a:r>
+              <a:rPr lang="de-DE" dirty="0" err="1" smtClean="0"/>
+              <a:t>persisted</a:t>
+            </a:r>
+            <a:r>
+              <a:rPr lang="de-DE" dirty="0" smtClean="0"/>
+              <a:t> </a:t>
+            </a:r>
+            <a:r>
+              <a:rPr lang="de-DE" dirty="0" err="1" smtClean="0"/>
+              <a:t>at</a:t>
+            </a:r>
+            <a:r>
+              <a:rPr lang="de-DE" dirty="0" smtClean="0"/>
+              <a:t> </a:t>
+            </a:r>
+            <a:r>
+              <a:rPr lang="de-DE" dirty="0" err="1" smtClean="0"/>
+              <a:t>both</a:t>
+            </a:r>
+            <a:r>
+              <a:rPr lang="de-DE" dirty="0" smtClean="0"/>
+              <a:t> </a:t>
+            </a:r>
+            <a:r>
+              <a:rPr lang="de-DE" dirty="0" err="1" smtClean="0"/>
+              <a:t>master</a:t>
+            </a:r>
+            <a:r>
+              <a:rPr lang="de-DE" dirty="0" smtClean="0"/>
+              <a:t> </a:t>
+            </a:r>
+            <a:r>
+              <a:rPr lang="de-DE" dirty="0" err="1" smtClean="0"/>
+              <a:t>and</a:t>
+            </a:r>
+            <a:r>
+              <a:rPr lang="de-DE" dirty="0" smtClean="0"/>
+              <a:t> </a:t>
+            </a:r>
+            <a:r>
+              <a:rPr lang="de-DE" dirty="0" err="1" smtClean="0"/>
+              <a:t>replica</a:t>
+            </a:r>
+            <a:r>
+              <a:rPr lang="de-DE" dirty="0" smtClean="0"/>
+              <a:t> Index </a:t>
+            </a:r>
+            <a:r>
+              <a:rPr lang="de-DE" dirty="0" err="1" smtClean="0"/>
+              <a:t>Coordinator</a:t>
+            </a:r>
+            <a:r>
+              <a:rPr lang="de-DE" dirty="0" smtClean="0"/>
+              <a:t>.</a:t>
+            </a:r>
+          </a:p>
+          <a:p>
+            <a:pPr marL="0" marR="0" indent="0" algn="l" defTabSz="457200" rtl="0" eaLnBrk="1" fontAlgn="auto" latinLnBrk="0" hangingPunct="1">
+              <a:lnSpc>
+                <a:spcPct val="100000"/>
+              </a:lnSpc>
+              <a:spcBef>
+                <a:spcPts val="0"/>
+              </a:spcBef>
+              <a:spcAft>
+                <a:spcPts val="0"/>
+              </a:spcAft>
+              <a:buClrTx/>
+              <a:buSzTx/>
+              <a:buFontTx/>
+              <a:buNone/>
+              <a:tabLst/>
+              <a:defRPr/>
+            </a:pPr>
+            <a:r>
+              <a:rPr lang="de-DE" dirty="0" smtClean="0"/>
+              <a:t>Index </a:t>
+            </a:r>
+            <a:r>
+              <a:rPr lang="de-DE" dirty="0" err="1" smtClean="0"/>
+              <a:t>Coordinator</a:t>
+            </a:r>
+            <a:r>
+              <a:rPr lang="de-DE" dirty="0" smtClean="0"/>
+              <a:t> Master </a:t>
+            </a:r>
+            <a:r>
+              <a:rPr lang="de-DE" dirty="0" err="1" smtClean="0"/>
+              <a:t>notifies</a:t>
+            </a:r>
+            <a:r>
+              <a:rPr lang="de-DE" dirty="0" smtClean="0"/>
+              <a:t> ALL KV </a:t>
+            </a:r>
+            <a:r>
+              <a:rPr lang="de-DE" dirty="0" err="1" smtClean="0"/>
+              <a:t>projectors</a:t>
+            </a:r>
+            <a:r>
+              <a:rPr lang="de-DE" dirty="0" smtClean="0"/>
+              <a:t> </a:t>
+            </a:r>
+            <a:r>
+              <a:rPr lang="de-DE" dirty="0" err="1" smtClean="0"/>
+              <a:t>for</a:t>
+            </a:r>
+            <a:r>
+              <a:rPr lang="de-DE" dirty="0" smtClean="0"/>
+              <a:t> </a:t>
+            </a:r>
+            <a:r>
+              <a:rPr lang="de-DE" dirty="0" err="1" smtClean="0"/>
+              <a:t>the</a:t>
+            </a:r>
+            <a:r>
+              <a:rPr lang="de-DE" dirty="0" smtClean="0"/>
+              <a:t> </a:t>
+            </a:r>
+            <a:r>
+              <a:rPr lang="de-DE" dirty="0" err="1" smtClean="0"/>
+              <a:t>new</a:t>
+            </a:r>
+            <a:r>
+              <a:rPr lang="de-DE" dirty="0" smtClean="0"/>
+              <a:t> DDL </a:t>
+            </a:r>
+            <a:r>
+              <a:rPr lang="de-DE" dirty="0" err="1" smtClean="0"/>
+              <a:t>request</a:t>
+            </a:r>
+            <a:r>
+              <a:rPr lang="de-DE" dirty="0" smtClean="0"/>
+              <a:t>.</a:t>
+            </a:r>
+          </a:p>
+          <a:p>
+            <a:pPr marL="0" marR="0" indent="0" algn="l" defTabSz="457200" rtl="0" eaLnBrk="1" fontAlgn="auto" latinLnBrk="0" hangingPunct="1">
+              <a:lnSpc>
+                <a:spcPct val="100000"/>
+              </a:lnSpc>
+              <a:spcBef>
+                <a:spcPts val="0"/>
+              </a:spcBef>
+              <a:spcAft>
+                <a:spcPts val="0"/>
+              </a:spcAft>
+              <a:buClrTx/>
+              <a:buSzTx/>
+              <a:buFontTx/>
+              <a:buNone/>
+              <a:tabLst/>
+              <a:defRPr/>
+            </a:pPr>
+            <a:r>
+              <a:rPr lang="de-DE" dirty="0" smtClean="0"/>
+              <a:t>Index </a:t>
+            </a:r>
+            <a:r>
+              <a:rPr lang="de-DE" dirty="0" err="1" smtClean="0"/>
+              <a:t>Coordinator</a:t>
+            </a:r>
+            <a:r>
+              <a:rPr lang="de-DE" dirty="0" smtClean="0"/>
+              <a:t> </a:t>
+            </a:r>
+            <a:r>
+              <a:rPr lang="de-DE" dirty="0" err="1" smtClean="0"/>
+              <a:t>returns</a:t>
+            </a:r>
+            <a:r>
+              <a:rPr lang="de-DE" dirty="0" smtClean="0"/>
+              <a:t> </a:t>
+            </a:r>
+            <a:r>
+              <a:rPr lang="de-DE" dirty="0" err="1" smtClean="0"/>
+              <a:t>status</a:t>
+            </a:r>
+            <a:r>
+              <a:rPr lang="de-DE" dirty="0" smtClean="0"/>
+              <a:t> </a:t>
+            </a:r>
+            <a:r>
+              <a:rPr lang="de-DE" dirty="0" err="1" smtClean="0"/>
+              <a:t>of</a:t>
+            </a:r>
+            <a:r>
+              <a:rPr lang="de-DE" dirty="0" smtClean="0"/>
+              <a:t> DDL </a:t>
+            </a:r>
+            <a:r>
+              <a:rPr lang="de-DE" dirty="0" err="1" smtClean="0"/>
+              <a:t>request</a:t>
+            </a:r>
+            <a:r>
+              <a:rPr lang="de-DE" dirty="0" smtClean="0"/>
+              <a:t> </a:t>
+            </a:r>
+            <a:r>
+              <a:rPr lang="de-DE" dirty="0" err="1" smtClean="0"/>
+              <a:t>to</a:t>
+            </a:r>
+            <a:r>
+              <a:rPr lang="de-DE" dirty="0" smtClean="0"/>
+              <a:t> Index Client.</a:t>
+            </a:r>
+          </a:p>
+          <a:p>
+            <a:pPr marL="0" marR="0" indent="0" algn="l" defTabSz="457200" rtl="0" eaLnBrk="1" fontAlgn="auto" latinLnBrk="0" hangingPunct="1">
+              <a:lnSpc>
+                <a:spcPct val="100000"/>
+              </a:lnSpc>
+              <a:spcBef>
+                <a:spcPts val="0"/>
+              </a:spcBef>
+              <a:spcAft>
+                <a:spcPts val="0"/>
+              </a:spcAft>
+              <a:buClrTx/>
+              <a:buSzTx/>
+              <a:buFontTx/>
+              <a:buNone/>
+              <a:tabLst/>
+              <a:defRPr/>
+            </a:pPr>
+            <a:r>
+              <a:rPr lang="de-DE" dirty="0" smtClean="0"/>
+              <a:t>DDL Request Status </a:t>
+            </a:r>
+            <a:r>
+              <a:rPr lang="de-DE" dirty="0" err="1" smtClean="0"/>
+              <a:t>is</a:t>
+            </a:r>
+            <a:r>
+              <a:rPr lang="de-DE" dirty="0" smtClean="0"/>
+              <a:t> </a:t>
+            </a:r>
+            <a:r>
+              <a:rPr lang="de-DE" dirty="0" err="1" smtClean="0"/>
+              <a:t>returned</a:t>
+            </a:r>
+            <a:r>
+              <a:rPr lang="de-DE" dirty="0" smtClean="0"/>
+              <a:t> </a:t>
+            </a:r>
+            <a:r>
+              <a:rPr lang="de-DE" dirty="0" err="1" smtClean="0"/>
+              <a:t>to</a:t>
+            </a:r>
+            <a:r>
+              <a:rPr lang="de-DE" dirty="0" smtClean="0"/>
+              <a:t> Query Server.</a:t>
+            </a:r>
+            <a:endParaRPr lang="de-DE" dirty="0"/>
+          </a:p>
+        </p:txBody>
+      </p:sp>
+      <p:sp>
+        <p:nvSpPr>
+          <p:cNvPr id="4" name="Foliennummernplatzhalter 3"/>
+          <p:cNvSpPr>
+            <a:spLocks noGrp="1"/>
+          </p:cNvSpPr>
+          <p:nvPr>
+            <p:ph type="sldNum" sz="quarter" idx="10"/>
+          </p:nvPr>
+        </p:nvSpPr>
+        <p:spPr/>
+        <p:txBody>
+          <a:bodyPr/>
+          <a:lstStyle/>
+          <a:p>
+            <a:fld id="{F39351FC-18D6-4741-8EEB-9FDB1F020AAC}" type="slidenum">
+              <a:rPr lang="en-US" smtClean="0"/>
+              <a:t>11</a:t>
+            </a:fld>
+            <a:endParaRPr lang="en-US"/>
+          </a:p>
+        </p:txBody>
+      </p:sp>
+    </p:spTree>
+    <p:extLst>
+      <p:ext uri="{BB962C8B-B14F-4D97-AF65-F5344CB8AC3E}">
+        <p14:creationId xmlns:p14="http://schemas.microsoft.com/office/powerpoint/2010/main" val="229821969"/>
+      </p:ext>
+    </p:extLst>
+  </p:cSld>
+  <p:clrMapOvr>
+    <a:masterClrMapping/>
+  </p:clrMapOvr>
+</p:notes>
+</file>
+
+<file path=ppt/notesSlides/notesSlide2.xml><?xml version="1.0" encoding="utf-8"?>
+<p:notes xmlns:a="http://schemas.openxmlformats.org/drawingml/2006/main" xmlns:r="http://schemas.openxmlformats.org/officeDocument/2006/relationships" xmlns:p="http://schemas.openxmlformats.org/presentationml/2006/main">
+  <p:cSld>
+    <p:spTree>
+      <p:nvGrpSpPr>
+        <p:cNvPr id="1" name=""/>
+        <p:cNvGrpSpPr/>
+        <p:nvPr/>
+      </p:nvGrpSpPr>
+      <p:grpSpPr>
+        <a:xfrm>
+          <a:off x="0" y="0"/>
+          <a:ext cx="0" cy="0"/>
+          <a:chOff x="0" y="0"/>
+          <a:chExt cx="0" cy="0"/>
+        </a:xfrm>
+      </p:grpSpPr>
+      <p:sp>
+        <p:nvSpPr>
           <p:cNvPr id="2" name="Slide Image Placeholder 1"/>
           <p:cNvSpPr>
             <a:spLocks noGrp="1" noRot="1" noChangeAspect="1"/>
@@ -2018,7 +2748,7 @@
                 <a:latin typeface="Calibri"/>
               </a:rPr>
               <a:pPr/>
-              <a:t>20</a:t>
+              <a:t>21</a:t>
             </a:fld>
             <a:endParaRPr lang="en-US">
               <a:solidFill>
@@ -2042,7 +2772,7 @@
 </p:notes>
 </file>
 
-<file path=ppt/notesSlides/notesSlide2.xml><?xml version="1.0" encoding="utf-8"?>
+<file path=ppt/notesSlides/notesSlide3.xml><?xml version="1.0" encoding="utf-8"?>
 <p:notes xmlns:a="http://schemas.openxmlformats.org/drawingml/2006/main" xmlns:r="http://schemas.openxmlformats.org/officeDocument/2006/relationships" xmlns:p="http://schemas.openxmlformats.org/presentationml/2006/main">
   <p:cSld>
     <p:spTree>
@@ -2107,7 +2837,7 @@
           <a:p>
             <a:fld id="{615C908D-C35B-B346-A739-79C621D2BD36}" type="slidenum">
               <a:rPr lang="en-US" smtClean="0"/>
-              <a:t>21</a:t>
+              <a:t>22</a:t>
             </a:fld>
             <a:endParaRPr lang="en-US"/>
           </a:p>
@@ -5020,7 +5750,6 @@
               <a:rPr lang="en-US" dirty="0" smtClean="0"/>
               <a:t>On large datasets, index creation can take time</a:t>
             </a:r>
-            <a:endParaRPr lang="en-US" dirty="0" smtClean="0"/>
           </a:p>
           <a:p>
             <a:pPr>
@@ -5059,7 +5788,6 @@
               <a:rPr lang="en-US" dirty="0" smtClean="0"/>
               <a:t>Monitor build status through:</a:t>
             </a:r>
-            <a:endParaRPr lang="en-US" dirty="0" smtClean="0"/>
           </a:p>
         </p:txBody>
       </p:sp>
@@ -5140,10 +5868,6 @@
               </a:rPr>
               <a:t>= "online";</a:t>
             </a:r>
-            <a:endParaRPr lang="de-DE" dirty="0">
-              <a:latin typeface="Courier New"/>
-              <a:cs typeface="Courier New"/>
-            </a:endParaRPr>
           </a:p>
         </p:txBody>
       </p:sp>
@@ -5759,6 +6483,90 @@
             <a:spLocks noGrp="1"/>
           </p:cNvSpPr>
           <p:nvPr>
+            <p:ph type="title"/>
+          </p:nvPr>
+        </p:nvSpPr>
+        <p:spPr/>
+        <p:txBody>
+          <a:bodyPr/>
+          <a:lstStyle/>
+          <a:p>
+            <a:r>
+              <a:rPr lang="en-US" dirty="0" smtClean="0"/>
+              <a:t>Architecture</a:t>
+            </a:r>
+            <a:endParaRPr lang="en-US" dirty="0"/>
+          </a:p>
+        </p:txBody>
+      </p:sp>
+      <p:pic>
+        <p:nvPicPr>
+          <p:cNvPr id="4" name="Bild 3"/>
+          <p:cNvPicPr>
+            <a:picLocks noChangeAspect="1"/>
+          </p:cNvPicPr>
+          <p:nvPr/>
+        </p:nvPicPr>
+        <p:blipFill>
+          <a:blip r:embed="rId3"/>
+          <a:stretch>
+            <a:fillRect/>
+          </a:stretch>
+        </p:blipFill>
+        <p:spPr>
+          <a:xfrm>
+            <a:off x="0" y="599537"/>
+            <a:ext cx="9144000" cy="4220308"/>
+          </a:xfrm>
+          <a:prstGeom prst="rect">
+            <a:avLst/>
+          </a:prstGeom>
+        </p:spPr>
+      </p:pic>
+    </p:spTree>
+    <p:extLst>
+      <p:ext uri="{BB962C8B-B14F-4D97-AF65-F5344CB8AC3E}">
+        <p14:creationId xmlns:p14="http://schemas.microsoft.com/office/powerpoint/2010/main" val="318855054"/>
+      </p:ext>
+    </p:extLst>
+  </p:cSld>
+  <p:clrMapOvr>
+    <a:masterClrMapping/>
+  </p:clrMapOvr>
+  <p:timing>
+    <p:tnLst>
+      <p:par>
+        <p:cTn xmlns:p14="http://schemas.microsoft.com/office/powerpoint/2010/main" id="1" dur="indefinite" restart="never" nodeType="tmRoot"/>
+      </p:par>
+    </p:tnLst>
+  </p:timing>
+</p:sld>
+</file>
+
+<file path=ppt/slides/slide12.xml><?xml version="1.0" encoding="utf-8"?>
+<p:sld xmlns:a="http://schemas.openxmlformats.org/drawingml/2006/main" xmlns:r="http://schemas.openxmlformats.org/officeDocument/2006/relationships" xmlns:p="http://schemas.openxmlformats.org/presentationml/2006/main">
+  <p:cSld>
+    <p:spTree>
+      <p:nvGrpSpPr>
+        <p:cNvPr id="1" name=""/>
+        <p:cNvGrpSpPr/>
+        <p:nvPr/>
+      </p:nvGrpSpPr>
+      <p:grpSpPr>
+        <a:xfrm>
+          <a:off x="0" y="0"/>
+          <a:ext cx="0" cy="0"/>
+          <a:chOff x="0" y="0"/>
+          <a:chExt cx="0" cy="0"/>
+        </a:xfrm>
+      </p:grpSpPr>
+      <p:sp>
+        <p:nvSpPr>
+          <p:cNvPr id="2" name="Title 1"/>
+          <p:cNvSpPr>
+            <a:spLocks noGrp="1"/>
+          </p:cNvSpPr>
+          <p:nvPr>
             <p:ph type="ctrTitle"/>
           </p:nvPr>
         </p:nvSpPr>
@@ -5795,7 +6603,7 @@
 </p:sld>
 </file>
 
-<file path=ppt/slides/slide12.xml><?xml version="1.0" encoding="utf-8"?>
+<file path=ppt/slides/slide13.xml><?xml version="1.0" encoding="utf-8"?>
 <p:sld xmlns:a="http://schemas.openxmlformats.org/drawingml/2006/main" xmlns:r="http://schemas.openxmlformats.org/officeDocument/2006/relationships" xmlns:p="http://schemas.openxmlformats.org/presentationml/2006/main">
   <p:cSld>
     <p:spTree>
@@ -6251,7 +7059,7 @@
 </p:sld>
 </file>
 
-<file path=ppt/slides/slide13.xml><?xml version="1.0" encoding="utf-8"?>
+<file path=ppt/slides/slide14.xml><?xml version="1.0" encoding="utf-8"?>
 <p:sld xmlns:a="http://schemas.openxmlformats.org/drawingml/2006/main" xmlns:r="http://schemas.openxmlformats.org/officeDocument/2006/relationships" xmlns:p="http://schemas.openxmlformats.org/presentationml/2006/main">
   <p:cSld>
     <p:spTree>
@@ -6839,7 +7647,7 @@
 </p:sld>
 </file>
 
-<file path=ppt/slides/slide14.xml><?xml version="1.0" encoding="utf-8"?>
+<file path=ppt/slides/slide15.xml><?xml version="1.0" encoding="utf-8"?>
 <p:sld xmlns:a="http://schemas.openxmlformats.org/drawingml/2006/main" xmlns:r="http://schemas.openxmlformats.org/officeDocument/2006/relationships" xmlns:p="http://schemas.openxmlformats.org/presentationml/2006/main">
   <p:cSld>
     <p:spTree>
@@ -7230,66 +8038,6 @@
 </p:sld>
 </file>
 
-<file path=ppt/slides/slide15.xml><?xml version="1.0" encoding="utf-8"?>
-<p:sld xmlns:a="http://schemas.openxmlformats.org/drawingml/2006/main" xmlns:r="http://schemas.openxmlformats.org/officeDocument/2006/relationships" xmlns:p="http://schemas.openxmlformats.org/presentationml/2006/main">
-  <p:cSld>
-    <p:spTree>
-      <p:nvGrpSpPr>
-        <p:cNvPr id="1" name=""/>
-        <p:cNvGrpSpPr/>
-        <p:nvPr/>
-      </p:nvGrpSpPr>
-      <p:grpSpPr>
-        <a:xfrm>
-          <a:off x="0" y="0"/>
-          <a:ext cx="0" cy="0"/>
-          <a:chOff x="0" y="0"/>
-          <a:chExt cx="0" cy="0"/>
-        </a:xfrm>
-      </p:grpSpPr>
-      <p:sp>
-        <p:nvSpPr>
-          <p:cNvPr id="2" name="Title 1"/>
-          <p:cNvSpPr>
-            <a:spLocks noGrp="1"/>
-          </p:cNvSpPr>
-          <p:nvPr>
-            <p:ph type="ctrTitle"/>
-          </p:nvPr>
-        </p:nvSpPr>
-        <p:spPr/>
-        <p:txBody>
-          <a:bodyPr/>
-          <a:lstStyle/>
-          <a:p>
-            <a:r>
-              <a:rPr lang="en-US" dirty="0" smtClean="0"/>
-              <a:t>Advanced Queries - Java</a:t>
-            </a:r>
-            <a:endParaRPr lang="en-US" dirty="0"/>
-          </a:p>
-        </p:txBody>
-      </p:sp>
-    </p:spTree>
-    <p:extLst>
-      <p:ext uri="{BB962C8B-B14F-4D97-AF65-F5344CB8AC3E}">
-        <p14:creationId xmlns:p14="http://schemas.microsoft.com/office/powerpoint/2010/main" val="3683186877"/>
-      </p:ext>
-    </p:extLst>
-  </p:cSld>
-  <p:clrMapOvr>
-    <a:masterClrMapping/>
-  </p:clrMapOvr>
-  <p:timing>
-    <p:tnLst>
-      <p:par>
-        <p:cTn xmlns:p14="http://schemas.microsoft.com/office/powerpoint/2010/main" id="1" dur="indefinite" restart="never" nodeType="tmRoot"/>
-      </p:par>
-    </p:tnLst>
-  </p:timing>
-</p:sld>
-</file>
-
 <file path=ppt/slides/slide16.xml><?xml version="1.0" encoding="utf-8"?>
 <p:sld xmlns:a="http://schemas.openxmlformats.org/drawingml/2006/main" xmlns:r="http://schemas.openxmlformats.org/officeDocument/2006/relationships" xmlns:p="http://schemas.openxmlformats.org/presentationml/2006/main">
   <p:cSld>
@@ -7323,12 +8071,8 @@
           <a:lstStyle/>
           <a:p>
             <a:r>
-              <a:rPr lang="en-US" dirty="0"/>
-              <a:t>Advanced Queries - </a:t>
-            </a:r>
-            <a:r>
               <a:rPr lang="en-US" dirty="0" smtClean="0"/>
-              <a:t>.NET</a:t>
+              <a:t>Advanced Queries - Java</a:t>
             </a:r>
             <a:endParaRPr lang="en-US" dirty="0"/>
           </a:p>
@@ -7337,7 +8081,7 @@
     </p:spTree>
     <p:extLst>
       <p:ext uri="{BB962C8B-B14F-4D97-AF65-F5344CB8AC3E}">
-        <p14:creationId xmlns:p14="http://schemas.microsoft.com/office/powerpoint/2010/main" val="882545490"/>
+        <p14:creationId xmlns:p14="http://schemas.microsoft.com/office/powerpoint/2010/main" val="3683186877"/>
       </p:ext>
     </p:extLst>
   </p:cSld>
@@ -7391,8 +8135,8 @@
               <a:t>Advanced Queries - </a:t>
             </a:r>
             <a:r>
-              <a:rPr lang="en-US" dirty="0" err="1" smtClean="0"/>
-              <a:t>NodeJS</a:t>
+              <a:rPr lang="en-US" dirty="0" smtClean="0"/>
+              <a:t>.NET</a:t>
             </a:r>
             <a:endParaRPr lang="en-US" dirty="0"/>
           </a:p>
@@ -7401,7 +8145,7 @@
     </p:spTree>
     <p:extLst>
       <p:ext uri="{BB962C8B-B14F-4D97-AF65-F5344CB8AC3E}">
-        <p14:creationId xmlns:p14="http://schemas.microsoft.com/office/powerpoint/2010/main" val="3686523847"/>
+        <p14:creationId xmlns:p14="http://schemas.microsoft.com/office/powerpoint/2010/main" val="882545490"/>
       </p:ext>
     </p:extLst>
   </p:cSld>
@@ -7451,6 +8195,70 @@
           <a:lstStyle/>
           <a:p>
             <a:r>
+              <a:rPr lang="en-US" dirty="0"/>
+              <a:t>Advanced Queries - </a:t>
+            </a:r>
+            <a:r>
+              <a:rPr lang="en-US" dirty="0" err="1" smtClean="0"/>
+              <a:t>NodeJS</a:t>
+            </a:r>
+            <a:endParaRPr lang="en-US" dirty="0"/>
+          </a:p>
+        </p:txBody>
+      </p:sp>
+    </p:spTree>
+    <p:extLst>
+      <p:ext uri="{BB962C8B-B14F-4D97-AF65-F5344CB8AC3E}">
+        <p14:creationId xmlns:p14="http://schemas.microsoft.com/office/powerpoint/2010/main" val="3686523847"/>
+      </p:ext>
+    </p:extLst>
+  </p:cSld>
+  <p:clrMapOvr>
+    <a:masterClrMapping/>
+  </p:clrMapOvr>
+  <p:timing>
+    <p:tnLst>
+      <p:par>
+        <p:cTn xmlns:p14="http://schemas.microsoft.com/office/powerpoint/2010/main" id="1" dur="indefinite" restart="never" nodeType="tmRoot"/>
+      </p:par>
+    </p:tnLst>
+  </p:timing>
+</p:sld>
+</file>
+
+<file path=ppt/slides/slide19.xml><?xml version="1.0" encoding="utf-8"?>
+<p:sld xmlns:a="http://schemas.openxmlformats.org/drawingml/2006/main" xmlns:r="http://schemas.openxmlformats.org/officeDocument/2006/relationships" xmlns:p="http://schemas.openxmlformats.org/presentationml/2006/main">
+  <p:cSld>
+    <p:spTree>
+      <p:nvGrpSpPr>
+        <p:cNvPr id="1" name=""/>
+        <p:cNvGrpSpPr/>
+        <p:nvPr/>
+      </p:nvGrpSpPr>
+      <p:grpSpPr>
+        <a:xfrm>
+          <a:off x="0" y="0"/>
+          <a:ext cx="0" cy="0"/>
+          <a:chOff x="0" y="0"/>
+          <a:chExt cx="0" cy="0"/>
+        </a:xfrm>
+      </p:grpSpPr>
+      <p:sp>
+        <p:nvSpPr>
+          <p:cNvPr id="2" name="Title 1"/>
+          <p:cNvSpPr>
+            <a:spLocks noGrp="1"/>
+          </p:cNvSpPr>
+          <p:nvPr>
+            <p:ph type="ctrTitle"/>
+          </p:nvPr>
+        </p:nvSpPr>
+        <p:spPr/>
+        <p:txBody>
+          <a:bodyPr/>
+          <a:lstStyle/>
+          <a:p>
+            <a:r>
               <a:rPr lang="en-US" dirty="0" smtClean="0"/>
               <a:t>View vs. Indexes</a:t>
             </a:r>
@@ -7478,7 +8286,67 @@
 </p:sld>
 </file>
 
-<file path=ppt/slides/slide19.xml><?xml version="1.0" encoding="utf-8"?>
+<file path=ppt/slides/slide2.xml><?xml version="1.0" encoding="utf-8"?>
+<p:sld xmlns:a="http://schemas.openxmlformats.org/drawingml/2006/main" xmlns:r="http://schemas.openxmlformats.org/officeDocument/2006/relationships" xmlns:p="http://schemas.openxmlformats.org/presentationml/2006/main">
+  <p:cSld>
+    <p:spTree>
+      <p:nvGrpSpPr>
+        <p:cNvPr id="1" name=""/>
+        <p:cNvGrpSpPr/>
+        <p:nvPr/>
+      </p:nvGrpSpPr>
+      <p:grpSpPr>
+        <a:xfrm>
+          <a:off x="0" y="0"/>
+          <a:ext cx="0" cy="0"/>
+          <a:chOff x="0" y="0"/>
+          <a:chExt cx="0" cy="0"/>
+        </a:xfrm>
+      </p:grpSpPr>
+      <p:sp>
+        <p:nvSpPr>
+          <p:cNvPr id="2" name="Title 1"/>
+          <p:cNvSpPr>
+            <a:spLocks noGrp="1"/>
+          </p:cNvSpPr>
+          <p:nvPr>
+            <p:ph type="ctrTitle"/>
+          </p:nvPr>
+        </p:nvSpPr>
+        <p:spPr/>
+        <p:txBody>
+          <a:bodyPr/>
+          <a:lstStyle/>
+          <a:p>
+            <a:r>
+              <a:rPr lang="en-US" dirty="0" smtClean="0"/>
+              <a:t>Index Management</a:t>
+            </a:r>
+            <a:endParaRPr lang="en-US" dirty="0"/>
+          </a:p>
+        </p:txBody>
+      </p:sp>
+    </p:spTree>
+    <p:extLst>
+      <p:ext uri="{BB962C8B-B14F-4D97-AF65-F5344CB8AC3E}">
+        <p14:creationId xmlns:p14="http://schemas.microsoft.com/office/powerpoint/2010/main" val="735871736"/>
+      </p:ext>
+    </p:extLst>
+  </p:cSld>
+  <p:clrMapOvr>
+    <a:masterClrMapping/>
+  </p:clrMapOvr>
+  <p:timing>
+    <p:tnLst>
+      <p:par>
+        <p:cTn xmlns:p14="http://schemas.microsoft.com/office/powerpoint/2010/main" id="1" dur="indefinite" restart="never" nodeType="tmRoot"/>
+      </p:par>
+    </p:tnLst>
+  </p:timing>
+</p:sld>
+</file>
+
+<file path=ppt/slides/slide20.xml><?xml version="1.0" encoding="utf-8"?>
 <p:sld xmlns:a="http://schemas.openxmlformats.org/drawingml/2006/main" xmlns:r="http://schemas.openxmlformats.org/officeDocument/2006/relationships" xmlns:p="http://schemas.openxmlformats.org/presentationml/2006/main">
   <p:cSld>
     <p:spTree>
@@ -7893,67 +8761,7 @@
 </p:sld>
 </file>
 
-<file path=ppt/slides/slide2.xml><?xml version="1.0" encoding="utf-8"?>
-<p:sld xmlns:a="http://schemas.openxmlformats.org/drawingml/2006/main" xmlns:r="http://schemas.openxmlformats.org/officeDocument/2006/relationships" xmlns:p="http://schemas.openxmlformats.org/presentationml/2006/main">
-  <p:cSld>
-    <p:spTree>
-      <p:nvGrpSpPr>
-        <p:cNvPr id="1" name=""/>
-        <p:cNvGrpSpPr/>
-        <p:nvPr/>
-      </p:nvGrpSpPr>
-      <p:grpSpPr>
-        <a:xfrm>
-          <a:off x="0" y="0"/>
-          <a:ext cx="0" cy="0"/>
-          <a:chOff x="0" y="0"/>
-          <a:chExt cx="0" cy="0"/>
-        </a:xfrm>
-      </p:grpSpPr>
-      <p:sp>
-        <p:nvSpPr>
-          <p:cNvPr id="2" name="Title 1"/>
-          <p:cNvSpPr>
-            <a:spLocks noGrp="1"/>
-          </p:cNvSpPr>
-          <p:nvPr>
-            <p:ph type="ctrTitle"/>
-          </p:nvPr>
-        </p:nvSpPr>
-        <p:spPr/>
-        <p:txBody>
-          <a:bodyPr/>
-          <a:lstStyle/>
-          <a:p>
-            <a:r>
-              <a:rPr lang="en-US" dirty="0" smtClean="0"/>
-              <a:t>Index Management</a:t>
-            </a:r>
-            <a:endParaRPr lang="en-US" dirty="0"/>
-          </a:p>
-        </p:txBody>
-      </p:sp>
-    </p:spTree>
-    <p:extLst>
-      <p:ext uri="{BB962C8B-B14F-4D97-AF65-F5344CB8AC3E}">
-        <p14:creationId xmlns:p14="http://schemas.microsoft.com/office/powerpoint/2010/main" val="735871736"/>
-      </p:ext>
-    </p:extLst>
-  </p:cSld>
-  <p:clrMapOvr>
-    <a:masterClrMapping/>
-  </p:clrMapOvr>
-  <p:timing>
-    <p:tnLst>
-      <p:par>
-        <p:cTn xmlns:p14="http://schemas.microsoft.com/office/powerpoint/2010/main" id="1" dur="indefinite" restart="never" nodeType="tmRoot"/>
-      </p:par>
-    </p:tnLst>
-  </p:timing>
-</p:sld>
-</file>
-
-<file path=ppt/slides/slide20.xml><?xml version="1.0" encoding="utf-8"?>
+<file path=ppt/slides/slide21.xml><?xml version="1.0" encoding="utf-8"?>
 <p:sld xmlns:a="http://schemas.openxmlformats.org/drawingml/2006/main" xmlns:r="http://schemas.openxmlformats.org/officeDocument/2006/relationships" xmlns:p="http://schemas.openxmlformats.org/presentationml/2006/main">
   <p:cSld>
     <p:spTree>
@@ -8186,7 +8994,7 @@
             <a:fld id="{2066355A-084C-D24E-9AD2-7E4FC41EA627}" type="slidenum">
               <a:rPr lang="en-US" smtClean="0"/>
               <a:pPr/>
-              <a:t>20</a:t>
+              <a:t>21</a:t>
             </a:fld>
             <a:endParaRPr lang="en-US" dirty="0"/>
           </a:p>
@@ -11810,7 +12618,7 @@
 </p:sld>
 </file>
 
-<file path=ppt/slides/slide21.xml><?xml version="1.0" encoding="utf-8"?>
+<file path=ppt/slides/slide22.xml><?xml version="1.0" encoding="utf-8"?>
 <p:sld xmlns:a="http://schemas.openxmlformats.org/drawingml/2006/main" xmlns:r="http://schemas.openxmlformats.org/officeDocument/2006/relationships" xmlns:p="http://schemas.openxmlformats.org/presentationml/2006/main">
   <p:cSld>
     <p:spTree>
@@ -13737,7 +14545,7 @@
 </p:sld>
 </file>
 
-<file path=ppt/slides/slide22.xml><?xml version="1.0" encoding="utf-8"?>
+<file path=ppt/slides/slide23.xml><?xml version="1.0" encoding="utf-8"?>
 <p:sld xmlns:a="http://schemas.openxmlformats.org/drawingml/2006/main" xmlns:r="http://schemas.openxmlformats.org/officeDocument/2006/relationships" xmlns:p="http://schemas.openxmlformats.org/presentationml/2006/main">
   <p:cSld>
     <p:spTree>
@@ -14446,85 +15254,6 @@
 </p:sld>
 </file>
 
-<file path=ppt/slides/slide23.xml><?xml version="1.0" encoding="utf-8"?>
-<p:sld xmlns:a="http://schemas.openxmlformats.org/drawingml/2006/main" xmlns:r="http://schemas.openxmlformats.org/officeDocument/2006/relationships" xmlns:p="http://schemas.openxmlformats.org/presentationml/2006/main">
-  <p:cSld>
-    <p:spTree>
-      <p:nvGrpSpPr>
-        <p:cNvPr id="1" name=""/>
-        <p:cNvGrpSpPr/>
-        <p:nvPr/>
-      </p:nvGrpSpPr>
-      <p:grpSpPr>
-        <a:xfrm>
-          <a:off x="0" y="0"/>
-          <a:ext cx="0" cy="0"/>
-          <a:chOff x="0" y="0"/>
-          <a:chExt cx="0" cy="0"/>
-        </a:xfrm>
-      </p:grpSpPr>
-      <p:sp>
-        <p:nvSpPr>
-          <p:cNvPr id="2" name="Title 1"/>
-          <p:cNvSpPr>
-            <a:spLocks noGrp="1"/>
-          </p:cNvSpPr>
-          <p:nvPr>
-            <p:ph type="ctrTitle"/>
-          </p:nvPr>
-        </p:nvSpPr>
-        <p:spPr/>
-        <p:txBody>
-          <a:bodyPr/>
-          <a:lstStyle/>
-          <a:p>
-            <a:r>
-              <a:rPr lang="en-US" dirty="0" smtClean="0"/>
-              <a:t>Questions?</a:t>
-            </a:r>
-            <a:endParaRPr lang="en-US" dirty="0"/>
-          </a:p>
-        </p:txBody>
-      </p:sp>
-      <p:sp>
-        <p:nvSpPr>
-          <p:cNvPr id="3" name="Subtitle 2"/>
-          <p:cNvSpPr>
-            <a:spLocks noGrp="1"/>
-          </p:cNvSpPr>
-          <p:nvPr>
-            <p:ph type="subTitle" idx="1"/>
-          </p:nvPr>
-        </p:nvSpPr>
-        <p:spPr/>
-        <p:txBody>
-          <a:bodyPr/>
-          <a:lstStyle/>
-          <a:p>
-            <a:endParaRPr lang="en-US" dirty="0"/>
-          </a:p>
-        </p:txBody>
-      </p:sp>
-    </p:spTree>
-    <p:extLst>
-      <p:ext uri="{BB962C8B-B14F-4D97-AF65-F5344CB8AC3E}">
-        <p14:creationId xmlns:p14="http://schemas.microsoft.com/office/powerpoint/2010/main" val="904379520"/>
-      </p:ext>
-    </p:extLst>
-  </p:cSld>
-  <p:clrMapOvr>
-    <a:masterClrMapping/>
-  </p:clrMapOvr>
-  <p:timing>
-    <p:tnLst>
-      <p:par>
-        <p:cTn xmlns:p14="http://schemas.microsoft.com/office/powerpoint/2010/main" id="1" dur="indefinite" restart="never" nodeType="tmRoot"/>
-      </p:par>
-    </p:tnLst>
-  </p:timing>
-</p:sld>
-</file>
-
 <file path=ppt/slides/slide24.xml><?xml version="1.0" encoding="utf-8"?>
 <p:sld xmlns:a="http://schemas.openxmlformats.org/drawingml/2006/main" xmlns:r="http://schemas.openxmlformats.org/officeDocument/2006/relationships" xmlns:p="http://schemas.openxmlformats.org/presentationml/2006/main">
   <p:cSld>
@@ -14559,8 +15288,27 @@
           <a:p>
             <a:r>
               <a:rPr lang="en-US" dirty="0" smtClean="0"/>
-              <a:t>Thank you.</a:t>
-            </a:r>
+              <a:t>Questions?</a:t>
+            </a:r>
+            <a:endParaRPr lang="en-US" dirty="0"/>
+          </a:p>
+        </p:txBody>
+      </p:sp>
+      <p:sp>
+        <p:nvSpPr>
+          <p:cNvPr id="3" name="Subtitle 2"/>
+          <p:cNvSpPr>
+            <a:spLocks noGrp="1"/>
+          </p:cNvSpPr>
+          <p:nvPr>
+            <p:ph type="subTitle" idx="1"/>
+          </p:nvPr>
+        </p:nvSpPr>
+        <p:spPr/>
+        <p:txBody>
+          <a:bodyPr/>
+          <a:lstStyle/>
+          <a:p>
             <a:endParaRPr lang="en-US" dirty="0"/>
           </a:p>
         </p:txBody>
@@ -14568,7 +15316,7 @@
     </p:spTree>
     <p:extLst>
       <p:ext uri="{BB962C8B-B14F-4D97-AF65-F5344CB8AC3E}">
-        <p14:creationId xmlns:p14="http://schemas.microsoft.com/office/powerpoint/2010/main" val="2598212430"/>
+        <p14:creationId xmlns:p14="http://schemas.microsoft.com/office/powerpoint/2010/main" val="904379520"/>
       </p:ext>
     </p:extLst>
   </p:cSld>
@@ -14586,7 +15334,7 @@
 </file>
 
 <file path=ppt/slides/slide25.xml><?xml version="1.0" encoding="utf-8"?>
-<p:sld xmlns:a="http://schemas.openxmlformats.org/drawingml/2006/main" xmlns:r="http://schemas.openxmlformats.org/officeDocument/2006/relationships" xmlns:p="http://schemas.openxmlformats.org/presentationml/2006/main" show="0">
+<p:sld xmlns:a="http://schemas.openxmlformats.org/drawingml/2006/main" xmlns:r="http://schemas.openxmlformats.org/officeDocument/2006/relationships" xmlns:p="http://schemas.openxmlformats.org/presentationml/2006/main">
   <p:cSld>
     <p:spTree>
       <p:nvGrpSpPr>
@@ -14609,7 +15357,7 @@
             <a:spLocks noGrp="1"/>
           </p:cNvSpPr>
           <p:nvPr>
-            <p:ph type="title"/>
+            <p:ph type="ctrTitle"/>
           </p:nvPr>
         </p:nvSpPr>
         <p:spPr/>
@@ -14619,58 +15367,7 @@
           <a:p>
             <a:r>
               <a:rPr lang="en-US" dirty="0" smtClean="0"/>
-              <a:t>Title and Bullets</a:t>
-            </a:r>
-            <a:endParaRPr lang="en-US" dirty="0"/>
-          </a:p>
-        </p:txBody>
-      </p:sp>
-      <p:sp>
-        <p:nvSpPr>
-          <p:cNvPr id="3" name="Content Placeholder 2"/>
-          <p:cNvSpPr>
-            <a:spLocks noGrp="1"/>
-          </p:cNvSpPr>
-          <p:nvPr>
-            <p:ph idx="1"/>
-          </p:nvPr>
-        </p:nvSpPr>
-        <p:spPr/>
-        <p:txBody>
-          <a:bodyPr/>
-          <a:lstStyle/>
-          <a:p>
-            <a:r>
-              <a:rPr lang="en-US" dirty="0" smtClean="0"/>
-              <a:t>First Level Bullet</a:t>
-            </a:r>
-          </a:p>
-          <a:p>
-            <a:pPr lvl="1"/>
-            <a:r>
-              <a:rPr lang="en-US" dirty="0" smtClean="0"/>
-              <a:t>Second Level Bullet</a:t>
-            </a:r>
-          </a:p>
-          <a:p>
-            <a:pPr lvl="2"/>
-            <a:r>
-              <a:rPr lang="en-US" dirty="0" smtClean="0"/>
-              <a:t>Third Level Bullet</a:t>
-            </a:r>
-          </a:p>
-          <a:p>
-            <a:pPr lvl="3"/>
-            <a:r>
-              <a:rPr lang="en-US" dirty="0" smtClean="0"/>
-              <a:t>Fourth Level Bullet</a:t>
-            </a:r>
-          </a:p>
-          <a:p>
-            <a:pPr lvl="4"/>
-            <a:r>
-              <a:rPr lang="en-US" dirty="0" smtClean="0"/>
-              <a:t>Fifth Level Bullet</a:t>
+              <a:t>Thank you.</a:t>
             </a:r>
             <a:endParaRPr lang="en-US" dirty="0"/>
           </a:p>
@@ -14679,21 +15376,13 @@
     </p:spTree>
     <p:extLst>
       <p:ext uri="{BB962C8B-B14F-4D97-AF65-F5344CB8AC3E}">
-        <p14:creationId xmlns:p14="http://schemas.microsoft.com/office/powerpoint/2010/main" val="1910273132"/>
+        <p14:creationId xmlns:p14="http://schemas.microsoft.com/office/powerpoint/2010/main" val="2598212430"/>
       </p:ext>
     </p:extLst>
   </p:cSld>
   <p:clrMapOvr>
     <a:masterClrMapping/>
   </p:clrMapOvr>
-  <mc:AlternateContent xmlns:mc="http://schemas.openxmlformats.org/markup-compatibility/2006">
-    <mc:Choice xmlns:p14="http://schemas.microsoft.com/office/powerpoint/2010/main" Requires="p14">
-      <p:transition spd="slow" p14:dur="2000"/>
-    </mc:Choice>
-    <mc:Fallback>
-      <p:transition xmlns:p14="http://schemas.microsoft.com/office/powerpoint/2010/main" spd="slow"/>
-    </mc:Fallback>
-  </mc:AlternateContent>
   <p:timing>
     <p:tnLst>
       <p:par>
@@ -14738,7 +15427,7 @@
           <a:p>
             <a:r>
               <a:rPr lang="en-US" dirty="0" smtClean="0"/>
-              <a:t>Title and Text</a:t>
+              <a:t>Title and Bullets</a:t>
             </a:r>
             <a:endParaRPr lang="en-US" dirty="0"/>
           </a:p>
@@ -14760,167 +15449,37 @@
           <a:lstStyle/>
           <a:p>
             <a:r>
-              <a:rPr lang="en-US" dirty="0" err="1"/>
-              <a:t>Lorem</a:t>
-            </a:r>
-            <a:r>
-              <a:rPr lang="en-US" dirty="0"/>
-              <a:t> </a:t>
-            </a:r>
-            <a:r>
-              <a:rPr lang="en-US" dirty="0" err="1"/>
-              <a:t>ipsum</a:t>
-            </a:r>
-            <a:r>
-              <a:rPr lang="en-US" dirty="0"/>
-              <a:t> dolor sit </a:t>
-            </a:r>
-            <a:r>
-              <a:rPr lang="en-US" dirty="0" err="1"/>
-              <a:t>amet</a:t>
-            </a:r>
-            <a:r>
-              <a:rPr lang="en-US" dirty="0"/>
-              <a:t>, </a:t>
-            </a:r>
-            <a:r>
-              <a:rPr lang="en-US" dirty="0" err="1"/>
-              <a:t>consectetur</a:t>
-            </a:r>
-            <a:r>
-              <a:rPr lang="en-US" dirty="0"/>
-              <a:t> </a:t>
-            </a:r>
-            <a:r>
-              <a:rPr lang="en-US" dirty="0" err="1"/>
-              <a:t>adipiscing</a:t>
-            </a:r>
-            <a:r>
-              <a:rPr lang="en-US" dirty="0"/>
-              <a:t> </a:t>
-            </a:r>
-            <a:r>
-              <a:rPr lang="en-US" dirty="0" err="1"/>
-              <a:t>elit</a:t>
-            </a:r>
-            <a:r>
-              <a:rPr lang="en-US" dirty="0"/>
-              <a:t>. </a:t>
-            </a:r>
-            <a:r>
-              <a:rPr lang="en-US" dirty="0" err="1"/>
-              <a:t>Donec</a:t>
-            </a:r>
-            <a:r>
-              <a:rPr lang="en-US" dirty="0"/>
-              <a:t> </a:t>
-            </a:r>
-            <a:r>
-              <a:rPr lang="en-US" dirty="0" err="1"/>
-              <a:t>risus</a:t>
-            </a:r>
-            <a:r>
-              <a:rPr lang="en-US" dirty="0"/>
-              <a:t> </a:t>
-            </a:r>
-            <a:r>
-              <a:rPr lang="en-US" dirty="0" err="1"/>
-              <a:t>purus</a:t>
-            </a:r>
-            <a:r>
-              <a:rPr lang="en-US" dirty="0"/>
-              <a:t>, tempus in </a:t>
-            </a:r>
-            <a:r>
-              <a:rPr lang="en-US" dirty="0" err="1"/>
-              <a:t>quis</a:t>
-            </a:r>
-            <a:r>
-              <a:rPr lang="en-US" dirty="0"/>
-              <a:t>, </a:t>
-            </a:r>
-            <a:r>
-              <a:rPr lang="en-US" dirty="0" err="1"/>
-              <a:t>ultricies</a:t>
-            </a:r>
-            <a:r>
-              <a:rPr lang="en-US" dirty="0"/>
-              <a:t> </a:t>
-            </a:r>
-            <a:r>
-              <a:rPr lang="en-US" dirty="0" err="1"/>
-              <a:t>eu</a:t>
-            </a:r>
-            <a:r>
-              <a:rPr lang="en-US" dirty="0"/>
-              <a:t> diam. </a:t>
-            </a:r>
-            <a:r>
-              <a:rPr lang="en-US" dirty="0" err="1"/>
-              <a:t>Donec</a:t>
-            </a:r>
-            <a:r>
-              <a:rPr lang="en-US" dirty="0"/>
-              <a:t> </a:t>
-            </a:r>
-            <a:r>
-              <a:rPr lang="en-US" dirty="0" err="1"/>
-              <a:t>convallis</a:t>
-            </a:r>
-            <a:r>
-              <a:rPr lang="en-US" dirty="0"/>
-              <a:t> </a:t>
-            </a:r>
-            <a:r>
-              <a:rPr lang="en-US" dirty="0" err="1"/>
-              <a:t>enim</a:t>
-            </a:r>
-            <a:r>
-              <a:rPr lang="en-US" dirty="0"/>
-              <a:t> in mi </a:t>
-            </a:r>
-            <a:r>
-              <a:rPr lang="en-US" dirty="0" err="1"/>
-              <a:t>lacinia</a:t>
-            </a:r>
-            <a:r>
-              <a:rPr lang="en-US" dirty="0"/>
-              <a:t>, id </a:t>
-            </a:r>
-            <a:r>
-              <a:rPr lang="en-US" dirty="0" err="1"/>
-              <a:t>viverra</a:t>
-            </a:r>
-            <a:r>
-              <a:rPr lang="en-US" dirty="0"/>
-              <a:t> </a:t>
-            </a:r>
-            <a:r>
-              <a:rPr lang="en-US" dirty="0" err="1"/>
-              <a:t>neque</a:t>
-            </a:r>
-            <a:r>
-              <a:rPr lang="en-US" dirty="0"/>
-              <a:t> </a:t>
-            </a:r>
-            <a:r>
-              <a:rPr lang="en-US" dirty="0" err="1"/>
-              <a:t>pretium</a:t>
-            </a:r>
-            <a:r>
-              <a:rPr lang="en-US" dirty="0"/>
-              <a:t>. </a:t>
-            </a:r>
-            <a:r>
-              <a:rPr lang="en-US" dirty="0" err="1"/>
-              <a:t>Phasellus</a:t>
-            </a:r>
-            <a:r>
-              <a:rPr lang="en-US" dirty="0"/>
-              <a:t> et.</a:t>
-            </a:r>
-          </a:p>
-          <a:p>
+              <a:rPr lang="en-US" dirty="0" smtClean="0"/>
+              <a:t>First Level Bullet</a:t>
+            </a:r>
+          </a:p>
+          <a:p>
+            <a:pPr lvl="1"/>
+            <a:r>
+              <a:rPr lang="en-US" dirty="0" smtClean="0"/>
+              <a:t>Second Level Bullet</a:t>
+            </a:r>
+          </a:p>
+          <a:p>
+            <a:pPr lvl="2"/>
+            <a:r>
+              <a:rPr lang="en-US" dirty="0" smtClean="0"/>
+              <a:t>Third Level Bullet</a:t>
+            </a:r>
+          </a:p>
+          <a:p>
+            <a:pPr lvl="3"/>
+            <a:r>
+              <a:rPr lang="en-US" dirty="0" smtClean="0"/>
+              <a:t>Fourth Level Bullet</a:t>
+            </a:r>
+          </a:p>
+          <a:p>
+            <a:pPr lvl="4"/>
+            <a:r>
+              <a:rPr lang="en-US" dirty="0" smtClean="0"/>
+              <a:t>Fifth Level Bullet</a:t>
+            </a:r>
             <a:endParaRPr lang="en-US" dirty="0"/>
           </a:p>
         </p:txBody>
@@ -14928,7 +15487,7 @@
     </p:spTree>
     <p:extLst>
       <p:ext uri="{BB962C8B-B14F-4D97-AF65-F5344CB8AC3E}">
-        <p14:creationId xmlns:p14="http://schemas.microsoft.com/office/powerpoint/2010/main" val="2354427935"/>
+        <p14:creationId xmlns:p14="http://schemas.microsoft.com/office/powerpoint/2010/main" val="1910273132"/>
       </p:ext>
     </p:extLst>
   </p:cSld>
@@ -14972,7 +15531,7 @@
       </p:grpSpPr>
       <p:sp>
         <p:nvSpPr>
-          <p:cNvPr id="5" name="Title 4"/>
+          <p:cNvPr id="2" name="Title 1"/>
           <p:cNvSpPr>
             <a:spLocks noGrp="1"/>
           </p:cNvSpPr>
@@ -14987,8 +15546,189 @@
           <a:p>
             <a:r>
               <a:rPr lang="en-US" dirty="0" smtClean="0"/>
-              <a:t>Title Only</a:t>
-            </a:r>
+              <a:t>Title and Text</a:t>
+            </a:r>
+            <a:endParaRPr lang="en-US" dirty="0"/>
+          </a:p>
+        </p:txBody>
+      </p:sp>
+      <p:sp>
+        <p:nvSpPr>
+          <p:cNvPr id="3" name="Content Placeholder 2"/>
+          <p:cNvSpPr>
+            <a:spLocks noGrp="1"/>
+          </p:cNvSpPr>
+          <p:nvPr>
+            <p:ph idx="1"/>
+          </p:nvPr>
+        </p:nvSpPr>
+        <p:spPr/>
+        <p:txBody>
+          <a:bodyPr/>
+          <a:lstStyle/>
+          <a:p>
+            <a:r>
+              <a:rPr lang="en-US" dirty="0" err="1"/>
+              <a:t>Lorem</a:t>
+            </a:r>
+            <a:r>
+              <a:rPr lang="en-US" dirty="0"/>
+              <a:t> </a:t>
+            </a:r>
+            <a:r>
+              <a:rPr lang="en-US" dirty="0" err="1"/>
+              <a:t>ipsum</a:t>
+            </a:r>
+            <a:r>
+              <a:rPr lang="en-US" dirty="0"/>
+              <a:t> dolor sit </a:t>
+            </a:r>
+            <a:r>
+              <a:rPr lang="en-US" dirty="0" err="1"/>
+              <a:t>amet</a:t>
+            </a:r>
+            <a:r>
+              <a:rPr lang="en-US" dirty="0"/>
+              <a:t>, </a:t>
+            </a:r>
+            <a:r>
+              <a:rPr lang="en-US" dirty="0" err="1"/>
+              <a:t>consectetur</a:t>
+            </a:r>
+            <a:r>
+              <a:rPr lang="en-US" dirty="0"/>
+              <a:t> </a:t>
+            </a:r>
+            <a:r>
+              <a:rPr lang="en-US" dirty="0" err="1"/>
+              <a:t>adipiscing</a:t>
+            </a:r>
+            <a:r>
+              <a:rPr lang="en-US" dirty="0"/>
+              <a:t> </a:t>
+            </a:r>
+            <a:r>
+              <a:rPr lang="en-US" dirty="0" err="1"/>
+              <a:t>elit</a:t>
+            </a:r>
+            <a:r>
+              <a:rPr lang="en-US" dirty="0"/>
+              <a:t>. </a:t>
+            </a:r>
+            <a:r>
+              <a:rPr lang="en-US" dirty="0" err="1"/>
+              <a:t>Donec</a:t>
+            </a:r>
+            <a:r>
+              <a:rPr lang="en-US" dirty="0"/>
+              <a:t> </a:t>
+            </a:r>
+            <a:r>
+              <a:rPr lang="en-US" dirty="0" err="1"/>
+              <a:t>risus</a:t>
+            </a:r>
+            <a:r>
+              <a:rPr lang="en-US" dirty="0"/>
+              <a:t> </a:t>
+            </a:r>
+            <a:r>
+              <a:rPr lang="en-US" dirty="0" err="1"/>
+              <a:t>purus</a:t>
+            </a:r>
+            <a:r>
+              <a:rPr lang="en-US" dirty="0"/>
+              <a:t>, tempus in </a:t>
+            </a:r>
+            <a:r>
+              <a:rPr lang="en-US" dirty="0" err="1"/>
+              <a:t>quis</a:t>
+            </a:r>
+            <a:r>
+              <a:rPr lang="en-US" dirty="0"/>
+              <a:t>, </a:t>
+            </a:r>
+            <a:r>
+              <a:rPr lang="en-US" dirty="0" err="1"/>
+              <a:t>ultricies</a:t>
+            </a:r>
+            <a:r>
+              <a:rPr lang="en-US" dirty="0"/>
+              <a:t> </a:t>
+            </a:r>
+            <a:r>
+              <a:rPr lang="en-US" dirty="0" err="1"/>
+              <a:t>eu</a:t>
+            </a:r>
+            <a:r>
+              <a:rPr lang="en-US" dirty="0"/>
+              <a:t> diam. </a:t>
+            </a:r>
+            <a:r>
+              <a:rPr lang="en-US" dirty="0" err="1"/>
+              <a:t>Donec</a:t>
+            </a:r>
+            <a:r>
+              <a:rPr lang="en-US" dirty="0"/>
+              <a:t> </a:t>
+            </a:r>
+            <a:r>
+              <a:rPr lang="en-US" dirty="0" err="1"/>
+              <a:t>convallis</a:t>
+            </a:r>
+            <a:r>
+              <a:rPr lang="en-US" dirty="0"/>
+              <a:t> </a:t>
+            </a:r>
+            <a:r>
+              <a:rPr lang="en-US" dirty="0" err="1"/>
+              <a:t>enim</a:t>
+            </a:r>
+            <a:r>
+              <a:rPr lang="en-US" dirty="0"/>
+              <a:t> in mi </a:t>
+            </a:r>
+            <a:r>
+              <a:rPr lang="en-US" dirty="0" err="1"/>
+              <a:t>lacinia</a:t>
+            </a:r>
+            <a:r>
+              <a:rPr lang="en-US" dirty="0"/>
+              <a:t>, id </a:t>
+            </a:r>
+            <a:r>
+              <a:rPr lang="en-US" dirty="0" err="1"/>
+              <a:t>viverra</a:t>
+            </a:r>
+            <a:r>
+              <a:rPr lang="en-US" dirty="0"/>
+              <a:t> </a:t>
+            </a:r>
+            <a:r>
+              <a:rPr lang="en-US" dirty="0" err="1"/>
+              <a:t>neque</a:t>
+            </a:r>
+            <a:r>
+              <a:rPr lang="en-US" dirty="0"/>
+              <a:t> </a:t>
+            </a:r>
+            <a:r>
+              <a:rPr lang="en-US" dirty="0" err="1"/>
+              <a:t>pretium</a:t>
+            </a:r>
+            <a:r>
+              <a:rPr lang="en-US" dirty="0"/>
+              <a:t>. </a:t>
+            </a:r>
+            <a:r>
+              <a:rPr lang="en-US" dirty="0" err="1"/>
+              <a:t>Phasellus</a:t>
+            </a:r>
+            <a:r>
+              <a:rPr lang="en-US" dirty="0"/>
+              <a:t> et.</a:t>
+            </a:r>
+          </a:p>
+          <a:p>
             <a:endParaRPr lang="en-US" dirty="0"/>
           </a:p>
         </p:txBody>
@@ -14996,7 +15736,7 @@
     </p:spTree>
     <p:extLst>
       <p:ext uri="{BB962C8B-B14F-4D97-AF65-F5344CB8AC3E}">
-        <p14:creationId xmlns:p14="http://schemas.microsoft.com/office/powerpoint/2010/main" val="1439852271"/>
+        <p14:creationId xmlns:p14="http://schemas.microsoft.com/office/powerpoint/2010/main" val="2354427935"/>
       </p:ext>
     </p:extLst>
   </p:cSld>
@@ -15040,6 +15780,74 @@
       </p:grpSpPr>
       <p:sp>
         <p:nvSpPr>
+          <p:cNvPr id="5" name="Title 4"/>
+          <p:cNvSpPr>
+            <a:spLocks noGrp="1"/>
+          </p:cNvSpPr>
+          <p:nvPr>
+            <p:ph type="title"/>
+          </p:nvPr>
+        </p:nvSpPr>
+        <p:spPr/>
+        <p:txBody>
+          <a:bodyPr/>
+          <a:lstStyle/>
+          <a:p>
+            <a:r>
+              <a:rPr lang="en-US" dirty="0" smtClean="0"/>
+              <a:t>Title Only</a:t>
+            </a:r>
+            <a:endParaRPr lang="en-US" dirty="0"/>
+          </a:p>
+        </p:txBody>
+      </p:sp>
+    </p:spTree>
+    <p:extLst>
+      <p:ext uri="{BB962C8B-B14F-4D97-AF65-F5344CB8AC3E}">
+        <p14:creationId xmlns:p14="http://schemas.microsoft.com/office/powerpoint/2010/main" val="1439852271"/>
+      </p:ext>
+    </p:extLst>
+  </p:cSld>
+  <p:clrMapOvr>
+    <a:masterClrMapping/>
+  </p:clrMapOvr>
+  <mc:AlternateContent xmlns:mc="http://schemas.openxmlformats.org/markup-compatibility/2006">
+    <mc:Choice xmlns:p14="http://schemas.microsoft.com/office/powerpoint/2010/main" Requires="p14">
+      <p:transition spd="slow" p14:dur="2000"/>
+    </mc:Choice>
+    <mc:Fallback>
+      <p:transition xmlns:p14="http://schemas.microsoft.com/office/powerpoint/2010/main" spd="slow"/>
+    </mc:Fallback>
+  </mc:AlternateContent>
+  <p:timing>
+    <p:tnLst>
+      <p:par>
+        <p:cTn xmlns:p14="http://schemas.microsoft.com/office/powerpoint/2010/main" id="1" dur="indefinite" restart="never" nodeType="tmRoot"/>
+      </p:par>
+    </p:tnLst>
+  </p:timing>
+</p:sld>
+</file>
+
+<file path=ppt/slides/slide29.xml><?xml version="1.0" encoding="utf-8"?>
+<p:sld xmlns:a="http://schemas.openxmlformats.org/drawingml/2006/main" xmlns:r="http://schemas.openxmlformats.org/officeDocument/2006/relationships" xmlns:p="http://schemas.openxmlformats.org/presentationml/2006/main" show="0">
+  <p:cSld>
+    <p:spTree>
+      <p:nvGrpSpPr>
+        <p:cNvPr id="1" name=""/>
+        <p:cNvGrpSpPr/>
+        <p:nvPr/>
+      </p:nvGrpSpPr>
+      <p:grpSpPr>
+        <a:xfrm>
+          <a:off x="0" y="0"/>
+          <a:ext cx="0" cy="0"/>
+          <a:chOff x="0" y="0"/>
+          <a:chExt cx="0" cy="0"/>
+        </a:xfrm>
+      </p:grpSpPr>
+      <p:sp>
+        <p:nvSpPr>
           <p:cNvPr id="2" name="Title 1"/>
           <p:cNvSpPr>
             <a:spLocks noGrp="1"/>
@@ -15112,7 +15920,143 @@
 </p:sld>
 </file>
 
-<file path=ppt/slides/slide29.xml><?xml version="1.0" encoding="utf-8"?>
+<file path=ppt/slides/slide3.xml><?xml version="1.0" encoding="utf-8"?>
+<p:sld xmlns:a="http://schemas.openxmlformats.org/drawingml/2006/main" xmlns:r="http://schemas.openxmlformats.org/officeDocument/2006/relationships" xmlns:p="http://schemas.openxmlformats.org/presentationml/2006/main">
+  <p:cSld>
+    <p:spTree>
+      <p:nvGrpSpPr>
+        <p:cNvPr id="1" name=""/>
+        <p:cNvGrpSpPr/>
+        <p:nvPr/>
+      </p:nvGrpSpPr>
+      <p:grpSpPr>
+        <a:xfrm>
+          <a:off x="0" y="0"/>
+          <a:ext cx="0" cy="0"/>
+          <a:chOff x="0" y="0"/>
+          <a:chExt cx="0" cy="0"/>
+        </a:xfrm>
+      </p:grpSpPr>
+      <p:sp>
+        <p:nvSpPr>
+          <p:cNvPr id="2" name="Title 1"/>
+          <p:cNvSpPr>
+            <a:spLocks noGrp="1"/>
+          </p:cNvSpPr>
+          <p:nvPr>
+            <p:ph type="title"/>
+          </p:nvPr>
+        </p:nvSpPr>
+        <p:spPr/>
+        <p:txBody>
+          <a:bodyPr/>
+          <a:lstStyle/>
+          <a:p>
+            <a:r>
+              <a:rPr lang="en-US" dirty="0" smtClean="0"/>
+              <a:t>Secondary Indexes</a:t>
+            </a:r>
+            <a:endParaRPr lang="en-US" dirty="0"/>
+          </a:p>
+        </p:txBody>
+      </p:sp>
+      <p:sp>
+        <p:nvSpPr>
+          <p:cNvPr id="3" name="Content Placeholder 2"/>
+          <p:cNvSpPr>
+            <a:spLocks noGrp="1"/>
+          </p:cNvSpPr>
+          <p:nvPr>
+            <p:ph idx="1"/>
+          </p:nvPr>
+        </p:nvSpPr>
+        <p:spPr>
+          <a:xfrm>
+            <a:off x="457200" y="955193"/>
+            <a:ext cx="8007739" cy="3493655"/>
+          </a:xfrm>
+        </p:spPr>
+        <p:txBody>
+          <a:bodyPr/>
+          <a:lstStyle/>
+          <a:p>
+            <a:pPr>
+              <a:lnSpc>
+                <a:spcPct val="140000"/>
+              </a:lnSpc>
+            </a:pPr>
+            <a:r>
+              <a:rPr lang="en-US" dirty="0" smtClean="0"/>
+              <a:t>Are the backing data structure for N1QL</a:t>
+            </a:r>
+          </a:p>
+          <a:p>
+            <a:pPr>
+              <a:lnSpc>
+                <a:spcPct val="140000"/>
+              </a:lnSpc>
+            </a:pPr>
+            <a:r>
+              <a:rPr lang="en-US" dirty="0" smtClean="0"/>
+              <a:t>Optimize the data lookup path for the query engine (“avoiding the full table scan”)</a:t>
+            </a:r>
+          </a:p>
+          <a:p>
+            <a:pPr>
+              <a:lnSpc>
+                <a:spcPct val="140000"/>
+              </a:lnSpc>
+            </a:pPr>
+            <a:r>
+              <a:rPr lang="en-US" dirty="0" smtClean="0"/>
+              <a:t>Two types of indexes</a:t>
+            </a:r>
+          </a:p>
+          <a:p>
+            <a:pPr lvl="1">
+              <a:lnSpc>
+                <a:spcPct val="140000"/>
+              </a:lnSpc>
+            </a:pPr>
+            <a:r>
+              <a:rPr lang="en-US" dirty="0" smtClean="0"/>
+              <a:t>View indexes</a:t>
+            </a:r>
+          </a:p>
+          <a:p>
+            <a:pPr lvl="1">
+              <a:lnSpc>
+                <a:spcPct val="140000"/>
+              </a:lnSpc>
+            </a:pPr>
+            <a:r>
+              <a:rPr lang="en-US" dirty="0" smtClean="0"/>
+              <a:t>GSI indexes (new global secondary indexes)</a:t>
+            </a:r>
+          </a:p>
+        </p:txBody>
+      </p:sp>
+    </p:spTree>
+    <p:extLst>
+      <p:ext uri="{BB962C8B-B14F-4D97-AF65-F5344CB8AC3E}">
+        <p14:creationId xmlns:p14="http://schemas.microsoft.com/office/powerpoint/2010/main" val="230402553"/>
+      </p:ext>
+    </p:extLst>
+  </p:cSld>
+  <p:clrMapOvr>
+    <a:masterClrMapping/>
+  </p:clrMapOvr>
+  <p:timing>
+    <p:tnLst>
+      <p:par>
+        <p:cTn xmlns:p14="http://schemas.microsoft.com/office/powerpoint/2010/main" id="1" dur="indefinite" restart="never" nodeType="tmRoot"/>
+      </p:par>
+    </p:tnLst>
+  </p:timing>
+</p:sld>
+</file>
+
+<file path=ppt/slides/slide30.xml><?xml version="1.0" encoding="utf-8"?>
 <p:sld xmlns:a="http://schemas.openxmlformats.org/drawingml/2006/main" xmlns:r="http://schemas.openxmlformats.org/officeDocument/2006/relationships" xmlns:p="http://schemas.openxmlformats.org/presentationml/2006/main" show="0">
   <p:cSld>
     <p:spTree>
@@ -16734,143 +17678,7 @@
 </p:sld>
 </file>
 
-<file path=ppt/slides/slide3.xml><?xml version="1.0" encoding="utf-8"?>
-<p:sld xmlns:a="http://schemas.openxmlformats.org/drawingml/2006/main" xmlns:r="http://schemas.openxmlformats.org/officeDocument/2006/relationships" xmlns:p="http://schemas.openxmlformats.org/presentationml/2006/main">
-  <p:cSld>
-    <p:spTree>
-      <p:nvGrpSpPr>
-        <p:cNvPr id="1" name=""/>
-        <p:cNvGrpSpPr/>
-        <p:nvPr/>
-      </p:nvGrpSpPr>
-      <p:grpSpPr>
-        <a:xfrm>
-          <a:off x="0" y="0"/>
-          <a:ext cx="0" cy="0"/>
-          <a:chOff x="0" y="0"/>
-          <a:chExt cx="0" cy="0"/>
-        </a:xfrm>
-      </p:grpSpPr>
-      <p:sp>
-        <p:nvSpPr>
-          <p:cNvPr id="2" name="Title 1"/>
-          <p:cNvSpPr>
-            <a:spLocks noGrp="1"/>
-          </p:cNvSpPr>
-          <p:nvPr>
-            <p:ph type="title"/>
-          </p:nvPr>
-        </p:nvSpPr>
-        <p:spPr/>
-        <p:txBody>
-          <a:bodyPr/>
-          <a:lstStyle/>
-          <a:p>
-            <a:r>
-              <a:rPr lang="en-US" dirty="0" smtClean="0"/>
-              <a:t>Secondary Indexes</a:t>
-            </a:r>
-            <a:endParaRPr lang="en-US" dirty="0"/>
-          </a:p>
-        </p:txBody>
-      </p:sp>
-      <p:sp>
-        <p:nvSpPr>
-          <p:cNvPr id="3" name="Content Placeholder 2"/>
-          <p:cNvSpPr>
-            <a:spLocks noGrp="1"/>
-          </p:cNvSpPr>
-          <p:nvPr>
-            <p:ph idx="1"/>
-          </p:nvPr>
-        </p:nvSpPr>
-        <p:spPr>
-          <a:xfrm>
-            <a:off x="457200" y="955193"/>
-            <a:ext cx="8007739" cy="3493655"/>
-          </a:xfrm>
-        </p:spPr>
-        <p:txBody>
-          <a:bodyPr/>
-          <a:lstStyle/>
-          <a:p>
-            <a:pPr>
-              <a:lnSpc>
-                <a:spcPct val="140000"/>
-              </a:lnSpc>
-            </a:pPr>
-            <a:r>
-              <a:rPr lang="en-US" dirty="0" smtClean="0"/>
-              <a:t>Are the backing data structure for N1QL</a:t>
-            </a:r>
-          </a:p>
-          <a:p>
-            <a:pPr>
-              <a:lnSpc>
-                <a:spcPct val="140000"/>
-              </a:lnSpc>
-            </a:pPr>
-            <a:r>
-              <a:rPr lang="en-US" dirty="0" smtClean="0"/>
-              <a:t>Optimize the data lookup path for the query engine (“avoiding the full table scan”)</a:t>
-            </a:r>
-          </a:p>
-          <a:p>
-            <a:pPr>
-              <a:lnSpc>
-                <a:spcPct val="140000"/>
-              </a:lnSpc>
-            </a:pPr>
-            <a:r>
-              <a:rPr lang="en-US" dirty="0" smtClean="0"/>
-              <a:t>Two types of indexes</a:t>
-            </a:r>
-          </a:p>
-          <a:p>
-            <a:pPr lvl="1">
-              <a:lnSpc>
-                <a:spcPct val="140000"/>
-              </a:lnSpc>
-            </a:pPr>
-            <a:r>
-              <a:rPr lang="en-US" dirty="0" smtClean="0"/>
-              <a:t>View indexes</a:t>
-            </a:r>
-          </a:p>
-          <a:p>
-            <a:pPr lvl="1">
-              <a:lnSpc>
-                <a:spcPct val="140000"/>
-              </a:lnSpc>
-            </a:pPr>
-            <a:r>
-              <a:rPr lang="en-US" dirty="0" smtClean="0"/>
-              <a:t>GSI indexes (new global secondary indexes)</a:t>
-            </a:r>
-          </a:p>
-        </p:txBody>
-      </p:sp>
-    </p:spTree>
-    <p:extLst>
-      <p:ext uri="{BB962C8B-B14F-4D97-AF65-F5344CB8AC3E}">
-        <p14:creationId xmlns:p14="http://schemas.microsoft.com/office/powerpoint/2010/main" val="230402553"/>
-      </p:ext>
-    </p:extLst>
-  </p:cSld>
-  <p:clrMapOvr>
-    <a:masterClrMapping/>
-  </p:clrMapOvr>
-  <p:timing>
-    <p:tnLst>
-      <p:par>
-        <p:cTn xmlns:p14="http://schemas.microsoft.com/office/powerpoint/2010/main" id="1" dur="indefinite" restart="never" nodeType="tmRoot"/>
-      </p:par>
-    </p:tnLst>
-  </p:timing>
-</p:sld>
-</file>
-
-<file path=ppt/slides/slide30.xml><?xml version="1.0" encoding="utf-8"?>
+<file path=ppt/slides/slide31.xml><?xml version="1.0" encoding="utf-8"?>
 <p:sld xmlns:a="http://schemas.openxmlformats.org/drawingml/2006/main" xmlns:r="http://schemas.openxmlformats.org/officeDocument/2006/relationships" xmlns:p="http://schemas.openxmlformats.org/presentationml/2006/main" show="0">
   <p:cSld>
     <p:spTree>
@@ -17622,7 +18430,7 @@
 </p:sld>
 </file>
 
-<file path=ppt/slides/slide31.xml><?xml version="1.0" encoding="utf-8"?>
+<file path=ppt/slides/slide32.xml><?xml version="1.0" encoding="utf-8"?>
 <p:sld xmlns:a="http://schemas.openxmlformats.org/drawingml/2006/main" xmlns:r="http://schemas.openxmlformats.org/officeDocument/2006/relationships" xmlns:p="http://schemas.openxmlformats.org/presentationml/2006/main" show="0">
   <p:cSld>
     <p:spTree>
@@ -18374,7 +19182,7 @@
 </p:sld>
 </file>
 
-<file path=ppt/slides/slide32.xml><?xml version="1.0" encoding="utf-8"?>
+<file path=ppt/slides/slide33.xml><?xml version="1.0" encoding="utf-8"?>
 <p:sld xmlns:a="http://schemas.openxmlformats.org/drawingml/2006/main" xmlns:r="http://schemas.openxmlformats.org/officeDocument/2006/relationships" xmlns:p="http://schemas.openxmlformats.org/presentationml/2006/main" show="0">
   <p:cSld>
     <p:spTree>
@@ -18540,7 +19348,7 @@
 </p:sld>
 </file>
 
-<file path=ppt/slides/slide33.xml><?xml version="1.0" encoding="utf-8"?>
+<file path=ppt/slides/slide34.xml><?xml version="1.0" encoding="utf-8"?>
 <p:sld xmlns:a="http://schemas.openxmlformats.org/drawingml/2006/main" xmlns:r="http://schemas.openxmlformats.org/officeDocument/2006/relationships" xmlns:p="http://schemas.openxmlformats.org/presentationml/2006/main" show="0">
   <p:cSld>
     <p:spTree>
@@ -18706,7 +19514,7 @@
 </p:sld>
 </file>
 
-<file path=ppt/slides/slide34.xml><?xml version="1.0" encoding="utf-8"?>
+<file path=ppt/slides/slide35.xml><?xml version="1.0" encoding="utf-8"?>
 <p:sld xmlns:a="http://schemas.openxmlformats.org/drawingml/2006/main" xmlns:r="http://schemas.openxmlformats.org/officeDocument/2006/relationships" xmlns:p="http://schemas.openxmlformats.org/presentationml/2006/main" show="0">
   <p:cSld>
     <p:spTree>
@@ -18872,7 +19680,7 @@
 </p:sld>
 </file>
 
-<file path=ppt/slides/slide35.xml><?xml version="1.0" encoding="utf-8"?>
+<file path=ppt/slides/slide36.xml><?xml version="1.0" encoding="utf-8"?>
 <p:sld xmlns:a="http://schemas.openxmlformats.org/drawingml/2006/main" xmlns:r="http://schemas.openxmlformats.org/officeDocument/2006/relationships" xmlns:p="http://schemas.openxmlformats.org/presentationml/2006/main" show="0">
   <p:cSld>
     <p:spTree>
@@ -19566,7 +20374,7 @@
 </p:sld>
 </file>
 
-<file path=ppt/slides/slide36.xml><?xml version="1.0" encoding="utf-8"?>
+<file path=ppt/slides/slide37.xml><?xml version="1.0" encoding="utf-8"?>
 <p:sld xmlns:a="http://schemas.openxmlformats.org/drawingml/2006/main" xmlns:r="http://schemas.openxmlformats.org/officeDocument/2006/relationships" xmlns:p="http://schemas.openxmlformats.org/presentationml/2006/main" show="0">
   <p:cSld>
     <p:spTree>
@@ -19634,7 +20442,7 @@
 </p:sld>
 </file>
 
-<file path=ppt/slides/slide37.xml><?xml version="1.0" encoding="utf-8"?>
+<file path=ppt/slides/slide38.xml><?xml version="1.0" encoding="utf-8"?>
 <p:sld xmlns:a="http://schemas.openxmlformats.org/drawingml/2006/main" xmlns:r="http://schemas.openxmlformats.org/officeDocument/2006/relationships" xmlns:p="http://schemas.openxmlformats.org/presentationml/2006/main" show="0">
   <p:cSld>
     <p:spTree>

</xml_diff>

<commit_message>
latest changes based on feedback
</commit_message>
<xml_diff>
--- a/server/presentations/07_N1QL Details.pptx
+++ b/server/presentations/07_N1QL Details.pptx
@@ -5,10 +5,10 @@
     <p:sldMasterId id="2147483648" r:id="rId1"/>
   </p:sldMasterIdLst>
   <p:notesMasterIdLst>
-    <p:notesMasterId r:id="rId27"/>
+    <p:notesMasterId r:id="rId23"/>
   </p:notesMasterIdLst>
   <p:handoutMasterIdLst>
-    <p:handoutMasterId r:id="rId28"/>
+    <p:handoutMasterId r:id="rId24"/>
   </p:handoutMasterIdLst>
   <p:sldIdLst>
     <p:sldId id="256" r:id="rId2"/>
@@ -21,21 +21,17 @@
     <p:sldId id="299" r:id="rId9"/>
     <p:sldId id="300" r:id="rId10"/>
     <p:sldId id="305" r:id="rId11"/>
-    <p:sldId id="306" r:id="rId12"/>
-    <p:sldId id="301" r:id="rId13"/>
-    <p:sldId id="302" r:id="rId14"/>
-    <p:sldId id="304" r:id="rId15"/>
-    <p:sldId id="303" r:id="rId16"/>
-    <p:sldId id="290" r:id="rId17"/>
-    <p:sldId id="291" r:id="rId18"/>
-    <p:sldId id="292" r:id="rId19"/>
-    <p:sldId id="285" r:id="rId20"/>
-    <p:sldId id="284" r:id="rId21"/>
-    <p:sldId id="288" r:id="rId22"/>
-    <p:sldId id="287" r:id="rId23"/>
-    <p:sldId id="286" r:id="rId24"/>
-    <p:sldId id="289" r:id="rId25"/>
-    <p:sldId id="294" r:id="rId26"/>
+    <p:sldId id="301" r:id="rId12"/>
+    <p:sldId id="302" r:id="rId13"/>
+    <p:sldId id="304" r:id="rId14"/>
+    <p:sldId id="303" r:id="rId15"/>
+    <p:sldId id="306" r:id="rId16"/>
+    <p:sldId id="284" r:id="rId17"/>
+    <p:sldId id="288" r:id="rId18"/>
+    <p:sldId id="287" r:id="rId19"/>
+    <p:sldId id="286" r:id="rId20"/>
+    <p:sldId id="289" r:id="rId21"/>
+    <p:sldId id="294" r:id="rId22"/>
   </p:sldIdLst>
   <p:sldSz cx="9144000" cy="5143500" type="screen16x9"/>
   <p:notesSz cx="6858000" cy="9144000"/>
@@ -219,7 +215,7 @@
           <a:p>
             <a:fld id="{B5389E1E-C654-E943-9883-792E99AD7287}" type="datetimeFigureOut">
               <a:rPr lang="en-US" smtClean="0"/>
-              <a:t>5/31/15</a:t>
+              <a:t>01/06/15</a:t>
             </a:fld>
             <a:endParaRPr lang="en-US"/>
           </a:p>
@@ -285,7 +281,7 @@
           <a:p>
             <a:fld id="{0550E822-5F4D-874B-B26E-81691243670C}" type="slidenum">
               <a:rPr lang="en-US" smtClean="0"/>
-              <a:t>‹#›</a:t>
+              <a:t>‹Nr.›</a:t>
             </a:fld>
             <a:endParaRPr lang="en-US"/>
           </a:p>
@@ -385,7 +381,7 @@
           <a:p>
             <a:fld id="{9920D99B-2862-464A-984E-65BFC5FC0BBC}" type="datetimeFigureOut">
               <a:rPr lang="en-US" smtClean="0"/>
-              <a:t>5/31/15</a:t>
+              <a:t>01/06/15</a:t>
             </a:fld>
             <a:endParaRPr lang="en-US"/>
           </a:p>
@@ -544,7 +540,7 @@
           <a:p>
             <a:fld id="{F39351FC-18D6-4741-8EEB-9FDB1F020AAC}" type="slidenum">
               <a:rPr lang="en-US" smtClean="0"/>
-              <a:t>‹#›</a:t>
+              <a:t>‹Nr.›</a:t>
             </a:fld>
             <a:endParaRPr lang="en-US"/>
           </a:p>
@@ -673,735 +669,6 @@
       </p:grpSpPr>
       <p:sp>
         <p:nvSpPr>
-          <p:cNvPr id="2" name="Folienbildplatzhalter 1"/>
-          <p:cNvSpPr>
-            <a:spLocks noGrp="1" noRot="1" noChangeAspect="1"/>
-          </p:cNvSpPr>
-          <p:nvPr>
-            <p:ph type="sldImg"/>
-          </p:nvPr>
-        </p:nvSpPr>
-        <p:spPr/>
-      </p:sp>
-      <p:sp>
-        <p:nvSpPr>
-          <p:cNvPr id="3" name="Notizenplatzhalter 2"/>
-          <p:cNvSpPr>
-            <a:spLocks noGrp="1"/>
-          </p:cNvSpPr>
-          <p:nvPr>
-            <p:ph type="body" idx="1"/>
-          </p:nvPr>
-        </p:nvSpPr>
-        <p:spPr/>
-        <p:txBody>
-          <a:bodyPr/>
-          <a:lstStyle/>
-          <a:p>
-            <a:pPr marL="0" marR="0" indent="0" algn="l" defTabSz="457200" rtl="0" eaLnBrk="1" fontAlgn="auto" latinLnBrk="0" hangingPunct="1">
-              <a:lnSpc>
-                <a:spcPct val="100000"/>
-              </a:lnSpc>
-              <a:spcBef>
-                <a:spcPts val="0"/>
-              </a:spcBef>
-              <a:spcAft>
-                <a:spcPts val="0"/>
-              </a:spcAft>
-              <a:buClrTx/>
-              <a:buSzTx/>
-              <a:buFontTx/>
-              <a:buNone/>
-              <a:tabLst/>
-              <a:defRPr/>
-            </a:pPr>
-            <a:r>
-              <a:rPr lang="de-DE" dirty="0" smtClean="0"/>
-              <a:t>Index DDL Request </a:t>
-            </a:r>
-            <a:r>
-              <a:rPr lang="de-DE" dirty="0" err="1" smtClean="0"/>
-              <a:t>from</a:t>
-            </a:r>
-            <a:r>
-              <a:rPr lang="de-DE" dirty="0" smtClean="0"/>
-              <a:t> Query Server </a:t>
-            </a:r>
-            <a:r>
-              <a:rPr lang="de-DE" dirty="0" err="1" smtClean="0"/>
-              <a:t>to</a:t>
-            </a:r>
-            <a:r>
-              <a:rPr lang="de-DE" dirty="0" smtClean="0"/>
-              <a:t> Index Client.</a:t>
-            </a:r>
-          </a:p>
-          <a:p>
-            <a:pPr marL="0" marR="0" indent="0" algn="l" defTabSz="457200" rtl="0" eaLnBrk="1" fontAlgn="auto" latinLnBrk="0" hangingPunct="1">
-              <a:lnSpc>
-                <a:spcPct val="100000"/>
-              </a:lnSpc>
-              <a:spcBef>
-                <a:spcPts val="0"/>
-              </a:spcBef>
-              <a:spcAft>
-                <a:spcPts val="0"/>
-              </a:spcAft>
-              <a:buClrTx/>
-              <a:buSzTx/>
-              <a:buFontTx/>
-              <a:buNone/>
-              <a:tabLst/>
-              <a:defRPr/>
-            </a:pPr>
-            <a:r>
-              <a:rPr lang="de-DE" dirty="0" smtClean="0"/>
-              <a:t>Index Client </a:t>
-            </a:r>
-            <a:r>
-              <a:rPr lang="de-DE" dirty="0" err="1" smtClean="0"/>
-              <a:t>sends</a:t>
-            </a:r>
-            <a:r>
-              <a:rPr lang="de-DE" dirty="0" smtClean="0"/>
-              <a:t> </a:t>
-            </a:r>
-            <a:r>
-              <a:rPr lang="de-DE" dirty="0" err="1" smtClean="0"/>
-              <a:t>the</a:t>
-            </a:r>
-            <a:r>
-              <a:rPr lang="de-DE" dirty="0" smtClean="0"/>
-              <a:t> DDL </a:t>
-            </a:r>
-            <a:r>
-              <a:rPr lang="de-DE" dirty="0" err="1" smtClean="0"/>
-              <a:t>request</a:t>
-            </a:r>
-            <a:r>
-              <a:rPr lang="de-DE" dirty="0" smtClean="0"/>
-              <a:t> </a:t>
-            </a:r>
-            <a:r>
-              <a:rPr lang="de-DE" dirty="0" err="1" smtClean="0"/>
-              <a:t>to</a:t>
-            </a:r>
-            <a:r>
-              <a:rPr lang="de-DE" dirty="0" smtClean="0"/>
-              <a:t> Index </a:t>
-            </a:r>
-            <a:r>
-              <a:rPr lang="de-DE" dirty="0" err="1" smtClean="0"/>
-              <a:t>Coordinator</a:t>
-            </a:r>
-            <a:r>
-              <a:rPr lang="de-DE" dirty="0" smtClean="0"/>
-              <a:t> Master.</a:t>
-            </a:r>
-          </a:p>
-          <a:p>
-            <a:pPr marL="0" marR="0" indent="0" algn="l" defTabSz="457200" rtl="0" eaLnBrk="1" fontAlgn="auto" latinLnBrk="0" hangingPunct="1">
-              <a:lnSpc>
-                <a:spcPct val="100000"/>
-              </a:lnSpc>
-              <a:spcBef>
-                <a:spcPts val="0"/>
-              </a:spcBef>
-              <a:spcAft>
-                <a:spcPts val="0"/>
-              </a:spcAft>
-              <a:buClrTx/>
-              <a:buSzTx/>
-              <a:buFontTx/>
-              <a:buNone/>
-              <a:tabLst/>
-              <a:defRPr/>
-            </a:pPr>
-            <a:r>
-              <a:rPr lang="de-DE" dirty="0" smtClean="0"/>
-              <a:t>Index </a:t>
-            </a:r>
-            <a:r>
-              <a:rPr lang="de-DE" dirty="0" err="1" smtClean="0"/>
-              <a:t>Coordinator</a:t>
-            </a:r>
-            <a:r>
-              <a:rPr lang="de-DE" dirty="0" smtClean="0"/>
-              <a:t> Master </a:t>
-            </a:r>
-            <a:r>
-              <a:rPr lang="de-DE" dirty="0" err="1" smtClean="0"/>
-              <a:t>decides</a:t>
-            </a:r>
-            <a:r>
-              <a:rPr lang="de-DE" dirty="0" smtClean="0"/>
-              <a:t> </a:t>
-            </a:r>
-            <a:r>
-              <a:rPr lang="de-DE" dirty="0" err="1" smtClean="0"/>
-              <a:t>the</a:t>
-            </a:r>
-            <a:r>
-              <a:rPr lang="de-DE" dirty="0" smtClean="0"/>
-              <a:t> </a:t>
-            </a:r>
-            <a:r>
-              <a:rPr lang="de-DE" dirty="0" err="1" smtClean="0"/>
-              <a:t>topology</a:t>
-            </a:r>
-            <a:r>
-              <a:rPr lang="de-DE" dirty="0" smtClean="0"/>
-              <a:t> </a:t>
-            </a:r>
-            <a:r>
-              <a:rPr lang="de-DE" dirty="0" err="1" smtClean="0"/>
-              <a:t>and</a:t>
-            </a:r>
-            <a:r>
-              <a:rPr lang="de-DE" dirty="0" smtClean="0"/>
-              <a:t> </a:t>
-            </a:r>
-            <a:r>
-              <a:rPr lang="de-DE" dirty="0" err="1" smtClean="0"/>
-              <a:t>informs</a:t>
-            </a:r>
-            <a:r>
-              <a:rPr lang="de-DE" dirty="0" smtClean="0"/>
-              <a:t> </a:t>
-            </a:r>
-            <a:r>
-              <a:rPr lang="de-DE" dirty="0" err="1" smtClean="0"/>
-              <a:t>participating</a:t>
-            </a:r>
-            <a:r>
-              <a:rPr lang="de-DE" dirty="0" smtClean="0"/>
-              <a:t> </a:t>
-            </a:r>
-            <a:r>
-              <a:rPr lang="de-DE" dirty="0" err="1" smtClean="0"/>
-              <a:t>Local</a:t>
-            </a:r>
-            <a:r>
-              <a:rPr lang="de-DE" dirty="0" smtClean="0"/>
-              <a:t> </a:t>
-            </a:r>
-            <a:r>
-              <a:rPr lang="de-DE" dirty="0" err="1" smtClean="0"/>
-              <a:t>Indexers</a:t>
-            </a:r>
-            <a:r>
-              <a:rPr lang="de-DE" dirty="0" smtClean="0"/>
-              <a:t> </a:t>
-            </a:r>
-            <a:r>
-              <a:rPr lang="de-DE" dirty="0" err="1" smtClean="0"/>
-              <a:t>to</a:t>
-            </a:r>
-            <a:r>
-              <a:rPr lang="de-DE" dirty="0" smtClean="0"/>
-              <a:t> </a:t>
-            </a:r>
-            <a:r>
-              <a:rPr lang="de-DE" dirty="0" err="1" smtClean="0"/>
-              <a:t>process</a:t>
-            </a:r>
-            <a:r>
-              <a:rPr lang="de-DE" dirty="0" smtClean="0"/>
-              <a:t> DDL.</a:t>
-            </a:r>
-          </a:p>
-          <a:p>
-            <a:pPr marL="0" marR="0" indent="0" algn="l" defTabSz="457200" rtl="0" eaLnBrk="1" fontAlgn="auto" latinLnBrk="0" hangingPunct="1">
-              <a:lnSpc>
-                <a:spcPct val="100000"/>
-              </a:lnSpc>
-              <a:spcBef>
-                <a:spcPts val="0"/>
-              </a:spcBef>
-              <a:spcAft>
-                <a:spcPts val="0"/>
-              </a:spcAft>
-              <a:buClrTx/>
-              <a:buSzTx/>
-              <a:buFontTx/>
-              <a:buNone/>
-              <a:tabLst/>
-              <a:defRPr/>
-            </a:pPr>
-            <a:r>
-              <a:rPr lang="de-DE" dirty="0" err="1" smtClean="0"/>
-              <a:t>Local</a:t>
-            </a:r>
-            <a:r>
-              <a:rPr lang="de-DE" dirty="0" smtClean="0"/>
-              <a:t> </a:t>
-            </a:r>
-            <a:r>
-              <a:rPr lang="de-DE" dirty="0" err="1" smtClean="0"/>
-              <a:t>Indexers</a:t>
-            </a:r>
-            <a:r>
-              <a:rPr lang="de-DE" dirty="0" smtClean="0"/>
-              <a:t> </a:t>
-            </a:r>
-            <a:r>
-              <a:rPr lang="de-DE" dirty="0" err="1" smtClean="0"/>
-              <a:t>allocates</a:t>
-            </a:r>
-            <a:r>
-              <a:rPr lang="de-DE" dirty="0" smtClean="0"/>
-              <a:t>/</a:t>
-            </a:r>
-            <a:r>
-              <a:rPr lang="de-DE" dirty="0" err="1" smtClean="0"/>
-              <a:t>deallocates</a:t>
-            </a:r>
-            <a:r>
-              <a:rPr lang="de-DE" dirty="0" smtClean="0"/>
-              <a:t> </a:t>
-            </a:r>
-            <a:r>
-              <a:rPr lang="de-DE" dirty="0" err="1" smtClean="0"/>
-              <a:t>storage</a:t>
-            </a:r>
-            <a:r>
-              <a:rPr lang="de-DE" dirty="0" smtClean="0"/>
-              <a:t> </a:t>
-            </a:r>
-            <a:r>
-              <a:rPr lang="de-DE" dirty="0" err="1" smtClean="0"/>
-              <a:t>for</a:t>
-            </a:r>
-            <a:r>
-              <a:rPr lang="de-DE" dirty="0" smtClean="0"/>
-              <a:t> </a:t>
-            </a:r>
-            <a:r>
-              <a:rPr lang="de-DE" dirty="0" err="1" smtClean="0"/>
-              <a:t>new</a:t>
-            </a:r>
-            <a:r>
-              <a:rPr lang="de-DE" dirty="0" smtClean="0"/>
-              <a:t> DDL </a:t>
-            </a:r>
-            <a:r>
-              <a:rPr lang="de-DE" dirty="0" err="1" smtClean="0"/>
-              <a:t>request</a:t>
-            </a:r>
-            <a:r>
-              <a:rPr lang="de-DE" dirty="0" smtClean="0"/>
-              <a:t>.</a:t>
-            </a:r>
-          </a:p>
-          <a:p>
-            <a:pPr marL="0" marR="0" indent="0" algn="l" defTabSz="457200" rtl="0" eaLnBrk="1" fontAlgn="auto" latinLnBrk="0" hangingPunct="1">
-              <a:lnSpc>
-                <a:spcPct val="100000"/>
-              </a:lnSpc>
-              <a:spcBef>
-                <a:spcPts val="0"/>
-              </a:spcBef>
-              <a:spcAft>
-                <a:spcPts val="0"/>
-              </a:spcAft>
-              <a:buClrTx/>
-              <a:buSzTx/>
-              <a:buFontTx/>
-              <a:buNone/>
-              <a:tabLst/>
-              <a:defRPr/>
-            </a:pPr>
-            <a:r>
-              <a:rPr lang="de-DE" dirty="0" smtClean="0"/>
-              <a:t>Index </a:t>
-            </a:r>
-            <a:r>
-              <a:rPr lang="de-DE" dirty="0" err="1" smtClean="0"/>
-              <a:t>Coordinator</a:t>
-            </a:r>
-            <a:r>
-              <a:rPr lang="de-DE" dirty="0" smtClean="0"/>
-              <a:t> Master </a:t>
-            </a:r>
-            <a:r>
-              <a:rPr lang="de-DE" dirty="0" err="1" smtClean="0"/>
-              <a:t>replicates</a:t>
-            </a:r>
-            <a:r>
-              <a:rPr lang="de-DE" dirty="0" smtClean="0"/>
-              <a:t> </a:t>
-            </a:r>
-            <a:r>
-              <a:rPr lang="de-DE" dirty="0" err="1" smtClean="0"/>
-              <a:t>the</a:t>
-            </a:r>
-            <a:r>
-              <a:rPr lang="de-DE" dirty="0" smtClean="0"/>
-              <a:t> </a:t>
-            </a:r>
-            <a:r>
-              <a:rPr lang="de-DE" dirty="0" err="1" smtClean="0"/>
-              <a:t>updated</a:t>
-            </a:r>
-            <a:r>
-              <a:rPr lang="de-DE" dirty="0" smtClean="0"/>
-              <a:t> </a:t>
-            </a:r>
-            <a:r>
-              <a:rPr lang="de-DE" dirty="0" err="1" smtClean="0"/>
-              <a:t>metadata</a:t>
-            </a:r>
-            <a:r>
-              <a:rPr lang="de-DE" dirty="0" smtClean="0"/>
-              <a:t>.</a:t>
-            </a:r>
-          </a:p>
-          <a:p>
-            <a:pPr marL="0" marR="0" indent="0" algn="l" defTabSz="457200" rtl="0" eaLnBrk="1" fontAlgn="auto" latinLnBrk="0" hangingPunct="1">
-              <a:lnSpc>
-                <a:spcPct val="100000"/>
-              </a:lnSpc>
-              <a:spcBef>
-                <a:spcPts val="0"/>
-              </a:spcBef>
-              <a:spcAft>
-                <a:spcPts val="0"/>
-              </a:spcAft>
-              <a:buClrTx/>
-              <a:buSzTx/>
-              <a:buFontTx/>
-              <a:buNone/>
-              <a:tabLst/>
-              <a:defRPr/>
-            </a:pPr>
-            <a:r>
-              <a:rPr lang="de-DE" dirty="0" err="1" smtClean="0"/>
-              <a:t>Metadata</a:t>
-            </a:r>
-            <a:r>
-              <a:rPr lang="de-DE" dirty="0" smtClean="0"/>
-              <a:t> </a:t>
-            </a:r>
-            <a:r>
-              <a:rPr lang="de-DE" dirty="0" err="1" smtClean="0"/>
-              <a:t>is</a:t>
-            </a:r>
-            <a:r>
-              <a:rPr lang="de-DE" dirty="0" smtClean="0"/>
-              <a:t> </a:t>
-            </a:r>
-            <a:r>
-              <a:rPr lang="de-DE" dirty="0" err="1" smtClean="0"/>
-              <a:t>persisted</a:t>
-            </a:r>
-            <a:r>
-              <a:rPr lang="de-DE" dirty="0" smtClean="0"/>
-              <a:t> </a:t>
-            </a:r>
-            <a:r>
-              <a:rPr lang="de-DE" dirty="0" err="1" smtClean="0"/>
-              <a:t>at</a:t>
-            </a:r>
-            <a:r>
-              <a:rPr lang="de-DE" dirty="0" smtClean="0"/>
-              <a:t> </a:t>
-            </a:r>
-            <a:r>
-              <a:rPr lang="de-DE" dirty="0" err="1" smtClean="0"/>
-              <a:t>both</a:t>
-            </a:r>
-            <a:r>
-              <a:rPr lang="de-DE" dirty="0" smtClean="0"/>
-              <a:t> </a:t>
-            </a:r>
-            <a:r>
-              <a:rPr lang="de-DE" dirty="0" err="1" smtClean="0"/>
-              <a:t>master</a:t>
-            </a:r>
-            <a:r>
-              <a:rPr lang="de-DE" dirty="0" smtClean="0"/>
-              <a:t> </a:t>
-            </a:r>
-            <a:r>
-              <a:rPr lang="de-DE" dirty="0" err="1" smtClean="0"/>
-              <a:t>and</a:t>
-            </a:r>
-            <a:r>
-              <a:rPr lang="de-DE" dirty="0" smtClean="0"/>
-              <a:t> </a:t>
-            </a:r>
-            <a:r>
-              <a:rPr lang="de-DE" dirty="0" err="1" smtClean="0"/>
-              <a:t>replica</a:t>
-            </a:r>
-            <a:r>
-              <a:rPr lang="de-DE" dirty="0" smtClean="0"/>
-              <a:t> Index </a:t>
-            </a:r>
-            <a:r>
-              <a:rPr lang="de-DE" dirty="0" err="1" smtClean="0"/>
-              <a:t>Coordinator</a:t>
-            </a:r>
-            <a:r>
-              <a:rPr lang="de-DE" dirty="0" smtClean="0"/>
-              <a:t>.</a:t>
-            </a:r>
-          </a:p>
-          <a:p>
-            <a:pPr marL="0" marR="0" indent="0" algn="l" defTabSz="457200" rtl="0" eaLnBrk="1" fontAlgn="auto" latinLnBrk="0" hangingPunct="1">
-              <a:lnSpc>
-                <a:spcPct val="100000"/>
-              </a:lnSpc>
-              <a:spcBef>
-                <a:spcPts val="0"/>
-              </a:spcBef>
-              <a:spcAft>
-                <a:spcPts val="0"/>
-              </a:spcAft>
-              <a:buClrTx/>
-              <a:buSzTx/>
-              <a:buFontTx/>
-              <a:buNone/>
-              <a:tabLst/>
-              <a:defRPr/>
-            </a:pPr>
-            <a:r>
-              <a:rPr lang="de-DE" dirty="0" smtClean="0"/>
-              <a:t>Index </a:t>
-            </a:r>
-            <a:r>
-              <a:rPr lang="de-DE" dirty="0" err="1" smtClean="0"/>
-              <a:t>Coordinator</a:t>
-            </a:r>
-            <a:r>
-              <a:rPr lang="de-DE" dirty="0" smtClean="0"/>
-              <a:t> Master </a:t>
-            </a:r>
-            <a:r>
-              <a:rPr lang="de-DE" dirty="0" err="1" smtClean="0"/>
-              <a:t>notifies</a:t>
-            </a:r>
-            <a:r>
-              <a:rPr lang="de-DE" dirty="0" smtClean="0"/>
-              <a:t> ALL KV </a:t>
-            </a:r>
-            <a:r>
-              <a:rPr lang="de-DE" dirty="0" err="1" smtClean="0"/>
-              <a:t>projectors</a:t>
-            </a:r>
-            <a:r>
-              <a:rPr lang="de-DE" dirty="0" smtClean="0"/>
-              <a:t> </a:t>
-            </a:r>
-            <a:r>
-              <a:rPr lang="de-DE" dirty="0" err="1" smtClean="0"/>
-              <a:t>for</a:t>
-            </a:r>
-            <a:r>
-              <a:rPr lang="de-DE" dirty="0" smtClean="0"/>
-              <a:t> </a:t>
-            </a:r>
-            <a:r>
-              <a:rPr lang="de-DE" dirty="0" err="1" smtClean="0"/>
-              <a:t>the</a:t>
-            </a:r>
-            <a:r>
-              <a:rPr lang="de-DE" dirty="0" smtClean="0"/>
-              <a:t> </a:t>
-            </a:r>
-            <a:r>
-              <a:rPr lang="de-DE" dirty="0" err="1" smtClean="0"/>
-              <a:t>new</a:t>
-            </a:r>
-            <a:r>
-              <a:rPr lang="de-DE" dirty="0" smtClean="0"/>
-              <a:t> DDL </a:t>
-            </a:r>
-            <a:r>
-              <a:rPr lang="de-DE" dirty="0" err="1" smtClean="0"/>
-              <a:t>request</a:t>
-            </a:r>
-            <a:r>
-              <a:rPr lang="de-DE" dirty="0" smtClean="0"/>
-              <a:t>.</a:t>
-            </a:r>
-          </a:p>
-          <a:p>
-            <a:pPr marL="0" marR="0" indent="0" algn="l" defTabSz="457200" rtl="0" eaLnBrk="1" fontAlgn="auto" latinLnBrk="0" hangingPunct="1">
-              <a:lnSpc>
-                <a:spcPct val="100000"/>
-              </a:lnSpc>
-              <a:spcBef>
-                <a:spcPts val="0"/>
-              </a:spcBef>
-              <a:spcAft>
-                <a:spcPts val="0"/>
-              </a:spcAft>
-              <a:buClrTx/>
-              <a:buSzTx/>
-              <a:buFontTx/>
-              <a:buNone/>
-              <a:tabLst/>
-              <a:defRPr/>
-            </a:pPr>
-            <a:r>
-              <a:rPr lang="de-DE" dirty="0" smtClean="0"/>
-              <a:t>Index </a:t>
-            </a:r>
-            <a:r>
-              <a:rPr lang="de-DE" dirty="0" err="1" smtClean="0"/>
-              <a:t>Coordinator</a:t>
-            </a:r>
-            <a:r>
-              <a:rPr lang="de-DE" dirty="0" smtClean="0"/>
-              <a:t> </a:t>
-            </a:r>
-            <a:r>
-              <a:rPr lang="de-DE" dirty="0" err="1" smtClean="0"/>
-              <a:t>returns</a:t>
-            </a:r>
-            <a:r>
-              <a:rPr lang="de-DE" dirty="0" smtClean="0"/>
-              <a:t> </a:t>
-            </a:r>
-            <a:r>
-              <a:rPr lang="de-DE" dirty="0" err="1" smtClean="0"/>
-              <a:t>status</a:t>
-            </a:r>
-            <a:r>
-              <a:rPr lang="de-DE" dirty="0" smtClean="0"/>
-              <a:t> </a:t>
-            </a:r>
-            <a:r>
-              <a:rPr lang="de-DE" dirty="0" err="1" smtClean="0"/>
-              <a:t>of</a:t>
-            </a:r>
-            <a:r>
-              <a:rPr lang="de-DE" dirty="0" smtClean="0"/>
-              <a:t> DDL </a:t>
-            </a:r>
-            <a:r>
-              <a:rPr lang="de-DE" dirty="0" err="1" smtClean="0"/>
-              <a:t>request</a:t>
-            </a:r>
-            <a:r>
-              <a:rPr lang="de-DE" dirty="0" smtClean="0"/>
-              <a:t> </a:t>
-            </a:r>
-            <a:r>
-              <a:rPr lang="de-DE" dirty="0" err="1" smtClean="0"/>
-              <a:t>to</a:t>
-            </a:r>
-            <a:r>
-              <a:rPr lang="de-DE" dirty="0" smtClean="0"/>
-              <a:t> Index Client.</a:t>
-            </a:r>
-          </a:p>
-          <a:p>
-            <a:pPr marL="0" marR="0" indent="0" algn="l" defTabSz="457200" rtl="0" eaLnBrk="1" fontAlgn="auto" latinLnBrk="0" hangingPunct="1">
-              <a:lnSpc>
-                <a:spcPct val="100000"/>
-              </a:lnSpc>
-              <a:spcBef>
-                <a:spcPts val="0"/>
-              </a:spcBef>
-              <a:spcAft>
-                <a:spcPts val="0"/>
-              </a:spcAft>
-              <a:buClrTx/>
-              <a:buSzTx/>
-              <a:buFontTx/>
-              <a:buNone/>
-              <a:tabLst/>
-              <a:defRPr/>
-            </a:pPr>
-            <a:r>
-              <a:rPr lang="de-DE" dirty="0" smtClean="0"/>
-              <a:t>DDL Request Status </a:t>
-            </a:r>
-            <a:r>
-              <a:rPr lang="de-DE" dirty="0" err="1" smtClean="0"/>
-              <a:t>is</a:t>
-            </a:r>
-            <a:r>
-              <a:rPr lang="de-DE" dirty="0" smtClean="0"/>
-              <a:t> </a:t>
-            </a:r>
-            <a:r>
-              <a:rPr lang="de-DE" dirty="0" err="1" smtClean="0"/>
-              <a:t>returned</a:t>
-            </a:r>
-            <a:r>
-              <a:rPr lang="de-DE" dirty="0" smtClean="0"/>
-              <a:t> </a:t>
-            </a:r>
-            <a:r>
-              <a:rPr lang="de-DE" dirty="0" err="1" smtClean="0"/>
-              <a:t>to</a:t>
-            </a:r>
-            <a:r>
-              <a:rPr lang="de-DE" dirty="0" smtClean="0"/>
-              <a:t> Query Server.</a:t>
-            </a:r>
-            <a:endParaRPr lang="de-DE" dirty="0"/>
-          </a:p>
-        </p:txBody>
-      </p:sp>
-      <p:sp>
-        <p:nvSpPr>
-          <p:cNvPr id="4" name="Foliennummernplatzhalter 3"/>
-          <p:cNvSpPr>
-            <a:spLocks noGrp="1"/>
-          </p:cNvSpPr>
-          <p:nvPr>
-            <p:ph type="sldNum" sz="quarter" idx="10"/>
-          </p:nvPr>
-        </p:nvSpPr>
-        <p:spPr/>
-        <p:txBody>
-          <a:bodyPr/>
-          <a:lstStyle/>
-          <a:p>
-            <a:fld id="{F39351FC-18D6-4741-8EEB-9FDB1F020AAC}" type="slidenum">
-              <a:rPr lang="en-US" smtClean="0"/>
-              <a:t>11</a:t>
-            </a:fld>
-            <a:endParaRPr lang="en-US"/>
-          </a:p>
-        </p:txBody>
-      </p:sp>
-    </p:spTree>
-    <p:extLst>
-      <p:ext uri="{BB962C8B-B14F-4D97-AF65-F5344CB8AC3E}">
-        <p14:creationId xmlns:p14="http://schemas.microsoft.com/office/powerpoint/2010/main" val="229821969"/>
-      </p:ext>
-    </p:extLst>
-  </p:cSld>
-  <p:clrMapOvr>
-    <a:masterClrMapping/>
-  </p:clrMapOvr>
-</p:notes>
-</file>
-
-<file path=ppt/notesSlides/notesSlide2.xml><?xml version="1.0" encoding="utf-8"?>
-<p:notes xmlns:a="http://schemas.openxmlformats.org/drawingml/2006/main" xmlns:r="http://schemas.openxmlformats.org/officeDocument/2006/relationships" xmlns:p="http://schemas.openxmlformats.org/presentationml/2006/main">
-  <p:cSld>
-    <p:spTree>
-      <p:nvGrpSpPr>
-        <p:cNvPr id="1" name=""/>
-        <p:cNvGrpSpPr/>
-        <p:nvPr/>
-      </p:nvGrpSpPr>
-      <p:grpSpPr>
-        <a:xfrm>
-          <a:off x="0" y="0"/>
-          <a:ext cx="0" cy="0"/>
-          <a:chOff x="0" y="0"/>
-          <a:chExt cx="0" cy="0"/>
-        </a:xfrm>
-      </p:grpSpPr>
-      <p:sp>
-        <p:nvSpPr>
           <p:cNvPr id="2" name="Slide Image Placeholder 1"/>
           <p:cNvSpPr>
             <a:spLocks noGrp="1" noRot="1" noChangeAspect="1"/>
@@ -1509,7 +776,7 @@
                 <a:latin typeface="Calibri"/>
               </a:rPr>
               <a:pPr/>
-              <a:t>21</a:t>
+              <a:t>17</a:t>
             </a:fld>
             <a:endParaRPr lang="en-US">
               <a:solidFill>
@@ -1533,7 +800,7 @@
 </p:notes>
 </file>
 
-<file path=ppt/notesSlides/notesSlide3.xml><?xml version="1.0" encoding="utf-8"?>
+<file path=ppt/notesSlides/notesSlide2.xml><?xml version="1.0" encoding="utf-8"?>
 <p:notes xmlns:a="http://schemas.openxmlformats.org/drawingml/2006/main" xmlns:r="http://schemas.openxmlformats.org/officeDocument/2006/relationships" xmlns:p="http://schemas.openxmlformats.org/presentationml/2006/main">
   <p:cSld>
     <p:spTree>
@@ -1598,7 +865,7 @@
           <a:p>
             <a:fld id="{615C908D-C35B-B346-A739-79C621D2BD36}" type="slidenum">
               <a:rPr lang="en-US" smtClean="0"/>
-              <a:t>22</a:t>
+              <a:t>18</a:t>
             </a:fld>
             <a:endParaRPr lang="en-US"/>
           </a:p>
@@ -2301,7 +1568,7 @@
           <a:p>
             <a:fld id="{C25E7766-B4D4-B545-BC12-CA0EFEB1F16F}" type="slidenum">
               <a:rPr lang="en-US" smtClean="0"/>
-              <a:t>‹#›</a:t>
+              <a:t>‹Nr.›</a:t>
             </a:fld>
             <a:endParaRPr lang="en-US" dirty="0"/>
           </a:p>
@@ -2784,7 +2051,7 @@
           <a:p>
             <a:fld id="{C25E7766-B4D4-B545-BC12-CA0EFEB1F16F}" type="slidenum">
               <a:rPr lang="en-US" smtClean="0"/>
-              <a:t>‹#›</a:t>
+              <a:t>‹Nr.›</a:t>
             </a:fld>
             <a:endParaRPr lang="en-US" dirty="0"/>
           </a:p>
@@ -3140,7 +2407,7 @@
           <a:p>
             <a:fld id="{C25E7766-B4D4-B545-BC12-CA0EFEB1F16F}" type="slidenum">
               <a:rPr lang="en-US" smtClean="0"/>
-              <a:t>‹#›</a:t>
+              <a:t>‹Nr.›</a:t>
             </a:fld>
             <a:endParaRPr lang="en-US" dirty="0"/>
           </a:p>
@@ -3837,7 +3104,7 @@
           <a:p>
             <a:fld id="{C25E7766-B4D4-B545-BC12-CA0EFEB1F16F}" type="slidenum">
               <a:rPr lang="en-US" smtClean="0"/>
-              <a:t>‹#›</a:t>
+              <a:t>‹Nr.›</a:t>
             </a:fld>
             <a:endParaRPr lang="en-US" dirty="0"/>
           </a:p>
@@ -4049,7 +3316,7 @@
             <a:fld id="{E728A94C-44F1-DF43-8BD8-694E750DEF33}" type="slidenum">
               <a:rPr lang="en-US" smtClean="0"/>
               <a:pPr/>
-              <a:t>‹#›</a:t>
+              <a:t>‹Nr.›</a:t>
             </a:fld>
             <a:endParaRPr lang="en-US"/>
           </a:p>
@@ -4943,279 +4210,9 @@
   <p:timing>
     <p:tnLst>
       <p:par>
-        <p:cTn xmlns:p14="http://schemas.microsoft.com/office/powerpoint/2010/main" id="1" dur="indefinite" restart="never" nodeType="tmRoot">
-          <p:childTnLst>
-            <p:seq concurrent="1" nextAc="seek">
-              <p:cTn id="2" dur="indefinite" nodeType="mainSeq">
-                <p:childTnLst>
-                  <p:par>
-                    <p:cTn id="3" fill="hold">
-                      <p:stCondLst>
-                        <p:cond delay="indefinite"/>
-                      </p:stCondLst>
-                      <p:childTnLst>
-                        <p:par>
-                          <p:cTn id="4" fill="hold">
-                            <p:stCondLst>
-                              <p:cond delay="0"/>
-                            </p:stCondLst>
-                            <p:childTnLst>
-                              <p:par>
-                                <p:cTn id="5" presetID="10" presetClass="entr" presetSubtype="0" fill="hold" grpId="0" nodeType="clickEffect">
-                                  <p:stCondLst>
-                                    <p:cond delay="0"/>
-                                  </p:stCondLst>
-                                  <p:childTnLst>
-                                    <p:set>
-                                      <p:cBhvr>
-                                        <p:cTn id="6" dur="1" fill="hold">
-                                          <p:stCondLst>
-                                            <p:cond delay="0"/>
-                                          </p:stCondLst>
-                                        </p:cTn>
-                                        <p:tgtEl>
-                                          <p:spTgt spid="3">
-                                            <p:txEl>
-                                              <p:pRg st="0" end="0"/>
-                                            </p:txEl>
-                                          </p:spTgt>
-                                        </p:tgtEl>
-                                        <p:attrNameLst>
-                                          <p:attrName>style.visibility</p:attrName>
-                                        </p:attrNameLst>
-                                      </p:cBhvr>
-                                      <p:to>
-                                        <p:strVal val="visible"/>
-                                      </p:to>
-                                    </p:set>
-                                    <p:animEffect transition="in" filter="fade">
-                                      <p:cBhvr>
-                                        <p:cTn id="7" dur="500"/>
-                                        <p:tgtEl>
-                                          <p:spTgt spid="3">
-                                            <p:txEl>
-                                              <p:pRg st="0" end="0"/>
-                                            </p:txEl>
-                                          </p:spTgt>
-                                        </p:tgtEl>
-                                      </p:cBhvr>
-                                    </p:animEffect>
-                                  </p:childTnLst>
-                                </p:cTn>
-                              </p:par>
-                            </p:childTnLst>
-                          </p:cTn>
-                        </p:par>
-                      </p:childTnLst>
-                    </p:cTn>
-                  </p:par>
-                  <p:par>
-                    <p:cTn id="8" fill="hold">
-                      <p:stCondLst>
-                        <p:cond delay="indefinite"/>
-                      </p:stCondLst>
-                      <p:childTnLst>
-                        <p:par>
-                          <p:cTn id="9" fill="hold">
-                            <p:stCondLst>
-                              <p:cond delay="0"/>
-                            </p:stCondLst>
-                            <p:childTnLst>
-                              <p:par>
-                                <p:cTn id="10" presetID="10" presetClass="entr" presetSubtype="0" fill="hold" grpId="0" nodeType="clickEffect">
-                                  <p:stCondLst>
-                                    <p:cond delay="0"/>
-                                  </p:stCondLst>
-                                  <p:childTnLst>
-                                    <p:set>
-                                      <p:cBhvr>
-                                        <p:cTn id="11" dur="1" fill="hold">
-                                          <p:stCondLst>
-                                            <p:cond delay="0"/>
-                                          </p:stCondLst>
-                                        </p:cTn>
-                                        <p:tgtEl>
-                                          <p:spTgt spid="3">
-                                            <p:txEl>
-                                              <p:pRg st="1" end="1"/>
-                                            </p:txEl>
-                                          </p:spTgt>
-                                        </p:tgtEl>
-                                        <p:attrNameLst>
-                                          <p:attrName>style.visibility</p:attrName>
-                                        </p:attrNameLst>
-                                      </p:cBhvr>
-                                      <p:to>
-                                        <p:strVal val="visible"/>
-                                      </p:to>
-                                    </p:set>
-                                    <p:animEffect transition="in" filter="fade">
-                                      <p:cBhvr>
-                                        <p:cTn id="12" dur="500"/>
-                                        <p:tgtEl>
-                                          <p:spTgt spid="3">
-                                            <p:txEl>
-                                              <p:pRg st="1" end="1"/>
-                                            </p:txEl>
-                                          </p:spTgt>
-                                        </p:tgtEl>
-                                      </p:cBhvr>
-                                    </p:animEffect>
-                                  </p:childTnLst>
-                                </p:cTn>
-                              </p:par>
-                            </p:childTnLst>
-                          </p:cTn>
-                        </p:par>
-                      </p:childTnLst>
-                    </p:cTn>
-                  </p:par>
-                  <p:par>
-                    <p:cTn id="13" fill="hold">
-                      <p:stCondLst>
-                        <p:cond delay="indefinite"/>
-                      </p:stCondLst>
-                      <p:childTnLst>
-                        <p:par>
-                          <p:cTn id="14" fill="hold">
-                            <p:stCondLst>
-                              <p:cond delay="0"/>
-                            </p:stCondLst>
-                            <p:childTnLst>
-                              <p:par>
-                                <p:cTn id="15" presetID="10" presetClass="entr" presetSubtype="0" fill="hold" grpId="0" nodeType="clickEffect">
-                                  <p:stCondLst>
-                                    <p:cond delay="0"/>
-                                  </p:stCondLst>
-                                  <p:childTnLst>
-                                    <p:set>
-                                      <p:cBhvr>
-                                        <p:cTn id="16" dur="1" fill="hold">
-                                          <p:stCondLst>
-                                            <p:cond delay="0"/>
-                                          </p:stCondLst>
-                                        </p:cTn>
-                                        <p:tgtEl>
-                                          <p:spTgt spid="3">
-                                            <p:txEl>
-                                              <p:pRg st="2" end="2"/>
-                                            </p:txEl>
-                                          </p:spTgt>
-                                        </p:tgtEl>
-                                        <p:attrNameLst>
-                                          <p:attrName>style.visibility</p:attrName>
-                                        </p:attrNameLst>
-                                      </p:cBhvr>
-                                      <p:to>
-                                        <p:strVal val="visible"/>
-                                      </p:to>
-                                    </p:set>
-                                    <p:animEffect transition="in" filter="fade">
-                                      <p:cBhvr>
-                                        <p:cTn id="17" dur="500"/>
-                                        <p:tgtEl>
-                                          <p:spTgt spid="3">
-                                            <p:txEl>
-                                              <p:pRg st="2" end="2"/>
-                                            </p:txEl>
-                                          </p:spTgt>
-                                        </p:tgtEl>
-                                      </p:cBhvr>
-                                    </p:animEffect>
-                                  </p:childTnLst>
-                                </p:cTn>
-                              </p:par>
-                            </p:childTnLst>
-                          </p:cTn>
-                        </p:par>
-                      </p:childTnLst>
-                    </p:cTn>
-                  </p:par>
-                  <p:par>
-                    <p:cTn id="18" fill="hold">
-                      <p:stCondLst>
-                        <p:cond delay="indefinite"/>
-                      </p:stCondLst>
-                      <p:childTnLst>
-                        <p:par>
-                          <p:cTn id="19" fill="hold">
-                            <p:stCondLst>
-                              <p:cond delay="0"/>
-                            </p:stCondLst>
-                            <p:childTnLst>
-                              <p:par>
-                                <p:cTn id="20" presetID="10" presetClass="entr" presetSubtype="0" fill="hold" grpId="0" nodeType="clickEffect">
-                                  <p:stCondLst>
-                                    <p:cond delay="0"/>
-                                  </p:stCondLst>
-                                  <p:childTnLst>
-                                    <p:set>
-                                      <p:cBhvr>
-                                        <p:cTn id="21" dur="1" fill="hold">
-                                          <p:stCondLst>
-                                            <p:cond delay="0"/>
-                                          </p:stCondLst>
-                                        </p:cTn>
-                                        <p:tgtEl>
-                                          <p:spTgt spid="3">
-                                            <p:txEl>
-                                              <p:pRg st="5" end="5"/>
-                                            </p:txEl>
-                                          </p:spTgt>
-                                        </p:tgtEl>
-                                        <p:attrNameLst>
-                                          <p:attrName>style.visibility</p:attrName>
-                                        </p:attrNameLst>
-                                      </p:cBhvr>
-                                      <p:to>
-                                        <p:strVal val="visible"/>
-                                      </p:to>
-                                    </p:set>
-                                    <p:animEffect transition="in" filter="fade">
-                                      <p:cBhvr>
-                                        <p:cTn id="22" dur="500"/>
-                                        <p:tgtEl>
-                                          <p:spTgt spid="3">
-                                            <p:txEl>
-                                              <p:pRg st="5" end="5"/>
-                                            </p:txEl>
-                                          </p:spTgt>
-                                        </p:tgtEl>
-                                      </p:cBhvr>
-                                    </p:animEffect>
-                                  </p:childTnLst>
-                                </p:cTn>
-                              </p:par>
-                            </p:childTnLst>
-                          </p:cTn>
-                        </p:par>
-                      </p:childTnLst>
-                    </p:cTn>
-                  </p:par>
-                </p:childTnLst>
-              </p:cTn>
-              <p:prevCondLst>
-                <p:cond evt="onPrev" delay="0">
-                  <p:tgtEl>
-                    <p:sldTgt/>
-                  </p:tgtEl>
-                </p:cond>
-              </p:prevCondLst>
-              <p:nextCondLst>
-                <p:cond evt="onNext" delay="0">
-                  <p:tgtEl>
-                    <p:sldTgt/>
-                  </p:tgtEl>
-                </p:cond>
-              </p:nextCondLst>
-            </p:seq>
-          </p:childTnLst>
-        </p:cTn>
+        <p:cTn xmlns:p14="http://schemas.microsoft.com/office/powerpoint/2010/main" id="1" dur="indefinite" restart="never" nodeType="tmRoot"/>
       </p:par>
     </p:tnLst>
-    <p:bldLst>
-      <p:bldP spid="3" grpId="0" build="p"/>
-    </p:bldLst>
   </p:timing>
 </p:sld>
 </file>
@@ -5244,7 +4241,7 @@
             <a:spLocks noGrp="1"/>
           </p:cNvSpPr>
           <p:nvPr>
-            <p:ph type="title"/>
+            <p:ph type="ctrTitle"/>
           </p:nvPr>
         </p:nvSpPr>
         <p:spPr/>
@@ -5254,40 +4251,16 @@
           <a:p>
             <a:r>
               <a:rPr lang="en-US" dirty="0" smtClean="0"/>
-              <a:t>Architecture</a:t>
+              <a:t>Advanced Queries</a:t>
             </a:r>
             <a:endParaRPr lang="en-US" dirty="0"/>
           </a:p>
         </p:txBody>
       </p:sp>
-      <p:pic>
-        <p:nvPicPr>
-          <p:cNvPr id="4" name="Bild 3"/>
-          <p:cNvPicPr>
-            <a:picLocks noChangeAspect="1"/>
-          </p:cNvPicPr>
-          <p:nvPr/>
-        </p:nvPicPr>
-        <p:blipFill>
-          <a:blip r:embed="rId3"/>
-          <a:stretch>
-            <a:fillRect/>
-          </a:stretch>
-        </p:blipFill>
-        <p:spPr>
-          <a:xfrm>
-            <a:off x="0" y="599537"/>
-            <a:ext cx="9144000" cy="4220308"/>
-          </a:xfrm>
-          <a:prstGeom prst="rect">
-            <a:avLst/>
-          </a:prstGeom>
-        </p:spPr>
-      </p:pic>
     </p:spTree>
     <p:extLst>
       <p:ext uri="{BB962C8B-B14F-4D97-AF65-F5344CB8AC3E}">
-        <p14:creationId xmlns:p14="http://schemas.microsoft.com/office/powerpoint/2010/main" val="318855054"/>
+        <p14:creationId xmlns:p14="http://schemas.microsoft.com/office/powerpoint/2010/main" val="3793485633"/>
       </p:ext>
     </p:extLst>
   </p:cSld>
@@ -5328,7 +4301,7 @@
             <a:spLocks noGrp="1"/>
           </p:cNvSpPr>
           <p:nvPr>
-            <p:ph type="ctrTitle"/>
+            <p:ph type="title"/>
           </p:nvPr>
         </p:nvSpPr>
         <p:spPr/>
@@ -5338,8 +4311,109 @@
           <a:p>
             <a:r>
               <a:rPr lang="en-US" dirty="0" smtClean="0"/>
-              <a:t>Advanced Queries</a:t>
-            </a:r>
+              <a:t>Read Your Writes</a:t>
+            </a:r>
+            <a:endParaRPr lang="en-US" dirty="0"/>
+          </a:p>
+        </p:txBody>
+      </p:sp>
+      <p:sp>
+        <p:nvSpPr>
+          <p:cNvPr id="3" name="Content Placeholder 2"/>
+          <p:cNvSpPr>
+            <a:spLocks noGrp="1"/>
+          </p:cNvSpPr>
+          <p:nvPr>
+            <p:ph idx="1"/>
+          </p:nvPr>
+        </p:nvSpPr>
+        <p:spPr>
+          <a:xfrm>
+            <a:off x="457200" y="955193"/>
+            <a:ext cx="8007739" cy="3493655"/>
+          </a:xfrm>
+        </p:spPr>
+        <p:txBody>
+          <a:bodyPr/>
+          <a:lstStyle/>
+          <a:p>
+            <a:pPr>
+              <a:lnSpc>
+                <a:spcPct val="140000"/>
+              </a:lnSpc>
+            </a:pPr>
+            <a:r>
+              <a:rPr lang="en-US" dirty="0" smtClean="0"/>
+              <a:t>Non-Stale queries used for “immediate query consistency”</a:t>
+            </a:r>
+          </a:p>
+          <a:p>
+            <a:pPr>
+              <a:lnSpc>
+                <a:spcPct val="140000"/>
+              </a:lnSpc>
+            </a:pPr>
+            <a:r>
+              <a:rPr lang="en-US" dirty="0" smtClean="0"/>
+              <a:t>Query performance is likely to be slower (since indexing is not </a:t>
+            </a:r>
+            <a:r>
+              <a:rPr lang="en-US" dirty="0" err="1" smtClean="0"/>
+              <a:t>async</a:t>
+            </a:r>
+            <a:r>
+              <a:rPr lang="en-US" dirty="0" smtClean="0"/>
+              <a:t> from query anymore)</a:t>
+            </a:r>
+          </a:p>
+          <a:p>
+            <a:pPr>
+              <a:lnSpc>
+                <a:spcPct val="140000"/>
+              </a:lnSpc>
+            </a:pPr>
+            <a:r>
+              <a:rPr lang="en-US" dirty="0" smtClean="0"/>
+              <a:t>How?</a:t>
+            </a:r>
+          </a:p>
+          <a:p>
+            <a:pPr lvl="1">
+              <a:lnSpc>
+                <a:spcPct val="140000"/>
+              </a:lnSpc>
+            </a:pPr>
+            <a:r>
+              <a:rPr lang="en-US" dirty="0" smtClean="0"/>
+              <a:t>Perform document mutation (insert, </a:t>
+            </a:r>
+            <a:r>
+              <a:rPr lang="en-US" dirty="0" err="1" smtClean="0"/>
+              <a:t>upsert</a:t>
+            </a:r>
+            <a:r>
+              <a:rPr lang="en-US" dirty="0" smtClean="0"/>
+              <a:t>, replace,…)</a:t>
+            </a:r>
+          </a:p>
+          <a:p>
+            <a:pPr lvl="1">
+              <a:lnSpc>
+                <a:spcPct val="140000"/>
+              </a:lnSpc>
+            </a:pPr>
+            <a:r>
+              <a:rPr lang="en-US" dirty="0" smtClean="0"/>
+              <a:t>Query with REQUEST_PLUS consistency</a:t>
+            </a:r>
+          </a:p>
+          <a:p>
+            <a:pPr marL="0" indent="0">
+              <a:lnSpc>
+                <a:spcPct val="140000"/>
+              </a:lnSpc>
+              <a:buNone/>
+            </a:pPr>
             <a:endParaRPr lang="en-US" dirty="0"/>
           </a:p>
         </p:txBody>
@@ -5347,7 +4421,7 @@
     </p:spTree>
     <p:extLst>
       <p:ext uri="{BB962C8B-B14F-4D97-AF65-F5344CB8AC3E}">
-        <p14:creationId xmlns:p14="http://schemas.microsoft.com/office/powerpoint/2010/main" val="3793485633"/>
+        <p14:creationId xmlns:p14="http://schemas.microsoft.com/office/powerpoint/2010/main" val="3563268453"/>
       </p:ext>
     </p:extLst>
   </p:cSld>
@@ -5398,7 +4472,7 @@
           <a:p>
             <a:r>
               <a:rPr lang="en-US" dirty="0" smtClean="0"/>
-              <a:t>Read Your Writes</a:t>
+              <a:t>Parameterized Queries</a:t>
             </a:r>
             <a:endParaRPr lang="en-US" dirty="0"/>
           </a:p>
@@ -5431,7 +4505,7 @@
             </a:pPr>
             <a:r>
               <a:rPr lang="en-US" dirty="0" smtClean="0"/>
-              <a:t>Non-Stale queries used for “immediate query consistency”</a:t>
+              <a:t>Decouple parameters from the actual Query</a:t>
             </a:r>
           </a:p>
           <a:p>
@@ -5442,26 +4516,7 @@
             </a:pPr>
             <a:r>
               <a:rPr lang="en-US" dirty="0" smtClean="0"/>
-              <a:t>Query performance is likely to be slower (since indexing is not </a:t>
-            </a:r>
-            <a:r>
-              <a:rPr lang="en-US" dirty="0" err="1" smtClean="0"/>
-              <a:t>async</a:t>
-            </a:r>
-            <a:r>
-              <a:rPr lang="en-US" dirty="0" smtClean="0"/>
-              <a:t> from query anymore)</a:t>
-            </a:r>
-          </a:p>
-          <a:p>
-            <a:pPr>
-              <a:lnSpc>
-                <a:spcPct val="140000"/>
-              </a:lnSpc>
-            </a:pPr>
-            <a:r>
-              <a:rPr lang="en-US" dirty="0" smtClean="0"/>
-              <a:t>How?</a:t>
+              <a:t>Two variants</a:t>
             </a:r>
           </a:p>
           <a:p>
@@ -5472,15 +4527,7 @@
             </a:pPr>
             <a:r>
               <a:rPr lang="en-US" dirty="0" smtClean="0"/>
-              <a:t>Perform document mutation (insert, </a:t>
-            </a:r>
-            <a:r>
-              <a:rPr lang="en-US" dirty="0" err="1" smtClean="0"/>
-              <a:t>upsert</a:t>
-            </a:r>
-            <a:r>
-              <a:rPr lang="en-US" dirty="0" smtClean="0"/>
-              <a:t>, replace,…)</a:t>
+              <a:t>Positional Parameters ($1, $2,…)</a:t>
             </a:r>
           </a:p>
           <a:p>
@@ -5491,24 +4538,244 @@
             </a:pPr>
             <a:r>
               <a:rPr lang="en-US" dirty="0" smtClean="0"/>
-              <a:t>Query with REQUEST_PLUS consistency</a:t>
-            </a:r>
-          </a:p>
-          <a:p>
-            <a:pPr marL="0" indent="0">
-              <a:lnSpc>
-                <a:spcPct val="140000"/>
-              </a:lnSpc>
-              <a:buNone/>
-            </a:pPr>
-            <a:endParaRPr lang="en-US" dirty="0"/>
+              <a:t>Named Parameters ($</a:t>
+            </a:r>
+            <a:r>
+              <a:rPr lang="en-US" dirty="0" err="1" smtClean="0"/>
+              <a:t>fname</a:t>
+            </a:r>
+            <a:r>
+              <a:rPr lang="en-US" dirty="0" smtClean="0"/>
+              <a:t>, $</a:t>
+            </a:r>
+            <a:r>
+              <a:rPr lang="en-US" dirty="0" err="1" smtClean="0"/>
+              <a:t>lname</a:t>
+            </a:r>
+            <a:r>
+              <a:rPr lang="en-US" dirty="0" smtClean="0"/>
+              <a:t>)</a:t>
+            </a:r>
+          </a:p>
+        </p:txBody>
+      </p:sp>
+      <p:sp>
+        <p:nvSpPr>
+          <p:cNvPr id="4" name="Rechteck 3"/>
+          <p:cNvSpPr/>
+          <p:nvPr/>
+        </p:nvSpPr>
+        <p:spPr>
+          <a:xfrm>
+            <a:off x="457200" y="3244984"/>
+            <a:ext cx="8396825" cy="369332"/>
+          </a:xfrm>
+          <a:prstGeom prst="rect">
+            <a:avLst/>
+          </a:prstGeom>
+        </p:spPr>
+        <p:txBody>
+          <a:bodyPr wrap="square">
+            <a:spAutoFit/>
+          </a:bodyPr>
+          <a:lstStyle/>
+          <a:p>
+            <a:r>
+              <a:rPr lang="de-DE" dirty="0">
+                <a:latin typeface="Courier New"/>
+                <a:cs typeface="Courier New"/>
+              </a:rPr>
+              <a:t> SELECT </a:t>
+            </a:r>
+            <a:r>
+              <a:rPr lang="de-DE" dirty="0" err="1">
+                <a:latin typeface="Courier New"/>
+                <a:cs typeface="Courier New"/>
+              </a:rPr>
+              <a:t>detail</a:t>
+            </a:r>
+            <a:r>
+              <a:rPr lang="de-DE" dirty="0">
+                <a:latin typeface="Courier New"/>
+                <a:cs typeface="Courier New"/>
+              </a:rPr>
+              <a:t> FROM </a:t>
+            </a:r>
+            <a:r>
+              <a:rPr lang="de-DE" dirty="0" err="1">
+                <a:latin typeface="Courier New"/>
+                <a:cs typeface="Courier New"/>
+              </a:rPr>
+              <a:t>emp</a:t>
+            </a:r>
+            <a:r>
+              <a:rPr lang="de-DE" dirty="0">
+                <a:latin typeface="Courier New"/>
+                <a:cs typeface="Courier New"/>
+              </a:rPr>
+              <a:t> </a:t>
+            </a:r>
+            <a:r>
+              <a:rPr lang="de-DE" b="1" dirty="0">
+                <a:latin typeface="Courier New"/>
+                <a:cs typeface="Courier New"/>
+              </a:rPr>
+              <a:t>WHERE </a:t>
+            </a:r>
+            <a:r>
+              <a:rPr lang="de-DE" b="1" dirty="0" err="1">
+                <a:latin typeface="Courier New"/>
+                <a:cs typeface="Courier New"/>
+              </a:rPr>
+              <a:t>name</a:t>
+            </a:r>
+            <a:r>
+              <a:rPr lang="de-DE" b="1" dirty="0">
+                <a:latin typeface="Courier New"/>
+                <a:cs typeface="Courier New"/>
+              </a:rPr>
+              <a:t> = $1 AND </a:t>
+            </a:r>
+            <a:r>
+              <a:rPr lang="de-DE" b="1" dirty="0" err="1">
+                <a:latin typeface="Courier New"/>
+                <a:cs typeface="Courier New"/>
+              </a:rPr>
+              <a:t>hiredate</a:t>
+            </a:r>
+            <a:r>
+              <a:rPr lang="de-DE" b="1" dirty="0">
+                <a:latin typeface="Courier New"/>
+                <a:cs typeface="Courier New"/>
+              </a:rPr>
+              <a:t> &gt; $2 </a:t>
+            </a:r>
+          </a:p>
+        </p:txBody>
+      </p:sp>
+      <p:sp>
+        <p:nvSpPr>
+          <p:cNvPr id="5" name="Rechteck 4"/>
+          <p:cNvSpPr/>
+          <p:nvPr/>
+        </p:nvSpPr>
+        <p:spPr>
+          <a:xfrm>
+            <a:off x="422552" y="3691073"/>
+            <a:ext cx="8554885" cy="369332"/>
+          </a:xfrm>
+          <a:prstGeom prst="rect">
+            <a:avLst/>
+          </a:prstGeom>
+        </p:spPr>
+        <p:txBody>
+          <a:bodyPr wrap="square">
+            <a:spAutoFit/>
+          </a:bodyPr>
+          <a:lstStyle/>
+          <a:p>
+            <a:r>
+              <a:rPr lang="de-DE" dirty="0">
+                <a:latin typeface="Courier New"/>
+                <a:cs typeface="Courier New"/>
+              </a:rPr>
+              <a:t> SELECT </a:t>
+            </a:r>
+            <a:r>
+              <a:rPr lang="de-DE" dirty="0" err="1">
+                <a:latin typeface="Courier New"/>
+                <a:cs typeface="Courier New"/>
+              </a:rPr>
+              <a:t>detail</a:t>
+            </a:r>
+            <a:r>
+              <a:rPr lang="de-DE" dirty="0">
+                <a:latin typeface="Courier New"/>
+                <a:cs typeface="Courier New"/>
+              </a:rPr>
+              <a:t> FROM </a:t>
+            </a:r>
+            <a:r>
+              <a:rPr lang="de-DE" dirty="0" err="1">
+                <a:latin typeface="Courier New"/>
+                <a:cs typeface="Courier New"/>
+              </a:rPr>
+              <a:t>emp</a:t>
+            </a:r>
+            <a:r>
+              <a:rPr lang="de-DE" dirty="0">
+                <a:latin typeface="Courier New"/>
+                <a:cs typeface="Courier New"/>
+              </a:rPr>
+              <a:t> </a:t>
+            </a:r>
+            <a:r>
+              <a:rPr lang="de-DE" b="1" dirty="0">
+                <a:latin typeface="Courier New"/>
+                <a:cs typeface="Courier New"/>
+              </a:rPr>
+              <a:t>WHERE </a:t>
+            </a:r>
+            <a:r>
+              <a:rPr lang="de-DE" b="1" dirty="0" err="1">
+                <a:latin typeface="Courier New"/>
+                <a:cs typeface="Courier New"/>
+              </a:rPr>
+              <a:t>name</a:t>
+            </a:r>
+            <a:r>
+              <a:rPr lang="de-DE" b="1" dirty="0">
+                <a:latin typeface="Courier New"/>
+                <a:cs typeface="Courier New"/>
+              </a:rPr>
+              <a:t> = $</a:t>
+            </a:r>
+            <a:r>
+              <a:rPr lang="de-DE" b="1" dirty="0" err="1">
+                <a:latin typeface="Courier New"/>
+                <a:cs typeface="Courier New"/>
+              </a:rPr>
+              <a:t>nval</a:t>
+            </a:r>
+            <a:r>
+              <a:rPr lang="de-DE" b="1" dirty="0">
+                <a:latin typeface="Courier New"/>
+                <a:cs typeface="Courier New"/>
+              </a:rPr>
+              <a:t> AND </a:t>
+            </a:r>
+            <a:r>
+              <a:rPr lang="de-DE" b="1" dirty="0" err="1">
+                <a:latin typeface="Courier New"/>
+                <a:cs typeface="Courier New"/>
+              </a:rPr>
+              <a:t>age</a:t>
+            </a:r>
+            <a:r>
+              <a:rPr lang="de-DE" b="1" dirty="0">
+                <a:latin typeface="Courier New"/>
+                <a:cs typeface="Courier New"/>
+              </a:rPr>
+              <a:t> &gt; $</a:t>
+            </a:r>
+            <a:r>
+              <a:rPr lang="de-DE" b="1" dirty="0" err="1">
+                <a:latin typeface="Courier New"/>
+                <a:cs typeface="Courier New"/>
+              </a:rPr>
+              <a:t>aval</a:t>
+            </a:r>
+            <a:endParaRPr lang="de-DE" b="1" dirty="0">
+              <a:latin typeface="Courier New"/>
+              <a:cs typeface="Courier New"/>
+            </a:endParaRPr>
           </a:p>
         </p:txBody>
       </p:sp>
     </p:spTree>
     <p:extLst>
       <p:ext uri="{BB962C8B-B14F-4D97-AF65-F5344CB8AC3E}">
-        <p14:creationId xmlns:p14="http://schemas.microsoft.com/office/powerpoint/2010/main" val="3563268453"/>
+        <p14:creationId xmlns:p14="http://schemas.microsoft.com/office/powerpoint/2010/main" val="1090567114"/>
       </p:ext>
     </p:extLst>
   </p:cSld>
@@ -5518,304 +4785,9 @@
   <p:timing>
     <p:tnLst>
       <p:par>
-        <p:cTn xmlns:p14="http://schemas.microsoft.com/office/powerpoint/2010/main" id="1" dur="indefinite" restart="never" nodeType="tmRoot">
-          <p:childTnLst>
-            <p:seq concurrent="1" nextAc="seek">
-              <p:cTn id="2" dur="indefinite" nodeType="mainSeq">
-                <p:childTnLst>
-                  <p:par>
-                    <p:cTn id="3" fill="hold">
-                      <p:stCondLst>
-                        <p:cond delay="indefinite"/>
-                      </p:stCondLst>
-                      <p:childTnLst>
-                        <p:par>
-                          <p:cTn id="4" fill="hold">
-                            <p:stCondLst>
-                              <p:cond delay="0"/>
-                            </p:stCondLst>
-                            <p:childTnLst>
-                              <p:par>
-                                <p:cTn id="5" presetID="10" presetClass="entr" presetSubtype="0" fill="hold" grpId="0" nodeType="clickEffect">
-                                  <p:stCondLst>
-                                    <p:cond delay="0"/>
-                                  </p:stCondLst>
-                                  <p:childTnLst>
-                                    <p:set>
-                                      <p:cBhvr>
-                                        <p:cTn id="6" dur="1" fill="hold">
-                                          <p:stCondLst>
-                                            <p:cond delay="0"/>
-                                          </p:stCondLst>
-                                        </p:cTn>
-                                        <p:tgtEl>
-                                          <p:spTgt spid="3">
-                                            <p:txEl>
-                                              <p:pRg st="0" end="0"/>
-                                            </p:txEl>
-                                          </p:spTgt>
-                                        </p:tgtEl>
-                                        <p:attrNameLst>
-                                          <p:attrName>style.visibility</p:attrName>
-                                        </p:attrNameLst>
-                                      </p:cBhvr>
-                                      <p:to>
-                                        <p:strVal val="visible"/>
-                                      </p:to>
-                                    </p:set>
-                                    <p:animEffect transition="in" filter="fade">
-                                      <p:cBhvr>
-                                        <p:cTn id="7" dur="500"/>
-                                        <p:tgtEl>
-                                          <p:spTgt spid="3">
-                                            <p:txEl>
-                                              <p:pRg st="0" end="0"/>
-                                            </p:txEl>
-                                          </p:spTgt>
-                                        </p:tgtEl>
-                                      </p:cBhvr>
-                                    </p:animEffect>
-                                  </p:childTnLst>
-                                </p:cTn>
-                              </p:par>
-                            </p:childTnLst>
-                          </p:cTn>
-                        </p:par>
-                      </p:childTnLst>
-                    </p:cTn>
-                  </p:par>
-                  <p:par>
-                    <p:cTn id="8" fill="hold">
-                      <p:stCondLst>
-                        <p:cond delay="indefinite"/>
-                      </p:stCondLst>
-                      <p:childTnLst>
-                        <p:par>
-                          <p:cTn id="9" fill="hold">
-                            <p:stCondLst>
-                              <p:cond delay="0"/>
-                            </p:stCondLst>
-                            <p:childTnLst>
-                              <p:par>
-                                <p:cTn id="10" presetID="10" presetClass="entr" presetSubtype="0" fill="hold" grpId="0" nodeType="clickEffect">
-                                  <p:stCondLst>
-                                    <p:cond delay="0"/>
-                                  </p:stCondLst>
-                                  <p:childTnLst>
-                                    <p:set>
-                                      <p:cBhvr>
-                                        <p:cTn id="11" dur="1" fill="hold">
-                                          <p:stCondLst>
-                                            <p:cond delay="0"/>
-                                          </p:stCondLst>
-                                        </p:cTn>
-                                        <p:tgtEl>
-                                          <p:spTgt spid="3">
-                                            <p:txEl>
-                                              <p:pRg st="1" end="1"/>
-                                            </p:txEl>
-                                          </p:spTgt>
-                                        </p:tgtEl>
-                                        <p:attrNameLst>
-                                          <p:attrName>style.visibility</p:attrName>
-                                        </p:attrNameLst>
-                                      </p:cBhvr>
-                                      <p:to>
-                                        <p:strVal val="visible"/>
-                                      </p:to>
-                                    </p:set>
-                                    <p:animEffect transition="in" filter="fade">
-                                      <p:cBhvr>
-                                        <p:cTn id="12" dur="500"/>
-                                        <p:tgtEl>
-                                          <p:spTgt spid="3">
-                                            <p:txEl>
-                                              <p:pRg st="1" end="1"/>
-                                            </p:txEl>
-                                          </p:spTgt>
-                                        </p:tgtEl>
-                                      </p:cBhvr>
-                                    </p:animEffect>
-                                  </p:childTnLst>
-                                </p:cTn>
-                              </p:par>
-                            </p:childTnLst>
-                          </p:cTn>
-                        </p:par>
-                      </p:childTnLst>
-                    </p:cTn>
-                  </p:par>
-                  <p:par>
-                    <p:cTn id="13" fill="hold">
-                      <p:stCondLst>
-                        <p:cond delay="indefinite"/>
-                      </p:stCondLst>
-                      <p:childTnLst>
-                        <p:par>
-                          <p:cTn id="14" fill="hold">
-                            <p:stCondLst>
-                              <p:cond delay="0"/>
-                            </p:stCondLst>
-                            <p:childTnLst>
-                              <p:par>
-                                <p:cTn id="15" presetID="10" presetClass="entr" presetSubtype="0" fill="hold" grpId="0" nodeType="clickEffect">
-                                  <p:stCondLst>
-                                    <p:cond delay="0"/>
-                                  </p:stCondLst>
-                                  <p:childTnLst>
-                                    <p:set>
-                                      <p:cBhvr>
-                                        <p:cTn id="16" dur="1" fill="hold">
-                                          <p:stCondLst>
-                                            <p:cond delay="0"/>
-                                          </p:stCondLst>
-                                        </p:cTn>
-                                        <p:tgtEl>
-                                          <p:spTgt spid="3">
-                                            <p:txEl>
-                                              <p:pRg st="2" end="2"/>
-                                            </p:txEl>
-                                          </p:spTgt>
-                                        </p:tgtEl>
-                                        <p:attrNameLst>
-                                          <p:attrName>style.visibility</p:attrName>
-                                        </p:attrNameLst>
-                                      </p:cBhvr>
-                                      <p:to>
-                                        <p:strVal val="visible"/>
-                                      </p:to>
-                                    </p:set>
-                                    <p:animEffect transition="in" filter="fade">
-                                      <p:cBhvr>
-                                        <p:cTn id="17" dur="500"/>
-                                        <p:tgtEl>
-                                          <p:spTgt spid="3">
-                                            <p:txEl>
-                                              <p:pRg st="2" end="2"/>
-                                            </p:txEl>
-                                          </p:spTgt>
-                                        </p:tgtEl>
-                                      </p:cBhvr>
-                                    </p:animEffect>
-                                  </p:childTnLst>
-                                </p:cTn>
-                              </p:par>
-                              <p:par>
-                                <p:cTn id="18" presetID="10" presetClass="entr" presetSubtype="0" fill="hold" grpId="0" nodeType="withEffect">
-                                  <p:stCondLst>
-                                    <p:cond delay="0"/>
-                                  </p:stCondLst>
-                                  <p:childTnLst>
-                                    <p:set>
-                                      <p:cBhvr>
-                                        <p:cTn id="19" dur="1" fill="hold">
-                                          <p:stCondLst>
-                                            <p:cond delay="0"/>
-                                          </p:stCondLst>
-                                        </p:cTn>
-                                        <p:tgtEl>
-                                          <p:spTgt spid="3">
-                                            <p:txEl>
-                                              <p:pRg st="3" end="3"/>
-                                            </p:txEl>
-                                          </p:spTgt>
-                                        </p:tgtEl>
-                                        <p:attrNameLst>
-                                          <p:attrName>style.visibility</p:attrName>
-                                        </p:attrNameLst>
-                                      </p:cBhvr>
-                                      <p:to>
-                                        <p:strVal val="visible"/>
-                                      </p:to>
-                                    </p:set>
-                                    <p:animEffect transition="in" filter="fade">
-                                      <p:cBhvr>
-                                        <p:cTn id="20" dur="500"/>
-                                        <p:tgtEl>
-                                          <p:spTgt spid="3">
-                                            <p:txEl>
-                                              <p:pRg st="3" end="3"/>
-                                            </p:txEl>
-                                          </p:spTgt>
-                                        </p:tgtEl>
-                                      </p:cBhvr>
-                                    </p:animEffect>
-                                  </p:childTnLst>
-                                </p:cTn>
-                              </p:par>
-                              <p:par>
-                                <p:cTn id="21" presetID="10" presetClass="entr" presetSubtype="0" fill="hold" grpId="0" nodeType="withEffect">
-                                  <p:stCondLst>
-                                    <p:cond delay="0"/>
-                                  </p:stCondLst>
-                                  <p:childTnLst>
-                                    <p:set>
-                                      <p:cBhvr>
-                                        <p:cTn id="22" dur="1" fill="hold">
-                                          <p:stCondLst>
-                                            <p:cond delay="0"/>
-                                          </p:stCondLst>
-                                        </p:cTn>
-                                        <p:tgtEl>
-                                          <p:spTgt spid="3">
-                                            <p:txEl>
-                                              <p:pRg st="4" end="4"/>
-                                            </p:txEl>
-                                          </p:spTgt>
-                                        </p:tgtEl>
-                                        <p:attrNameLst>
-                                          <p:attrName>style.visibility</p:attrName>
-                                        </p:attrNameLst>
-                                      </p:cBhvr>
-                                      <p:to>
-                                        <p:strVal val="visible"/>
-                                      </p:to>
-                                    </p:set>
-                                    <p:animEffect transition="in" filter="fade">
-                                      <p:cBhvr>
-                                        <p:cTn id="23" dur="500"/>
-                                        <p:tgtEl>
-                                          <p:spTgt spid="3">
-                                            <p:txEl>
-                                              <p:pRg st="4" end="4"/>
-                                            </p:txEl>
-                                          </p:spTgt>
-                                        </p:tgtEl>
-                                      </p:cBhvr>
-                                    </p:animEffect>
-                                  </p:childTnLst>
-                                </p:cTn>
-                              </p:par>
-                            </p:childTnLst>
-                          </p:cTn>
-                        </p:par>
-                      </p:childTnLst>
-                    </p:cTn>
-                  </p:par>
-                </p:childTnLst>
-              </p:cTn>
-              <p:prevCondLst>
-                <p:cond evt="onPrev" delay="0">
-                  <p:tgtEl>
-                    <p:sldTgt/>
-                  </p:tgtEl>
-                </p:cond>
-              </p:prevCondLst>
-              <p:nextCondLst>
-                <p:cond evt="onNext" delay="0">
-                  <p:tgtEl>
-                    <p:sldTgt/>
-                  </p:tgtEl>
-                </p:cond>
-              </p:nextCondLst>
-            </p:seq>
-          </p:childTnLst>
-        </p:cTn>
+        <p:cTn xmlns:p14="http://schemas.microsoft.com/office/powerpoint/2010/main" id="1" dur="indefinite" restart="never" nodeType="tmRoot"/>
       </p:par>
     </p:tnLst>
-    <p:bldLst>
-      <p:bldP spid="3" grpId="0" build="p"/>
-    </p:bldLst>
   </p:timing>
 </p:sld>
 </file>
@@ -5854,594 +4826,6 @@
           <a:p>
             <a:r>
               <a:rPr lang="en-US" dirty="0" smtClean="0"/>
-              <a:t>Parameterized Queries</a:t>
-            </a:r>
-            <a:endParaRPr lang="en-US" dirty="0"/>
-          </a:p>
-        </p:txBody>
-      </p:sp>
-      <p:sp>
-        <p:nvSpPr>
-          <p:cNvPr id="3" name="Content Placeholder 2"/>
-          <p:cNvSpPr>
-            <a:spLocks noGrp="1"/>
-          </p:cNvSpPr>
-          <p:nvPr>
-            <p:ph idx="1"/>
-          </p:nvPr>
-        </p:nvSpPr>
-        <p:spPr>
-          <a:xfrm>
-            <a:off x="457200" y="955193"/>
-            <a:ext cx="8007739" cy="3493655"/>
-          </a:xfrm>
-        </p:spPr>
-        <p:txBody>
-          <a:bodyPr/>
-          <a:lstStyle/>
-          <a:p>
-            <a:pPr>
-              <a:lnSpc>
-                <a:spcPct val="140000"/>
-              </a:lnSpc>
-            </a:pPr>
-            <a:r>
-              <a:rPr lang="en-US" dirty="0" smtClean="0"/>
-              <a:t>Decouple parameters from the actual Query</a:t>
-            </a:r>
-          </a:p>
-          <a:p>
-            <a:pPr>
-              <a:lnSpc>
-                <a:spcPct val="140000"/>
-              </a:lnSpc>
-            </a:pPr>
-            <a:r>
-              <a:rPr lang="en-US" dirty="0" smtClean="0"/>
-              <a:t>Two variants</a:t>
-            </a:r>
-          </a:p>
-          <a:p>
-            <a:pPr lvl="1">
-              <a:lnSpc>
-                <a:spcPct val="140000"/>
-              </a:lnSpc>
-            </a:pPr>
-            <a:r>
-              <a:rPr lang="en-US" dirty="0" smtClean="0"/>
-              <a:t>Positional Parameters ($1, $2,…)</a:t>
-            </a:r>
-          </a:p>
-          <a:p>
-            <a:pPr lvl="1">
-              <a:lnSpc>
-                <a:spcPct val="140000"/>
-              </a:lnSpc>
-            </a:pPr>
-            <a:r>
-              <a:rPr lang="en-US" dirty="0" smtClean="0"/>
-              <a:t>Named Parameters ($</a:t>
-            </a:r>
-            <a:r>
-              <a:rPr lang="en-US" dirty="0" err="1" smtClean="0"/>
-              <a:t>fname</a:t>
-            </a:r>
-            <a:r>
-              <a:rPr lang="en-US" dirty="0" smtClean="0"/>
-              <a:t>, $</a:t>
-            </a:r>
-            <a:r>
-              <a:rPr lang="en-US" dirty="0" err="1" smtClean="0"/>
-              <a:t>lname</a:t>
-            </a:r>
-            <a:r>
-              <a:rPr lang="en-US" dirty="0" smtClean="0"/>
-              <a:t>)</a:t>
-            </a:r>
-          </a:p>
-        </p:txBody>
-      </p:sp>
-      <p:sp>
-        <p:nvSpPr>
-          <p:cNvPr id="4" name="Rechteck 3"/>
-          <p:cNvSpPr/>
-          <p:nvPr/>
-        </p:nvSpPr>
-        <p:spPr>
-          <a:xfrm>
-            <a:off x="457200" y="3244984"/>
-            <a:ext cx="8396825" cy="369332"/>
-          </a:xfrm>
-          <a:prstGeom prst="rect">
-            <a:avLst/>
-          </a:prstGeom>
-        </p:spPr>
-        <p:txBody>
-          <a:bodyPr wrap="square">
-            <a:spAutoFit/>
-          </a:bodyPr>
-          <a:lstStyle/>
-          <a:p>
-            <a:r>
-              <a:rPr lang="de-DE" dirty="0">
-                <a:latin typeface="Courier New"/>
-                <a:cs typeface="Courier New"/>
-              </a:rPr>
-              <a:t> SELECT </a:t>
-            </a:r>
-            <a:r>
-              <a:rPr lang="de-DE" dirty="0" err="1">
-                <a:latin typeface="Courier New"/>
-                <a:cs typeface="Courier New"/>
-              </a:rPr>
-              <a:t>detail</a:t>
-            </a:r>
-            <a:r>
-              <a:rPr lang="de-DE" dirty="0">
-                <a:latin typeface="Courier New"/>
-                <a:cs typeface="Courier New"/>
-              </a:rPr>
-              <a:t> FROM </a:t>
-            </a:r>
-            <a:r>
-              <a:rPr lang="de-DE" dirty="0" err="1">
-                <a:latin typeface="Courier New"/>
-                <a:cs typeface="Courier New"/>
-              </a:rPr>
-              <a:t>emp</a:t>
-            </a:r>
-            <a:r>
-              <a:rPr lang="de-DE" dirty="0">
-                <a:latin typeface="Courier New"/>
-                <a:cs typeface="Courier New"/>
-              </a:rPr>
-              <a:t> </a:t>
-            </a:r>
-            <a:r>
-              <a:rPr lang="de-DE" b="1" dirty="0">
-                <a:latin typeface="Courier New"/>
-                <a:cs typeface="Courier New"/>
-              </a:rPr>
-              <a:t>WHERE </a:t>
-            </a:r>
-            <a:r>
-              <a:rPr lang="de-DE" b="1" dirty="0" err="1">
-                <a:latin typeface="Courier New"/>
-                <a:cs typeface="Courier New"/>
-              </a:rPr>
-              <a:t>name</a:t>
-            </a:r>
-            <a:r>
-              <a:rPr lang="de-DE" b="1" dirty="0">
-                <a:latin typeface="Courier New"/>
-                <a:cs typeface="Courier New"/>
-              </a:rPr>
-              <a:t> = $1 AND </a:t>
-            </a:r>
-            <a:r>
-              <a:rPr lang="de-DE" b="1" dirty="0" err="1">
-                <a:latin typeface="Courier New"/>
-                <a:cs typeface="Courier New"/>
-              </a:rPr>
-              <a:t>hiredate</a:t>
-            </a:r>
-            <a:r>
-              <a:rPr lang="de-DE" b="1" dirty="0">
-                <a:latin typeface="Courier New"/>
-                <a:cs typeface="Courier New"/>
-              </a:rPr>
-              <a:t> &gt; $2 </a:t>
-            </a:r>
-          </a:p>
-        </p:txBody>
-      </p:sp>
-      <p:sp>
-        <p:nvSpPr>
-          <p:cNvPr id="5" name="Rechteck 4"/>
-          <p:cNvSpPr/>
-          <p:nvPr/>
-        </p:nvSpPr>
-        <p:spPr>
-          <a:xfrm>
-            <a:off x="422552" y="3691073"/>
-            <a:ext cx="8554885" cy="369332"/>
-          </a:xfrm>
-          <a:prstGeom prst="rect">
-            <a:avLst/>
-          </a:prstGeom>
-        </p:spPr>
-        <p:txBody>
-          <a:bodyPr wrap="square">
-            <a:spAutoFit/>
-          </a:bodyPr>
-          <a:lstStyle/>
-          <a:p>
-            <a:r>
-              <a:rPr lang="de-DE" dirty="0">
-                <a:latin typeface="Courier New"/>
-                <a:cs typeface="Courier New"/>
-              </a:rPr>
-              <a:t> SELECT </a:t>
-            </a:r>
-            <a:r>
-              <a:rPr lang="de-DE" dirty="0" err="1">
-                <a:latin typeface="Courier New"/>
-                <a:cs typeface="Courier New"/>
-              </a:rPr>
-              <a:t>detail</a:t>
-            </a:r>
-            <a:r>
-              <a:rPr lang="de-DE" dirty="0">
-                <a:latin typeface="Courier New"/>
-                <a:cs typeface="Courier New"/>
-              </a:rPr>
-              <a:t> FROM </a:t>
-            </a:r>
-            <a:r>
-              <a:rPr lang="de-DE" dirty="0" err="1">
-                <a:latin typeface="Courier New"/>
-                <a:cs typeface="Courier New"/>
-              </a:rPr>
-              <a:t>emp</a:t>
-            </a:r>
-            <a:r>
-              <a:rPr lang="de-DE" dirty="0">
-                <a:latin typeface="Courier New"/>
-                <a:cs typeface="Courier New"/>
-              </a:rPr>
-              <a:t> </a:t>
-            </a:r>
-            <a:r>
-              <a:rPr lang="de-DE" b="1" dirty="0">
-                <a:latin typeface="Courier New"/>
-                <a:cs typeface="Courier New"/>
-              </a:rPr>
-              <a:t>WHERE </a:t>
-            </a:r>
-            <a:r>
-              <a:rPr lang="de-DE" b="1" dirty="0" err="1">
-                <a:latin typeface="Courier New"/>
-                <a:cs typeface="Courier New"/>
-              </a:rPr>
-              <a:t>name</a:t>
-            </a:r>
-            <a:r>
-              <a:rPr lang="de-DE" b="1" dirty="0">
-                <a:latin typeface="Courier New"/>
-                <a:cs typeface="Courier New"/>
-              </a:rPr>
-              <a:t> = $</a:t>
-            </a:r>
-            <a:r>
-              <a:rPr lang="de-DE" b="1" dirty="0" err="1">
-                <a:latin typeface="Courier New"/>
-                <a:cs typeface="Courier New"/>
-              </a:rPr>
-              <a:t>nval</a:t>
-            </a:r>
-            <a:r>
-              <a:rPr lang="de-DE" b="1" dirty="0">
-                <a:latin typeface="Courier New"/>
-                <a:cs typeface="Courier New"/>
-              </a:rPr>
-              <a:t> AND </a:t>
-            </a:r>
-            <a:r>
-              <a:rPr lang="de-DE" b="1" dirty="0" err="1">
-                <a:latin typeface="Courier New"/>
-                <a:cs typeface="Courier New"/>
-              </a:rPr>
-              <a:t>age</a:t>
-            </a:r>
-            <a:r>
-              <a:rPr lang="de-DE" b="1" dirty="0">
-                <a:latin typeface="Courier New"/>
-                <a:cs typeface="Courier New"/>
-              </a:rPr>
-              <a:t> &gt; $</a:t>
-            </a:r>
-            <a:r>
-              <a:rPr lang="de-DE" b="1" dirty="0" err="1">
-                <a:latin typeface="Courier New"/>
-                <a:cs typeface="Courier New"/>
-              </a:rPr>
-              <a:t>aval</a:t>
-            </a:r>
-            <a:endParaRPr lang="de-DE" b="1" dirty="0">
-              <a:latin typeface="Courier New"/>
-              <a:cs typeface="Courier New"/>
-            </a:endParaRPr>
-          </a:p>
-        </p:txBody>
-      </p:sp>
-    </p:spTree>
-    <p:extLst>
-      <p:ext uri="{BB962C8B-B14F-4D97-AF65-F5344CB8AC3E}">
-        <p14:creationId xmlns:p14="http://schemas.microsoft.com/office/powerpoint/2010/main" val="1090567114"/>
-      </p:ext>
-    </p:extLst>
-  </p:cSld>
-  <p:clrMapOvr>
-    <a:masterClrMapping/>
-  </p:clrMapOvr>
-  <p:timing>
-    <p:tnLst>
-      <p:par>
-        <p:cTn xmlns:p14="http://schemas.microsoft.com/office/powerpoint/2010/main" id="1" dur="indefinite" restart="never" nodeType="tmRoot">
-          <p:childTnLst>
-            <p:seq concurrent="1" nextAc="seek">
-              <p:cTn id="2" dur="indefinite" nodeType="mainSeq">
-                <p:childTnLst>
-                  <p:par>
-                    <p:cTn id="3" fill="hold">
-                      <p:stCondLst>
-                        <p:cond delay="indefinite"/>
-                      </p:stCondLst>
-                      <p:childTnLst>
-                        <p:par>
-                          <p:cTn id="4" fill="hold">
-                            <p:stCondLst>
-                              <p:cond delay="0"/>
-                            </p:stCondLst>
-                            <p:childTnLst>
-                              <p:par>
-                                <p:cTn id="5" presetID="10" presetClass="entr" presetSubtype="0" fill="hold" grpId="0" nodeType="clickEffect">
-                                  <p:stCondLst>
-                                    <p:cond delay="0"/>
-                                  </p:stCondLst>
-                                  <p:childTnLst>
-                                    <p:set>
-                                      <p:cBhvr>
-                                        <p:cTn id="6" dur="1" fill="hold">
-                                          <p:stCondLst>
-                                            <p:cond delay="0"/>
-                                          </p:stCondLst>
-                                        </p:cTn>
-                                        <p:tgtEl>
-                                          <p:spTgt spid="3">
-                                            <p:txEl>
-                                              <p:pRg st="0" end="0"/>
-                                            </p:txEl>
-                                          </p:spTgt>
-                                        </p:tgtEl>
-                                        <p:attrNameLst>
-                                          <p:attrName>style.visibility</p:attrName>
-                                        </p:attrNameLst>
-                                      </p:cBhvr>
-                                      <p:to>
-                                        <p:strVal val="visible"/>
-                                      </p:to>
-                                    </p:set>
-                                    <p:animEffect transition="in" filter="fade">
-                                      <p:cBhvr>
-                                        <p:cTn id="7" dur="500"/>
-                                        <p:tgtEl>
-                                          <p:spTgt spid="3">
-                                            <p:txEl>
-                                              <p:pRg st="0" end="0"/>
-                                            </p:txEl>
-                                          </p:spTgt>
-                                        </p:tgtEl>
-                                      </p:cBhvr>
-                                    </p:animEffect>
-                                  </p:childTnLst>
-                                </p:cTn>
-                              </p:par>
-                            </p:childTnLst>
-                          </p:cTn>
-                        </p:par>
-                      </p:childTnLst>
-                    </p:cTn>
-                  </p:par>
-                  <p:par>
-                    <p:cTn id="8" fill="hold">
-                      <p:stCondLst>
-                        <p:cond delay="indefinite"/>
-                      </p:stCondLst>
-                      <p:childTnLst>
-                        <p:par>
-                          <p:cTn id="9" fill="hold">
-                            <p:stCondLst>
-                              <p:cond delay="0"/>
-                            </p:stCondLst>
-                            <p:childTnLst>
-                              <p:par>
-                                <p:cTn id="10" presetID="10" presetClass="entr" presetSubtype="0" fill="hold" grpId="0" nodeType="clickEffect">
-                                  <p:stCondLst>
-                                    <p:cond delay="0"/>
-                                  </p:stCondLst>
-                                  <p:childTnLst>
-                                    <p:set>
-                                      <p:cBhvr>
-                                        <p:cTn id="11" dur="1" fill="hold">
-                                          <p:stCondLst>
-                                            <p:cond delay="0"/>
-                                          </p:stCondLst>
-                                        </p:cTn>
-                                        <p:tgtEl>
-                                          <p:spTgt spid="3">
-                                            <p:txEl>
-                                              <p:pRg st="1" end="1"/>
-                                            </p:txEl>
-                                          </p:spTgt>
-                                        </p:tgtEl>
-                                        <p:attrNameLst>
-                                          <p:attrName>style.visibility</p:attrName>
-                                        </p:attrNameLst>
-                                      </p:cBhvr>
-                                      <p:to>
-                                        <p:strVal val="visible"/>
-                                      </p:to>
-                                    </p:set>
-                                    <p:animEffect transition="in" filter="fade">
-                                      <p:cBhvr>
-                                        <p:cTn id="12" dur="500"/>
-                                        <p:tgtEl>
-                                          <p:spTgt spid="3">
-                                            <p:txEl>
-                                              <p:pRg st="1" end="1"/>
-                                            </p:txEl>
-                                          </p:spTgt>
-                                        </p:tgtEl>
-                                      </p:cBhvr>
-                                    </p:animEffect>
-                                  </p:childTnLst>
-                                </p:cTn>
-                              </p:par>
-                              <p:par>
-                                <p:cTn id="13" presetID="10" presetClass="entr" presetSubtype="0" fill="hold" grpId="0" nodeType="withEffect">
-                                  <p:stCondLst>
-                                    <p:cond delay="0"/>
-                                  </p:stCondLst>
-                                  <p:childTnLst>
-                                    <p:set>
-                                      <p:cBhvr>
-                                        <p:cTn id="14" dur="1" fill="hold">
-                                          <p:stCondLst>
-                                            <p:cond delay="0"/>
-                                          </p:stCondLst>
-                                        </p:cTn>
-                                        <p:tgtEl>
-                                          <p:spTgt spid="3">
-                                            <p:txEl>
-                                              <p:pRg st="2" end="2"/>
-                                            </p:txEl>
-                                          </p:spTgt>
-                                        </p:tgtEl>
-                                        <p:attrNameLst>
-                                          <p:attrName>style.visibility</p:attrName>
-                                        </p:attrNameLst>
-                                      </p:cBhvr>
-                                      <p:to>
-                                        <p:strVal val="visible"/>
-                                      </p:to>
-                                    </p:set>
-                                    <p:animEffect transition="in" filter="fade">
-                                      <p:cBhvr>
-                                        <p:cTn id="15" dur="500"/>
-                                        <p:tgtEl>
-                                          <p:spTgt spid="3">
-                                            <p:txEl>
-                                              <p:pRg st="2" end="2"/>
-                                            </p:txEl>
-                                          </p:spTgt>
-                                        </p:tgtEl>
-                                      </p:cBhvr>
-                                    </p:animEffect>
-                                  </p:childTnLst>
-                                </p:cTn>
-                              </p:par>
-                              <p:par>
-                                <p:cTn id="16" presetID="10" presetClass="entr" presetSubtype="0" fill="hold" grpId="0" nodeType="withEffect">
-                                  <p:stCondLst>
-                                    <p:cond delay="0"/>
-                                  </p:stCondLst>
-                                  <p:childTnLst>
-                                    <p:set>
-                                      <p:cBhvr>
-                                        <p:cTn id="17" dur="1" fill="hold">
-                                          <p:stCondLst>
-                                            <p:cond delay="0"/>
-                                          </p:stCondLst>
-                                        </p:cTn>
-                                        <p:tgtEl>
-                                          <p:spTgt spid="3">
-                                            <p:txEl>
-                                              <p:pRg st="3" end="3"/>
-                                            </p:txEl>
-                                          </p:spTgt>
-                                        </p:tgtEl>
-                                        <p:attrNameLst>
-                                          <p:attrName>style.visibility</p:attrName>
-                                        </p:attrNameLst>
-                                      </p:cBhvr>
-                                      <p:to>
-                                        <p:strVal val="visible"/>
-                                      </p:to>
-                                    </p:set>
-                                    <p:animEffect transition="in" filter="fade">
-                                      <p:cBhvr>
-                                        <p:cTn id="18" dur="500"/>
-                                        <p:tgtEl>
-                                          <p:spTgt spid="3">
-                                            <p:txEl>
-                                              <p:pRg st="3" end="3"/>
-                                            </p:txEl>
-                                          </p:spTgt>
-                                        </p:tgtEl>
-                                      </p:cBhvr>
-                                    </p:animEffect>
-                                  </p:childTnLst>
-                                </p:cTn>
-                              </p:par>
-                            </p:childTnLst>
-                          </p:cTn>
-                        </p:par>
-                      </p:childTnLst>
-                    </p:cTn>
-                  </p:par>
-                </p:childTnLst>
-              </p:cTn>
-              <p:prevCondLst>
-                <p:cond evt="onPrev" delay="0">
-                  <p:tgtEl>
-                    <p:sldTgt/>
-                  </p:tgtEl>
-                </p:cond>
-              </p:prevCondLst>
-              <p:nextCondLst>
-                <p:cond evt="onNext" delay="0">
-                  <p:tgtEl>
-                    <p:sldTgt/>
-                  </p:tgtEl>
-                </p:cond>
-              </p:nextCondLst>
-            </p:seq>
-          </p:childTnLst>
-        </p:cTn>
-      </p:par>
-    </p:tnLst>
-    <p:bldLst>
-      <p:bldP spid="3" grpId="0" build="p"/>
-    </p:bldLst>
-  </p:timing>
-</p:sld>
-</file>
-
-<file path=ppt/slides/slide15.xml><?xml version="1.0" encoding="utf-8"?>
-<p:sld xmlns:a="http://schemas.openxmlformats.org/drawingml/2006/main" xmlns:r="http://schemas.openxmlformats.org/officeDocument/2006/relationships" xmlns:p="http://schemas.openxmlformats.org/presentationml/2006/main">
-  <p:cSld>
-    <p:spTree>
-      <p:nvGrpSpPr>
-        <p:cNvPr id="1" name=""/>
-        <p:cNvGrpSpPr/>
-        <p:nvPr/>
-      </p:nvGrpSpPr>
-      <p:grpSpPr>
-        <a:xfrm>
-          <a:off x="0" y="0"/>
-          <a:ext cx="0" cy="0"/>
-          <a:chOff x="0" y="0"/>
-          <a:chExt cx="0" cy="0"/>
-        </a:xfrm>
-      </p:grpSpPr>
-      <p:sp>
-        <p:nvSpPr>
-          <p:cNvPr id="2" name="Title 1"/>
-          <p:cNvSpPr>
-            <a:spLocks noGrp="1"/>
-          </p:cNvSpPr>
-          <p:nvPr>
-            <p:ph type="title"/>
-          </p:nvPr>
-        </p:nvSpPr>
-        <p:spPr/>
-        <p:txBody>
-          <a:bodyPr/>
-          <a:lstStyle/>
-          <a:p>
-            <a:r>
-              <a:rPr lang="en-US" dirty="0" smtClean="0"/>
               <a:t>Prepared Queries</a:t>
             </a:r>
             <a:endParaRPr lang="en-US" dirty="0"/>
@@ -6583,223 +4967,14 @@
   <p:timing>
     <p:tnLst>
       <p:par>
-        <p:cTn xmlns:p14="http://schemas.microsoft.com/office/powerpoint/2010/main" id="1" dur="indefinite" restart="never" nodeType="tmRoot">
-          <p:childTnLst>
-            <p:seq concurrent="1" nextAc="seek">
-              <p:cTn id="2" dur="indefinite" nodeType="mainSeq">
-                <p:childTnLst>
-                  <p:par>
-                    <p:cTn id="3" fill="hold">
-                      <p:stCondLst>
-                        <p:cond delay="indefinite"/>
-                      </p:stCondLst>
-                      <p:childTnLst>
-                        <p:par>
-                          <p:cTn id="4" fill="hold">
-                            <p:stCondLst>
-                              <p:cond delay="0"/>
-                            </p:stCondLst>
-                            <p:childTnLst>
-                              <p:par>
-                                <p:cTn id="5" presetID="10" presetClass="entr" presetSubtype="0" fill="hold" grpId="0" nodeType="clickEffect">
-                                  <p:stCondLst>
-                                    <p:cond delay="0"/>
-                                  </p:stCondLst>
-                                  <p:childTnLst>
-                                    <p:set>
-                                      <p:cBhvr>
-                                        <p:cTn id="6" dur="1" fill="hold">
-                                          <p:stCondLst>
-                                            <p:cond delay="0"/>
-                                          </p:stCondLst>
-                                        </p:cTn>
-                                        <p:tgtEl>
-                                          <p:spTgt spid="3">
-                                            <p:txEl>
-                                              <p:pRg st="0" end="0"/>
-                                            </p:txEl>
-                                          </p:spTgt>
-                                        </p:tgtEl>
-                                        <p:attrNameLst>
-                                          <p:attrName>style.visibility</p:attrName>
-                                        </p:attrNameLst>
-                                      </p:cBhvr>
-                                      <p:to>
-                                        <p:strVal val="visible"/>
-                                      </p:to>
-                                    </p:set>
-                                    <p:animEffect transition="in" filter="fade">
-                                      <p:cBhvr>
-                                        <p:cTn id="7" dur="500"/>
-                                        <p:tgtEl>
-                                          <p:spTgt spid="3">
-                                            <p:txEl>
-                                              <p:pRg st="0" end="0"/>
-                                            </p:txEl>
-                                          </p:spTgt>
-                                        </p:tgtEl>
-                                      </p:cBhvr>
-                                    </p:animEffect>
-                                  </p:childTnLst>
-                                </p:cTn>
-                              </p:par>
-                            </p:childTnLst>
-                          </p:cTn>
-                        </p:par>
-                      </p:childTnLst>
-                    </p:cTn>
-                  </p:par>
-                  <p:par>
-                    <p:cTn id="8" fill="hold">
-                      <p:stCondLst>
-                        <p:cond delay="indefinite"/>
-                      </p:stCondLst>
-                      <p:childTnLst>
-                        <p:par>
-                          <p:cTn id="9" fill="hold">
-                            <p:stCondLst>
-                              <p:cond delay="0"/>
-                            </p:stCondLst>
-                            <p:childTnLst>
-                              <p:par>
-                                <p:cTn id="10" presetID="10" presetClass="entr" presetSubtype="0" fill="hold" grpId="0" nodeType="clickEffect">
-                                  <p:stCondLst>
-                                    <p:cond delay="0"/>
-                                  </p:stCondLst>
-                                  <p:childTnLst>
-                                    <p:set>
-                                      <p:cBhvr>
-                                        <p:cTn id="11" dur="1" fill="hold">
-                                          <p:stCondLst>
-                                            <p:cond delay="0"/>
-                                          </p:stCondLst>
-                                        </p:cTn>
-                                        <p:tgtEl>
-                                          <p:spTgt spid="3">
-                                            <p:txEl>
-                                              <p:pRg st="2" end="2"/>
-                                            </p:txEl>
-                                          </p:spTgt>
-                                        </p:tgtEl>
-                                        <p:attrNameLst>
-                                          <p:attrName>style.visibility</p:attrName>
-                                        </p:attrNameLst>
-                                      </p:cBhvr>
-                                      <p:to>
-                                        <p:strVal val="visible"/>
-                                      </p:to>
-                                    </p:set>
-                                    <p:animEffect transition="in" filter="fade">
-                                      <p:cBhvr>
-                                        <p:cTn id="12" dur="500"/>
-                                        <p:tgtEl>
-                                          <p:spTgt spid="3">
-                                            <p:txEl>
-                                              <p:pRg st="2" end="2"/>
-                                            </p:txEl>
-                                          </p:spTgt>
-                                        </p:tgtEl>
-                                      </p:cBhvr>
-                                    </p:animEffect>
-                                  </p:childTnLst>
-                                </p:cTn>
-                              </p:par>
-                            </p:childTnLst>
-                          </p:cTn>
-                        </p:par>
-                      </p:childTnLst>
-                    </p:cTn>
-                  </p:par>
-                  <p:par>
-                    <p:cTn id="13" fill="hold">
-                      <p:stCondLst>
-                        <p:cond delay="indefinite"/>
-                      </p:stCondLst>
-                      <p:childTnLst>
-                        <p:par>
-                          <p:cTn id="14" fill="hold">
-                            <p:stCondLst>
-                              <p:cond delay="0"/>
-                            </p:stCondLst>
-                            <p:childTnLst>
-                              <p:par>
-                                <p:cTn id="15" presetID="10" presetClass="entr" presetSubtype="0" fill="hold" grpId="0" nodeType="clickEffect">
-                                  <p:stCondLst>
-                                    <p:cond delay="0"/>
-                                  </p:stCondLst>
-                                  <p:childTnLst>
-                                    <p:set>
-                                      <p:cBhvr>
-                                        <p:cTn id="16" dur="1" fill="hold">
-                                          <p:stCondLst>
-                                            <p:cond delay="0"/>
-                                          </p:stCondLst>
-                                        </p:cTn>
-                                        <p:tgtEl>
-                                          <p:spTgt spid="3">
-                                            <p:txEl>
-                                              <p:pRg st="3" end="3"/>
-                                            </p:txEl>
-                                          </p:spTgt>
-                                        </p:tgtEl>
-                                        <p:attrNameLst>
-                                          <p:attrName>style.visibility</p:attrName>
-                                        </p:attrNameLst>
-                                      </p:cBhvr>
-                                      <p:to>
-                                        <p:strVal val="visible"/>
-                                      </p:to>
-                                    </p:set>
-                                    <p:animEffect transition="in" filter="fade">
-                                      <p:cBhvr>
-                                        <p:cTn id="17" dur="500"/>
-                                        <p:tgtEl>
-                                          <p:spTgt spid="3">
-                                            <p:txEl>
-                                              <p:pRg st="3" end="3"/>
-                                            </p:txEl>
-                                          </p:spTgt>
-                                        </p:tgtEl>
-                                      </p:cBhvr>
-                                    </p:animEffect>
-                                  </p:childTnLst>
-                                </p:cTn>
-                              </p:par>
-                            </p:childTnLst>
-                          </p:cTn>
-                        </p:par>
-                      </p:childTnLst>
-                    </p:cTn>
-                  </p:par>
-                </p:childTnLst>
-              </p:cTn>
-              <p:prevCondLst>
-                <p:cond evt="onPrev" delay="0">
-                  <p:tgtEl>
-                    <p:sldTgt/>
-                  </p:tgtEl>
-                </p:cond>
-              </p:prevCondLst>
-              <p:nextCondLst>
-                <p:cond evt="onNext" delay="0">
-                  <p:tgtEl>
-                    <p:sldTgt/>
-                  </p:tgtEl>
-                </p:cond>
-              </p:nextCondLst>
-            </p:seq>
-          </p:childTnLst>
-        </p:cTn>
+        <p:cTn xmlns:p14="http://schemas.microsoft.com/office/powerpoint/2010/main" id="1" dur="indefinite" restart="never" nodeType="tmRoot"/>
       </p:par>
     </p:tnLst>
-    <p:bldLst>
-      <p:bldP spid="3" grpId="0" build="p"/>
-    </p:bldLst>
   </p:timing>
 </p:sld>
 </file>
 
-<file path=ppt/slides/slide16.xml><?xml version="1.0" encoding="utf-8"?>
+<file path=ppt/slides/slide15.xml><?xml version="1.0" encoding="utf-8"?>
 <p:sld xmlns:a="http://schemas.openxmlformats.org/drawingml/2006/main" xmlns:r="http://schemas.openxmlformats.org/officeDocument/2006/relationships" xmlns:p="http://schemas.openxmlformats.org/presentationml/2006/main">
   <p:cSld>
     <p:spTree>
@@ -6833,8 +5008,27 @@
           <a:p>
             <a:r>
               <a:rPr lang="en-US" dirty="0" smtClean="0"/>
-              <a:t>Advanced Queries - Java</a:t>
-            </a:r>
+              <a:t>Views vs. Indexes</a:t>
+            </a:r>
+            <a:endParaRPr lang="en-US" dirty="0"/>
+          </a:p>
+        </p:txBody>
+      </p:sp>
+      <p:sp>
+        <p:nvSpPr>
+          <p:cNvPr id="3" name="Subtitle 2"/>
+          <p:cNvSpPr>
+            <a:spLocks noGrp="1"/>
+          </p:cNvSpPr>
+          <p:nvPr>
+            <p:ph type="subTitle" idx="1"/>
+          </p:nvPr>
+        </p:nvSpPr>
+        <p:spPr/>
+        <p:txBody>
+          <a:bodyPr/>
+          <a:lstStyle/>
+          <a:p>
             <a:endParaRPr lang="en-US" dirty="0"/>
           </a:p>
         </p:txBody>
@@ -6842,7 +5036,7 @@
     </p:spTree>
     <p:extLst>
       <p:ext uri="{BB962C8B-B14F-4D97-AF65-F5344CB8AC3E}">
-        <p14:creationId xmlns:p14="http://schemas.microsoft.com/office/powerpoint/2010/main" val="3683186877"/>
+        <p14:creationId xmlns:p14="http://schemas.microsoft.com/office/powerpoint/2010/main" val="3600556044"/>
       </p:ext>
     </p:extLst>
   </p:cSld>
@@ -6859,255 +5053,7 @@
 </p:sld>
 </file>
 
-<file path=ppt/slides/slide17.xml><?xml version="1.0" encoding="utf-8"?>
-<p:sld xmlns:a="http://schemas.openxmlformats.org/drawingml/2006/main" xmlns:r="http://schemas.openxmlformats.org/officeDocument/2006/relationships" xmlns:p="http://schemas.openxmlformats.org/presentationml/2006/main">
-  <p:cSld>
-    <p:spTree>
-      <p:nvGrpSpPr>
-        <p:cNvPr id="1" name=""/>
-        <p:cNvGrpSpPr/>
-        <p:nvPr/>
-      </p:nvGrpSpPr>
-      <p:grpSpPr>
-        <a:xfrm>
-          <a:off x="0" y="0"/>
-          <a:ext cx="0" cy="0"/>
-          <a:chOff x="0" y="0"/>
-          <a:chExt cx="0" cy="0"/>
-        </a:xfrm>
-      </p:grpSpPr>
-      <p:sp>
-        <p:nvSpPr>
-          <p:cNvPr id="2" name="Title 1"/>
-          <p:cNvSpPr>
-            <a:spLocks noGrp="1"/>
-          </p:cNvSpPr>
-          <p:nvPr>
-            <p:ph type="ctrTitle"/>
-          </p:nvPr>
-        </p:nvSpPr>
-        <p:spPr/>
-        <p:txBody>
-          <a:bodyPr/>
-          <a:lstStyle/>
-          <a:p>
-            <a:r>
-              <a:rPr lang="en-US" dirty="0"/>
-              <a:t>Advanced Queries - </a:t>
-            </a:r>
-            <a:r>
-              <a:rPr lang="en-US" dirty="0" smtClean="0"/>
-              <a:t>.NET</a:t>
-            </a:r>
-            <a:endParaRPr lang="en-US" dirty="0"/>
-          </a:p>
-        </p:txBody>
-      </p:sp>
-    </p:spTree>
-    <p:extLst>
-      <p:ext uri="{BB962C8B-B14F-4D97-AF65-F5344CB8AC3E}">
-        <p14:creationId xmlns:p14="http://schemas.microsoft.com/office/powerpoint/2010/main" val="882545490"/>
-      </p:ext>
-    </p:extLst>
-  </p:cSld>
-  <p:clrMapOvr>
-    <a:masterClrMapping/>
-  </p:clrMapOvr>
-  <p:timing>
-    <p:tnLst>
-      <p:par>
-        <p:cTn xmlns:p14="http://schemas.microsoft.com/office/powerpoint/2010/main" id="1" dur="indefinite" restart="never" nodeType="tmRoot"/>
-      </p:par>
-    </p:tnLst>
-  </p:timing>
-</p:sld>
-</file>
-
-<file path=ppt/slides/slide18.xml><?xml version="1.0" encoding="utf-8"?>
-<p:sld xmlns:a="http://schemas.openxmlformats.org/drawingml/2006/main" xmlns:r="http://schemas.openxmlformats.org/officeDocument/2006/relationships" xmlns:p="http://schemas.openxmlformats.org/presentationml/2006/main">
-  <p:cSld>
-    <p:spTree>
-      <p:nvGrpSpPr>
-        <p:cNvPr id="1" name=""/>
-        <p:cNvGrpSpPr/>
-        <p:nvPr/>
-      </p:nvGrpSpPr>
-      <p:grpSpPr>
-        <a:xfrm>
-          <a:off x="0" y="0"/>
-          <a:ext cx="0" cy="0"/>
-          <a:chOff x="0" y="0"/>
-          <a:chExt cx="0" cy="0"/>
-        </a:xfrm>
-      </p:grpSpPr>
-      <p:sp>
-        <p:nvSpPr>
-          <p:cNvPr id="2" name="Title 1"/>
-          <p:cNvSpPr>
-            <a:spLocks noGrp="1"/>
-          </p:cNvSpPr>
-          <p:nvPr>
-            <p:ph type="ctrTitle"/>
-          </p:nvPr>
-        </p:nvSpPr>
-        <p:spPr/>
-        <p:txBody>
-          <a:bodyPr/>
-          <a:lstStyle/>
-          <a:p>
-            <a:r>
-              <a:rPr lang="en-US" dirty="0"/>
-              <a:t>Advanced Queries - </a:t>
-            </a:r>
-            <a:r>
-              <a:rPr lang="en-US" dirty="0" err="1" smtClean="0"/>
-              <a:t>NodeJS</a:t>
-            </a:r>
-            <a:endParaRPr lang="en-US" dirty="0"/>
-          </a:p>
-        </p:txBody>
-      </p:sp>
-    </p:spTree>
-    <p:extLst>
-      <p:ext uri="{BB962C8B-B14F-4D97-AF65-F5344CB8AC3E}">
-        <p14:creationId xmlns:p14="http://schemas.microsoft.com/office/powerpoint/2010/main" val="3686523847"/>
-      </p:ext>
-    </p:extLst>
-  </p:cSld>
-  <p:clrMapOvr>
-    <a:masterClrMapping/>
-  </p:clrMapOvr>
-  <p:timing>
-    <p:tnLst>
-      <p:par>
-        <p:cTn xmlns:p14="http://schemas.microsoft.com/office/powerpoint/2010/main" id="1" dur="indefinite" restart="never" nodeType="tmRoot"/>
-      </p:par>
-    </p:tnLst>
-  </p:timing>
-</p:sld>
-</file>
-
-<file path=ppt/slides/slide19.xml><?xml version="1.0" encoding="utf-8"?>
-<p:sld xmlns:a="http://schemas.openxmlformats.org/drawingml/2006/main" xmlns:r="http://schemas.openxmlformats.org/officeDocument/2006/relationships" xmlns:p="http://schemas.openxmlformats.org/presentationml/2006/main">
-  <p:cSld>
-    <p:spTree>
-      <p:nvGrpSpPr>
-        <p:cNvPr id="1" name=""/>
-        <p:cNvGrpSpPr/>
-        <p:nvPr/>
-      </p:nvGrpSpPr>
-      <p:grpSpPr>
-        <a:xfrm>
-          <a:off x="0" y="0"/>
-          <a:ext cx="0" cy="0"/>
-          <a:chOff x="0" y="0"/>
-          <a:chExt cx="0" cy="0"/>
-        </a:xfrm>
-      </p:grpSpPr>
-      <p:sp>
-        <p:nvSpPr>
-          <p:cNvPr id="2" name="Title 1"/>
-          <p:cNvSpPr>
-            <a:spLocks noGrp="1"/>
-          </p:cNvSpPr>
-          <p:nvPr>
-            <p:ph type="ctrTitle"/>
-          </p:nvPr>
-        </p:nvSpPr>
-        <p:spPr/>
-        <p:txBody>
-          <a:bodyPr/>
-          <a:lstStyle/>
-          <a:p>
-            <a:r>
-              <a:rPr lang="en-US" dirty="0" smtClean="0"/>
-              <a:t>View vs. Indexes</a:t>
-            </a:r>
-            <a:endParaRPr lang="en-US" dirty="0"/>
-          </a:p>
-        </p:txBody>
-      </p:sp>
-    </p:spTree>
-    <p:extLst>
-      <p:ext uri="{BB962C8B-B14F-4D97-AF65-F5344CB8AC3E}">
-        <p14:creationId xmlns:p14="http://schemas.microsoft.com/office/powerpoint/2010/main" val="1029701812"/>
-      </p:ext>
-    </p:extLst>
-  </p:cSld>
-  <p:clrMapOvr>
-    <a:masterClrMapping/>
-  </p:clrMapOvr>
-  <p:timing>
-    <p:tnLst>
-      <p:par>
-        <p:cTn xmlns:p14="http://schemas.microsoft.com/office/powerpoint/2010/main" id="1" dur="indefinite" restart="never" nodeType="tmRoot"/>
-      </p:par>
-    </p:tnLst>
-  </p:timing>
-</p:sld>
-</file>
-
-<file path=ppt/slides/slide2.xml><?xml version="1.0" encoding="utf-8"?>
-<p:sld xmlns:a="http://schemas.openxmlformats.org/drawingml/2006/main" xmlns:r="http://schemas.openxmlformats.org/officeDocument/2006/relationships" xmlns:p="http://schemas.openxmlformats.org/presentationml/2006/main">
-  <p:cSld>
-    <p:spTree>
-      <p:nvGrpSpPr>
-        <p:cNvPr id="1" name=""/>
-        <p:cNvGrpSpPr/>
-        <p:nvPr/>
-      </p:nvGrpSpPr>
-      <p:grpSpPr>
-        <a:xfrm>
-          <a:off x="0" y="0"/>
-          <a:ext cx="0" cy="0"/>
-          <a:chOff x="0" y="0"/>
-          <a:chExt cx="0" cy="0"/>
-        </a:xfrm>
-      </p:grpSpPr>
-      <p:sp>
-        <p:nvSpPr>
-          <p:cNvPr id="2" name="Title 1"/>
-          <p:cNvSpPr>
-            <a:spLocks noGrp="1"/>
-          </p:cNvSpPr>
-          <p:nvPr>
-            <p:ph type="ctrTitle"/>
-          </p:nvPr>
-        </p:nvSpPr>
-        <p:spPr/>
-        <p:txBody>
-          <a:bodyPr/>
-          <a:lstStyle/>
-          <a:p>
-            <a:r>
-              <a:rPr lang="en-US" dirty="0" smtClean="0"/>
-              <a:t>Index Management</a:t>
-            </a:r>
-            <a:endParaRPr lang="en-US" dirty="0"/>
-          </a:p>
-        </p:txBody>
-      </p:sp>
-    </p:spTree>
-    <p:extLst>
-      <p:ext uri="{BB962C8B-B14F-4D97-AF65-F5344CB8AC3E}">
-        <p14:creationId xmlns:p14="http://schemas.microsoft.com/office/powerpoint/2010/main" val="735871736"/>
-      </p:ext>
-    </p:extLst>
-  </p:cSld>
-  <p:clrMapOvr>
-    <a:masterClrMapping/>
-  </p:clrMapOvr>
-  <p:timing>
-    <p:tnLst>
-      <p:par>
-        <p:cTn xmlns:p14="http://schemas.microsoft.com/office/powerpoint/2010/main" id="1" dur="indefinite" restart="never" nodeType="tmRoot"/>
-      </p:par>
-    </p:tnLst>
-  </p:timing>
-</p:sld>
-</file>
-
-<file path=ppt/slides/slide20.xml><?xml version="1.0" encoding="utf-8"?>
+<file path=ppt/slides/slide16.xml><?xml version="1.0" encoding="utf-8"?>
 <p:sld xmlns:a="http://schemas.openxmlformats.org/drawingml/2006/main" xmlns:r="http://schemas.openxmlformats.org/officeDocument/2006/relationships" xmlns:p="http://schemas.openxmlformats.org/presentationml/2006/main">
   <p:cSld>
     <p:spTree>
@@ -7522,7 +5468,7 @@
 </p:sld>
 </file>
 
-<file path=ppt/slides/slide21.xml><?xml version="1.0" encoding="utf-8"?>
+<file path=ppt/slides/slide17.xml><?xml version="1.0" encoding="utf-8"?>
 <p:sld xmlns:a="http://schemas.openxmlformats.org/drawingml/2006/main" xmlns:r="http://schemas.openxmlformats.org/officeDocument/2006/relationships" xmlns:p="http://schemas.openxmlformats.org/presentationml/2006/main">
   <p:cSld>
     <p:spTree>
@@ -7755,7 +5701,7 @@
             <a:fld id="{2066355A-084C-D24E-9AD2-7E4FC41EA627}" type="slidenum">
               <a:rPr lang="en-US" smtClean="0"/>
               <a:pPr/>
-              <a:t>21</a:t>
+              <a:t>17</a:t>
             </a:fld>
             <a:endParaRPr lang="en-US" dirty="0"/>
           </a:p>
@@ -11379,7 +9325,7 @@
 </p:sld>
 </file>
 
-<file path=ppt/slides/slide22.xml><?xml version="1.0" encoding="utf-8"?>
+<file path=ppt/slides/slide18.xml><?xml version="1.0" encoding="utf-8"?>
 <p:sld xmlns:a="http://schemas.openxmlformats.org/drawingml/2006/main" xmlns:r="http://schemas.openxmlformats.org/officeDocument/2006/relationships" xmlns:p="http://schemas.openxmlformats.org/presentationml/2006/main">
   <p:cSld>
     <p:spTree>
@@ -13306,7 +11252,7 @@
 </p:sld>
 </file>
 
-<file path=ppt/slides/slide23.xml><?xml version="1.0" encoding="utf-8"?>
+<file path=ppt/slides/slide19.xml><?xml version="1.0" encoding="utf-8"?>
 <p:sld xmlns:a="http://schemas.openxmlformats.org/drawingml/2006/main" xmlns:r="http://schemas.openxmlformats.org/officeDocument/2006/relationships" xmlns:p="http://schemas.openxmlformats.org/presentationml/2006/main">
   <p:cSld>
     <p:spTree>
@@ -13340,15 +11286,7 @@
           <a:p>
             <a:r>
               <a:rPr lang="en-US" dirty="0" smtClean="0"/>
-              <a:t>Views </a:t>
-            </a:r>
-            <a:r>
-              <a:rPr lang="en-US" dirty="0" smtClean="0"/>
-              <a:t> &amp; New </a:t>
-            </a:r>
-            <a:r>
-              <a:rPr lang="en-US" dirty="0" smtClean="0"/>
-              <a:t>Indexes</a:t>
+              <a:t>Views  &amp; New Indexes</a:t>
             </a:r>
             <a:endParaRPr lang="en-US" dirty="0"/>
           </a:p>
@@ -14015,7 +11953,7 @@
 </p:sld>
 </file>
 
-<file path=ppt/slides/slide24.xml><?xml version="1.0" encoding="utf-8"?>
+<file path=ppt/slides/slide2.xml><?xml version="1.0" encoding="utf-8"?>
 <p:sld xmlns:a="http://schemas.openxmlformats.org/drawingml/2006/main" xmlns:r="http://schemas.openxmlformats.org/officeDocument/2006/relationships" xmlns:p="http://schemas.openxmlformats.org/presentationml/2006/main">
   <p:cSld>
     <p:spTree>
@@ -14049,6 +11987,66 @@
           <a:p>
             <a:r>
               <a:rPr lang="en-US" dirty="0" smtClean="0"/>
+              <a:t>Index Management</a:t>
+            </a:r>
+            <a:endParaRPr lang="en-US" dirty="0"/>
+          </a:p>
+        </p:txBody>
+      </p:sp>
+    </p:spTree>
+    <p:extLst>
+      <p:ext uri="{BB962C8B-B14F-4D97-AF65-F5344CB8AC3E}">
+        <p14:creationId xmlns:p14="http://schemas.microsoft.com/office/powerpoint/2010/main" val="735871736"/>
+      </p:ext>
+    </p:extLst>
+  </p:cSld>
+  <p:clrMapOvr>
+    <a:masterClrMapping/>
+  </p:clrMapOvr>
+  <p:timing>
+    <p:tnLst>
+      <p:par>
+        <p:cTn xmlns:p14="http://schemas.microsoft.com/office/powerpoint/2010/main" id="1" dur="indefinite" restart="never" nodeType="tmRoot"/>
+      </p:par>
+    </p:tnLst>
+  </p:timing>
+</p:sld>
+</file>
+
+<file path=ppt/slides/slide20.xml><?xml version="1.0" encoding="utf-8"?>
+<p:sld xmlns:a="http://schemas.openxmlformats.org/drawingml/2006/main" xmlns:r="http://schemas.openxmlformats.org/officeDocument/2006/relationships" xmlns:p="http://schemas.openxmlformats.org/presentationml/2006/main">
+  <p:cSld>
+    <p:spTree>
+      <p:nvGrpSpPr>
+        <p:cNvPr id="1" name=""/>
+        <p:cNvGrpSpPr/>
+        <p:nvPr/>
+      </p:nvGrpSpPr>
+      <p:grpSpPr>
+        <a:xfrm>
+          <a:off x="0" y="0"/>
+          <a:ext cx="0" cy="0"/>
+          <a:chOff x="0" y="0"/>
+          <a:chExt cx="0" cy="0"/>
+        </a:xfrm>
+      </p:grpSpPr>
+      <p:sp>
+        <p:nvSpPr>
+          <p:cNvPr id="2" name="Title 1"/>
+          <p:cNvSpPr>
+            <a:spLocks noGrp="1"/>
+          </p:cNvSpPr>
+          <p:nvPr>
+            <p:ph type="ctrTitle"/>
+          </p:nvPr>
+        </p:nvSpPr>
+        <p:spPr/>
+        <p:txBody>
+          <a:bodyPr/>
+          <a:lstStyle/>
+          <a:p>
+            <a:r>
+              <a:rPr lang="en-US" dirty="0" smtClean="0"/>
               <a:t>Questions?</a:t>
             </a:r>
             <a:endParaRPr lang="en-US" dirty="0"/>
@@ -14094,7 +12092,7 @@
 </p:sld>
 </file>
 
-<file path=ppt/slides/slide25.xml><?xml version="1.0" encoding="utf-8"?>
+<file path=ppt/slides/slide21.xml><?xml version="1.0" encoding="utf-8"?>
 <p:sld xmlns:a="http://schemas.openxmlformats.org/drawingml/2006/main" xmlns:r="http://schemas.openxmlformats.org/officeDocument/2006/relationships" xmlns:p="http://schemas.openxmlformats.org/presentationml/2006/main">
   <p:cSld>
     <p:spTree>
@@ -14685,7 +12683,11 @@
             </a:pPr>
             <a:r>
               <a:rPr lang="en-US" dirty="0"/>
-              <a:t>Names are unique on a per-bucket </a:t>
+              <a:t>Names are unique on a per-</a:t>
+            </a:r>
+            <a:r>
+              <a:rPr lang="en-US" dirty="0" smtClean="0"/>
+              <a:t>bucket &amp; type </a:t>
             </a:r>
             <a:r>
               <a:rPr lang="en-US" dirty="0" smtClean="0"/>
@@ -14913,157 +12915,9 @@
   <p:timing>
     <p:tnLst>
       <p:par>
-        <p:cTn xmlns:p14="http://schemas.microsoft.com/office/powerpoint/2010/main" id="1" dur="indefinite" restart="never" nodeType="tmRoot">
-          <p:childTnLst>
-            <p:seq concurrent="1" nextAc="seek">
-              <p:cTn id="2" dur="indefinite" nodeType="mainSeq">
-                <p:childTnLst>
-                  <p:par>
-                    <p:cTn id="3" fill="hold">
-                      <p:stCondLst>
-                        <p:cond delay="indefinite"/>
-                      </p:stCondLst>
-                      <p:childTnLst>
-                        <p:par>
-                          <p:cTn id="4" fill="hold">
-                            <p:stCondLst>
-                              <p:cond delay="0"/>
-                            </p:stCondLst>
-                            <p:childTnLst>
-                              <p:par>
-                                <p:cTn id="5" presetID="10" presetClass="entr" presetSubtype="0" fill="hold" grpId="0" nodeType="clickEffect">
-                                  <p:stCondLst>
-                                    <p:cond delay="0"/>
-                                  </p:stCondLst>
-                                  <p:childTnLst>
-                                    <p:set>
-                                      <p:cBhvr>
-                                        <p:cTn id="6" dur="1" fill="hold">
-                                          <p:stCondLst>
-                                            <p:cond delay="0"/>
-                                          </p:stCondLst>
-                                        </p:cTn>
-                                        <p:tgtEl>
-                                          <p:spTgt spid="3">
-                                            <p:txEl>
-                                              <p:pRg st="0" end="0"/>
-                                            </p:txEl>
-                                          </p:spTgt>
-                                        </p:tgtEl>
-                                        <p:attrNameLst>
-                                          <p:attrName>style.visibility</p:attrName>
-                                        </p:attrNameLst>
-                                      </p:cBhvr>
-                                      <p:to>
-                                        <p:strVal val="visible"/>
-                                      </p:to>
-                                    </p:set>
-                                    <p:animEffect transition="in" filter="fade">
-                                      <p:cBhvr>
-                                        <p:cTn id="7" dur="500"/>
-                                        <p:tgtEl>
-                                          <p:spTgt spid="3">
-                                            <p:txEl>
-                                              <p:pRg st="0" end="0"/>
-                                            </p:txEl>
-                                          </p:spTgt>
-                                        </p:tgtEl>
-                                      </p:cBhvr>
-                                    </p:animEffect>
-                                  </p:childTnLst>
-                                </p:cTn>
-                              </p:par>
-                            </p:childTnLst>
-                          </p:cTn>
-                        </p:par>
-                      </p:childTnLst>
-                    </p:cTn>
-                  </p:par>
-                  <p:par>
-                    <p:cTn id="8" fill="hold">
-                      <p:stCondLst>
-                        <p:cond delay="indefinite"/>
-                      </p:stCondLst>
-                      <p:childTnLst>
-                        <p:par>
-                          <p:cTn id="9" fill="hold">
-                            <p:stCondLst>
-                              <p:cond delay="0"/>
-                            </p:stCondLst>
-                            <p:childTnLst>
-                              <p:par>
-                                <p:cTn id="10" presetID="10" presetClass="entr" presetSubtype="0" fill="hold" grpId="0" nodeType="clickEffect">
-                                  <p:stCondLst>
-                                    <p:cond delay="0"/>
-                                  </p:stCondLst>
-                                  <p:childTnLst>
-                                    <p:set>
-                                      <p:cBhvr>
-                                        <p:cTn id="11" dur="1" fill="hold">
-                                          <p:stCondLst>
-                                            <p:cond delay="0"/>
-                                          </p:stCondLst>
-                                        </p:cTn>
-                                        <p:tgtEl>
-                                          <p:spTgt spid="3">
-                                            <p:txEl>
-                                              <p:pRg st="1" end="1"/>
-                                            </p:txEl>
-                                          </p:spTgt>
-                                        </p:tgtEl>
-                                        <p:attrNameLst>
-                                          <p:attrName>style.visibility</p:attrName>
-                                        </p:attrNameLst>
-                                      </p:cBhvr>
-                                      <p:to>
-                                        <p:strVal val="visible"/>
-                                      </p:to>
-                                    </p:set>
-                                    <p:animEffect transition="in" filter="fade">
-                                      <p:cBhvr>
-                                        <p:cTn id="12" dur="500"/>
-                                        <p:tgtEl>
-                                          <p:spTgt spid="3">
-                                            <p:txEl>
-                                              <p:pRg st="1" end="1"/>
-                                            </p:txEl>
-                                          </p:spTgt>
-                                        </p:tgtEl>
-                                      </p:cBhvr>
-                                    </p:animEffect>
-                                  </p:childTnLst>
-                                </p:cTn>
-                              </p:par>
-                            </p:childTnLst>
-                          </p:cTn>
-                        </p:par>
-                      </p:childTnLst>
-                    </p:cTn>
-                  </p:par>
-                </p:childTnLst>
-              </p:cTn>
-              <p:prevCondLst>
-                <p:cond evt="onPrev" delay="0">
-                  <p:tgtEl>
-                    <p:sldTgt/>
-                  </p:tgtEl>
-                </p:cond>
-              </p:prevCondLst>
-              <p:nextCondLst>
-                <p:cond evt="onNext" delay="0">
-                  <p:tgtEl>
-                    <p:sldTgt/>
-                  </p:tgtEl>
-                </p:cond>
-              </p:nextCondLst>
-            </p:seq>
-          </p:childTnLst>
-        </p:cTn>
+        <p:cTn xmlns:p14="http://schemas.microsoft.com/office/powerpoint/2010/main" id="1" dur="indefinite" restart="never" nodeType="tmRoot"/>
       </p:par>
     </p:tnLst>
-    <p:bldLst>
-      <p:bldP spid="3" grpId="0" build="p"/>
-    </p:bldLst>
   </p:timing>
 </p:sld>
 </file>
@@ -15304,157 +13158,9 @@
   <p:timing>
     <p:tnLst>
       <p:par>
-        <p:cTn xmlns:p14="http://schemas.microsoft.com/office/powerpoint/2010/main" id="1" dur="indefinite" restart="never" nodeType="tmRoot">
-          <p:childTnLst>
-            <p:seq concurrent="1" nextAc="seek">
-              <p:cTn id="2" dur="indefinite" nodeType="mainSeq">
-                <p:childTnLst>
-                  <p:par>
-                    <p:cTn id="3" fill="hold">
-                      <p:stCondLst>
-                        <p:cond delay="indefinite"/>
-                      </p:stCondLst>
-                      <p:childTnLst>
-                        <p:par>
-                          <p:cTn id="4" fill="hold">
-                            <p:stCondLst>
-                              <p:cond delay="0"/>
-                            </p:stCondLst>
-                            <p:childTnLst>
-                              <p:par>
-                                <p:cTn id="5" presetID="10" presetClass="entr" presetSubtype="0" fill="hold" grpId="0" nodeType="clickEffect">
-                                  <p:stCondLst>
-                                    <p:cond delay="0"/>
-                                  </p:stCondLst>
-                                  <p:childTnLst>
-                                    <p:set>
-                                      <p:cBhvr>
-                                        <p:cTn id="6" dur="1" fill="hold">
-                                          <p:stCondLst>
-                                            <p:cond delay="0"/>
-                                          </p:stCondLst>
-                                        </p:cTn>
-                                        <p:tgtEl>
-                                          <p:spTgt spid="3">
-                                            <p:txEl>
-                                              <p:pRg st="0" end="0"/>
-                                            </p:txEl>
-                                          </p:spTgt>
-                                        </p:tgtEl>
-                                        <p:attrNameLst>
-                                          <p:attrName>style.visibility</p:attrName>
-                                        </p:attrNameLst>
-                                      </p:cBhvr>
-                                      <p:to>
-                                        <p:strVal val="visible"/>
-                                      </p:to>
-                                    </p:set>
-                                    <p:animEffect transition="in" filter="fade">
-                                      <p:cBhvr>
-                                        <p:cTn id="7" dur="500"/>
-                                        <p:tgtEl>
-                                          <p:spTgt spid="3">
-                                            <p:txEl>
-                                              <p:pRg st="0" end="0"/>
-                                            </p:txEl>
-                                          </p:spTgt>
-                                        </p:tgtEl>
-                                      </p:cBhvr>
-                                    </p:animEffect>
-                                  </p:childTnLst>
-                                </p:cTn>
-                              </p:par>
-                            </p:childTnLst>
-                          </p:cTn>
-                        </p:par>
-                      </p:childTnLst>
-                    </p:cTn>
-                  </p:par>
-                  <p:par>
-                    <p:cTn id="8" fill="hold">
-                      <p:stCondLst>
-                        <p:cond delay="indefinite"/>
-                      </p:stCondLst>
-                      <p:childTnLst>
-                        <p:par>
-                          <p:cTn id="9" fill="hold">
-                            <p:stCondLst>
-                              <p:cond delay="0"/>
-                            </p:stCondLst>
-                            <p:childTnLst>
-                              <p:par>
-                                <p:cTn id="10" presetID="10" presetClass="entr" presetSubtype="0" fill="hold" grpId="0" nodeType="clickEffect">
-                                  <p:stCondLst>
-                                    <p:cond delay="0"/>
-                                  </p:stCondLst>
-                                  <p:childTnLst>
-                                    <p:set>
-                                      <p:cBhvr>
-                                        <p:cTn id="11" dur="1" fill="hold">
-                                          <p:stCondLst>
-                                            <p:cond delay="0"/>
-                                          </p:stCondLst>
-                                        </p:cTn>
-                                        <p:tgtEl>
-                                          <p:spTgt spid="3">
-                                            <p:txEl>
-                                              <p:pRg st="1" end="1"/>
-                                            </p:txEl>
-                                          </p:spTgt>
-                                        </p:tgtEl>
-                                        <p:attrNameLst>
-                                          <p:attrName>style.visibility</p:attrName>
-                                        </p:attrNameLst>
-                                      </p:cBhvr>
-                                      <p:to>
-                                        <p:strVal val="visible"/>
-                                      </p:to>
-                                    </p:set>
-                                    <p:animEffect transition="in" filter="fade">
-                                      <p:cBhvr>
-                                        <p:cTn id="12" dur="500"/>
-                                        <p:tgtEl>
-                                          <p:spTgt spid="3">
-                                            <p:txEl>
-                                              <p:pRg st="1" end="1"/>
-                                            </p:txEl>
-                                          </p:spTgt>
-                                        </p:tgtEl>
-                                      </p:cBhvr>
-                                    </p:animEffect>
-                                  </p:childTnLst>
-                                </p:cTn>
-                              </p:par>
-                            </p:childTnLst>
-                          </p:cTn>
-                        </p:par>
-                      </p:childTnLst>
-                    </p:cTn>
-                  </p:par>
-                </p:childTnLst>
-              </p:cTn>
-              <p:prevCondLst>
-                <p:cond evt="onPrev" delay="0">
-                  <p:tgtEl>
-                    <p:sldTgt/>
-                  </p:tgtEl>
-                </p:cond>
-              </p:prevCondLst>
-              <p:nextCondLst>
-                <p:cond evt="onNext" delay="0">
-                  <p:tgtEl>
-                    <p:sldTgt/>
-                  </p:tgtEl>
-                </p:cond>
-              </p:nextCondLst>
-            </p:seq>
-          </p:childTnLst>
-        </p:cTn>
+        <p:cTn xmlns:p14="http://schemas.microsoft.com/office/powerpoint/2010/main" id="1" dur="indefinite" restart="never" nodeType="tmRoot"/>
       </p:par>
     </p:tnLst>
-    <p:bldLst>
-      <p:bldP spid="3" grpId="0" build="p"/>
-    </p:bldLst>
   </p:timing>
 </p:sld>
 </file>
@@ -15994,157 +13700,9 @@
   <p:timing>
     <p:tnLst>
       <p:par>
-        <p:cTn xmlns:p14="http://schemas.microsoft.com/office/powerpoint/2010/main" id="1" dur="indefinite" restart="never" nodeType="tmRoot">
-          <p:childTnLst>
-            <p:seq concurrent="1" nextAc="seek">
-              <p:cTn id="2" dur="indefinite" nodeType="mainSeq">
-                <p:childTnLst>
-                  <p:par>
-                    <p:cTn id="3" fill="hold">
-                      <p:stCondLst>
-                        <p:cond delay="indefinite"/>
-                      </p:stCondLst>
-                      <p:childTnLst>
-                        <p:par>
-                          <p:cTn id="4" fill="hold">
-                            <p:stCondLst>
-                              <p:cond delay="0"/>
-                            </p:stCondLst>
-                            <p:childTnLst>
-                              <p:par>
-                                <p:cTn id="5" presetID="10" presetClass="entr" presetSubtype="0" fill="hold" grpId="0" nodeType="clickEffect">
-                                  <p:stCondLst>
-                                    <p:cond delay="0"/>
-                                  </p:stCondLst>
-                                  <p:childTnLst>
-                                    <p:set>
-                                      <p:cBhvr>
-                                        <p:cTn id="6" dur="1" fill="hold">
-                                          <p:stCondLst>
-                                            <p:cond delay="0"/>
-                                          </p:stCondLst>
-                                        </p:cTn>
-                                        <p:tgtEl>
-                                          <p:spTgt spid="3">
-                                            <p:txEl>
-                                              <p:pRg st="0" end="0"/>
-                                            </p:txEl>
-                                          </p:spTgt>
-                                        </p:tgtEl>
-                                        <p:attrNameLst>
-                                          <p:attrName>style.visibility</p:attrName>
-                                        </p:attrNameLst>
-                                      </p:cBhvr>
-                                      <p:to>
-                                        <p:strVal val="visible"/>
-                                      </p:to>
-                                    </p:set>
-                                    <p:animEffect transition="in" filter="fade">
-                                      <p:cBhvr>
-                                        <p:cTn id="7" dur="500"/>
-                                        <p:tgtEl>
-                                          <p:spTgt spid="3">
-                                            <p:txEl>
-                                              <p:pRg st="0" end="0"/>
-                                            </p:txEl>
-                                          </p:spTgt>
-                                        </p:tgtEl>
-                                      </p:cBhvr>
-                                    </p:animEffect>
-                                  </p:childTnLst>
-                                </p:cTn>
-                              </p:par>
-                            </p:childTnLst>
-                          </p:cTn>
-                        </p:par>
-                      </p:childTnLst>
-                    </p:cTn>
-                  </p:par>
-                  <p:par>
-                    <p:cTn id="8" fill="hold">
-                      <p:stCondLst>
-                        <p:cond delay="indefinite"/>
-                      </p:stCondLst>
-                      <p:childTnLst>
-                        <p:par>
-                          <p:cTn id="9" fill="hold">
-                            <p:stCondLst>
-                              <p:cond delay="0"/>
-                            </p:stCondLst>
-                            <p:childTnLst>
-                              <p:par>
-                                <p:cTn id="10" presetID="10" presetClass="entr" presetSubtype="0" fill="hold" grpId="0" nodeType="clickEffect">
-                                  <p:stCondLst>
-                                    <p:cond delay="0"/>
-                                  </p:stCondLst>
-                                  <p:childTnLst>
-                                    <p:set>
-                                      <p:cBhvr>
-                                        <p:cTn id="11" dur="1" fill="hold">
-                                          <p:stCondLst>
-                                            <p:cond delay="0"/>
-                                          </p:stCondLst>
-                                        </p:cTn>
-                                        <p:tgtEl>
-                                          <p:spTgt spid="3">
-                                            <p:txEl>
-                                              <p:pRg st="3" end="3"/>
-                                            </p:txEl>
-                                          </p:spTgt>
-                                        </p:tgtEl>
-                                        <p:attrNameLst>
-                                          <p:attrName>style.visibility</p:attrName>
-                                        </p:attrNameLst>
-                                      </p:cBhvr>
-                                      <p:to>
-                                        <p:strVal val="visible"/>
-                                      </p:to>
-                                    </p:set>
-                                    <p:animEffect transition="in" filter="fade">
-                                      <p:cBhvr>
-                                        <p:cTn id="12" dur="500"/>
-                                        <p:tgtEl>
-                                          <p:spTgt spid="3">
-                                            <p:txEl>
-                                              <p:pRg st="3" end="3"/>
-                                            </p:txEl>
-                                          </p:spTgt>
-                                        </p:tgtEl>
-                                      </p:cBhvr>
-                                    </p:animEffect>
-                                  </p:childTnLst>
-                                </p:cTn>
-                              </p:par>
-                            </p:childTnLst>
-                          </p:cTn>
-                        </p:par>
-                      </p:childTnLst>
-                    </p:cTn>
-                  </p:par>
-                </p:childTnLst>
-              </p:cTn>
-              <p:prevCondLst>
-                <p:cond evt="onPrev" delay="0">
-                  <p:tgtEl>
-                    <p:sldTgt/>
-                  </p:tgtEl>
-                </p:cond>
-              </p:prevCondLst>
-              <p:nextCondLst>
-                <p:cond evt="onNext" delay="0">
-                  <p:tgtEl>
-                    <p:sldTgt/>
-                  </p:tgtEl>
-                </p:cond>
-              </p:nextCondLst>
-            </p:seq>
-          </p:childTnLst>
-        </p:cTn>
+        <p:cTn xmlns:p14="http://schemas.microsoft.com/office/powerpoint/2010/main" id="1" dur="indefinite" restart="never" nodeType="tmRoot"/>
       </p:par>
     </p:tnLst>
-    <p:bldLst>
-      <p:bldP spid="3" grpId="0" build="p"/>
-    </p:bldLst>
   </p:timing>
 </p:sld>
 </file>

</xml_diff>